<commit_message>
wip : convert to Spring Boot
</commit_message>
<xml_diff>
--- a/A_Livrables/MOREL_Olivier_4_slides_062022.pptx
+++ b/A_Livrables/MOREL_Olivier_4_slides_062022.pptx
@@ -233,7 +233,7 @@
           <a:p>
             <a:fld id="{5C7AB521-C1B9-49E9-9F3E-FC8BC84D64FF}" type="datetimeFigureOut">
               <a:rPr lang="fr-FR" smtClean="0"/>
-              <a:t>23/07/2022</a:t>
+              <a:t>27/07/2022</a:t>
             </a:fld>
             <a:endParaRPr lang="fr-FR"/>
           </a:p>
@@ -3528,7 +3528,7 @@
           <a:p>
             <a:fld id="{BAAA5C57-0FC7-4809-8DE0-9FB8CD72F45B}" type="datetime1">
               <a:rPr lang="fr-FR" smtClean="0"/>
-              <a:t>23/07/2022</a:t>
+              <a:t>27/07/2022</a:t>
             </a:fld>
             <a:endParaRPr lang="fr-FR"/>
           </a:p>
@@ -3726,7 +3726,7 @@
           <a:p>
             <a:fld id="{D6394C11-AF79-46EB-8628-81685E730859}" type="datetime1">
               <a:rPr lang="fr-FR" smtClean="0"/>
-              <a:t>23/07/2022</a:t>
+              <a:t>27/07/2022</a:t>
             </a:fld>
             <a:endParaRPr lang="fr-FR"/>
           </a:p>
@@ -3934,7 +3934,7 @@
           <a:p>
             <a:fld id="{195502D9-FD20-4B10-85D7-D0A36058A8A9}" type="datetime1">
               <a:rPr lang="fr-FR" smtClean="0"/>
-              <a:t>23/07/2022</a:t>
+              <a:t>27/07/2022</a:t>
             </a:fld>
             <a:endParaRPr lang="fr-FR"/>
           </a:p>
@@ -4132,7 +4132,7 @@
           <a:p>
             <a:fld id="{57684602-8624-4EB1-9235-5DD654D82F09}" type="datetime1">
               <a:rPr lang="fr-FR" smtClean="0"/>
-              <a:t>23/07/2022</a:t>
+              <a:t>27/07/2022</a:t>
             </a:fld>
             <a:endParaRPr lang="fr-FR"/>
           </a:p>
@@ -4407,7 +4407,7 @@
           <a:p>
             <a:fld id="{E41784DB-987A-45B6-9772-C36DF83C3C02}" type="datetime1">
               <a:rPr lang="fr-FR" smtClean="0"/>
-              <a:t>23/07/2022</a:t>
+              <a:t>27/07/2022</a:t>
             </a:fld>
             <a:endParaRPr lang="fr-FR"/>
           </a:p>
@@ -4672,7 +4672,7 @@
           <a:p>
             <a:fld id="{E595D999-DF18-4099-8D0D-BC2297023F60}" type="datetime1">
               <a:rPr lang="fr-FR" smtClean="0"/>
-              <a:t>23/07/2022</a:t>
+              <a:t>27/07/2022</a:t>
             </a:fld>
             <a:endParaRPr lang="fr-FR"/>
           </a:p>
@@ -5084,7 +5084,7 @@
           <a:p>
             <a:fld id="{871871E2-9510-47F9-812F-D25C732F0E19}" type="datetime1">
               <a:rPr lang="fr-FR" smtClean="0"/>
-              <a:t>23/07/2022</a:t>
+              <a:t>27/07/2022</a:t>
             </a:fld>
             <a:endParaRPr lang="fr-FR"/>
           </a:p>
@@ -5225,7 +5225,7 @@
           <a:p>
             <a:fld id="{76383D6D-8978-42A7-ABAD-D463CD4AD0CE}" type="datetime1">
               <a:rPr lang="fr-FR" smtClean="0"/>
-              <a:t>23/07/2022</a:t>
+              <a:t>27/07/2022</a:t>
             </a:fld>
             <a:endParaRPr lang="fr-FR"/>
           </a:p>
@@ -5338,7 +5338,7 @@
           <a:p>
             <a:fld id="{C6571784-1182-4604-B720-0FE25B0575C8}" type="datetime1">
               <a:rPr lang="fr-FR" smtClean="0"/>
-              <a:t>23/07/2022</a:t>
+              <a:t>27/07/2022</a:t>
             </a:fld>
             <a:endParaRPr lang="fr-FR"/>
           </a:p>
@@ -5649,7 +5649,7 @@
           <a:p>
             <a:fld id="{BCE52CFF-6AA8-4EB4-A5AB-E9E18645216B}" type="datetime1">
               <a:rPr lang="fr-FR" smtClean="0"/>
-              <a:t>23/07/2022</a:t>
+              <a:t>27/07/2022</a:t>
             </a:fld>
             <a:endParaRPr lang="fr-FR"/>
           </a:p>
@@ -5937,7 +5937,7 @@
           <a:p>
             <a:fld id="{5EA3A904-D97A-4686-B1B2-2D6167D64CF7}" type="datetime1">
               <a:rPr lang="fr-FR" smtClean="0"/>
-              <a:t>23/07/2022</a:t>
+              <a:t>27/07/2022</a:t>
             </a:fld>
             <a:endParaRPr lang="fr-FR"/>
           </a:p>
@@ -6178,7 +6178,7 @@
           <a:p>
             <a:fld id="{5CD26E4C-FA77-42C7-B5FC-F70A55A82F63}" type="datetime1">
               <a:rPr lang="fr-FR" smtClean="0"/>
-              <a:t>23/07/2022</a:t>
+              <a:t>27/07/2022</a:t>
             </a:fld>
             <a:endParaRPr lang="fr-FR"/>
           </a:p>
@@ -14242,7 +14242,7 @@
               <a:rPr lang="fr-FR" sz="1400">
                 <a:latin typeface="Consolas" panose="020B0609020204030204" pitchFamily="49" charset="0"/>
               </a:rPr>
-              <a:t> nombre d’adulte et d’enfant est:</a:t>
+              <a:t> le nombre d’adulte et d’enfant est:</a:t>
             </a:r>
           </a:p>
           <a:p>
@@ -14467,22 +14467,21 @@
               <a:rPr lang="fr-FR" sz="1400">
                 <a:latin typeface="Consolas" panose="020B0609020204030204" pitchFamily="49" charset="0"/>
               </a:rPr>
-              <a:t>nombre d’adulte = </a:t>
-            </a:r>
-            <a:r>
-              <a:rPr lang="fr-FR" sz="1400">
-                <a:solidFill>
-                  <a:srgbClr val="FF0000"/>
-                </a:solidFill>
-                <a:latin typeface="Consolas" panose="020B0609020204030204" pitchFamily="49" charset="0"/>
-              </a:rPr>
-              <a:t>  </a:t>
-            </a:r>
-            <a:r>
-              <a:rPr lang="fr-FR" sz="1400">
-                <a:latin typeface="Consolas" panose="020B0609020204030204" pitchFamily="49" charset="0"/>
-              </a:rPr>
-              <a:t>et nombre d’enfant = </a:t>
+              <a:t>le nombre d’adulte et d’enfant est:</a:t>
+            </a:r>
+          </a:p>
+          <a:p>
+            <a:pPr marL="0" indent="0" defTabSz="360000">
+              <a:spcBef>
+                <a:spcPts val="0"/>
+              </a:spcBef>
+              <a:buNone/>
+            </a:pPr>
+            <a:r>
+              <a:rPr lang="fr-FR" sz="1400">
+                <a:latin typeface="Consolas" panose="020B0609020204030204" pitchFamily="49" charset="0"/>
+              </a:rPr>
+              <a:t> </a:t>
             </a:r>
             <a:r>
               <a:rPr lang="fr-FR" sz="1400">
@@ -17736,7 +17735,21 @@
               <a:rPr lang="fr-FR" sz="1400">
                 <a:latin typeface="Consolas" panose="020B0609020204030204" pitchFamily="49" charset="0"/>
               </a:rPr>
-              <a:t>	|"1"  |	</a:t>
+              <a:t>	|"1"  |</a:t>
+            </a:r>
+          </a:p>
+          <a:p>
+            <a:pPr marL="0" indent="0" defTabSz="360000">
+              <a:spcBef>
+                <a:spcPts val="0"/>
+              </a:spcBef>
+              <a:buNone/>
+            </a:pPr>
+            <a:r>
+              <a:rPr lang="fr-FR" sz="1400">
+                <a:latin typeface="Consolas" panose="020B0609020204030204" pitchFamily="49" charset="0"/>
+              </a:rPr>
+              <a:t>	</a:t>
             </a:r>
           </a:p>
           <a:p>

</xml_diff>

<commit_message>
feat : UML, service&repository interfaces and controller endpoints written
</commit_message>
<xml_diff>
--- a/A_Livrables/MOREL_Olivier_4_slides_062022.pptx
+++ b/A_Livrables/MOREL_Olivier_4_slides_062022.pptx
@@ -233,7 +233,7 @@
           <a:p>
             <a:fld id="{5C7AB521-C1B9-49E9-9F3E-FC8BC84D64FF}" type="datetimeFigureOut">
               <a:rPr lang="fr-FR" smtClean="0"/>
-              <a:t>30/07/2022</a:t>
+              <a:t>13/08/2022</a:t>
             </a:fld>
             <a:endParaRPr lang="fr-FR"/>
           </a:p>
@@ -3528,7 +3528,7 @@
           <a:p>
             <a:fld id="{BAAA5C57-0FC7-4809-8DE0-9FB8CD72F45B}" type="datetime1">
               <a:rPr lang="fr-FR" smtClean="0"/>
-              <a:t>30/07/2022</a:t>
+              <a:t>13/08/2022</a:t>
             </a:fld>
             <a:endParaRPr lang="fr-FR"/>
           </a:p>
@@ -3726,7 +3726,7 @@
           <a:p>
             <a:fld id="{D6394C11-AF79-46EB-8628-81685E730859}" type="datetime1">
               <a:rPr lang="fr-FR" smtClean="0"/>
-              <a:t>30/07/2022</a:t>
+              <a:t>13/08/2022</a:t>
             </a:fld>
             <a:endParaRPr lang="fr-FR"/>
           </a:p>
@@ -3934,7 +3934,7 @@
           <a:p>
             <a:fld id="{195502D9-FD20-4B10-85D7-D0A36058A8A9}" type="datetime1">
               <a:rPr lang="fr-FR" smtClean="0"/>
-              <a:t>30/07/2022</a:t>
+              <a:t>13/08/2022</a:t>
             </a:fld>
             <a:endParaRPr lang="fr-FR"/>
           </a:p>
@@ -4132,7 +4132,7 @@
           <a:p>
             <a:fld id="{57684602-8624-4EB1-9235-5DD654D82F09}" type="datetime1">
               <a:rPr lang="fr-FR" smtClean="0"/>
-              <a:t>30/07/2022</a:t>
+              <a:t>13/08/2022</a:t>
             </a:fld>
             <a:endParaRPr lang="fr-FR"/>
           </a:p>
@@ -4407,7 +4407,7 @@
           <a:p>
             <a:fld id="{E41784DB-987A-45B6-9772-C36DF83C3C02}" type="datetime1">
               <a:rPr lang="fr-FR" smtClean="0"/>
-              <a:t>30/07/2022</a:t>
+              <a:t>13/08/2022</a:t>
             </a:fld>
             <a:endParaRPr lang="fr-FR"/>
           </a:p>
@@ -4672,7 +4672,7 @@
           <a:p>
             <a:fld id="{E595D999-DF18-4099-8D0D-BC2297023F60}" type="datetime1">
               <a:rPr lang="fr-FR" smtClean="0"/>
-              <a:t>30/07/2022</a:t>
+              <a:t>13/08/2022</a:t>
             </a:fld>
             <a:endParaRPr lang="fr-FR"/>
           </a:p>
@@ -5084,7 +5084,7 @@
           <a:p>
             <a:fld id="{871871E2-9510-47F9-812F-D25C732F0E19}" type="datetime1">
               <a:rPr lang="fr-FR" smtClean="0"/>
-              <a:t>30/07/2022</a:t>
+              <a:t>13/08/2022</a:t>
             </a:fld>
             <a:endParaRPr lang="fr-FR"/>
           </a:p>
@@ -5225,7 +5225,7 @@
           <a:p>
             <a:fld id="{76383D6D-8978-42A7-ABAD-D463CD4AD0CE}" type="datetime1">
               <a:rPr lang="fr-FR" smtClean="0"/>
-              <a:t>30/07/2022</a:t>
+              <a:t>13/08/2022</a:t>
             </a:fld>
             <a:endParaRPr lang="fr-FR"/>
           </a:p>
@@ -5338,7 +5338,7 @@
           <a:p>
             <a:fld id="{C6571784-1182-4604-B720-0FE25B0575C8}" type="datetime1">
               <a:rPr lang="fr-FR" smtClean="0"/>
-              <a:t>30/07/2022</a:t>
+              <a:t>13/08/2022</a:t>
             </a:fld>
             <a:endParaRPr lang="fr-FR"/>
           </a:p>
@@ -5649,7 +5649,7 @@
           <a:p>
             <a:fld id="{BCE52CFF-6AA8-4EB4-A5AB-E9E18645216B}" type="datetime1">
               <a:rPr lang="fr-FR" smtClean="0"/>
-              <a:t>30/07/2022</a:t>
+              <a:t>13/08/2022</a:t>
             </a:fld>
             <a:endParaRPr lang="fr-FR"/>
           </a:p>
@@ -5937,7 +5937,7 @@
           <a:p>
             <a:fld id="{5EA3A904-D97A-4686-B1B2-2D6167D64CF7}" type="datetime1">
               <a:rPr lang="fr-FR" smtClean="0"/>
-              <a:t>30/07/2022</a:t>
+              <a:t>13/08/2022</a:t>
             </a:fld>
             <a:endParaRPr lang="fr-FR"/>
           </a:p>
@@ -6178,7 +6178,7 @@
           <a:p>
             <a:fld id="{5CD26E4C-FA77-42C7-B5FC-F70A55A82F63}" type="datetime1">
               <a:rPr lang="fr-FR" smtClean="0"/>
-              <a:t>30/07/2022</a:t>
+              <a:t>13/08/2022</a:t>
             </a:fld>
             <a:endParaRPr lang="fr-FR"/>
           </a:p>

</xml_diff>

<commit_message>
wip : minimal coding to understand how coding test 'cause lack of experience
</commit_message>
<xml_diff>
--- a/A_Livrables/MOREL_Olivier_4_slides_062022.pptx
+++ b/A_Livrables/MOREL_Olivier_4_slides_062022.pptx
@@ -5,7 +5,7 @@
     <p:sldMasterId id="2147483648" r:id="rId1"/>
   </p:sldMasterIdLst>
   <p:notesMasterIdLst>
-    <p:notesMasterId r:id="rId24"/>
+    <p:notesMasterId r:id="rId25"/>
   </p:notesMasterIdLst>
   <p:sldIdLst>
     <p:sldId id="256" r:id="rId2"/>
@@ -20,16 +20,17 @@
     <p:sldId id="277" r:id="rId11"/>
     <p:sldId id="278" r:id="rId12"/>
     <p:sldId id="279" r:id="rId13"/>
-    <p:sldId id="257" r:id="rId14"/>
-    <p:sldId id="258" r:id="rId15"/>
-    <p:sldId id="261" r:id="rId16"/>
-    <p:sldId id="262" r:id="rId17"/>
-    <p:sldId id="270" r:id="rId18"/>
-    <p:sldId id="263" r:id="rId19"/>
-    <p:sldId id="264" r:id="rId20"/>
-    <p:sldId id="265" r:id="rId21"/>
-    <p:sldId id="266" r:id="rId22"/>
-    <p:sldId id="267" r:id="rId23"/>
+    <p:sldId id="280" r:id="rId14"/>
+    <p:sldId id="257" r:id="rId15"/>
+    <p:sldId id="258" r:id="rId16"/>
+    <p:sldId id="261" r:id="rId17"/>
+    <p:sldId id="262" r:id="rId18"/>
+    <p:sldId id="270" r:id="rId19"/>
+    <p:sldId id="263" r:id="rId20"/>
+    <p:sldId id="264" r:id="rId21"/>
+    <p:sldId id="265" r:id="rId22"/>
+    <p:sldId id="266" r:id="rId23"/>
+    <p:sldId id="267" r:id="rId24"/>
   </p:sldIdLst>
   <p:sldSz cx="12192000" cy="6858000"/>
   <p:notesSz cx="6858000" cy="9144000"/>
@@ -976,77 +977,18 @@
           <a:p>
             <a:r>
               <a:rPr lang="fr-FR" dirty="0"/>
-              <a:t>Fork du </a:t>
-            </a:r>
-            <a:r>
-              <a:rPr lang="fr-FR" dirty="0" err="1"/>
-              <a:t>dépot</a:t>
-            </a:r>
-            <a:r>
-              <a:rPr lang="fr-FR" dirty="0"/>
-              <a:t> vers mon repository GitHub</a:t>
-            </a:r>
-          </a:p>
-          <a:p>
-            <a:r>
-              <a:rPr lang="fr-FR" dirty="0"/>
-              <a:t>Clone de mon repository vers mon ordinateur</a:t>
-            </a:r>
-          </a:p>
-          <a:p>
-            <a:r>
-              <a:rPr lang="fr-FR" dirty="0"/>
-              <a:t>Importation dans </a:t>
-            </a:r>
-            <a:r>
-              <a:rPr lang="fr-FR" dirty="0" err="1"/>
-              <a:t>eclipse</a:t>
-            </a:r>
-            <a:r>
-              <a:rPr lang="fr-FR" dirty="0"/>
-              <a:t> et </a:t>
-            </a:r>
-            <a:r>
-              <a:rPr lang="fr-FR" dirty="0" err="1"/>
-              <a:t>GitBash</a:t>
-            </a:r>
-            <a:r>
-              <a:rPr lang="fr-FR" dirty="0"/>
-              <a:t> (</a:t>
-            </a:r>
-            <a:r>
-              <a:rPr lang="fr-FR" dirty="0" err="1"/>
-              <a:t>BashShell</a:t>
-            </a:r>
-            <a:r>
-              <a:rPr lang="fr-FR" dirty="0"/>
-              <a:t>)</a:t>
+              <a:t>Le problème : </a:t>
+            </a:r>
+            <a:r>
+              <a:rPr lang="fr-FR" b="0" i="0" dirty="0">
+                <a:effectLst/>
+                <a:latin typeface="Montserrat"/>
+              </a:rPr>
+              <a:t>décompte des symptômes incorrect</a:t>
             </a:r>
           </a:p>
           <a:p>
             <a:endParaRPr lang="fr-FR" dirty="0"/>
-          </a:p>
-          <a:p>
-            <a:r>
-              <a:rPr lang="fr-FR" dirty="0"/>
-              <a:t>Recherche « </a:t>
-            </a:r>
-            <a:r>
-              <a:rPr lang="fr-FR" dirty="0" err="1"/>
-              <a:t>user.dir</a:t>
-            </a:r>
-            <a:r>
-              <a:rPr lang="fr-FR" dirty="0"/>
-              <a:t> » google -&gt; </a:t>
-            </a:r>
-            <a:r>
-              <a:rPr lang="fr-FR" dirty="0" err="1"/>
-              <a:t>StackOverFlow</a:t>
-            </a:r>
-            <a:r>
-              <a:rPr lang="fr-FR" dirty="0"/>
-              <a:t> -&gt; doc java oracle</a:t>
-            </a:r>
           </a:p>
         </p:txBody>
       </p:sp>
@@ -1076,7 +1018,7 @@
     </p:spTree>
     <p:extLst>
       <p:ext uri="{BB962C8B-B14F-4D97-AF65-F5344CB8AC3E}">
-        <p14:creationId xmlns:p14="http://schemas.microsoft.com/office/powerpoint/2010/main" val="2798657783"/>
+        <p14:creationId xmlns:p14="http://schemas.microsoft.com/office/powerpoint/2010/main" val="829223417"/>
       </p:ext>
     </p:extLst>
   </p:cSld>
@@ -1132,519 +1074,77 @@
           <a:p>
             <a:r>
               <a:rPr lang="fr-FR" dirty="0"/>
-              <a:t>Template MVC avec DAO :</a:t>
-            </a:r>
-          </a:p>
-          <a:p>
-            <a:pPr marL="171450" indent="-171450">
-              <a:buFont typeface="Arial" panose="020B0604020202020204" pitchFamily="34" charset="0"/>
-              <a:buChar char="•"/>
-            </a:pPr>
+              <a:t>Fork du </a:t>
+            </a:r>
+            <a:r>
+              <a:rPr lang="fr-FR" dirty="0" err="1"/>
+              <a:t>dépot</a:t>
+            </a:r>
             <a:r>
               <a:rPr lang="fr-FR" dirty="0"/>
-              <a:t>Meilleur lisibilité du code (factorisation, évite une longue fonction)</a:t>
-            </a:r>
-          </a:p>
-          <a:p>
-            <a:pPr marL="171450" indent="-171450">
-              <a:buFont typeface="Arial" panose="020B0604020202020204" pitchFamily="34" charset="0"/>
-              <a:buChar char="•"/>
-            </a:pPr>
+              <a:t> vers mon repository GitHub</a:t>
+            </a:r>
+          </a:p>
+          <a:p>
             <a:r>
               <a:rPr lang="fr-FR" dirty="0"/>
-              <a:t>Respecte les principes de la programmation orienté objet (DAO, Modèle). Chaque objet porte sa responsabilité</a:t>
-            </a:r>
-          </a:p>
-          <a:p>
-            <a:pPr marL="171450" indent="-171450">
-              <a:buFont typeface="Arial" panose="020B0604020202020204" pitchFamily="34" charset="0"/>
-              <a:buChar char="•"/>
-            </a:pPr>
+              <a:t>Clone de mon repository vers mon ordinateur</a:t>
+            </a:r>
+          </a:p>
+          <a:p>
             <a:r>
               <a:rPr lang="fr-FR" dirty="0"/>
-              <a:t>DAO sera renommé </a:t>
+              <a:t>Importation dans </a:t>
             </a:r>
             <a:r>
               <a:rPr lang="fr-FR" dirty="0" err="1"/>
-              <a:t>ISymptomIO</a:t>
+              <a:t>eclipse</a:t>
             </a:r>
             <a:r>
               <a:rPr lang="fr-FR" dirty="0"/>
-              <a:t> (Reader/Writer)</a:t>
-            </a:r>
-          </a:p>
-          <a:p>
-            <a:pPr marL="171450" indent="-171450">
-              <a:buFontTx/>
-              <a:buChar char="-"/>
-            </a:pPr>
+              <a:t> et </a:t>
+            </a:r>
+            <a:r>
+              <a:rPr lang="fr-FR" dirty="0" err="1"/>
+              <a:t>GitBash</a:t>
+            </a:r>
+            <a:r>
+              <a:rPr lang="fr-FR" dirty="0"/>
+              <a:t> (</a:t>
+            </a:r>
+            <a:r>
+              <a:rPr lang="fr-FR" dirty="0" err="1"/>
+              <a:t>BashShell</a:t>
+            </a:r>
+            <a:r>
+              <a:rPr lang="fr-FR" dirty="0"/>
+              <a:t>)</a:t>
+            </a:r>
+          </a:p>
+          <a:p>
             <a:endParaRPr lang="fr-FR" dirty="0"/>
           </a:p>
           <a:p>
             <a:r>
               <a:rPr lang="fr-FR" dirty="0"/>
-              <a:t>Aucune logique dans le main :</a:t>
-            </a:r>
-          </a:p>
-          <a:p>
-            <a:pPr marL="180340" marR="180340">
-              <a:lnSpc>
-                <a:spcPct val="107000"/>
-              </a:lnSpc>
-              <a:tabLst>
-                <a:tab pos="304800" algn="l"/>
-                <a:tab pos="609600" algn="l"/>
-                <a:tab pos="914400" algn="l"/>
-                <a:tab pos="1219200" algn="l"/>
-                <a:tab pos="1524000" algn="l"/>
-                <a:tab pos="1828800" algn="l"/>
-                <a:tab pos="2133600" algn="l"/>
-                <a:tab pos="2438400" algn="l"/>
-                <a:tab pos="2743200" algn="l"/>
-              </a:tabLst>
-            </a:pPr>
+              <a:t>Recherche « </a:t>
+            </a:r>
+            <a:r>
+              <a:rPr lang="fr-FR" dirty="0" err="1"/>
+              <a:t>user.dir</a:t>
+            </a:r>
             <a:r>
               <a:rPr lang="fr-FR" dirty="0"/>
-              <a:t>Permet adaptation </a:t>
+              <a:t> » google -&gt; </a:t>
             </a:r>
             <a:r>
               <a:rPr lang="fr-FR" dirty="0" err="1"/>
-              <a:t>JavaFX</a:t>
-            </a:r>
-            <a:br>
+              <a:t>StackOverFlow</a:t>
+            </a:r>
+            <a:r>
               <a:rPr lang="fr-FR" dirty="0"/>
-            </a:br>
-            <a:r>
-              <a:rPr lang="fr-FR" sz="1000" b="1" dirty="0">
-                <a:effectLst/>
-                <a:latin typeface="Consolas" panose="020B0609020204030204" pitchFamily="49" charset="0"/>
-                <a:ea typeface="Calibri" panose="020F0502020204030204" pitchFamily="34" charset="0"/>
-                <a:cs typeface="Arial" panose="020B0604020202020204" pitchFamily="34" charset="0"/>
-              </a:rPr>
-              <a:t>public class </a:t>
-            </a:r>
-            <a:r>
-              <a:rPr lang="fr-FR" sz="1000" b="1" dirty="0" err="1">
-                <a:effectLst/>
-                <a:latin typeface="Consolas" panose="020B0609020204030204" pitchFamily="49" charset="0"/>
-                <a:ea typeface="Calibri" panose="020F0502020204030204" pitchFamily="34" charset="0"/>
-                <a:cs typeface="Arial" panose="020B0604020202020204" pitchFamily="34" charset="0"/>
-              </a:rPr>
-              <a:t>MaClasseGraphique</a:t>
-            </a:r>
-            <a:r>
-              <a:rPr lang="fr-FR" sz="1000" b="1" dirty="0">
-                <a:effectLst/>
-                <a:latin typeface="Consolas" panose="020B0609020204030204" pitchFamily="49" charset="0"/>
-                <a:ea typeface="Calibri" panose="020F0502020204030204" pitchFamily="34" charset="0"/>
-                <a:cs typeface="Arial" panose="020B0604020202020204" pitchFamily="34" charset="0"/>
-              </a:rPr>
-              <a:t> </a:t>
-            </a:r>
-            <a:r>
-              <a:rPr lang="fr-FR" sz="1000" b="1" dirty="0" err="1">
-                <a:effectLst/>
-                <a:latin typeface="Consolas" panose="020B0609020204030204" pitchFamily="49" charset="0"/>
-                <a:ea typeface="Calibri" panose="020F0502020204030204" pitchFamily="34" charset="0"/>
-                <a:cs typeface="Arial" panose="020B0604020202020204" pitchFamily="34" charset="0"/>
-              </a:rPr>
-              <a:t>extends</a:t>
-            </a:r>
-            <a:r>
-              <a:rPr lang="fr-FR" sz="1000" b="1" dirty="0">
-                <a:effectLst/>
-                <a:latin typeface="Consolas" panose="020B0609020204030204" pitchFamily="49" charset="0"/>
-                <a:ea typeface="Calibri" panose="020F0502020204030204" pitchFamily="34" charset="0"/>
-                <a:cs typeface="Arial" panose="020B0604020202020204" pitchFamily="34" charset="0"/>
-              </a:rPr>
-              <a:t> </a:t>
-            </a:r>
-            <a:r>
-              <a:rPr lang="fr-FR" sz="1000" b="1" dirty="0">
-                <a:solidFill>
-                  <a:srgbClr val="00B050"/>
-                </a:solidFill>
-                <a:effectLst/>
-                <a:latin typeface="Consolas" panose="020B0609020204030204" pitchFamily="49" charset="0"/>
-                <a:ea typeface="Calibri" panose="020F0502020204030204" pitchFamily="34" charset="0"/>
-                <a:cs typeface="Arial" panose="020B0604020202020204" pitchFamily="34" charset="0"/>
-              </a:rPr>
-              <a:t>Application</a:t>
-            </a:r>
-            <a:endParaRPr lang="fr-FR" sz="1000" dirty="0">
-              <a:effectLst/>
-              <a:latin typeface="Consolas" panose="020B0609020204030204" pitchFamily="49" charset="0"/>
-              <a:ea typeface="Calibri" panose="020F0502020204030204" pitchFamily="34" charset="0"/>
-              <a:cs typeface="Arial" panose="020B0604020202020204" pitchFamily="34" charset="0"/>
-            </a:endParaRPr>
-          </a:p>
-          <a:p>
-            <a:pPr marL="355600" marR="180340">
-              <a:lnSpc>
-                <a:spcPct val="107000"/>
-              </a:lnSpc>
-              <a:tabLst>
-                <a:tab pos="355600" algn="l"/>
-                <a:tab pos="609600" algn="l"/>
-                <a:tab pos="914400" algn="l"/>
-                <a:tab pos="1219200" algn="l"/>
-                <a:tab pos="1524000" algn="l"/>
-                <a:tab pos="1828800" algn="l"/>
-                <a:tab pos="2133600" algn="l"/>
-                <a:tab pos="2438400" algn="l"/>
-                <a:tab pos="2743200" algn="l"/>
-              </a:tabLst>
-            </a:pPr>
-            <a:r>
-              <a:rPr lang="fr-FR" sz="1000" b="1" dirty="0">
-                <a:effectLst/>
-                <a:latin typeface="Consolas" panose="020B0609020204030204" pitchFamily="49" charset="0"/>
-                <a:ea typeface="Calibri" panose="020F0502020204030204" pitchFamily="34" charset="0"/>
-                <a:cs typeface="Arial" panose="020B0604020202020204" pitchFamily="34" charset="0"/>
-              </a:rPr>
-              <a:t>public </a:t>
-            </a:r>
-            <a:r>
-              <a:rPr lang="fr-FR" sz="1000" b="1" dirty="0" err="1">
-                <a:effectLst/>
-                <a:latin typeface="Consolas" panose="020B0609020204030204" pitchFamily="49" charset="0"/>
-                <a:ea typeface="Calibri" panose="020F0502020204030204" pitchFamily="34" charset="0"/>
-                <a:cs typeface="Arial" panose="020B0604020202020204" pitchFamily="34" charset="0"/>
-              </a:rPr>
-              <a:t>static</a:t>
-            </a:r>
-            <a:r>
-              <a:rPr lang="fr-FR" sz="1000" b="1" dirty="0">
-                <a:effectLst/>
-                <a:latin typeface="Consolas" panose="020B0609020204030204" pitchFamily="49" charset="0"/>
-                <a:ea typeface="Calibri" panose="020F0502020204030204" pitchFamily="34" charset="0"/>
-                <a:cs typeface="Arial" panose="020B0604020202020204" pitchFamily="34" charset="0"/>
-              </a:rPr>
-              <a:t> </a:t>
-            </a:r>
-            <a:r>
-              <a:rPr lang="fr-FR" sz="1000" b="1" dirty="0" err="1">
-                <a:effectLst/>
-                <a:latin typeface="Consolas" panose="020B0609020204030204" pitchFamily="49" charset="0"/>
-                <a:ea typeface="Calibri" panose="020F0502020204030204" pitchFamily="34" charset="0"/>
-                <a:cs typeface="Arial" panose="020B0604020202020204" pitchFamily="34" charset="0"/>
-              </a:rPr>
-              <a:t>void</a:t>
-            </a:r>
-            <a:r>
-              <a:rPr lang="fr-FR" sz="1000" b="1" dirty="0">
-                <a:effectLst/>
-                <a:latin typeface="Consolas" panose="020B0609020204030204" pitchFamily="49" charset="0"/>
-                <a:ea typeface="Calibri" panose="020F0502020204030204" pitchFamily="34" charset="0"/>
-                <a:cs typeface="Arial" panose="020B0604020202020204" pitchFamily="34" charset="0"/>
-              </a:rPr>
-              <a:t> main(String[] args) { </a:t>
-            </a:r>
-            <a:r>
-              <a:rPr lang="fr-FR" sz="1000" b="1" dirty="0">
-                <a:solidFill>
-                  <a:srgbClr val="0070C0"/>
-                </a:solidFill>
-                <a:effectLst/>
-                <a:latin typeface="Consolas" panose="020B0609020204030204" pitchFamily="49" charset="0"/>
-                <a:ea typeface="Calibri" panose="020F0502020204030204" pitchFamily="34" charset="0"/>
-                <a:cs typeface="Arial" panose="020B0604020202020204" pitchFamily="34" charset="0"/>
-              </a:rPr>
-              <a:t>// </a:t>
-            </a:r>
-            <a:r>
-              <a:rPr lang="fr-FR" sz="1000" dirty="0">
-                <a:solidFill>
-                  <a:srgbClr val="0070C0"/>
-                </a:solidFill>
-                <a:effectLst/>
-                <a:latin typeface="Consolas" panose="020B0609020204030204" pitchFamily="49" charset="0"/>
-                <a:ea typeface="Calibri" panose="020F0502020204030204" pitchFamily="34" charset="0"/>
-                <a:cs typeface="Arial" panose="020B0604020202020204" pitchFamily="34" charset="0"/>
-              </a:rPr>
-              <a:t>A laisser </a:t>
-            </a:r>
-            <a:r>
-              <a:rPr lang="fr-FR" sz="1000" dirty="0" err="1">
-                <a:solidFill>
-                  <a:srgbClr val="0070C0"/>
-                </a:solidFill>
-                <a:effectLst/>
-                <a:latin typeface="Consolas" panose="020B0609020204030204" pitchFamily="49" charset="0"/>
-                <a:ea typeface="Calibri" panose="020F0502020204030204" pitchFamily="34" charset="0"/>
-                <a:cs typeface="Arial" panose="020B0604020202020204" pitchFamily="34" charset="0"/>
-              </a:rPr>
-              <a:t>telquel</a:t>
-            </a:r>
-            <a:endParaRPr lang="fr-FR" sz="1000" dirty="0">
-              <a:effectLst/>
-              <a:latin typeface="Consolas" panose="020B0609020204030204" pitchFamily="49" charset="0"/>
-              <a:ea typeface="Calibri" panose="020F0502020204030204" pitchFamily="34" charset="0"/>
-              <a:cs typeface="Arial" panose="020B0604020202020204" pitchFamily="34" charset="0"/>
-            </a:endParaRPr>
-          </a:p>
-          <a:p>
-            <a:pPr marL="534988" marR="180340">
-              <a:lnSpc>
-                <a:spcPct val="107000"/>
-              </a:lnSpc>
-              <a:spcAft>
-                <a:spcPts val="0"/>
-              </a:spcAft>
-              <a:tabLst>
-                <a:tab pos="609600" algn="l"/>
-                <a:tab pos="914400" algn="l"/>
-                <a:tab pos="1219200" algn="l"/>
-                <a:tab pos="1524000" algn="l"/>
-                <a:tab pos="1828800" algn="l"/>
-                <a:tab pos="2133600" algn="l"/>
-                <a:tab pos="2438400" algn="l"/>
-                <a:tab pos="2743200" algn="l"/>
-              </a:tabLst>
-            </a:pPr>
-            <a:r>
-              <a:rPr lang="fr-FR" sz="1000" b="1" dirty="0">
-                <a:effectLst/>
-                <a:latin typeface="Consolas" panose="020B0609020204030204" pitchFamily="49" charset="0"/>
-                <a:ea typeface="Calibri" panose="020F0502020204030204" pitchFamily="34" charset="0"/>
-                <a:cs typeface="Arial" panose="020B0604020202020204" pitchFamily="34" charset="0"/>
-              </a:rPr>
-              <a:t>launch(args); </a:t>
-            </a:r>
-            <a:r>
-              <a:rPr lang="fr-FR" sz="1000" b="1" dirty="0">
-                <a:solidFill>
-                  <a:srgbClr val="0070C0"/>
-                </a:solidFill>
-                <a:effectLst/>
-                <a:latin typeface="Consolas" panose="020B0609020204030204" pitchFamily="49" charset="0"/>
-                <a:ea typeface="Calibri" panose="020F0502020204030204" pitchFamily="34" charset="0"/>
-                <a:cs typeface="Arial" panose="020B0604020202020204" pitchFamily="34" charset="0"/>
-              </a:rPr>
-              <a:t>// = </a:t>
-            </a:r>
-            <a:r>
-              <a:rPr lang="fr-FR" sz="1000" b="1" dirty="0" err="1">
-                <a:solidFill>
-                  <a:srgbClr val="00B050"/>
-                </a:solidFill>
-                <a:effectLst/>
-                <a:latin typeface="Consolas" panose="020B0609020204030204" pitchFamily="49" charset="0"/>
-                <a:ea typeface="Calibri" panose="020F0502020204030204" pitchFamily="34" charset="0"/>
-                <a:cs typeface="Arial" panose="020B0604020202020204" pitchFamily="34" charset="0"/>
-              </a:rPr>
-              <a:t>Application</a:t>
-            </a:r>
-            <a:r>
-              <a:rPr lang="fr-FR" sz="1000" b="1" dirty="0" err="1">
-                <a:solidFill>
-                  <a:srgbClr val="0070C0"/>
-                </a:solidFill>
-                <a:effectLst/>
-                <a:latin typeface="Consolas" panose="020B0609020204030204" pitchFamily="49" charset="0"/>
-                <a:ea typeface="Calibri" panose="020F0502020204030204" pitchFamily="34" charset="0"/>
-                <a:cs typeface="Arial" panose="020B0604020202020204" pitchFamily="34" charset="0"/>
-              </a:rPr>
-              <a:t>.launch</a:t>
-            </a:r>
-            <a:r>
-              <a:rPr lang="fr-FR" sz="1000" b="1" dirty="0">
-                <a:solidFill>
-                  <a:srgbClr val="0070C0"/>
-                </a:solidFill>
-                <a:effectLst/>
-                <a:latin typeface="Consolas" panose="020B0609020204030204" pitchFamily="49" charset="0"/>
-                <a:ea typeface="Calibri" panose="020F0502020204030204" pitchFamily="34" charset="0"/>
-                <a:cs typeface="Arial" panose="020B0604020202020204" pitchFamily="34" charset="0"/>
-              </a:rPr>
-              <a:t>(args); </a:t>
-            </a:r>
-            <a:r>
-              <a:rPr lang="fr-FR" sz="1000" dirty="0" err="1">
-                <a:solidFill>
-                  <a:srgbClr val="0070C0"/>
-                </a:solidFill>
-                <a:effectLst/>
-                <a:latin typeface="Consolas" panose="020B0609020204030204" pitchFamily="49" charset="0"/>
-                <a:ea typeface="Calibri" panose="020F0502020204030204" pitchFamily="34" charset="0"/>
-                <a:cs typeface="Arial" panose="020B0604020202020204" pitchFamily="34" charset="0"/>
-              </a:rPr>
-              <a:t>methode</a:t>
-            </a:r>
-            <a:r>
-              <a:rPr lang="fr-FR" sz="1000" dirty="0">
-                <a:solidFill>
-                  <a:srgbClr val="0070C0"/>
-                </a:solidFill>
-                <a:effectLst/>
-                <a:latin typeface="Consolas" panose="020B0609020204030204" pitchFamily="49" charset="0"/>
-                <a:ea typeface="Calibri" panose="020F0502020204030204" pitchFamily="34" charset="0"/>
-                <a:cs typeface="Arial" panose="020B0604020202020204" pitchFamily="34" charset="0"/>
-              </a:rPr>
-              <a:t> public </a:t>
-            </a:r>
-            <a:r>
-              <a:rPr lang="fr-FR" sz="1000" dirty="0" err="1">
-                <a:solidFill>
-                  <a:srgbClr val="0070C0"/>
-                </a:solidFill>
-                <a:effectLst/>
-                <a:latin typeface="Consolas" panose="020B0609020204030204" pitchFamily="49" charset="0"/>
-                <a:ea typeface="Calibri" panose="020F0502020204030204" pitchFamily="34" charset="0"/>
-                <a:cs typeface="Arial" panose="020B0604020202020204" pitchFamily="34" charset="0"/>
-              </a:rPr>
-              <a:t>static</a:t>
-            </a:r>
-            <a:r>
-              <a:rPr lang="fr-FR" sz="1000" dirty="0">
-                <a:solidFill>
-                  <a:srgbClr val="0070C0"/>
-                </a:solidFill>
-                <a:effectLst/>
-                <a:latin typeface="Consolas" panose="020B0609020204030204" pitchFamily="49" charset="0"/>
-                <a:ea typeface="Calibri" panose="020F0502020204030204" pitchFamily="34" charset="0"/>
-                <a:cs typeface="Arial" panose="020B0604020202020204" pitchFamily="34" charset="0"/>
-              </a:rPr>
-              <a:t> </a:t>
-            </a:r>
-            <a:r>
-              <a:rPr lang="fr-FR" sz="1000" dirty="0" err="1">
-                <a:solidFill>
-                  <a:srgbClr val="0070C0"/>
-                </a:solidFill>
-                <a:effectLst/>
-                <a:latin typeface="Consolas" panose="020B0609020204030204" pitchFamily="49" charset="0"/>
-                <a:ea typeface="Calibri" panose="020F0502020204030204" pitchFamily="34" charset="0"/>
-                <a:cs typeface="Arial" panose="020B0604020202020204" pitchFamily="34" charset="0"/>
-              </a:rPr>
-              <a:t>void</a:t>
-            </a:r>
-            <a:endParaRPr lang="fr-FR" sz="1000" dirty="0">
-              <a:effectLst/>
-              <a:latin typeface="Consolas" panose="020B0609020204030204" pitchFamily="49" charset="0"/>
-              <a:ea typeface="Calibri" panose="020F0502020204030204" pitchFamily="34" charset="0"/>
-              <a:cs typeface="Arial" panose="020B0604020202020204" pitchFamily="34" charset="0"/>
-            </a:endParaRPr>
-          </a:p>
-          <a:p>
-            <a:pPr marL="355600" marR="180340">
-              <a:lnSpc>
-                <a:spcPct val="107000"/>
-              </a:lnSpc>
-              <a:tabLst>
-                <a:tab pos="355600" algn="l"/>
-                <a:tab pos="609600" algn="l"/>
-                <a:tab pos="914400" algn="l"/>
-                <a:tab pos="1219200" algn="l"/>
-                <a:tab pos="1524000" algn="l"/>
-                <a:tab pos="1828800" algn="l"/>
-                <a:tab pos="2133600" algn="l"/>
-                <a:tab pos="2438400" algn="l"/>
-                <a:tab pos="2743200" algn="l"/>
-              </a:tabLst>
-            </a:pPr>
-            <a:r>
-              <a:rPr lang="fr-FR" sz="1000" b="1" dirty="0">
-                <a:effectLst/>
-                <a:latin typeface="Consolas" panose="020B0609020204030204" pitchFamily="49" charset="0"/>
-                <a:ea typeface="Calibri" panose="020F0502020204030204" pitchFamily="34" charset="0"/>
-                <a:cs typeface="Arial" panose="020B0604020202020204" pitchFamily="34" charset="0"/>
-              </a:rPr>
-              <a:t>}</a:t>
-            </a:r>
-            <a:br>
-              <a:rPr lang="fr-FR" sz="1000" b="1" dirty="0">
-                <a:effectLst/>
-                <a:latin typeface="Consolas" panose="020B0609020204030204" pitchFamily="49" charset="0"/>
-                <a:ea typeface="Calibri" panose="020F0502020204030204" pitchFamily="34" charset="0"/>
-                <a:cs typeface="Arial" panose="020B0604020202020204" pitchFamily="34" charset="0"/>
-              </a:rPr>
-            </a:br>
-            <a:r>
-              <a:rPr lang="fr-FR" sz="1000" b="1" dirty="0">
-                <a:latin typeface="Consolas" panose="020B0609020204030204" pitchFamily="49" charset="0"/>
-                <a:cs typeface="Arial" panose="020B0604020202020204" pitchFamily="34" charset="0"/>
-              </a:rPr>
-              <a:t>public </a:t>
-            </a:r>
-            <a:r>
-              <a:rPr lang="fr-FR" sz="1000" b="1" dirty="0" err="1">
-                <a:latin typeface="Consolas" panose="020B0609020204030204" pitchFamily="49" charset="0"/>
-                <a:cs typeface="Arial" panose="020B0604020202020204" pitchFamily="34" charset="0"/>
-              </a:rPr>
-              <a:t>void</a:t>
-            </a:r>
-            <a:r>
-              <a:rPr lang="fr-FR" sz="1000" b="1" dirty="0">
-                <a:latin typeface="Consolas" panose="020B0609020204030204" pitchFamily="49" charset="0"/>
-                <a:cs typeface="Arial" panose="020B0604020202020204" pitchFamily="34" charset="0"/>
-              </a:rPr>
-              <a:t> start(Stage </a:t>
-            </a:r>
-            <a:r>
-              <a:rPr lang="fr-FR" sz="1000" b="1" dirty="0" err="1">
-                <a:latin typeface="Consolas" panose="020B0609020204030204" pitchFamily="49" charset="0"/>
-                <a:cs typeface="Arial" panose="020B0604020202020204" pitchFamily="34" charset="0"/>
-              </a:rPr>
-              <a:t>primaryStage</a:t>
-            </a:r>
-            <a:r>
-              <a:rPr lang="fr-FR" sz="1000" b="1" dirty="0">
-                <a:latin typeface="Consolas" panose="020B0609020204030204" pitchFamily="49" charset="0"/>
-                <a:cs typeface="Arial" panose="020B0604020202020204" pitchFamily="34" charset="0"/>
-              </a:rPr>
-              <a:t>) { </a:t>
-            </a:r>
-            <a:r>
-              <a:rPr lang="fr-FR" sz="1000" dirty="0">
-                <a:solidFill>
-                  <a:srgbClr val="0070C0"/>
-                </a:solidFill>
-                <a:latin typeface="Consolas" panose="020B0609020204030204" pitchFamily="49" charset="0"/>
-                <a:cs typeface="Arial" panose="020B0604020202020204" pitchFamily="34" charset="0"/>
-              </a:rPr>
-              <a:t>// Point de départ du programme</a:t>
-            </a:r>
-          </a:p>
-          <a:p>
-            <a:pPr marL="177800" marR="180340">
-              <a:lnSpc>
-                <a:spcPct val="107000"/>
-              </a:lnSpc>
-              <a:tabLst>
-                <a:tab pos="609600" algn="l"/>
-                <a:tab pos="914400" algn="l"/>
-                <a:tab pos="1219200" algn="l"/>
-                <a:tab pos="1524000" algn="l"/>
-                <a:tab pos="1828800" algn="l"/>
-                <a:tab pos="2133600" algn="l"/>
-                <a:tab pos="2438400" algn="l"/>
-                <a:tab pos="2743200" algn="l"/>
-              </a:tabLst>
-            </a:pPr>
-            <a:r>
-              <a:rPr lang="fr-FR" dirty="0"/>
-              <a:t>Permet adaptation JSP/Servlet</a:t>
-            </a:r>
-          </a:p>
-          <a:p>
-            <a:pPr marL="180340" marR="180340">
-              <a:lnSpc>
-                <a:spcPct val="107000"/>
-              </a:lnSpc>
-              <a:tabLst>
-                <a:tab pos="304800" algn="l"/>
-                <a:tab pos="609600" algn="l"/>
-                <a:tab pos="914400" algn="l"/>
-                <a:tab pos="1219200" algn="l"/>
-                <a:tab pos="1524000" algn="l"/>
-                <a:tab pos="1828800" algn="l"/>
-                <a:tab pos="2133600" algn="l"/>
-                <a:tab pos="2438400" algn="l"/>
-                <a:tab pos="2743200" algn="l"/>
-              </a:tabLst>
-            </a:pPr>
-            <a:endParaRPr lang="fr-FR" sz="1000" dirty="0"/>
+              <a:t> -&gt; doc java oracle</a:t>
+            </a:r>
           </a:p>
         </p:txBody>
       </p:sp>
@@ -1674,7 +1174,7 @@
     </p:spTree>
     <p:extLst>
       <p:ext uri="{BB962C8B-B14F-4D97-AF65-F5344CB8AC3E}">
-        <p14:creationId xmlns:p14="http://schemas.microsoft.com/office/powerpoint/2010/main" val="2674054699"/>
+        <p14:creationId xmlns:p14="http://schemas.microsoft.com/office/powerpoint/2010/main" val="2798657783"/>
       </p:ext>
     </p:extLst>
   </p:cSld>
@@ -1730,7 +1230,7 @@
           <a:p>
             <a:r>
               <a:rPr lang="fr-FR" dirty="0"/>
-              <a:t>A gauche : la gestion de l’instance unique du singleton :</a:t>
+              <a:t>Template MVC avec DAO :</a:t>
             </a:r>
           </a:p>
           <a:p>
@@ -1740,15 +1240,7 @@
             </a:pPr>
             <a:r>
               <a:rPr lang="fr-FR" dirty="0"/>
-              <a:t>accès </a:t>
-            </a:r>
-            <a:r>
-              <a:rPr lang="fr-FR" dirty="0" err="1"/>
-              <a:t>private</a:t>
-            </a:r>
-            <a:r>
-              <a:rPr lang="fr-FR" dirty="0"/>
-              <a:t> pour instance et constructeur</a:t>
+              <a:t>Meilleur lisibilité du code (factorisation, évite une longue fonction)</a:t>
             </a:r>
           </a:p>
           <a:p>
@@ -1757,20 +1249,8 @@
               <a:buChar char="•"/>
             </a:pPr>
             <a:r>
-              <a:rPr lang="fr-FR" dirty="0" err="1"/>
-              <a:t>methode</a:t>
-            </a:r>
-            <a:r>
               <a:rPr lang="fr-FR" dirty="0"/>
-              <a:t> </a:t>
-            </a:r>
-            <a:r>
-              <a:rPr lang="fr-FR" dirty="0" err="1"/>
-              <a:t>static</a:t>
-            </a:r>
-            <a:r>
-              <a:rPr lang="fr-FR" dirty="0"/>
-              <a:t> pour obtenir l’instance unique</a:t>
+              <a:t>Respecte les principes de la programmation orienté objet (DAO, Modèle). Chaque objet porte sa responsabilité</a:t>
             </a:r>
           </a:p>
           <a:p>
@@ -1780,64 +1260,489 @@
             </a:pPr>
             <a:r>
               <a:rPr lang="fr-FR" dirty="0"/>
-              <a:t>champs Viewer à portée globale</a:t>
+              <a:t>DAO sera renommé </a:t>
+            </a:r>
+            <a:r>
+              <a:rPr lang="fr-FR" dirty="0" err="1"/>
+              <a:t>ISymptomIO</a:t>
+            </a:r>
+            <a:r>
+              <a:rPr lang="fr-FR" dirty="0"/>
+              <a:t> (Reader/Writer)</a:t>
             </a:r>
           </a:p>
           <a:p>
             <a:pPr marL="171450" indent="-171450">
-              <a:buFont typeface="Arial" panose="020B0604020202020204" pitchFamily="34" charset="0"/>
-              <a:buChar char="•"/>
+              <a:buFontTx/>
+              <a:buChar char="-"/>
             </a:pPr>
             <a:endParaRPr lang="fr-FR" dirty="0"/>
           </a:p>
           <a:p>
             <a:r>
               <a:rPr lang="fr-FR" dirty="0"/>
-              <a:t>A droite : la logique de contrôle :</a:t>
-            </a:r>
-          </a:p>
-          <a:p>
-            <a:pPr marL="171450" indent="-171450">
-              <a:buFont typeface="Arial" panose="020B0604020202020204" pitchFamily="34" charset="0"/>
-              <a:buChar char="•"/>
+              <a:t>Aucune logique dans le main :</a:t>
+            </a:r>
+          </a:p>
+          <a:p>
+            <a:pPr marL="180340" marR="180340">
+              <a:lnSpc>
+                <a:spcPct val="107000"/>
+              </a:lnSpc>
+              <a:tabLst>
+                <a:tab pos="304800" algn="l"/>
+                <a:tab pos="609600" algn="l"/>
+                <a:tab pos="914400" algn="l"/>
+                <a:tab pos="1219200" algn="l"/>
+                <a:tab pos="1524000" algn="l"/>
+                <a:tab pos="1828800" algn="l"/>
+                <a:tab pos="2133600" algn="l"/>
+                <a:tab pos="2438400" algn="l"/>
+                <a:tab pos="2743200" algn="l"/>
+              </a:tabLst>
             </a:pPr>
             <a:r>
               <a:rPr lang="fr-FR" dirty="0"/>
-              <a:t>déclaration des variables au début, avec un nom explicite et initialisations</a:t>
-            </a:r>
-          </a:p>
-          <a:p>
-            <a:pPr marL="171450" indent="-171450">
-              <a:buFont typeface="Arial" panose="020B0604020202020204" pitchFamily="34" charset="0"/>
-              <a:buChar char="•"/>
-            </a:pPr>
-            <a:r>
+              <a:t>Permet adaptation </a:t>
+            </a:r>
+            <a:r>
+              <a:rPr lang="fr-FR" dirty="0" err="1"/>
+              <a:t>JavaFX</a:t>
+            </a:r>
+            <a:br>
               <a:rPr lang="fr-FR" dirty="0"/>
-              <a:t>final pour les accès au fichier (devra être changé si utilisation du String[] args)</a:t>
-            </a:r>
-          </a:p>
-          <a:p>
-            <a:pPr marL="171450" indent="-171450">
-              <a:buFont typeface="Arial" panose="020B0604020202020204" pitchFamily="34" charset="0"/>
-              <a:buChar char="•"/>
+            </a:br>
+            <a:r>
+              <a:rPr lang="fr-FR" sz="1000" b="1" dirty="0">
+                <a:effectLst/>
+                <a:latin typeface="Consolas" panose="020B0609020204030204" pitchFamily="49" charset="0"/>
+                <a:ea typeface="Calibri" panose="020F0502020204030204" pitchFamily="34" charset="0"/>
+                <a:cs typeface="Arial" panose="020B0604020202020204" pitchFamily="34" charset="0"/>
+              </a:rPr>
+              <a:t>public class </a:t>
+            </a:r>
+            <a:r>
+              <a:rPr lang="fr-FR" sz="1000" b="1" dirty="0" err="1">
+                <a:effectLst/>
+                <a:latin typeface="Consolas" panose="020B0609020204030204" pitchFamily="49" charset="0"/>
+                <a:ea typeface="Calibri" panose="020F0502020204030204" pitchFamily="34" charset="0"/>
+                <a:cs typeface="Arial" panose="020B0604020202020204" pitchFamily="34" charset="0"/>
+              </a:rPr>
+              <a:t>MaClasseGraphique</a:t>
+            </a:r>
+            <a:r>
+              <a:rPr lang="fr-FR" sz="1000" b="1" dirty="0">
+                <a:effectLst/>
+                <a:latin typeface="Consolas" panose="020B0609020204030204" pitchFamily="49" charset="0"/>
+                <a:ea typeface="Calibri" panose="020F0502020204030204" pitchFamily="34" charset="0"/>
+                <a:cs typeface="Arial" panose="020B0604020202020204" pitchFamily="34" charset="0"/>
+              </a:rPr>
+              <a:t> </a:t>
+            </a:r>
+            <a:r>
+              <a:rPr lang="fr-FR" sz="1000" b="1" dirty="0" err="1">
+                <a:effectLst/>
+                <a:latin typeface="Consolas" panose="020B0609020204030204" pitchFamily="49" charset="0"/>
+                <a:ea typeface="Calibri" panose="020F0502020204030204" pitchFamily="34" charset="0"/>
+                <a:cs typeface="Arial" panose="020B0604020202020204" pitchFamily="34" charset="0"/>
+              </a:rPr>
+              <a:t>extends</a:t>
+            </a:r>
+            <a:r>
+              <a:rPr lang="fr-FR" sz="1000" b="1" dirty="0">
+                <a:effectLst/>
+                <a:latin typeface="Consolas" panose="020B0609020204030204" pitchFamily="49" charset="0"/>
+                <a:ea typeface="Calibri" panose="020F0502020204030204" pitchFamily="34" charset="0"/>
+                <a:cs typeface="Arial" panose="020B0604020202020204" pitchFamily="34" charset="0"/>
+              </a:rPr>
+              <a:t> </a:t>
+            </a:r>
+            <a:r>
+              <a:rPr lang="fr-FR" sz="1000" b="1" dirty="0">
+                <a:solidFill>
+                  <a:srgbClr val="00B050"/>
+                </a:solidFill>
+                <a:effectLst/>
+                <a:latin typeface="Consolas" panose="020B0609020204030204" pitchFamily="49" charset="0"/>
+                <a:ea typeface="Calibri" panose="020F0502020204030204" pitchFamily="34" charset="0"/>
+                <a:cs typeface="Arial" panose="020B0604020202020204" pitchFamily="34" charset="0"/>
+              </a:rPr>
+              <a:t>Application</a:t>
+            </a:r>
+            <a:endParaRPr lang="fr-FR" sz="1000" dirty="0">
+              <a:effectLst/>
+              <a:latin typeface="Consolas" panose="020B0609020204030204" pitchFamily="49" charset="0"/>
+              <a:ea typeface="Calibri" panose="020F0502020204030204" pitchFamily="34" charset="0"/>
+              <a:cs typeface="Arial" panose="020B0604020202020204" pitchFamily="34" charset="0"/>
+            </a:endParaRPr>
+          </a:p>
+          <a:p>
+            <a:pPr marL="355600" marR="180340">
+              <a:lnSpc>
+                <a:spcPct val="107000"/>
+              </a:lnSpc>
+              <a:tabLst>
+                <a:tab pos="355600" algn="l"/>
+                <a:tab pos="609600" algn="l"/>
+                <a:tab pos="914400" algn="l"/>
+                <a:tab pos="1219200" algn="l"/>
+                <a:tab pos="1524000" algn="l"/>
+                <a:tab pos="1828800" algn="l"/>
+                <a:tab pos="2133600" algn="l"/>
+                <a:tab pos="2438400" algn="l"/>
+                <a:tab pos="2743200" algn="l"/>
+              </a:tabLst>
+            </a:pPr>
+            <a:r>
+              <a:rPr lang="fr-FR" sz="1000" b="1" dirty="0">
+                <a:effectLst/>
+                <a:latin typeface="Consolas" panose="020B0609020204030204" pitchFamily="49" charset="0"/>
+                <a:ea typeface="Calibri" panose="020F0502020204030204" pitchFamily="34" charset="0"/>
+                <a:cs typeface="Arial" panose="020B0604020202020204" pitchFamily="34" charset="0"/>
+              </a:rPr>
+              <a:t>public </a:t>
+            </a:r>
+            <a:r>
+              <a:rPr lang="fr-FR" sz="1000" b="1" dirty="0" err="1">
+                <a:effectLst/>
+                <a:latin typeface="Consolas" panose="020B0609020204030204" pitchFamily="49" charset="0"/>
+                <a:ea typeface="Calibri" panose="020F0502020204030204" pitchFamily="34" charset="0"/>
+                <a:cs typeface="Arial" panose="020B0604020202020204" pitchFamily="34" charset="0"/>
+              </a:rPr>
+              <a:t>static</a:t>
+            </a:r>
+            <a:r>
+              <a:rPr lang="fr-FR" sz="1000" b="1" dirty="0">
+                <a:effectLst/>
+                <a:latin typeface="Consolas" panose="020B0609020204030204" pitchFamily="49" charset="0"/>
+                <a:ea typeface="Calibri" panose="020F0502020204030204" pitchFamily="34" charset="0"/>
+                <a:cs typeface="Arial" panose="020B0604020202020204" pitchFamily="34" charset="0"/>
+              </a:rPr>
+              <a:t> </a:t>
+            </a:r>
+            <a:r>
+              <a:rPr lang="fr-FR" sz="1000" b="1" dirty="0" err="1">
+                <a:effectLst/>
+                <a:latin typeface="Consolas" panose="020B0609020204030204" pitchFamily="49" charset="0"/>
+                <a:ea typeface="Calibri" panose="020F0502020204030204" pitchFamily="34" charset="0"/>
+                <a:cs typeface="Arial" panose="020B0604020202020204" pitchFamily="34" charset="0"/>
+              </a:rPr>
+              <a:t>void</a:t>
+            </a:r>
+            <a:r>
+              <a:rPr lang="fr-FR" sz="1000" b="1" dirty="0">
+                <a:effectLst/>
+                <a:latin typeface="Consolas" panose="020B0609020204030204" pitchFamily="49" charset="0"/>
+                <a:ea typeface="Calibri" panose="020F0502020204030204" pitchFamily="34" charset="0"/>
+                <a:cs typeface="Arial" panose="020B0604020202020204" pitchFamily="34" charset="0"/>
+              </a:rPr>
+              <a:t> main(String[] args) { </a:t>
+            </a:r>
+            <a:r>
+              <a:rPr lang="fr-FR" sz="1000" b="1" dirty="0">
+                <a:solidFill>
+                  <a:srgbClr val="0070C0"/>
+                </a:solidFill>
+                <a:effectLst/>
+                <a:latin typeface="Consolas" panose="020B0609020204030204" pitchFamily="49" charset="0"/>
+                <a:ea typeface="Calibri" panose="020F0502020204030204" pitchFamily="34" charset="0"/>
+                <a:cs typeface="Arial" panose="020B0604020202020204" pitchFamily="34" charset="0"/>
+              </a:rPr>
+              <a:t>// </a:t>
+            </a:r>
+            <a:r>
+              <a:rPr lang="fr-FR" sz="1000" dirty="0">
+                <a:solidFill>
+                  <a:srgbClr val="0070C0"/>
+                </a:solidFill>
+                <a:effectLst/>
+                <a:latin typeface="Consolas" panose="020B0609020204030204" pitchFamily="49" charset="0"/>
+                <a:ea typeface="Calibri" panose="020F0502020204030204" pitchFamily="34" charset="0"/>
+                <a:cs typeface="Arial" panose="020B0604020202020204" pitchFamily="34" charset="0"/>
+              </a:rPr>
+              <a:t>A laisser </a:t>
+            </a:r>
+            <a:r>
+              <a:rPr lang="fr-FR" sz="1000" dirty="0" err="1">
+                <a:solidFill>
+                  <a:srgbClr val="0070C0"/>
+                </a:solidFill>
+                <a:effectLst/>
+                <a:latin typeface="Consolas" panose="020B0609020204030204" pitchFamily="49" charset="0"/>
+                <a:ea typeface="Calibri" panose="020F0502020204030204" pitchFamily="34" charset="0"/>
+                <a:cs typeface="Arial" panose="020B0604020202020204" pitchFamily="34" charset="0"/>
+              </a:rPr>
+              <a:t>telquel</a:t>
+            </a:r>
+            <a:endParaRPr lang="fr-FR" sz="1000" dirty="0">
+              <a:effectLst/>
+              <a:latin typeface="Consolas" panose="020B0609020204030204" pitchFamily="49" charset="0"/>
+              <a:ea typeface="Calibri" panose="020F0502020204030204" pitchFamily="34" charset="0"/>
+              <a:cs typeface="Arial" panose="020B0604020202020204" pitchFamily="34" charset="0"/>
+            </a:endParaRPr>
+          </a:p>
+          <a:p>
+            <a:pPr marL="534988" marR="180340">
+              <a:lnSpc>
+                <a:spcPct val="107000"/>
+              </a:lnSpc>
+              <a:spcAft>
+                <a:spcPts val="0"/>
+              </a:spcAft>
+              <a:tabLst>
+                <a:tab pos="609600" algn="l"/>
+                <a:tab pos="914400" algn="l"/>
+                <a:tab pos="1219200" algn="l"/>
+                <a:tab pos="1524000" algn="l"/>
+                <a:tab pos="1828800" algn="l"/>
+                <a:tab pos="2133600" algn="l"/>
+                <a:tab pos="2438400" algn="l"/>
+                <a:tab pos="2743200" algn="l"/>
+              </a:tabLst>
+            </a:pPr>
+            <a:r>
+              <a:rPr lang="fr-FR" sz="1000" b="1" dirty="0">
+                <a:effectLst/>
+                <a:latin typeface="Consolas" panose="020B0609020204030204" pitchFamily="49" charset="0"/>
+                <a:ea typeface="Calibri" panose="020F0502020204030204" pitchFamily="34" charset="0"/>
+                <a:cs typeface="Arial" panose="020B0604020202020204" pitchFamily="34" charset="0"/>
+              </a:rPr>
+              <a:t>launch(args); </a:t>
+            </a:r>
+            <a:r>
+              <a:rPr lang="fr-FR" sz="1000" b="1" dirty="0">
+                <a:solidFill>
+                  <a:srgbClr val="0070C0"/>
+                </a:solidFill>
+                <a:effectLst/>
+                <a:latin typeface="Consolas" panose="020B0609020204030204" pitchFamily="49" charset="0"/>
+                <a:ea typeface="Calibri" panose="020F0502020204030204" pitchFamily="34" charset="0"/>
+                <a:cs typeface="Arial" panose="020B0604020202020204" pitchFamily="34" charset="0"/>
+              </a:rPr>
+              <a:t>// = </a:t>
+            </a:r>
+            <a:r>
+              <a:rPr lang="fr-FR" sz="1000" b="1" dirty="0" err="1">
+                <a:solidFill>
+                  <a:srgbClr val="00B050"/>
+                </a:solidFill>
+                <a:effectLst/>
+                <a:latin typeface="Consolas" panose="020B0609020204030204" pitchFamily="49" charset="0"/>
+                <a:ea typeface="Calibri" panose="020F0502020204030204" pitchFamily="34" charset="0"/>
+                <a:cs typeface="Arial" panose="020B0604020202020204" pitchFamily="34" charset="0"/>
+              </a:rPr>
+              <a:t>Application</a:t>
+            </a:r>
+            <a:r>
+              <a:rPr lang="fr-FR" sz="1000" b="1" dirty="0" err="1">
+                <a:solidFill>
+                  <a:srgbClr val="0070C0"/>
+                </a:solidFill>
+                <a:effectLst/>
+                <a:latin typeface="Consolas" panose="020B0609020204030204" pitchFamily="49" charset="0"/>
+                <a:ea typeface="Calibri" panose="020F0502020204030204" pitchFamily="34" charset="0"/>
+                <a:cs typeface="Arial" panose="020B0604020202020204" pitchFamily="34" charset="0"/>
+              </a:rPr>
+              <a:t>.launch</a:t>
+            </a:r>
+            <a:r>
+              <a:rPr lang="fr-FR" sz="1000" b="1" dirty="0">
+                <a:solidFill>
+                  <a:srgbClr val="0070C0"/>
+                </a:solidFill>
+                <a:effectLst/>
+                <a:latin typeface="Consolas" panose="020B0609020204030204" pitchFamily="49" charset="0"/>
+                <a:ea typeface="Calibri" panose="020F0502020204030204" pitchFamily="34" charset="0"/>
+                <a:cs typeface="Arial" panose="020B0604020202020204" pitchFamily="34" charset="0"/>
+              </a:rPr>
+              <a:t>(args); </a:t>
+            </a:r>
+            <a:r>
+              <a:rPr lang="fr-FR" sz="1000" dirty="0" err="1">
+                <a:solidFill>
+                  <a:srgbClr val="0070C0"/>
+                </a:solidFill>
+                <a:effectLst/>
+                <a:latin typeface="Consolas" panose="020B0609020204030204" pitchFamily="49" charset="0"/>
+                <a:ea typeface="Calibri" panose="020F0502020204030204" pitchFamily="34" charset="0"/>
+                <a:cs typeface="Arial" panose="020B0604020202020204" pitchFamily="34" charset="0"/>
+              </a:rPr>
+              <a:t>methode</a:t>
+            </a:r>
+            <a:r>
+              <a:rPr lang="fr-FR" sz="1000" dirty="0">
+                <a:solidFill>
+                  <a:srgbClr val="0070C0"/>
+                </a:solidFill>
+                <a:effectLst/>
+                <a:latin typeface="Consolas" panose="020B0609020204030204" pitchFamily="49" charset="0"/>
+                <a:ea typeface="Calibri" panose="020F0502020204030204" pitchFamily="34" charset="0"/>
+                <a:cs typeface="Arial" panose="020B0604020202020204" pitchFamily="34" charset="0"/>
+              </a:rPr>
+              <a:t> public </a:t>
+            </a:r>
+            <a:r>
+              <a:rPr lang="fr-FR" sz="1000" dirty="0" err="1">
+                <a:solidFill>
+                  <a:srgbClr val="0070C0"/>
+                </a:solidFill>
+                <a:effectLst/>
+                <a:latin typeface="Consolas" panose="020B0609020204030204" pitchFamily="49" charset="0"/>
+                <a:ea typeface="Calibri" panose="020F0502020204030204" pitchFamily="34" charset="0"/>
+                <a:cs typeface="Arial" panose="020B0604020202020204" pitchFamily="34" charset="0"/>
+              </a:rPr>
+              <a:t>static</a:t>
+            </a:r>
+            <a:r>
+              <a:rPr lang="fr-FR" sz="1000" dirty="0">
+                <a:solidFill>
+                  <a:srgbClr val="0070C0"/>
+                </a:solidFill>
+                <a:effectLst/>
+                <a:latin typeface="Consolas" panose="020B0609020204030204" pitchFamily="49" charset="0"/>
+                <a:ea typeface="Calibri" panose="020F0502020204030204" pitchFamily="34" charset="0"/>
+                <a:cs typeface="Arial" panose="020B0604020202020204" pitchFamily="34" charset="0"/>
+              </a:rPr>
+              <a:t> </a:t>
+            </a:r>
+            <a:r>
+              <a:rPr lang="fr-FR" sz="1000" dirty="0" err="1">
+                <a:solidFill>
+                  <a:srgbClr val="0070C0"/>
+                </a:solidFill>
+                <a:effectLst/>
+                <a:latin typeface="Consolas" panose="020B0609020204030204" pitchFamily="49" charset="0"/>
+                <a:ea typeface="Calibri" panose="020F0502020204030204" pitchFamily="34" charset="0"/>
+                <a:cs typeface="Arial" panose="020B0604020202020204" pitchFamily="34" charset="0"/>
+              </a:rPr>
+              <a:t>void</a:t>
+            </a:r>
+            <a:endParaRPr lang="fr-FR" sz="1000" dirty="0">
+              <a:effectLst/>
+              <a:latin typeface="Consolas" panose="020B0609020204030204" pitchFamily="49" charset="0"/>
+              <a:ea typeface="Calibri" panose="020F0502020204030204" pitchFamily="34" charset="0"/>
+              <a:cs typeface="Arial" panose="020B0604020202020204" pitchFamily="34" charset="0"/>
+            </a:endParaRPr>
+          </a:p>
+          <a:p>
+            <a:pPr marL="355600" marR="180340">
+              <a:lnSpc>
+                <a:spcPct val="107000"/>
+              </a:lnSpc>
+              <a:tabLst>
+                <a:tab pos="355600" algn="l"/>
+                <a:tab pos="609600" algn="l"/>
+                <a:tab pos="914400" algn="l"/>
+                <a:tab pos="1219200" algn="l"/>
+                <a:tab pos="1524000" algn="l"/>
+                <a:tab pos="1828800" algn="l"/>
+                <a:tab pos="2133600" algn="l"/>
+                <a:tab pos="2438400" algn="l"/>
+                <a:tab pos="2743200" algn="l"/>
+              </a:tabLst>
+            </a:pPr>
+            <a:r>
+              <a:rPr lang="fr-FR" sz="1000" b="1" dirty="0">
+                <a:effectLst/>
+                <a:latin typeface="Consolas" panose="020B0609020204030204" pitchFamily="49" charset="0"/>
+                <a:ea typeface="Calibri" panose="020F0502020204030204" pitchFamily="34" charset="0"/>
+                <a:cs typeface="Arial" panose="020B0604020202020204" pitchFamily="34" charset="0"/>
+              </a:rPr>
+              <a:t>}</a:t>
+            </a:r>
+            <a:br>
+              <a:rPr lang="fr-FR" sz="1000" b="1" dirty="0">
+                <a:effectLst/>
+                <a:latin typeface="Consolas" panose="020B0609020204030204" pitchFamily="49" charset="0"/>
+                <a:ea typeface="Calibri" panose="020F0502020204030204" pitchFamily="34" charset="0"/>
+                <a:cs typeface="Arial" panose="020B0604020202020204" pitchFamily="34" charset="0"/>
+              </a:rPr>
+            </a:br>
+            <a:r>
+              <a:rPr lang="fr-FR" sz="1000" b="1" dirty="0">
+                <a:latin typeface="Consolas" panose="020B0609020204030204" pitchFamily="49" charset="0"/>
+                <a:cs typeface="Arial" panose="020B0604020202020204" pitchFamily="34" charset="0"/>
+              </a:rPr>
+              <a:t>public </a:t>
+            </a:r>
+            <a:r>
+              <a:rPr lang="fr-FR" sz="1000" b="1" dirty="0" err="1">
+                <a:latin typeface="Consolas" panose="020B0609020204030204" pitchFamily="49" charset="0"/>
+                <a:cs typeface="Arial" panose="020B0604020202020204" pitchFamily="34" charset="0"/>
+              </a:rPr>
+              <a:t>void</a:t>
+            </a:r>
+            <a:r>
+              <a:rPr lang="fr-FR" sz="1000" b="1" dirty="0">
+                <a:latin typeface="Consolas" panose="020B0609020204030204" pitchFamily="49" charset="0"/>
+                <a:cs typeface="Arial" panose="020B0604020202020204" pitchFamily="34" charset="0"/>
+              </a:rPr>
+              <a:t> start(Stage </a:t>
+            </a:r>
+            <a:r>
+              <a:rPr lang="fr-FR" sz="1000" b="1" dirty="0" err="1">
+                <a:latin typeface="Consolas" panose="020B0609020204030204" pitchFamily="49" charset="0"/>
+                <a:cs typeface="Arial" panose="020B0604020202020204" pitchFamily="34" charset="0"/>
+              </a:rPr>
+              <a:t>primaryStage</a:t>
+            </a:r>
+            <a:r>
+              <a:rPr lang="fr-FR" sz="1000" b="1" dirty="0">
+                <a:latin typeface="Consolas" panose="020B0609020204030204" pitchFamily="49" charset="0"/>
+                <a:cs typeface="Arial" panose="020B0604020202020204" pitchFamily="34" charset="0"/>
+              </a:rPr>
+              <a:t>) { </a:t>
+            </a:r>
+            <a:r>
+              <a:rPr lang="fr-FR" sz="1000" dirty="0">
+                <a:solidFill>
+                  <a:srgbClr val="0070C0"/>
+                </a:solidFill>
+                <a:latin typeface="Consolas" panose="020B0609020204030204" pitchFamily="49" charset="0"/>
+                <a:cs typeface="Arial" panose="020B0604020202020204" pitchFamily="34" charset="0"/>
+              </a:rPr>
+              <a:t>// Point de départ du programme</a:t>
+            </a:r>
+          </a:p>
+          <a:p>
+            <a:pPr marL="177800" marR="180340">
+              <a:lnSpc>
+                <a:spcPct val="107000"/>
+              </a:lnSpc>
+              <a:tabLst>
+                <a:tab pos="609600" algn="l"/>
+                <a:tab pos="914400" algn="l"/>
+                <a:tab pos="1219200" algn="l"/>
+                <a:tab pos="1524000" algn="l"/>
+                <a:tab pos="1828800" algn="l"/>
+                <a:tab pos="2133600" algn="l"/>
+                <a:tab pos="2438400" algn="l"/>
+                <a:tab pos="2743200" algn="l"/>
+              </a:tabLst>
             </a:pPr>
             <a:r>
               <a:rPr lang="fr-FR" dirty="0"/>
-              <a:t>Portée du DAO limité à la méthode run </a:t>
-            </a:r>
-          </a:p>
-          <a:p>
-            <a:pPr marL="171450" indent="-171450">
-              <a:buFont typeface="Arial" panose="020B0604020202020204" pitchFamily="34" charset="0"/>
-              <a:buChar char="•"/>
-            </a:pPr>
-            <a:endParaRPr lang="fr-FR" dirty="0"/>
-          </a:p>
-          <a:p>
-            <a:r>
-              <a:rPr lang="fr-FR" dirty="0"/>
-              <a:t> </a:t>
-            </a:r>
+              <a:t>Permet adaptation JSP/Servlet</a:t>
+            </a:r>
+          </a:p>
+          <a:p>
+            <a:pPr marL="180340" marR="180340">
+              <a:lnSpc>
+                <a:spcPct val="107000"/>
+              </a:lnSpc>
+              <a:tabLst>
+                <a:tab pos="304800" algn="l"/>
+                <a:tab pos="609600" algn="l"/>
+                <a:tab pos="914400" algn="l"/>
+                <a:tab pos="1219200" algn="l"/>
+                <a:tab pos="1524000" algn="l"/>
+                <a:tab pos="1828800" algn="l"/>
+                <a:tab pos="2133600" algn="l"/>
+                <a:tab pos="2438400" algn="l"/>
+                <a:tab pos="2743200" algn="l"/>
+              </a:tabLst>
+            </a:pPr>
+            <a:endParaRPr lang="fr-FR" sz="1000" dirty="0"/>
           </a:p>
         </p:txBody>
       </p:sp>
@@ -1867,7 +1772,7 @@
     </p:spTree>
     <p:extLst>
       <p:ext uri="{BB962C8B-B14F-4D97-AF65-F5344CB8AC3E}">
-        <p14:creationId xmlns:p14="http://schemas.microsoft.com/office/powerpoint/2010/main" val="4126443417"/>
+        <p14:creationId xmlns:p14="http://schemas.microsoft.com/office/powerpoint/2010/main" val="2674054699"/>
       </p:ext>
     </p:extLst>
   </p:cSld>
@@ -1921,7 +1826,116 @@
           <a:bodyPr/>
           <a:lstStyle/>
           <a:p>
-            <a:endParaRPr lang="fr-FR"/>
+            <a:r>
+              <a:rPr lang="fr-FR" dirty="0"/>
+              <a:t>A gauche : la gestion de l’instance unique du singleton :</a:t>
+            </a:r>
+          </a:p>
+          <a:p>
+            <a:pPr marL="171450" indent="-171450">
+              <a:buFont typeface="Arial" panose="020B0604020202020204" pitchFamily="34" charset="0"/>
+              <a:buChar char="•"/>
+            </a:pPr>
+            <a:r>
+              <a:rPr lang="fr-FR" dirty="0"/>
+              <a:t>accès </a:t>
+            </a:r>
+            <a:r>
+              <a:rPr lang="fr-FR" dirty="0" err="1"/>
+              <a:t>private</a:t>
+            </a:r>
+            <a:r>
+              <a:rPr lang="fr-FR" dirty="0"/>
+              <a:t> pour instance et constructeur</a:t>
+            </a:r>
+          </a:p>
+          <a:p>
+            <a:pPr marL="171450" indent="-171450">
+              <a:buFont typeface="Arial" panose="020B0604020202020204" pitchFamily="34" charset="0"/>
+              <a:buChar char="•"/>
+            </a:pPr>
+            <a:r>
+              <a:rPr lang="fr-FR" dirty="0" err="1"/>
+              <a:t>methode</a:t>
+            </a:r>
+            <a:r>
+              <a:rPr lang="fr-FR" dirty="0"/>
+              <a:t> </a:t>
+            </a:r>
+            <a:r>
+              <a:rPr lang="fr-FR" dirty="0" err="1"/>
+              <a:t>static</a:t>
+            </a:r>
+            <a:r>
+              <a:rPr lang="fr-FR" dirty="0"/>
+              <a:t> pour obtenir l’instance unique</a:t>
+            </a:r>
+          </a:p>
+          <a:p>
+            <a:pPr marL="171450" indent="-171450">
+              <a:buFont typeface="Arial" panose="020B0604020202020204" pitchFamily="34" charset="0"/>
+              <a:buChar char="•"/>
+            </a:pPr>
+            <a:r>
+              <a:rPr lang="fr-FR" dirty="0"/>
+              <a:t>champs Viewer à portée globale</a:t>
+            </a:r>
+          </a:p>
+          <a:p>
+            <a:pPr marL="171450" indent="-171450">
+              <a:buFont typeface="Arial" panose="020B0604020202020204" pitchFamily="34" charset="0"/>
+              <a:buChar char="•"/>
+            </a:pPr>
+            <a:endParaRPr lang="fr-FR" dirty="0"/>
+          </a:p>
+          <a:p>
+            <a:r>
+              <a:rPr lang="fr-FR" dirty="0"/>
+              <a:t>A droite : la logique de contrôle :</a:t>
+            </a:r>
+          </a:p>
+          <a:p>
+            <a:pPr marL="171450" indent="-171450">
+              <a:buFont typeface="Arial" panose="020B0604020202020204" pitchFamily="34" charset="0"/>
+              <a:buChar char="•"/>
+            </a:pPr>
+            <a:r>
+              <a:rPr lang="fr-FR" dirty="0"/>
+              <a:t>déclaration des variables au début, avec un nom explicite et initialisations</a:t>
+            </a:r>
+          </a:p>
+          <a:p>
+            <a:pPr marL="171450" indent="-171450">
+              <a:buFont typeface="Arial" panose="020B0604020202020204" pitchFamily="34" charset="0"/>
+              <a:buChar char="•"/>
+            </a:pPr>
+            <a:r>
+              <a:rPr lang="fr-FR" dirty="0"/>
+              <a:t>final pour les accès au fichier (devra être changé si utilisation du String[] args)</a:t>
+            </a:r>
+          </a:p>
+          <a:p>
+            <a:pPr marL="171450" indent="-171450">
+              <a:buFont typeface="Arial" panose="020B0604020202020204" pitchFamily="34" charset="0"/>
+              <a:buChar char="•"/>
+            </a:pPr>
+            <a:r>
+              <a:rPr lang="fr-FR" dirty="0"/>
+              <a:t>Portée du DAO limité à la méthode run </a:t>
+            </a:r>
+          </a:p>
+          <a:p>
+            <a:pPr marL="171450" indent="-171450">
+              <a:buFont typeface="Arial" panose="020B0604020202020204" pitchFamily="34" charset="0"/>
+              <a:buChar char="•"/>
+            </a:pPr>
+            <a:endParaRPr lang="fr-FR" dirty="0"/>
+          </a:p>
+          <a:p>
+            <a:r>
+              <a:rPr lang="fr-FR" dirty="0"/>
+              <a:t> </a:t>
+            </a:r>
           </a:p>
         </p:txBody>
       </p:sp>
@@ -1951,7 +1965,7 @@
     </p:spTree>
     <p:extLst>
       <p:ext uri="{BB962C8B-B14F-4D97-AF65-F5344CB8AC3E}">
-        <p14:creationId xmlns:p14="http://schemas.microsoft.com/office/powerpoint/2010/main" val="3039162432"/>
+        <p14:creationId xmlns:p14="http://schemas.microsoft.com/office/powerpoint/2010/main" val="4126443417"/>
       </p:ext>
     </p:extLst>
   </p:cSld>
@@ -2035,7 +2049,7 @@
     </p:spTree>
     <p:extLst>
       <p:ext uri="{BB962C8B-B14F-4D97-AF65-F5344CB8AC3E}">
-        <p14:creationId xmlns:p14="http://schemas.microsoft.com/office/powerpoint/2010/main" val="2310374602"/>
+        <p14:creationId xmlns:p14="http://schemas.microsoft.com/office/powerpoint/2010/main" val="3039162432"/>
       </p:ext>
     </p:extLst>
   </p:cSld>
@@ -2119,7 +2133,7 @@
     </p:spTree>
     <p:extLst>
       <p:ext uri="{BB962C8B-B14F-4D97-AF65-F5344CB8AC3E}">
-        <p14:creationId xmlns:p14="http://schemas.microsoft.com/office/powerpoint/2010/main" val="3276614651"/>
+        <p14:creationId xmlns:p14="http://schemas.microsoft.com/office/powerpoint/2010/main" val="2310374602"/>
       </p:ext>
     </p:extLst>
   </p:cSld>
@@ -2173,13 +2187,7 @@
           <a:bodyPr/>
           <a:lstStyle/>
           <a:p>
-            <a:r>
-              <a:rPr lang="fr-FR" dirty="0"/>
-              <a:t>Polymorphisme</a:t>
-            </a:r>
-          </a:p>
-          <a:p>
-            <a:endParaRPr lang="fr-FR" dirty="0"/>
+            <a:endParaRPr lang="fr-FR"/>
           </a:p>
         </p:txBody>
       </p:sp>
@@ -2209,7 +2217,7 @@
     </p:spTree>
     <p:extLst>
       <p:ext uri="{BB962C8B-B14F-4D97-AF65-F5344CB8AC3E}">
-        <p14:creationId xmlns:p14="http://schemas.microsoft.com/office/powerpoint/2010/main" val="70605523"/>
+        <p14:creationId xmlns:p14="http://schemas.microsoft.com/office/powerpoint/2010/main" val="3276614651"/>
       </p:ext>
     </p:extLst>
   </p:cSld>
@@ -2347,7 +2355,13 @@
           <a:bodyPr/>
           <a:lstStyle/>
           <a:p>
-            <a:endParaRPr lang="fr-FR"/>
+            <a:r>
+              <a:rPr lang="fr-FR" dirty="0"/>
+              <a:t>Polymorphisme</a:t>
+            </a:r>
+          </a:p>
+          <a:p>
+            <a:endParaRPr lang="fr-FR" dirty="0"/>
           </a:p>
         </p:txBody>
       </p:sp>
@@ -2377,7 +2391,7 @@
     </p:spTree>
     <p:extLst>
       <p:ext uri="{BB962C8B-B14F-4D97-AF65-F5344CB8AC3E}">
-        <p14:creationId xmlns:p14="http://schemas.microsoft.com/office/powerpoint/2010/main" val="572450112"/>
+        <p14:creationId xmlns:p14="http://schemas.microsoft.com/office/powerpoint/2010/main" val="70605523"/>
       </p:ext>
     </p:extLst>
   </p:cSld>
@@ -2461,7 +2475,7 @@
     </p:spTree>
     <p:extLst>
       <p:ext uri="{BB962C8B-B14F-4D97-AF65-F5344CB8AC3E}">
-        <p14:creationId xmlns:p14="http://schemas.microsoft.com/office/powerpoint/2010/main" val="2598232560"/>
+        <p14:creationId xmlns:p14="http://schemas.microsoft.com/office/powerpoint/2010/main" val="572450112"/>
       </p:ext>
     </p:extLst>
   </p:cSld>
@@ -2515,16 +2529,7 @@
           <a:bodyPr/>
           <a:lstStyle/>
           <a:p>
-            <a:r>
-              <a:rPr lang="fr-FR" dirty="0"/>
-              <a:t>FIN</a:t>
-            </a:r>
-          </a:p>
-          <a:p>
-            <a:r>
-              <a:rPr lang="fr-FR" dirty="0"/>
-              <a:t>Questions ?</a:t>
-            </a:r>
+            <a:endParaRPr lang="fr-FR"/>
           </a:p>
         </p:txBody>
       </p:sp>
@@ -2546,6 +2551,99 @@
             <a:fld id="{20E6D720-7EE3-48C6-A432-79F856A50EC5}" type="slidenum">
               <a:rPr lang="fr-FR" smtClean="0"/>
               <a:t>22</a:t>
+            </a:fld>
+            <a:endParaRPr lang="fr-FR"/>
+          </a:p>
+        </p:txBody>
+      </p:sp>
+    </p:spTree>
+    <p:extLst>
+      <p:ext uri="{BB962C8B-B14F-4D97-AF65-F5344CB8AC3E}">
+        <p14:creationId xmlns:p14="http://schemas.microsoft.com/office/powerpoint/2010/main" val="2598232560"/>
+      </p:ext>
+    </p:extLst>
+  </p:cSld>
+  <p:clrMapOvr>
+    <a:masterClrMapping/>
+  </p:clrMapOvr>
+</p:notes>
+</file>
+
+<file path=ppt/notesSlides/notesSlide23.xml><?xml version="1.0" encoding="utf-8"?>
+<p:notes xmlns:a="http://schemas.openxmlformats.org/drawingml/2006/main" xmlns:r="http://schemas.openxmlformats.org/officeDocument/2006/relationships" xmlns:p="http://schemas.openxmlformats.org/presentationml/2006/main">
+  <p:cSld>
+    <p:spTree>
+      <p:nvGrpSpPr>
+        <p:cNvPr id="1" name=""/>
+        <p:cNvGrpSpPr/>
+        <p:nvPr/>
+      </p:nvGrpSpPr>
+      <p:grpSpPr>
+        <a:xfrm>
+          <a:off x="0" y="0"/>
+          <a:ext cx="0" cy="0"/>
+          <a:chOff x="0" y="0"/>
+          <a:chExt cx="0" cy="0"/>
+        </a:xfrm>
+      </p:grpSpPr>
+      <p:sp>
+        <p:nvSpPr>
+          <p:cNvPr id="2" name="Espace réservé de l'image des diapositives 1"/>
+          <p:cNvSpPr>
+            <a:spLocks noGrp="1" noRot="1" noChangeAspect="1"/>
+          </p:cNvSpPr>
+          <p:nvPr>
+            <p:ph type="sldImg"/>
+          </p:nvPr>
+        </p:nvSpPr>
+        <p:spPr/>
+      </p:sp>
+      <p:sp>
+        <p:nvSpPr>
+          <p:cNvPr id="3" name="Espace réservé des notes 2"/>
+          <p:cNvSpPr>
+            <a:spLocks noGrp="1"/>
+          </p:cNvSpPr>
+          <p:nvPr>
+            <p:ph type="body" idx="1"/>
+          </p:nvPr>
+        </p:nvSpPr>
+        <p:spPr/>
+        <p:txBody>
+          <a:bodyPr/>
+          <a:lstStyle/>
+          <a:p>
+            <a:r>
+              <a:rPr lang="fr-FR" dirty="0"/>
+              <a:t>FIN</a:t>
+            </a:r>
+          </a:p>
+          <a:p>
+            <a:r>
+              <a:rPr lang="fr-FR" dirty="0"/>
+              <a:t>Questions ?</a:t>
+            </a:r>
+          </a:p>
+        </p:txBody>
+      </p:sp>
+      <p:sp>
+        <p:nvSpPr>
+          <p:cNvPr id="4" name="Espace réservé du numéro de diapositive 3"/>
+          <p:cNvSpPr>
+            <a:spLocks noGrp="1"/>
+          </p:cNvSpPr>
+          <p:nvPr>
+            <p:ph type="sldNum" sz="quarter" idx="5"/>
+          </p:nvPr>
+        </p:nvSpPr>
+        <p:spPr/>
+        <p:txBody>
+          <a:bodyPr/>
+          <a:lstStyle/>
+          <a:p>
+            <a:fld id="{20E6D720-7EE3-48C6-A432-79F856A50EC5}" type="slidenum">
+              <a:rPr lang="fr-FR" smtClean="0"/>
+              <a:t>23</a:t>
             </a:fld>
             <a:endParaRPr lang="fr-FR"/>
           </a:p>
@@ -10140,6 +10238,143 @@
           <a:chExt cx="0" cy="0"/>
         </a:xfrm>
       </p:grpSpPr>
+      <p:sp>
+        <p:nvSpPr>
+          <p:cNvPr id="2" name="Titre 1">
+            <a:extLst>
+              <a:ext uri="{FF2B5EF4-FFF2-40B4-BE49-F238E27FC236}">
+                <a16:creationId xmlns:a16="http://schemas.microsoft.com/office/drawing/2014/main" id="{71B8B1D2-694D-4124-BFA6-F2C501B35109}"/>
+              </a:ext>
+            </a:extLst>
+          </p:cNvPr>
+          <p:cNvSpPr>
+            <a:spLocks noGrp="1"/>
+          </p:cNvSpPr>
+          <p:nvPr>
+            <p:ph type="title"/>
+          </p:nvPr>
+        </p:nvSpPr>
+        <p:spPr>
+          <a:xfrm>
+            <a:off x="838200" y="365126"/>
+            <a:ext cx="10515600" cy="732118"/>
+          </a:xfrm>
+        </p:spPr>
+        <p:txBody>
+          <a:bodyPr/>
+          <a:lstStyle/>
+          <a:p>
+            <a:pPr algn="ctr"/>
+            <a:r>
+              <a:rPr lang="fr-FR"/>
+              <a:t>UML </a:t>
+            </a:r>
+            <a:endParaRPr lang="fr-FR" dirty="0"/>
+          </a:p>
+        </p:txBody>
+      </p:sp>
+      <p:pic>
+        <p:nvPicPr>
+          <p:cNvPr id="6" name="Espace réservé du contenu 5">
+            <a:extLst>
+              <a:ext uri="{FF2B5EF4-FFF2-40B4-BE49-F238E27FC236}">
+                <a16:creationId xmlns:a16="http://schemas.microsoft.com/office/drawing/2014/main" id="{0D4BA0BD-D958-09EE-17EC-8654E8F7143A}"/>
+              </a:ext>
+            </a:extLst>
+          </p:cNvPr>
+          <p:cNvPicPr>
+            <a:picLocks noGrp="1" noChangeAspect="1"/>
+          </p:cNvPicPr>
+          <p:nvPr>
+            <p:ph idx="1"/>
+          </p:nvPr>
+        </p:nvPicPr>
+        <p:blipFill>
+          <a:blip r:embed="rId3">
+            <a:extLst>
+              <a:ext uri="{28A0092B-C50C-407E-A947-70E740481C1C}">
+                <a14:useLocalDpi xmlns:a14="http://schemas.microsoft.com/office/drawing/2010/main" val="0"/>
+              </a:ext>
+            </a:extLst>
+          </a:blip>
+          <a:stretch>
+            <a:fillRect/>
+          </a:stretch>
+        </p:blipFill>
+        <p:spPr>
+          <a:xfrm>
+            <a:off x="1207464" y="1097243"/>
+            <a:ext cx="9777072" cy="5624232"/>
+          </a:xfrm>
+        </p:spPr>
+      </p:pic>
+      <p:sp>
+        <p:nvSpPr>
+          <p:cNvPr id="4" name="Espace réservé du numéro de diapositive 3">
+            <a:extLst>
+              <a:ext uri="{FF2B5EF4-FFF2-40B4-BE49-F238E27FC236}">
+                <a16:creationId xmlns:a16="http://schemas.microsoft.com/office/drawing/2014/main" id="{CE404544-46A4-47E3-ABC8-EAD4F49196F5}"/>
+              </a:ext>
+            </a:extLst>
+          </p:cNvPr>
+          <p:cNvSpPr>
+            <a:spLocks noGrp="1"/>
+          </p:cNvSpPr>
+          <p:nvPr>
+            <p:ph type="sldNum" sz="quarter" idx="12"/>
+          </p:nvPr>
+        </p:nvSpPr>
+        <p:spPr/>
+        <p:txBody>
+          <a:bodyPr/>
+          <a:lstStyle/>
+          <a:p>
+            <a:fld id="{504562DC-6A68-4B1A-ACD4-40BBA2BD5EE0}" type="slidenum">
+              <a:rPr lang="fr-FR" smtClean="0">
+                <a:solidFill>
+                  <a:schemeClr val="tx1"/>
+                </a:solidFill>
+              </a:rPr>
+              <a:t>13</a:t>
+            </a:fld>
+            <a:endParaRPr lang="fr-FR" dirty="0">
+              <a:solidFill>
+                <a:schemeClr val="tx1"/>
+              </a:solidFill>
+            </a:endParaRPr>
+          </a:p>
+        </p:txBody>
+      </p:sp>
+    </p:spTree>
+    <p:extLst>
+      <p:ext uri="{BB962C8B-B14F-4D97-AF65-F5344CB8AC3E}">
+        <p14:creationId xmlns:p14="http://schemas.microsoft.com/office/powerpoint/2010/main" val="2494145486"/>
+      </p:ext>
+    </p:extLst>
+  </p:cSld>
+  <p:clrMapOvr>
+    <a:masterClrMapping/>
+  </p:clrMapOvr>
+</p:sld>
+</file>
+
+<file path=ppt/slides/slide14.xml><?xml version="1.0" encoding="utf-8"?>
+<p:sld xmlns:a="http://schemas.openxmlformats.org/drawingml/2006/main" xmlns:r="http://schemas.openxmlformats.org/officeDocument/2006/relationships" xmlns:p="http://schemas.openxmlformats.org/presentationml/2006/main">
+  <p:cSld>
+    <p:spTree>
+      <p:nvGrpSpPr>
+        <p:cNvPr id="1" name=""/>
+        <p:cNvGrpSpPr/>
+        <p:nvPr/>
+      </p:nvGrpSpPr>
+      <p:grpSpPr>
+        <a:xfrm>
+          <a:off x="0" y="0"/>
+          <a:ext cx="0" cy="0"/>
+          <a:chOff x="0" y="0"/>
+          <a:chExt cx="0" cy="0"/>
+        </a:xfrm>
+      </p:grpSpPr>
       <p:pic>
         <p:nvPicPr>
           <p:cNvPr id="15" name="Image 14">
@@ -10834,7 +11069,7 @@
                   <a:schemeClr val="tx1"/>
                 </a:solidFill>
               </a:rPr>
-              <a:t>13</a:t>
+              <a:t>14</a:t>
             </a:fld>
             <a:endParaRPr lang="fr-FR" dirty="0">
               <a:solidFill>
@@ -10857,7 +11092,7 @@
 </p:sld>
 </file>
 
-<file path=ppt/slides/slide14.xml><?xml version="1.0" encoding="utf-8"?>
+<file path=ppt/slides/slide15.xml><?xml version="1.0" encoding="utf-8"?>
 <p:sld xmlns:a="http://schemas.openxmlformats.org/drawingml/2006/main" xmlns:r="http://schemas.openxmlformats.org/officeDocument/2006/relationships" xmlns:p="http://schemas.openxmlformats.org/presentationml/2006/main">
   <p:cSld>
     <p:spTree>
@@ -11204,7 +11439,7 @@
                   <a:schemeClr val="tx1"/>
                 </a:solidFill>
               </a:rPr>
-              <a:t>14</a:t>
+              <a:t>15</a:t>
             </a:fld>
             <a:endParaRPr lang="fr-FR" dirty="0">
               <a:solidFill>
@@ -11227,7 +11462,7 @@
 </p:sld>
 </file>
 
-<file path=ppt/slides/slide15.xml><?xml version="1.0" encoding="utf-8"?>
+<file path=ppt/slides/slide16.xml><?xml version="1.0" encoding="utf-8"?>
 <p:sld xmlns:a="http://schemas.openxmlformats.org/drawingml/2006/main" xmlns:r="http://schemas.openxmlformats.org/officeDocument/2006/relationships" xmlns:p="http://schemas.openxmlformats.org/presentationml/2006/main">
   <p:cSld>
     <p:spTree>
@@ -11451,7 +11686,7 @@
                   <a:schemeClr val="tx1"/>
                 </a:solidFill>
               </a:rPr>
-              <a:t>15</a:t>
+              <a:t>16</a:t>
             </a:fld>
             <a:endParaRPr lang="fr-FR" dirty="0">
               <a:solidFill>
@@ -11474,7 +11709,7 @@
 </p:sld>
 </file>
 
-<file path=ppt/slides/slide16.xml><?xml version="1.0" encoding="utf-8"?>
+<file path=ppt/slides/slide17.xml><?xml version="1.0" encoding="utf-8"?>
 <p:sld xmlns:a="http://schemas.openxmlformats.org/drawingml/2006/main" xmlns:r="http://schemas.openxmlformats.org/officeDocument/2006/relationships" xmlns:p="http://schemas.openxmlformats.org/presentationml/2006/main">
   <p:cSld>
     <p:spTree>
@@ -11664,7 +11899,7 @@
                   <a:schemeClr val="tx1"/>
                 </a:solidFill>
               </a:rPr>
-              <a:t>16</a:t>
+              <a:t>17</a:t>
             </a:fld>
             <a:endParaRPr lang="fr-FR" dirty="0">
               <a:solidFill>
@@ -11687,7 +11922,7 @@
 </p:sld>
 </file>
 
-<file path=ppt/slides/slide17.xml><?xml version="1.0" encoding="utf-8"?>
+<file path=ppt/slides/slide18.xml><?xml version="1.0" encoding="utf-8"?>
 <p:sld xmlns:a="http://schemas.openxmlformats.org/drawingml/2006/main" xmlns:r="http://schemas.openxmlformats.org/officeDocument/2006/relationships" xmlns:p="http://schemas.openxmlformats.org/presentationml/2006/main">
   <p:cSld>
     <p:spTree>
@@ -11796,7 +12031,7 @@
                   <a:schemeClr val="tx1"/>
                 </a:solidFill>
               </a:rPr>
-              <a:t>17</a:t>
+              <a:t>18</a:t>
             </a:fld>
             <a:endParaRPr lang="fr-FR" dirty="0">
               <a:solidFill>
@@ -11819,7 +12054,7 @@
 </p:sld>
 </file>
 
-<file path=ppt/slides/slide18.xml><?xml version="1.0" encoding="utf-8"?>
+<file path=ppt/slides/slide19.xml><?xml version="1.0" encoding="utf-8"?>
 <p:sld xmlns:a="http://schemas.openxmlformats.org/drawingml/2006/main" xmlns:r="http://schemas.openxmlformats.org/officeDocument/2006/relationships" xmlns:p="http://schemas.openxmlformats.org/presentationml/2006/main">
   <p:cSld>
     <p:spTree>
@@ -11978,7 +12213,7 @@
                   <a:schemeClr val="tx1"/>
                 </a:solidFill>
               </a:rPr>
-              <a:t>18</a:t>
+              <a:t>19</a:t>
             </a:fld>
             <a:endParaRPr lang="fr-FR" dirty="0">
               <a:solidFill>
@@ -12001,7 +12236,437 @@
 </p:sld>
 </file>
 
-<file path=ppt/slides/slide19.xml><?xml version="1.0" encoding="utf-8"?>
+<file path=ppt/slides/slide2.xml><?xml version="1.0" encoding="utf-8"?>
+<p:sld xmlns:a="http://schemas.openxmlformats.org/drawingml/2006/main" xmlns:r="http://schemas.openxmlformats.org/officeDocument/2006/relationships" xmlns:p="http://schemas.openxmlformats.org/presentationml/2006/main">
+  <p:cSld>
+    <p:spTree>
+      <p:nvGrpSpPr>
+        <p:cNvPr id="1" name=""/>
+        <p:cNvGrpSpPr/>
+        <p:nvPr/>
+      </p:nvGrpSpPr>
+      <p:grpSpPr>
+        <a:xfrm>
+          <a:off x="0" y="0"/>
+          <a:ext cx="0" cy="0"/>
+          <a:chOff x="0" y="0"/>
+          <a:chExt cx="0" cy="0"/>
+        </a:xfrm>
+      </p:grpSpPr>
+      <p:sp>
+        <p:nvSpPr>
+          <p:cNvPr id="2" name="Titre 1">
+            <a:extLst>
+              <a:ext uri="{FF2B5EF4-FFF2-40B4-BE49-F238E27FC236}">
+                <a16:creationId xmlns:a16="http://schemas.microsoft.com/office/drawing/2014/main" id="{DDA24EF0-3A4B-4E54-8339-CA6871D44C6A}"/>
+              </a:ext>
+            </a:extLst>
+          </p:cNvPr>
+          <p:cNvSpPr>
+            <a:spLocks noGrp="1"/>
+          </p:cNvSpPr>
+          <p:nvPr>
+            <p:ph type="title"/>
+          </p:nvPr>
+        </p:nvSpPr>
+        <p:spPr/>
+        <p:txBody>
+          <a:bodyPr/>
+          <a:lstStyle/>
+          <a:p>
+            <a:pPr algn="ctr"/>
+            <a:r>
+              <a:rPr lang="fr-FR" dirty="0"/>
+              <a:t>Sommaire</a:t>
+            </a:r>
+          </a:p>
+        </p:txBody>
+      </p:sp>
+      <p:sp>
+        <p:nvSpPr>
+          <p:cNvPr id="3" name="Espace réservé du contenu 2">
+            <a:extLst>
+              <a:ext uri="{FF2B5EF4-FFF2-40B4-BE49-F238E27FC236}">
+                <a16:creationId xmlns:a16="http://schemas.microsoft.com/office/drawing/2014/main" id="{60FDD6D5-A309-4EB5-8CBF-E6C70A3FEABD}"/>
+              </a:ext>
+            </a:extLst>
+          </p:cNvPr>
+          <p:cNvSpPr>
+            <a:spLocks noGrp="1"/>
+          </p:cNvSpPr>
+          <p:nvPr>
+            <p:ph idx="1"/>
+          </p:nvPr>
+        </p:nvSpPr>
+        <p:spPr>
+          <a:xfrm>
+            <a:off x="1845732" y="1825625"/>
+            <a:ext cx="8500535" cy="4351338"/>
+          </a:xfrm>
+        </p:spPr>
+        <p:txBody>
+          <a:bodyPr>
+            <a:normAutofit fontScale="92500" lnSpcReduction="20000"/>
+          </a:bodyPr>
+          <a:lstStyle/>
+          <a:p>
+            <a:pPr>
+              <a:lnSpc>
+                <a:spcPct val="80000"/>
+              </a:lnSpc>
+            </a:pPr>
+            <a:r>
+              <a:rPr lang="fr-FR" sz="2600">
+                <a:hlinkClick r:id="rId3" action="ppaction://hlinksldjump"/>
+              </a:rPr>
+              <a:t>Les contraintes techniques</a:t>
+            </a:r>
+            <a:endParaRPr lang="fr-FR" sz="2600"/>
+          </a:p>
+          <a:p>
+            <a:pPr>
+              <a:lnSpc>
+                <a:spcPct val="80000"/>
+              </a:lnSpc>
+            </a:pPr>
+            <a:r>
+              <a:rPr lang="fr-FR" sz="2600">
+                <a:hlinkClick r:id="rId4" action="ppaction://hlinksldjump"/>
+              </a:rPr>
+              <a:t>Exigences</a:t>
+            </a:r>
+            <a:endParaRPr lang="fr-FR" sz="2600"/>
+          </a:p>
+          <a:p>
+            <a:pPr>
+              <a:lnSpc>
+                <a:spcPct val="80000"/>
+              </a:lnSpc>
+            </a:pPr>
+            <a:r>
+              <a:rPr lang="fr-FR" sz="2600">
+                <a:hlinkClick r:id="rId5" action="ppaction://hlinksldjump"/>
+              </a:rPr>
+              <a:t>Les besoins du back-end</a:t>
+            </a:r>
+            <a:endParaRPr lang="fr-FR" sz="2600" dirty="0"/>
+          </a:p>
+          <a:p>
+            <a:pPr>
+              <a:lnSpc>
+                <a:spcPct val="80000"/>
+              </a:lnSpc>
+            </a:pPr>
+            <a:r>
+              <a:rPr lang="fr-FR" sz="2600">
+                <a:hlinkClick r:id="rId6" action="ppaction://hlinksldjump"/>
+              </a:rPr>
+              <a:t>Tests d'acceptation</a:t>
+            </a:r>
+            <a:endParaRPr lang="fr-FR" sz="2600"/>
+          </a:p>
+          <a:p>
+            <a:pPr>
+              <a:lnSpc>
+                <a:spcPct val="80000"/>
+              </a:lnSpc>
+            </a:pPr>
+            <a:r>
+              <a:rPr lang="fr-FR" sz="2600">
+                <a:hlinkClick r:id="rId7" action="ppaction://hlinksldjump"/>
+              </a:rPr>
+              <a:t>UML</a:t>
+            </a:r>
+            <a:endParaRPr lang="fr-FR" sz="2600" dirty="0"/>
+          </a:p>
+          <a:p>
+            <a:pPr>
+              <a:lnSpc>
+                <a:spcPct val="80000"/>
+              </a:lnSpc>
+            </a:pPr>
+            <a:r>
+              <a:rPr lang="fr-FR" sz="2600" dirty="0">
+                <a:hlinkClick r:id="rId8" action="ppaction://hlinksldjump"/>
+              </a:rPr>
+              <a:t>1</a:t>
+            </a:r>
+            <a:r>
+              <a:rPr lang="fr-FR" sz="2600" baseline="30000" dirty="0">
+                <a:hlinkClick r:id="rId8" action="ppaction://hlinksldjump"/>
+              </a:rPr>
+              <a:t>ère</a:t>
+            </a:r>
+            <a:r>
+              <a:rPr lang="fr-FR" sz="2600" dirty="0">
+                <a:hlinkClick r:id="rId8" action="ppaction://hlinksldjump"/>
+              </a:rPr>
+              <a:t> itération : lire le fichier</a:t>
+            </a:r>
+            <a:endParaRPr lang="fr-FR" sz="2600" dirty="0"/>
+          </a:p>
+          <a:p>
+            <a:pPr lvl="1">
+              <a:lnSpc>
+                <a:spcPct val="80000"/>
+              </a:lnSpc>
+              <a:buFont typeface="Courier New" panose="02070309020205020404" pitchFamily="49" charset="0"/>
+              <a:buChar char="o"/>
+            </a:pPr>
+            <a:r>
+              <a:rPr lang="fr-FR" sz="2200" dirty="0"/>
+              <a:t> </a:t>
+            </a:r>
+            <a:r>
+              <a:rPr lang="fr-FR" sz="2200" dirty="0">
+                <a:hlinkClick r:id="rId9" action="ppaction://hlinksldjump"/>
+              </a:rPr>
+              <a:t>Le contrôleur</a:t>
+            </a:r>
+            <a:endParaRPr lang="fr-FR" sz="2200" dirty="0"/>
+          </a:p>
+          <a:p>
+            <a:pPr lvl="1">
+              <a:lnSpc>
+                <a:spcPct val="80000"/>
+              </a:lnSpc>
+              <a:buFont typeface="Courier New" panose="02070309020205020404" pitchFamily="49" charset="0"/>
+              <a:buChar char="o"/>
+            </a:pPr>
+            <a:r>
+              <a:rPr lang="fr-FR" sz="2200" dirty="0"/>
+              <a:t> </a:t>
+            </a:r>
+            <a:r>
+              <a:rPr lang="fr-FR" sz="2200" dirty="0">
+                <a:hlinkClick r:id="rId10" action="ppaction://hlinksldjump"/>
+              </a:rPr>
+              <a:t>DAO</a:t>
+            </a:r>
+            <a:endParaRPr lang="fr-FR" sz="2200" dirty="0"/>
+          </a:p>
+          <a:p>
+            <a:pPr lvl="1">
+              <a:lnSpc>
+                <a:spcPct val="80000"/>
+              </a:lnSpc>
+              <a:buFont typeface="Courier New" panose="02070309020205020404" pitchFamily="49" charset="0"/>
+              <a:buChar char="o"/>
+            </a:pPr>
+            <a:r>
+              <a:rPr lang="fr-FR" sz="2200" dirty="0"/>
+              <a:t> </a:t>
+            </a:r>
+            <a:r>
+              <a:rPr lang="fr-FR" sz="2200" dirty="0">
+                <a:hlinkClick r:id="rId11" action="ppaction://hlinksldjump"/>
+              </a:rPr>
+              <a:t>Résultat</a:t>
+            </a:r>
+            <a:endParaRPr lang="fr-FR" sz="2200" dirty="0"/>
+          </a:p>
+          <a:p>
+            <a:pPr>
+              <a:lnSpc>
+                <a:spcPct val="80000"/>
+              </a:lnSpc>
+            </a:pPr>
+            <a:r>
+              <a:rPr lang="fr-FR" sz="2600" dirty="0">
+                <a:hlinkClick r:id="rId12" action="ppaction://hlinksldjump"/>
+              </a:rPr>
+              <a:t>2ème itération : écrire le fichier </a:t>
+            </a:r>
+            <a:r>
+              <a:rPr lang="fr-FR" sz="2600" dirty="0" err="1">
+                <a:hlinkClick r:id="rId12" action="ppaction://hlinksldjump"/>
+              </a:rPr>
+              <a:t>result.out</a:t>
+            </a:r>
+            <a:endParaRPr lang="fr-FR" sz="2600" dirty="0"/>
+          </a:p>
+          <a:p>
+            <a:pPr lvl="1">
+              <a:lnSpc>
+                <a:spcPct val="80000"/>
+              </a:lnSpc>
+              <a:buFont typeface="Courier New" panose="02070309020205020404" pitchFamily="49" charset="0"/>
+              <a:buChar char="o"/>
+            </a:pPr>
+            <a:r>
+              <a:rPr lang="fr-FR" sz="2200" dirty="0"/>
+              <a:t> </a:t>
+            </a:r>
+            <a:r>
+              <a:rPr lang="fr-FR" sz="2200" dirty="0">
+                <a:hlinkClick r:id="rId13" action="ppaction://hlinksldjump"/>
+              </a:rPr>
+              <a:t>Le modèle</a:t>
+            </a:r>
+            <a:endParaRPr lang="fr-FR" sz="2200" dirty="0"/>
+          </a:p>
+          <a:p>
+            <a:pPr lvl="1">
+              <a:lnSpc>
+                <a:spcPct val="80000"/>
+              </a:lnSpc>
+              <a:buFont typeface="Courier New" panose="02070309020205020404" pitchFamily="49" charset="0"/>
+              <a:buChar char="o"/>
+            </a:pPr>
+            <a:r>
+              <a:rPr lang="fr-FR" sz="2200" dirty="0"/>
+              <a:t> </a:t>
+            </a:r>
+            <a:r>
+              <a:rPr lang="fr-FR" sz="2200" dirty="0">
+                <a:hlinkClick r:id="rId14" action="ppaction://hlinksldjump"/>
+              </a:rPr>
+              <a:t>Code ajouté dans le contrôleur</a:t>
+            </a:r>
+            <a:endParaRPr lang="fr-FR" sz="2200" dirty="0"/>
+          </a:p>
+          <a:p>
+            <a:pPr lvl="1">
+              <a:lnSpc>
+                <a:spcPct val="80000"/>
+              </a:lnSpc>
+              <a:buFont typeface="Courier New" panose="02070309020205020404" pitchFamily="49" charset="0"/>
+              <a:buChar char="o"/>
+            </a:pPr>
+            <a:r>
+              <a:rPr lang="fr-FR" sz="2200" dirty="0"/>
+              <a:t> </a:t>
+            </a:r>
+            <a:r>
+              <a:rPr lang="fr-FR" sz="2200" dirty="0">
+                <a:hlinkClick r:id="rId15" action="ppaction://hlinksldjump"/>
+              </a:rPr>
+              <a:t>DAO</a:t>
+            </a:r>
+            <a:endParaRPr lang="fr-FR" sz="2200" dirty="0"/>
+          </a:p>
+          <a:p>
+            <a:pPr lvl="1">
+              <a:lnSpc>
+                <a:spcPct val="80000"/>
+              </a:lnSpc>
+              <a:buFont typeface="Courier New" panose="02070309020205020404" pitchFamily="49" charset="0"/>
+              <a:buChar char="o"/>
+            </a:pPr>
+            <a:r>
+              <a:rPr lang="fr-FR" sz="2200" dirty="0"/>
+              <a:t> </a:t>
+            </a:r>
+            <a:r>
+              <a:rPr lang="fr-FR" sz="2200" dirty="0">
+                <a:hlinkClick r:id="rId16" action="ppaction://hlinksldjump"/>
+              </a:rPr>
+              <a:t>La solution fonctionnelle</a:t>
+            </a:r>
+            <a:endParaRPr lang="fr-FR" sz="2000" dirty="0"/>
+          </a:p>
+          <a:p>
+            <a:pPr lvl="1">
+              <a:lnSpc>
+                <a:spcPct val="70000"/>
+              </a:lnSpc>
+              <a:buFont typeface="Courier New" panose="02070309020205020404" pitchFamily="49" charset="0"/>
+              <a:buChar char="o"/>
+            </a:pPr>
+            <a:endParaRPr lang="fr-FR" sz="2000" dirty="0"/>
+          </a:p>
+          <a:p>
+            <a:pPr lvl="1">
+              <a:lnSpc>
+                <a:spcPct val="70000"/>
+              </a:lnSpc>
+              <a:buFont typeface="Courier New" panose="02070309020205020404" pitchFamily="49" charset="0"/>
+              <a:buChar char="o"/>
+            </a:pPr>
+            <a:endParaRPr lang="fr-FR" sz="2000" dirty="0"/>
+          </a:p>
+          <a:p>
+            <a:endParaRPr lang="fr-FR" sz="2400" dirty="0"/>
+          </a:p>
+          <a:p>
+            <a:endParaRPr lang="fr-FR" sz="2400" dirty="0"/>
+          </a:p>
+          <a:p>
+            <a:pPr lvl="1">
+              <a:buFont typeface="Courier New" panose="02070309020205020404" pitchFamily="49" charset="0"/>
+              <a:buChar char="o"/>
+            </a:pPr>
+            <a:endParaRPr lang="fr-FR" sz="2000" dirty="0"/>
+          </a:p>
+          <a:p>
+            <a:pPr lvl="1">
+              <a:buFont typeface="Courier New" panose="02070309020205020404" pitchFamily="49" charset="0"/>
+              <a:buChar char="o"/>
+            </a:pPr>
+            <a:endParaRPr lang="fr-FR" dirty="0"/>
+          </a:p>
+          <a:p>
+            <a:endParaRPr lang="fr-FR" dirty="0"/>
+          </a:p>
+          <a:p>
+            <a:endParaRPr lang="fr-FR" dirty="0"/>
+          </a:p>
+          <a:p>
+            <a:endParaRPr lang="fr-FR" dirty="0"/>
+          </a:p>
+        </p:txBody>
+      </p:sp>
+      <p:sp>
+        <p:nvSpPr>
+          <p:cNvPr id="4" name="Espace réservé du numéro de diapositive 3">
+            <a:extLst>
+              <a:ext uri="{FF2B5EF4-FFF2-40B4-BE49-F238E27FC236}">
+                <a16:creationId xmlns:a16="http://schemas.microsoft.com/office/drawing/2014/main" id="{26D5CFC3-CCE2-41FA-B569-20CEA6AFDCD5}"/>
+              </a:ext>
+            </a:extLst>
+          </p:cNvPr>
+          <p:cNvSpPr>
+            <a:spLocks noGrp="1"/>
+          </p:cNvSpPr>
+          <p:nvPr>
+            <p:ph type="sldNum" sz="quarter" idx="12"/>
+          </p:nvPr>
+        </p:nvSpPr>
+        <p:spPr/>
+        <p:txBody>
+          <a:bodyPr/>
+          <a:lstStyle/>
+          <a:p>
+            <a:fld id="{504562DC-6A68-4B1A-ACD4-40BBA2BD5EE0}" type="slidenum">
+              <a:rPr lang="fr-FR" smtClean="0">
+                <a:solidFill>
+                  <a:schemeClr val="tx1"/>
+                </a:solidFill>
+              </a:rPr>
+              <a:t>2</a:t>
+            </a:fld>
+            <a:endParaRPr lang="fr-FR" dirty="0">
+              <a:solidFill>
+                <a:schemeClr val="tx1"/>
+              </a:solidFill>
+            </a:endParaRPr>
+          </a:p>
+        </p:txBody>
+      </p:sp>
+    </p:spTree>
+    <p:extLst>
+      <p:ext uri="{BB962C8B-B14F-4D97-AF65-F5344CB8AC3E}">
+        <p14:creationId xmlns:p14="http://schemas.microsoft.com/office/powerpoint/2010/main" val="4100240391"/>
+      </p:ext>
+    </p:extLst>
+  </p:cSld>
+  <p:clrMapOvr>
+    <a:masterClrMapping/>
+  </p:clrMapOvr>
+</p:sld>
+</file>
+
+<file path=ppt/slides/slide20.xml><?xml version="1.0" encoding="utf-8"?>
 <p:sld xmlns:a="http://schemas.openxmlformats.org/drawingml/2006/main" xmlns:r="http://schemas.openxmlformats.org/officeDocument/2006/relationships" xmlns:p="http://schemas.openxmlformats.org/presentationml/2006/main">
   <p:cSld>
     <p:spTree>
@@ -12184,7 +12849,7 @@
                   <a:schemeClr val="tx1"/>
                 </a:solidFill>
               </a:rPr>
-              <a:t>19</a:t>
+              <a:t>20</a:t>
             </a:fld>
             <a:endParaRPr lang="fr-FR" dirty="0">
               <a:solidFill>
@@ -12207,443 +12872,7 @@
 </p:sld>
 </file>
 
-<file path=ppt/slides/slide2.xml><?xml version="1.0" encoding="utf-8"?>
-<p:sld xmlns:a="http://schemas.openxmlformats.org/drawingml/2006/main" xmlns:r="http://schemas.openxmlformats.org/officeDocument/2006/relationships" xmlns:p="http://schemas.openxmlformats.org/presentationml/2006/main">
-  <p:cSld>
-    <p:spTree>
-      <p:nvGrpSpPr>
-        <p:cNvPr id="1" name=""/>
-        <p:cNvGrpSpPr/>
-        <p:nvPr/>
-      </p:nvGrpSpPr>
-      <p:grpSpPr>
-        <a:xfrm>
-          <a:off x="0" y="0"/>
-          <a:ext cx="0" cy="0"/>
-          <a:chOff x="0" y="0"/>
-          <a:chExt cx="0" cy="0"/>
-        </a:xfrm>
-      </p:grpSpPr>
-      <p:sp>
-        <p:nvSpPr>
-          <p:cNvPr id="2" name="Titre 1">
-            <a:extLst>
-              <a:ext uri="{FF2B5EF4-FFF2-40B4-BE49-F238E27FC236}">
-                <a16:creationId xmlns:a16="http://schemas.microsoft.com/office/drawing/2014/main" id="{DDA24EF0-3A4B-4E54-8339-CA6871D44C6A}"/>
-              </a:ext>
-            </a:extLst>
-          </p:cNvPr>
-          <p:cNvSpPr>
-            <a:spLocks noGrp="1"/>
-          </p:cNvSpPr>
-          <p:nvPr>
-            <p:ph type="title"/>
-          </p:nvPr>
-        </p:nvSpPr>
-        <p:spPr/>
-        <p:txBody>
-          <a:bodyPr/>
-          <a:lstStyle/>
-          <a:p>
-            <a:pPr algn="ctr"/>
-            <a:r>
-              <a:rPr lang="fr-FR" dirty="0"/>
-              <a:t>Sommaire</a:t>
-            </a:r>
-          </a:p>
-        </p:txBody>
-      </p:sp>
-      <p:sp>
-        <p:nvSpPr>
-          <p:cNvPr id="3" name="Espace réservé du contenu 2">
-            <a:extLst>
-              <a:ext uri="{FF2B5EF4-FFF2-40B4-BE49-F238E27FC236}">
-                <a16:creationId xmlns:a16="http://schemas.microsoft.com/office/drawing/2014/main" id="{60FDD6D5-A309-4EB5-8CBF-E6C70A3FEABD}"/>
-              </a:ext>
-            </a:extLst>
-          </p:cNvPr>
-          <p:cNvSpPr>
-            <a:spLocks noGrp="1"/>
-          </p:cNvSpPr>
-          <p:nvPr>
-            <p:ph idx="1"/>
-          </p:nvPr>
-        </p:nvSpPr>
-        <p:spPr>
-          <a:xfrm>
-            <a:off x="1845732" y="1825625"/>
-            <a:ext cx="8500535" cy="4351338"/>
-          </a:xfrm>
-        </p:spPr>
-        <p:txBody>
-          <a:bodyPr>
-            <a:normAutofit fontScale="92500" lnSpcReduction="20000"/>
-          </a:bodyPr>
-          <a:lstStyle/>
-          <a:p>
-            <a:pPr>
-              <a:lnSpc>
-                <a:spcPct val="80000"/>
-              </a:lnSpc>
-            </a:pPr>
-            <a:r>
-              <a:rPr lang="fr-FR" sz="2600">
-                <a:hlinkClick r:id="rId3" action="ppaction://hlinksldjump"/>
-              </a:rPr>
-              <a:t>Les contraintes techniques</a:t>
-            </a:r>
-            <a:endParaRPr lang="fr-FR" sz="2600"/>
-          </a:p>
-          <a:p>
-            <a:pPr>
-              <a:lnSpc>
-                <a:spcPct val="80000"/>
-              </a:lnSpc>
-            </a:pPr>
-            <a:r>
-              <a:rPr lang="fr-FR" sz="2600">
-                <a:hlinkClick r:id="rId4" action="ppaction://hlinksldjump"/>
-              </a:rPr>
-              <a:t>Exigences</a:t>
-            </a:r>
-            <a:endParaRPr lang="fr-FR" sz="2600"/>
-          </a:p>
-          <a:p>
-            <a:pPr>
-              <a:lnSpc>
-                <a:spcPct val="80000"/>
-              </a:lnSpc>
-            </a:pPr>
-            <a:r>
-              <a:rPr lang="fr-FR" sz="2600">
-                <a:hlinkClick r:id="rId5" action="ppaction://hlinksldjump"/>
-              </a:rPr>
-              <a:t>Les besoins du back-end</a:t>
-            </a:r>
-            <a:endParaRPr lang="fr-FR" sz="2600" dirty="0"/>
-          </a:p>
-          <a:p>
-            <a:pPr>
-              <a:lnSpc>
-                <a:spcPct val="80000"/>
-              </a:lnSpc>
-            </a:pPr>
-            <a:r>
-              <a:rPr lang="fr-FR" sz="2600">
-                <a:hlinkClick r:id="rId6" action="ppaction://hlinksldjump"/>
-              </a:rPr>
-              <a:t>Tests d'acceptation</a:t>
-            </a:r>
-            <a:endParaRPr lang="fr-FR" sz="2600"/>
-          </a:p>
-          <a:p>
-            <a:pPr>
-              <a:lnSpc>
-                <a:spcPct val="80000"/>
-              </a:lnSpc>
-            </a:pPr>
-            <a:r>
-              <a:rPr lang="fr-FR" sz="2600">
-                <a:hlinkClick r:id="rId7" action="ppaction://hlinksldjump"/>
-              </a:rPr>
-              <a:t>Test </a:t>
-            </a:r>
-            <a:r>
-              <a:rPr lang="fr-FR" sz="2600" dirty="0">
-                <a:hlinkClick r:id="rId7" action="ppaction://hlinksldjump"/>
-              </a:rPr>
-              <a:t>du code original</a:t>
-            </a:r>
-            <a:endParaRPr lang="fr-FR" sz="2600" dirty="0"/>
-          </a:p>
-          <a:p>
-            <a:pPr>
-              <a:lnSpc>
-                <a:spcPct val="80000"/>
-              </a:lnSpc>
-            </a:pPr>
-            <a:r>
-              <a:rPr lang="fr-FR" sz="2600" dirty="0">
-                <a:hlinkClick r:id="rId8" action="ppaction://hlinksldjump"/>
-              </a:rPr>
-              <a:t>1</a:t>
-            </a:r>
-            <a:r>
-              <a:rPr lang="fr-FR" sz="2600" baseline="30000" dirty="0">
-                <a:hlinkClick r:id="rId8" action="ppaction://hlinksldjump"/>
-              </a:rPr>
-              <a:t>ère</a:t>
-            </a:r>
-            <a:r>
-              <a:rPr lang="fr-FR" sz="2600" dirty="0">
-                <a:hlinkClick r:id="rId8" action="ppaction://hlinksldjump"/>
-              </a:rPr>
-              <a:t> itération : lire le fichier</a:t>
-            </a:r>
-            <a:endParaRPr lang="fr-FR" sz="2600" dirty="0"/>
-          </a:p>
-          <a:p>
-            <a:pPr lvl="1">
-              <a:lnSpc>
-                <a:spcPct val="80000"/>
-              </a:lnSpc>
-              <a:buFont typeface="Courier New" panose="02070309020205020404" pitchFamily="49" charset="0"/>
-              <a:buChar char="o"/>
-            </a:pPr>
-            <a:r>
-              <a:rPr lang="fr-FR" sz="2200" dirty="0"/>
-              <a:t> </a:t>
-            </a:r>
-            <a:r>
-              <a:rPr lang="fr-FR" sz="2200" dirty="0">
-                <a:hlinkClick r:id="rId9" action="ppaction://hlinksldjump"/>
-              </a:rPr>
-              <a:t>Le contrôleur</a:t>
-            </a:r>
-            <a:endParaRPr lang="fr-FR" sz="2200" dirty="0"/>
-          </a:p>
-          <a:p>
-            <a:pPr lvl="1">
-              <a:lnSpc>
-                <a:spcPct val="80000"/>
-              </a:lnSpc>
-              <a:buFont typeface="Courier New" panose="02070309020205020404" pitchFamily="49" charset="0"/>
-              <a:buChar char="o"/>
-            </a:pPr>
-            <a:r>
-              <a:rPr lang="fr-FR" sz="2200" dirty="0"/>
-              <a:t> </a:t>
-            </a:r>
-            <a:r>
-              <a:rPr lang="fr-FR" sz="2200" dirty="0">
-                <a:hlinkClick r:id="rId10" action="ppaction://hlinksldjump"/>
-              </a:rPr>
-              <a:t>DAO</a:t>
-            </a:r>
-            <a:endParaRPr lang="fr-FR" sz="2200" dirty="0"/>
-          </a:p>
-          <a:p>
-            <a:pPr lvl="1">
-              <a:lnSpc>
-                <a:spcPct val="80000"/>
-              </a:lnSpc>
-              <a:buFont typeface="Courier New" panose="02070309020205020404" pitchFamily="49" charset="0"/>
-              <a:buChar char="o"/>
-            </a:pPr>
-            <a:r>
-              <a:rPr lang="fr-FR" sz="2200" dirty="0"/>
-              <a:t> </a:t>
-            </a:r>
-            <a:r>
-              <a:rPr lang="fr-FR" sz="2200" dirty="0">
-                <a:hlinkClick r:id="rId11" action="ppaction://hlinksldjump"/>
-              </a:rPr>
-              <a:t>Résultat</a:t>
-            </a:r>
-            <a:endParaRPr lang="fr-FR" sz="2200" dirty="0"/>
-          </a:p>
-          <a:p>
-            <a:pPr>
-              <a:lnSpc>
-                <a:spcPct val="80000"/>
-              </a:lnSpc>
-            </a:pPr>
-            <a:r>
-              <a:rPr lang="fr-FR" sz="2600" dirty="0">
-                <a:hlinkClick r:id="rId12" action="ppaction://hlinksldjump"/>
-              </a:rPr>
-              <a:t>2ème itération : écrire le fichier </a:t>
-            </a:r>
-            <a:r>
-              <a:rPr lang="fr-FR" sz="2600" dirty="0" err="1">
-                <a:hlinkClick r:id="rId12" action="ppaction://hlinksldjump"/>
-              </a:rPr>
-              <a:t>result.out</a:t>
-            </a:r>
-            <a:endParaRPr lang="fr-FR" sz="2600" dirty="0"/>
-          </a:p>
-          <a:p>
-            <a:pPr lvl="1">
-              <a:lnSpc>
-                <a:spcPct val="80000"/>
-              </a:lnSpc>
-              <a:buFont typeface="Courier New" panose="02070309020205020404" pitchFamily="49" charset="0"/>
-              <a:buChar char="o"/>
-            </a:pPr>
-            <a:r>
-              <a:rPr lang="fr-FR" sz="2200" dirty="0"/>
-              <a:t> </a:t>
-            </a:r>
-            <a:r>
-              <a:rPr lang="fr-FR" sz="2200" dirty="0">
-                <a:hlinkClick r:id="rId13" action="ppaction://hlinksldjump"/>
-              </a:rPr>
-              <a:t>Le modèle</a:t>
-            </a:r>
-            <a:endParaRPr lang="fr-FR" sz="2200" dirty="0"/>
-          </a:p>
-          <a:p>
-            <a:pPr lvl="1">
-              <a:lnSpc>
-                <a:spcPct val="80000"/>
-              </a:lnSpc>
-              <a:buFont typeface="Courier New" panose="02070309020205020404" pitchFamily="49" charset="0"/>
-              <a:buChar char="o"/>
-            </a:pPr>
-            <a:r>
-              <a:rPr lang="fr-FR" sz="2200" dirty="0"/>
-              <a:t> </a:t>
-            </a:r>
-            <a:r>
-              <a:rPr lang="fr-FR" sz="2200" dirty="0">
-                <a:hlinkClick r:id="rId14" action="ppaction://hlinksldjump"/>
-              </a:rPr>
-              <a:t>Code ajouté dans le contrôleur</a:t>
-            </a:r>
-            <a:endParaRPr lang="fr-FR" sz="2200" dirty="0"/>
-          </a:p>
-          <a:p>
-            <a:pPr lvl="1">
-              <a:lnSpc>
-                <a:spcPct val="80000"/>
-              </a:lnSpc>
-              <a:buFont typeface="Courier New" panose="02070309020205020404" pitchFamily="49" charset="0"/>
-              <a:buChar char="o"/>
-            </a:pPr>
-            <a:r>
-              <a:rPr lang="fr-FR" sz="2200" dirty="0"/>
-              <a:t> </a:t>
-            </a:r>
-            <a:r>
-              <a:rPr lang="fr-FR" sz="2200" dirty="0">
-                <a:hlinkClick r:id="rId15" action="ppaction://hlinksldjump"/>
-              </a:rPr>
-              <a:t>DAO</a:t>
-            </a:r>
-            <a:endParaRPr lang="fr-FR" sz="2200" dirty="0"/>
-          </a:p>
-          <a:p>
-            <a:pPr lvl="1">
-              <a:lnSpc>
-                <a:spcPct val="80000"/>
-              </a:lnSpc>
-              <a:buFont typeface="Courier New" panose="02070309020205020404" pitchFamily="49" charset="0"/>
-              <a:buChar char="o"/>
-            </a:pPr>
-            <a:r>
-              <a:rPr lang="fr-FR" sz="2200" dirty="0"/>
-              <a:t> </a:t>
-            </a:r>
-            <a:r>
-              <a:rPr lang="fr-FR" sz="2200" dirty="0">
-                <a:hlinkClick r:id="rId16" action="ppaction://hlinksldjump"/>
-              </a:rPr>
-              <a:t>La solution fonctionnelle</a:t>
-            </a:r>
-            <a:endParaRPr lang="fr-FR" sz="2000" dirty="0"/>
-          </a:p>
-          <a:p>
-            <a:pPr lvl="1">
-              <a:lnSpc>
-                <a:spcPct val="70000"/>
-              </a:lnSpc>
-              <a:buFont typeface="Courier New" panose="02070309020205020404" pitchFamily="49" charset="0"/>
-              <a:buChar char="o"/>
-            </a:pPr>
-            <a:endParaRPr lang="fr-FR" sz="2000" dirty="0"/>
-          </a:p>
-          <a:p>
-            <a:pPr lvl="1">
-              <a:lnSpc>
-                <a:spcPct val="70000"/>
-              </a:lnSpc>
-              <a:buFont typeface="Courier New" panose="02070309020205020404" pitchFamily="49" charset="0"/>
-              <a:buChar char="o"/>
-            </a:pPr>
-            <a:endParaRPr lang="fr-FR" sz="2000" dirty="0"/>
-          </a:p>
-          <a:p>
-            <a:endParaRPr lang="fr-FR" sz="2400" dirty="0"/>
-          </a:p>
-          <a:p>
-            <a:endParaRPr lang="fr-FR" sz="2400" dirty="0"/>
-          </a:p>
-          <a:p>
-            <a:pPr lvl="1">
-              <a:buFont typeface="Courier New" panose="02070309020205020404" pitchFamily="49" charset="0"/>
-              <a:buChar char="o"/>
-            </a:pPr>
-            <a:endParaRPr lang="fr-FR" sz="2000" dirty="0"/>
-          </a:p>
-          <a:p>
-            <a:pPr lvl="1">
-              <a:buFont typeface="Courier New" panose="02070309020205020404" pitchFamily="49" charset="0"/>
-              <a:buChar char="o"/>
-            </a:pPr>
-            <a:endParaRPr lang="fr-FR" dirty="0"/>
-          </a:p>
-          <a:p>
-            <a:endParaRPr lang="fr-FR" dirty="0"/>
-          </a:p>
-          <a:p>
-            <a:endParaRPr lang="fr-FR" dirty="0"/>
-          </a:p>
-          <a:p>
-            <a:endParaRPr lang="fr-FR" dirty="0"/>
-          </a:p>
-        </p:txBody>
-      </p:sp>
-      <p:sp>
-        <p:nvSpPr>
-          <p:cNvPr id="4" name="Espace réservé du numéro de diapositive 3">
-            <a:extLst>
-              <a:ext uri="{FF2B5EF4-FFF2-40B4-BE49-F238E27FC236}">
-                <a16:creationId xmlns:a16="http://schemas.microsoft.com/office/drawing/2014/main" id="{26D5CFC3-CCE2-41FA-B569-20CEA6AFDCD5}"/>
-              </a:ext>
-            </a:extLst>
-          </p:cNvPr>
-          <p:cNvSpPr>
-            <a:spLocks noGrp="1"/>
-          </p:cNvSpPr>
-          <p:nvPr>
-            <p:ph type="sldNum" sz="quarter" idx="12"/>
-          </p:nvPr>
-        </p:nvSpPr>
-        <p:spPr/>
-        <p:txBody>
-          <a:bodyPr/>
-          <a:lstStyle/>
-          <a:p>
-            <a:fld id="{504562DC-6A68-4B1A-ACD4-40BBA2BD5EE0}" type="slidenum">
-              <a:rPr lang="fr-FR" smtClean="0">
-                <a:solidFill>
-                  <a:schemeClr val="tx1"/>
-                </a:solidFill>
-              </a:rPr>
-              <a:t>2</a:t>
-            </a:fld>
-            <a:endParaRPr lang="fr-FR" dirty="0">
-              <a:solidFill>
-                <a:schemeClr val="tx1"/>
-              </a:solidFill>
-            </a:endParaRPr>
-          </a:p>
-        </p:txBody>
-      </p:sp>
-    </p:spTree>
-    <p:extLst>
-      <p:ext uri="{BB962C8B-B14F-4D97-AF65-F5344CB8AC3E}">
-        <p14:creationId xmlns:p14="http://schemas.microsoft.com/office/powerpoint/2010/main" val="4100240391"/>
-      </p:ext>
-    </p:extLst>
-  </p:cSld>
-  <p:clrMapOvr>
-    <a:masterClrMapping/>
-  </p:clrMapOvr>
-</p:sld>
-</file>
-
-<file path=ppt/slides/slide20.xml><?xml version="1.0" encoding="utf-8"?>
+<file path=ppt/slides/slide21.xml><?xml version="1.0" encoding="utf-8"?>
 <p:sld xmlns:a="http://schemas.openxmlformats.org/drawingml/2006/main" xmlns:r="http://schemas.openxmlformats.org/officeDocument/2006/relationships" xmlns:p="http://schemas.openxmlformats.org/presentationml/2006/main">
   <p:cSld>
     <p:spTree>
@@ -12753,7 +12982,7 @@
                   <a:schemeClr val="tx1"/>
                 </a:solidFill>
               </a:rPr>
-              <a:t>20</a:t>
+              <a:t>21</a:t>
             </a:fld>
             <a:endParaRPr lang="fr-FR" dirty="0">
               <a:solidFill>
@@ -12776,7 +13005,7 @@
 </p:sld>
 </file>
 
-<file path=ppt/slides/slide21.xml><?xml version="1.0" encoding="utf-8"?>
+<file path=ppt/slides/slide22.xml><?xml version="1.0" encoding="utf-8"?>
 <p:sld xmlns:a="http://schemas.openxmlformats.org/drawingml/2006/main" xmlns:r="http://schemas.openxmlformats.org/officeDocument/2006/relationships" xmlns:p="http://schemas.openxmlformats.org/presentationml/2006/main">
   <p:cSld>
     <p:spTree>
@@ -12886,7 +13115,7 @@
                   <a:schemeClr val="tx1"/>
                 </a:solidFill>
               </a:rPr>
-              <a:t>21</a:t>
+              <a:t>22</a:t>
             </a:fld>
             <a:endParaRPr lang="fr-FR" dirty="0">
               <a:solidFill>
@@ -12909,7 +13138,7 @@
 </p:sld>
 </file>
 
-<file path=ppt/slides/slide22.xml><?xml version="1.0" encoding="utf-8"?>
+<file path=ppt/slides/slide23.xml><?xml version="1.0" encoding="utf-8"?>
 <p:sld xmlns:a="http://schemas.openxmlformats.org/drawingml/2006/main" xmlns:r="http://schemas.openxmlformats.org/officeDocument/2006/relationships" xmlns:p="http://schemas.openxmlformats.org/presentationml/2006/main">
   <p:cSld>
     <p:spTree>
@@ -13054,7 +13283,7 @@
                   <a:schemeClr val="tx1"/>
                 </a:solidFill>
               </a:rPr>
-              <a:t>22</a:t>
+              <a:t>23</a:t>
             </a:fld>
             <a:endParaRPr lang="fr-FR" dirty="0">
               <a:solidFill>

</xml_diff>

<commit_message>
wip : minimal coding to understand how coding test 'cause lack of experience 2
</commit_message>
<xml_diff>
--- a/A_Livrables/MOREL_Olivier_4_slides_062022.pptx
+++ b/A_Livrables/MOREL_Olivier_4_slides_062022.pptx
@@ -234,7 +234,7 @@
           <a:p>
             <a:fld id="{5C7AB521-C1B9-49E9-9F3E-FC8BC84D64FF}" type="datetimeFigureOut">
               <a:rPr lang="fr-FR" smtClean="0"/>
-              <a:t>13/08/2022</a:t>
+              <a:t>17/08/2022</a:t>
             </a:fld>
             <a:endParaRPr lang="fr-FR"/>
           </a:p>
@@ -3626,7 +3626,7 @@
           <a:p>
             <a:fld id="{BAAA5C57-0FC7-4809-8DE0-9FB8CD72F45B}" type="datetime1">
               <a:rPr lang="fr-FR" smtClean="0"/>
-              <a:t>13/08/2022</a:t>
+              <a:t>17/08/2022</a:t>
             </a:fld>
             <a:endParaRPr lang="fr-FR"/>
           </a:p>
@@ -3824,7 +3824,7 @@
           <a:p>
             <a:fld id="{D6394C11-AF79-46EB-8628-81685E730859}" type="datetime1">
               <a:rPr lang="fr-FR" smtClean="0"/>
-              <a:t>13/08/2022</a:t>
+              <a:t>17/08/2022</a:t>
             </a:fld>
             <a:endParaRPr lang="fr-FR"/>
           </a:p>
@@ -4032,7 +4032,7 @@
           <a:p>
             <a:fld id="{195502D9-FD20-4B10-85D7-D0A36058A8A9}" type="datetime1">
               <a:rPr lang="fr-FR" smtClean="0"/>
-              <a:t>13/08/2022</a:t>
+              <a:t>17/08/2022</a:t>
             </a:fld>
             <a:endParaRPr lang="fr-FR"/>
           </a:p>
@@ -4230,7 +4230,7 @@
           <a:p>
             <a:fld id="{57684602-8624-4EB1-9235-5DD654D82F09}" type="datetime1">
               <a:rPr lang="fr-FR" smtClean="0"/>
-              <a:t>13/08/2022</a:t>
+              <a:t>17/08/2022</a:t>
             </a:fld>
             <a:endParaRPr lang="fr-FR"/>
           </a:p>
@@ -4505,7 +4505,7 @@
           <a:p>
             <a:fld id="{E41784DB-987A-45B6-9772-C36DF83C3C02}" type="datetime1">
               <a:rPr lang="fr-FR" smtClean="0"/>
-              <a:t>13/08/2022</a:t>
+              <a:t>17/08/2022</a:t>
             </a:fld>
             <a:endParaRPr lang="fr-FR"/>
           </a:p>
@@ -4770,7 +4770,7 @@
           <a:p>
             <a:fld id="{E595D999-DF18-4099-8D0D-BC2297023F60}" type="datetime1">
               <a:rPr lang="fr-FR" smtClean="0"/>
-              <a:t>13/08/2022</a:t>
+              <a:t>17/08/2022</a:t>
             </a:fld>
             <a:endParaRPr lang="fr-FR"/>
           </a:p>
@@ -5182,7 +5182,7 @@
           <a:p>
             <a:fld id="{871871E2-9510-47F9-812F-D25C732F0E19}" type="datetime1">
               <a:rPr lang="fr-FR" smtClean="0"/>
-              <a:t>13/08/2022</a:t>
+              <a:t>17/08/2022</a:t>
             </a:fld>
             <a:endParaRPr lang="fr-FR"/>
           </a:p>
@@ -5323,7 +5323,7 @@
           <a:p>
             <a:fld id="{76383D6D-8978-42A7-ABAD-D463CD4AD0CE}" type="datetime1">
               <a:rPr lang="fr-FR" smtClean="0"/>
-              <a:t>13/08/2022</a:t>
+              <a:t>17/08/2022</a:t>
             </a:fld>
             <a:endParaRPr lang="fr-FR"/>
           </a:p>
@@ -5436,7 +5436,7 @@
           <a:p>
             <a:fld id="{C6571784-1182-4604-B720-0FE25B0575C8}" type="datetime1">
               <a:rPr lang="fr-FR" smtClean="0"/>
-              <a:t>13/08/2022</a:t>
+              <a:t>17/08/2022</a:t>
             </a:fld>
             <a:endParaRPr lang="fr-FR"/>
           </a:p>
@@ -5747,7 +5747,7 @@
           <a:p>
             <a:fld id="{BCE52CFF-6AA8-4EB4-A5AB-E9E18645216B}" type="datetime1">
               <a:rPr lang="fr-FR" smtClean="0"/>
-              <a:t>13/08/2022</a:t>
+              <a:t>17/08/2022</a:t>
             </a:fld>
             <a:endParaRPr lang="fr-FR"/>
           </a:p>
@@ -6035,7 +6035,7 @@
           <a:p>
             <a:fld id="{5EA3A904-D97A-4686-B1B2-2D6167D64CF7}" type="datetime1">
               <a:rPr lang="fr-FR" smtClean="0"/>
-              <a:t>13/08/2022</a:t>
+              <a:t>17/08/2022</a:t>
             </a:fld>
             <a:endParaRPr lang="fr-FR"/>
           </a:p>
@@ -6276,7 +6276,7 @@
           <a:p>
             <a:fld id="{5CD26E4C-FA77-42C7-B5FC-F70A55A82F63}" type="datetime1">
               <a:rPr lang="fr-FR" smtClean="0"/>
-              <a:t>13/08/2022</a:t>
+              <a:t>17/08/2022</a:t>
             </a:fld>
             <a:endParaRPr lang="fr-FR"/>
           </a:p>
@@ -16403,45 +16403,45 @@
               <a:t>|</a:t>
             </a:r>
             <a:r>
+              <a:rPr lang="fr-FR" sz="1400" err="1">
+                <a:solidFill>
+                  <a:srgbClr val="FF0000"/>
+                </a:solidFill>
+                <a:latin typeface="Consolas" panose="020B0609020204030204" pitchFamily="49" charset="0"/>
+              </a:rPr>
+              <a:t>others</a:t>
+            </a:r>
+            <a:r>
+              <a:rPr lang="fr-FR" sz="1400">
+                <a:solidFill>
+                  <a:srgbClr val="FF0000"/>
+                </a:solidFill>
+                <a:latin typeface="Consolas" panose="020B0609020204030204" pitchFamily="49" charset="0"/>
+              </a:rPr>
+              <a:t>                  </a:t>
+            </a:r>
+            <a:r>
+              <a:rPr lang="fr-FR" sz="1400" dirty="0">
+                <a:latin typeface="Consolas" panose="020B0609020204030204" pitchFamily="49" charset="0"/>
+              </a:rPr>
+              <a:t>|</a:t>
+            </a:r>
+          </a:p>
+          <a:p>
+            <a:pPr marL="0" indent="0" defTabSz="360000">
+              <a:spcBef>
+                <a:spcPts val="0"/>
+              </a:spcBef>
+              <a:buNone/>
+            </a:pPr>
+            <a:r>
+              <a:rPr lang="fr-FR" sz="1400" dirty="0">
+                <a:latin typeface="Consolas" panose="020B0609020204030204" pitchFamily="49" charset="0"/>
+              </a:rPr>
+              <a:t>		|"</a:t>
+            </a:r>
+            <a:r>
               <a:rPr lang="fr-FR" sz="1400" dirty="0" err="1">
-                <a:solidFill>
-                  <a:srgbClr val="FF0000"/>
-                </a:solidFill>
-                <a:latin typeface="Consolas" panose="020B0609020204030204" pitchFamily="49" charset="0"/>
-              </a:rPr>
-              <a:t>others</a:t>
-            </a:r>
-            <a:r>
-              <a:rPr lang="fr-FR" sz="1400" dirty="0">
-                <a:solidFill>
-                  <a:srgbClr val="FF0000"/>
-                </a:solidFill>
-                <a:latin typeface="Consolas" panose="020B0609020204030204" pitchFamily="49" charset="0"/>
-              </a:rPr>
-              <a:t>                                </a:t>
-            </a:r>
-            <a:r>
-              <a:rPr lang="fr-FR" sz="1400" dirty="0">
-                <a:latin typeface="Consolas" panose="020B0609020204030204" pitchFamily="49" charset="0"/>
-              </a:rPr>
-              <a:t>|</a:t>
-            </a:r>
-          </a:p>
-          <a:p>
-            <a:pPr marL="0" indent="0" defTabSz="360000">
-              <a:spcBef>
-                <a:spcPts val="0"/>
-              </a:spcBef>
-              <a:buNone/>
-            </a:pPr>
-            <a:r>
-              <a:rPr lang="fr-FR" sz="1400" dirty="0">
-                <a:latin typeface="Consolas" panose="020B0609020204030204" pitchFamily="49" charset="0"/>
-              </a:rPr>
-              <a:t>		|"</a:t>
-            </a:r>
-            <a:r>
-              <a:rPr lang="fr-FR" sz="1400" dirty="0" err="1">
                 <a:latin typeface="Consolas" panose="020B0609020204030204" pitchFamily="49" charset="0"/>
               </a:rPr>
               <a:t>Tenley</a:t>
@@ -16465,19 +16465,19 @@
               <a:rPr lang="fr-FR" sz="1400" dirty="0">
                 <a:latin typeface="Consolas" panose="020B0609020204030204" pitchFamily="49" charset="0"/>
               </a:rPr>
-              <a:t>|"Boyd"  |"18"|"John Boyd, Tessa </a:t>
-            </a:r>
-            <a:r>
-              <a:rPr lang="fr-FR" sz="1400" dirty="0" err="1">
-                <a:latin typeface="Consolas" panose="020B0609020204030204" pitchFamily="49" charset="0"/>
-              </a:rPr>
-              <a:t>Carman</a:t>
-            </a:r>
-            <a:r>
-              <a:rPr lang="fr-FR" sz="1400" dirty="0">
-                <a:latin typeface="Consolas" panose="020B0609020204030204" pitchFamily="49" charset="0"/>
-              </a:rPr>
-              <a:t>, Tony Boyd"  |</a:t>
+              <a:t>|"Boyd"  |"18"|"John </a:t>
+            </a:r>
+            <a:r>
+              <a:rPr lang="fr-FR" sz="1400">
+                <a:latin typeface="Consolas" panose="020B0609020204030204" pitchFamily="49" charset="0"/>
+              </a:rPr>
+              <a:t>Boyd, Tony </a:t>
+            </a:r>
+            <a:r>
+              <a:rPr lang="fr-FR" sz="1400" dirty="0">
+                <a:latin typeface="Consolas" panose="020B0609020204030204" pitchFamily="49" charset="0"/>
+              </a:rPr>
+              <a:t>Boyd"  |</a:t>
             </a:r>
           </a:p>
           <a:p>
@@ -16494,29 +16494,20 @@
               <a:t>		|"Tony"   |"Boyd"  |"12"|"John Boyd, </a:t>
             </a:r>
             <a:r>
-              <a:rPr lang="fr-FR" sz="1400" dirty="0" err="1">
+              <a:rPr lang="fr-FR" sz="1400" err="1">
                 <a:latin typeface="Consolas" panose="020B0609020204030204" pitchFamily="49" charset="0"/>
               </a:rPr>
               <a:t>Tenley</a:t>
             </a:r>
             <a:r>
-              <a:rPr lang="fr-FR" sz="1400" dirty="0">
-                <a:latin typeface="Consolas" panose="020B0609020204030204" pitchFamily="49" charset="0"/>
-              </a:rPr>
-              <a:t> Boyd, Tessa </a:t>
-            </a:r>
-            <a:r>
-              <a:rPr lang="fr-FR" sz="1400" dirty="0" err="1">
-                <a:latin typeface="Consolas" panose="020B0609020204030204" pitchFamily="49" charset="0"/>
-              </a:rPr>
-              <a:t>Carman</a:t>
-            </a:r>
-            <a:r>
-              <a:rPr lang="fr-FR" sz="1400" dirty="0">
-                <a:latin typeface="Consolas" panose="020B0609020204030204" pitchFamily="49" charset="0"/>
-              </a:rPr>
-              <a:t>"|</a:t>
-            </a:r>
+              <a:rPr lang="fr-FR" sz="1400">
+                <a:latin typeface="Consolas" panose="020B0609020204030204" pitchFamily="49" charset="0"/>
+              </a:rPr>
+              <a:t> Boyd"|</a:t>
+            </a:r>
+            <a:endParaRPr lang="fr-FR" sz="1400" dirty="0">
+              <a:latin typeface="Consolas" panose="020B0609020204030204" pitchFamily="49" charset="0"/>
+            </a:endParaRPr>
           </a:p>
           <a:p>
             <a:pPr marL="0" indent="0" defTabSz="360000">

</xml_diff>

<commit_message>
wip : minimal coding to understand how coding test 'cause lack of experience 6
</commit_message>
<xml_diff>
--- a/A_Livrables/MOREL_Olivier_4_slides_062022.pptx
+++ b/A_Livrables/MOREL_Olivier_4_slides_062022.pptx
@@ -234,7 +234,7 @@
           <a:p>
             <a:fld id="{5C7AB521-C1B9-49E9-9F3E-FC8BC84D64FF}" type="datetimeFigureOut">
               <a:rPr lang="fr-FR" smtClean="0"/>
-              <a:t>17/08/2022</a:t>
+              <a:t>22/08/2022</a:t>
             </a:fld>
             <a:endParaRPr lang="fr-FR"/>
           </a:p>
@@ -3626,7 +3626,7 @@
           <a:p>
             <a:fld id="{BAAA5C57-0FC7-4809-8DE0-9FB8CD72F45B}" type="datetime1">
               <a:rPr lang="fr-FR" smtClean="0"/>
-              <a:t>17/08/2022</a:t>
+              <a:t>22/08/2022</a:t>
             </a:fld>
             <a:endParaRPr lang="fr-FR"/>
           </a:p>
@@ -3824,7 +3824,7 @@
           <a:p>
             <a:fld id="{D6394C11-AF79-46EB-8628-81685E730859}" type="datetime1">
               <a:rPr lang="fr-FR" smtClean="0"/>
-              <a:t>17/08/2022</a:t>
+              <a:t>22/08/2022</a:t>
             </a:fld>
             <a:endParaRPr lang="fr-FR"/>
           </a:p>
@@ -4032,7 +4032,7 @@
           <a:p>
             <a:fld id="{195502D9-FD20-4B10-85D7-D0A36058A8A9}" type="datetime1">
               <a:rPr lang="fr-FR" smtClean="0"/>
-              <a:t>17/08/2022</a:t>
+              <a:t>22/08/2022</a:t>
             </a:fld>
             <a:endParaRPr lang="fr-FR"/>
           </a:p>
@@ -4230,7 +4230,7 @@
           <a:p>
             <a:fld id="{57684602-8624-4EB1-9235-5DD654D82F09}" type="datetime1">
               <a:rPr lang="fr-FR" smtClean="0"/>
-              <a:t>17/08/2022</a:t>
+              <a:t>22/08/2022</a:t>
             </a:fld>
             <a:endParaRPr lang="fr-FR"/>
           </a:p>
@@ -4505,7 +4505,7 @@
           <a:p>
             <a:fld id="{E41784DB-987A-45B6-9772-C36DF83C3C02}" type="datetime1">
               <a:rPr lang="fr-FR" smtClean="0"/>
-              <a:t>17/08/2022</a:t>
+              <a:t>22/08/2022</a:t>
             </a:fld>
             <a:endParaRPr lang="fr-FR"/>
           </a:p>
@@ -4770,7 +4770,7 @@
           <a:p>
             <a:fld id="{E595D999-DF18-4099-8D0D-BC2297023F60}" type="datetime1">
               <a:rPr lang="fr-FR" smtClean="0"/>
-              <a:t>17/08/2022</a:t>
+              <a:t>22/08/2022</a:t>
             </a:fld>
             <a:endParaRPr lang="fr-FR"/>
           </a:p>
@@ -5182,7 +5182,7 @@
           <a:p>
             <a:fld id="{871871E2-9510-47F9-812F-D25C732F0E19}" type="datetime1">
               <a:rPr lang="fr-FR" smtClean="0"/>
-              <a:t>17/08/2022</a:t>
+              <a:t>22/08/2022</a:t>
             </a:fld>
             <a:endParaRPr lang="fr-FR"/>
           </a:p>
@@ -5323,7 +5323,7 @@
           <a:p>
             <a:fld id="{76383D6D-8978-42A7-ABAD-D463CD4AD0CE}" type="datetime1">
               <a:rPr lang="fr-FR" smtClean="0"/>
-              <a:t>17/08/2022</a:t>
+              <a:t>22/08/2022</a:t>
             </a:fld>
             <a:endParaRPr lang="fr-FR"/>
           </a:p>
@@ -5436,7 +5436,7 @@
           <a:p>
             <a:fld id="{C6571784-1182-4604-B720-0FE25B0575C8}" type="datetime1">
               <a:rPr lang="fr-FR" smtClean="0"/>
-              <a:t>17/08/2022</a:t>
+              <a:t>22/08/2022</a:t>
             </a:fld>
             <a:endParaRPr lang="fr-FR"/>
           </a:p>
@@ -5747,7 +5747,7 @@
           <a:p>
             <a:fld id="{BCE52CFF-6AA8-4EB4-A5AB-E9E18645216B}" type="datetime1">
               <a:rPr lang="fr-FR" smtClean="0"/>
-              <a:t>17/08/2022</a:t>
+              <a:t>22/08/2022</a:t>
             </a:fld>
             <a:endParaRPr lang="fr-FR"/>
           </a:p>
@@ -6035,7 +6035,7 @@
           <a:p>
             <a:fld id="{5EA3A904-D97A-4686-B1B2-2D6167D64CF7}" type="datetime1">
               <a:rPr lang="fr-FR" smtClean="0"/>
-              <a:t>17/08/2022</a:t>
+              <a:t>22/08/2022</a:t>
             </a:fld>
             <a:endParaRPr lang="fr-FR"/>
           </a:p>
@@ -6276,7 +6276,7 @@
           <a:p>
             <a:fld id="{5CD26E4C-FA77-42C7-B5FC-F70A55A82F63}" type="datetime1">
               <a:rPr lang="fr-FR" smtClean="0"/>
-              <a:t>17/08/2022</a:t>
+              <a:t>22/08/2022</a:t>
             </a:fld>
             <a:endParaRPr lang="fr-FR"/>
           </a:p>
@@ -8011,67 +8011,185 @@
               <a:t>|</a:t>
             </a:r>
             <a:r>
+              <a:rPr lang="fr-FR" sz="1100" err="1">
+                <a:solidFill>
+                  <a:srgbClr val="FF0000"/>
+                </a:solidFill>
+                <a:latin typeface="Consolas" panose="020B0609020204030204" pitchFamily="49" charset="0"/>
+              </a:rPr>
+              <a:t>age</a:t>
+            </a:r>
+            <a:r>
+              <a:rPr lang="fr-FR" sz="1100">
+                <a:solidFill>
+                  <a:srgbClr val="FF0000"/>
+                </a:solidFill>
+                <a:latin typeface="Consolas" panose="020B0609020204030204" pitchFamily="49" charset="0"/>
+              </a:rPr>
+              <a:t> </a:t>
+            </a:r>
+            <a:r>
+              <a:rPr lang="fr-FR" sz="1100">
+                <a:latin typeface="Consolas" panose="020B0609020204030204" pitchFamily="49" charset="0"/>
+              </a:rPr>
+              <a:t>|</a:t>
+            </a:r>
+            <a:r>
+              <a:rPr lang="fr-FR" sz="1100">
+                <a:solidFill>
+                  <a:srgbClr val="FF0000"/>
+                </a:solidFill>
+                <a:latin typeface="Consolas" panose="020B0609020204030204" pitchFamily="49" charset="0"/>
+              </a:rPr>
+              <a:t> lastName</a:t>
+            </a:r>
+            <a:r>
+              <a:rPr lang="fr-FR" sz="1100">
+                <a:latin typeface="Consolas" panose="020B0609020204030204" pitchFamily="49" charset="0"/>
+              </a:rPr>
+              <a:t>| </a:t>
+            </a:r>
+            <a:r>
+              <a:rPr lang="fr-FR" sz="1100">
+                <a:solidFill>
+                  <a:srgbClr val="FF0000"/>
+                </a:solidFill>
+                <a:latin typeface="Consolas" panose="020B0609020204030204" pitchFamily="49" charset="0"/>
+              </a:rPr>
+              <a:t>medications               </a:t>
+            </a:r>
+            <a:r>
+              <a:rPr lang="fr-FR" sz="1100" dirty="0">
+                <a:latin typeface="Consolas" panose="020B0609020204030204" pitchFamily="49" charset="0"/>
+              </a:rPr>
+              <a:t>|</a:t>
+            </a:r>
+            <a:r>
+              <a:rPr lang="fr-FR" sz="1100" dirty="0">
+                <a:solidFill>
+                  <a:srgbClr val="FF0000"/>
+                </a:solidFill>
+                <a:latin typeface="Consolas" panose="020B0609020204030204" pitchFamily="49" charset="0"/>
+              </a:rPr>
+              <a:t>allergies     </a:t>
+            </a:r>
+            <a:r>
+              <a:rPr lang="fr-FR" sz="1100" dirty="0">
+                <a:latin typeface="Consolas" panose="020B0609020204030204" pitchFamily="49" charset="0"/>
+              </a:rPr>
+              <a:t>|</a:t>
+            </a:r>
+          </a:p>
+          <a:p>
+            <a:pPr marL="0" indent="0" defTabSz="360000">
+              <a:spcBef>
+                <a:spcPts val="0"/>
+              </a:spcBef>
+              <a:buNone/>
+            </a:pPr>
+            <a:r>
+              <a:rPr lang="fr-FR" sz="1100" dirty="0">
+                <a:latin typeface="Consolas" panose="020B0609020204030204" pitchFamily="49" charset="0"/>
+              </a:rPr>
+              <a:t>	|"1509 </a:t>
+            </a:r>
+            <a:r>
               <a:rPr lang="fr-FR" sz="1100" dirty="0" err="1">
-                <a:solidFill>
-                  <a:srgbClr val="FF0000"/>
-                </a:solidFill>
-                <a:latin typeface="Consolas" panose="020B0609020204030204" pitchFamily="49" charset="0"/>
-              </a:rPr>
-              <a:t>age</a:t>
+                <a:latin typeface="Consolas" panose="020B0609020204030204" pitchFamily="49" charset="0"/>
+              </a:rPr>
+              <a:t>Culver</a:t>
             </a:r>
             <a:r>
               <a:rPr lang="fr-FR" sz="1100" dirty="0">
-                <a:solidFill>
-                  <a:srgbClr val="FF0000"/>
-                </a:solidFill>
                 <a:latin typeface="Consolas" panose="020B0609020204030204" pitchFamily="49" charset="0"/>
               </a:rPr>
               <a:t> </a:t>
             </a:r>
             <a:r>
+              <a:rPr lang="fr-FR" sz="1100" dirty="0" err="1">
+                <a:latin typeface="Consolas" panose="020B0609020204030204" pitchFamily="49" charset="0"/>
+              </a:rPr>
+              <a:t>St"|"Boyd</a:t>
+            </a:r>
+            <a:r>
               <a:rPr lang="fr-FR" sz="1100" dirty="0">
                 <a:latin typeface="Consolas" panose="020B0609020204030204" pitchFamily="49" charset="0"/>
               </a:rPr>
-              <a:t>|</a:t>
+              <a:t>"  |"841-874-6512"|"</a:t>
+            </a:r>
+            <a:r>
+              <a:rPr lang="fr-FR" sz="1100">
+                <a:latin typeface="Consolas" panose="020B0609020204030204" pitchFamily="49" charset="0"/>
+              </a:rPr>
+              <a:t>30"|"Boyd"   |"</a:t>
+            </a:r>
+            <a:r>
+              <a:rPr lang="fr-FR" sz="1100" dirty="0">
+                <a:latin typeface="Consolas" panose="020B0609020204030204" pitchFamily="49" charset="0"/>
+              </a:rPr>
+              <a:t>aznol:350mg, hyzol:100mg"|"peanut, wasp"|</a:t>
+            </a:r>
+          </a:p>
+          <a:p>
+            <a:pPr marL="0" indent="0" defTabSz="360000">
+              <a:spcBef>
+                <a:spcPts val="0"/>
+              </a:spcBef>
+              <a:buNone/>
+            </a:pPr>
+            <a:r>
+              <a:rPr lang="fr-FR" sz="1100" dirty="0">
+                <a:latin typeface="Consolas" panose="020B0609020204030204" pitchFamily="49" charset="0"/>
+              </a:rPr>
+              <a:t>	|"1509 </a:t>
             </a:r>
             <a:r>
               <a:rPr lang="fr-FR" sz="1100" dirty="0" err="1">
-                <a:solidFill>
-                  <a:srgbClr val="FF0000"/>
-                </a:solidFill>
-                <a:latin typeface="Consolas" panose="020B0609020204030204" pitchFamily="49" charset="0"/>
-              </a:rPr>
-              <a:t>medications</a:t>
+                <a:latin typeface="Consolas" panose="020B0609020204030204" pitchFamily="49" charset="0"/>
+              </a:rPr>
+              <a:t>Culver</a:t>
             </a:r>
             <a:r>
               <a:rPr lang="fr-FR" sz="1100" dirty="0">
-                <a:solidFill>
-                  <a:srgbClr val="FF0000"/>
-                </a:solidFill>
-                <a:latin typeface="Consolas" panose="020B0609020204030204" pitchFamily="49" charset="0"/>
-              </a:rPr>
-              <a:t>               </a:t>
+                <a:latin typeface="Consolas" panose="020B0609020204030204" pitchFamily="49" charset="0"/>
+              </a:rPr>
+              <a:t> </a:t>
+            </a:r>
+            <a:r>
+              <a:rPr lang="fr-FR" sz="1100" dirty="0" err="1">
+                <a:latin typeface="Consolas" panose="020B0609020204030204" pitchFamily="49" charset="0"/>
+              </a:rPr>
+              <a:t>St"|"Boyd</a:t>
             </a:r>
             <a:r>
               <a:rPr lang="fr-FR" sz="1100" dirty="0">
                 <a:latin typeface="Consolas" panose="020B0609020204030204" pitchFamily="49" charset="0"/>
               </a:rPr>
-              <a:t>|</a:t>
+              <a:t>"  |"841-874-6513"|"</a:t>
+            </a:r>
+            <a:r>
+              <a:rPr lang="fr-FR" sz="1100">
+                <a:latin typeface="Consolas" panose="020B0609020204030204" pitchFamily="49" charset="0"/>
+              </a:rPr>
+              <a:t>18"|"Boyd"   |"</a:t>
             </a:r>
             <a:r>
               <a:rPr lang="fr-FR" sz="1100" dirty="0">
-                <a:solidFill>
-                  <a:srgbClr val="FF0000"/>
-                </a:solidFill>
-                <a:latin typeface="Consolas" panose="020B0609020204030204" pitchFamily="49" charset="0"/>
-              </a:rPr>
-              <a:t>allergies     </a:t>
+                <a:latin typeface="Consolas" panose="020B0609020204030204" pitchFamily="49" charset="0"/>
+              </a:rPr>
+              <a:t>hyzol:100mg"             |"</a:t>
+            </a:r>
+            <a:r>
+              <a:rPr lang="fr-FR" sz="1100" dirty="0" err="1">
+                <a:latin typeface="Consolas" panose="020B0609020204030204" pitchFamily="49" charset="0"/>
+              </a:rPr>
+              <a:t>peanut</a:t>
             </a:r>
             <a:r>
               <a:rPr lang="fr-FR" sz="1100" dirty="0">
                 <a:latin typeface="Consolas" panose="020B0609020204030204" pitchFamily="49" charset="0"/>
               </a:rPr>
-              <a:t>|</a:t>
+              <a:t>"      |</a:t>
             </a:r>
           </a:p>
           <a:p>
@@ -8085,133 +8203,69 @@
               <a:rPr lang="fr-FR" sz="1100" dirty="0">
                 <a:latin typeface="Consolas" panose="020B0609020204030204" pitchFamily="49" charset="0"/>
               </a:rPr>
-              <a:t>	|"1509 </a:t>
+              <a:t>	|"834 </a:t>
             </a:r>
             <a:r>
               <a:rPr lang="fr-FR" sz="1100" dirty="0" err="1">
                 <a:latin typeface="Consolas" panose="020B0609020204030204" pitchFamily="49" charset="0"/>
               </a:rPr>
-              <a:t>Culver</a:t>
+              <a:t>Binoc</a:t>
             </a:r>
             <a:r>
               <a:rPr lang="fr-FR" sz="1100" dirty="0">
                 <a:latin typeface="Consolas" panose="020B0609020204030204" pitchFamily="49" charset="0"/>
               </a:rPr>
-              <a:t> </a:t>
+              <a:t> Ave" |"Carman"|"841-874-6514"|"</a:t>
+            </a:r>
+            <a:r>
+              <a:rPr lang="fr-FR" sz="1100">
+                <a:latin typeface="Consolas" panose="020B0609020204030204" pitchFamily="49" charset="0"/>
+              </a:rPr>
+              <a:t>20"|"Carman" |                          </a:t>
+            </a:r>
+            <a:r>
+              <a:rPr lang="fr-FR" sz="1100" dirty="0">
+                <a:latin typeface="Consolas" panose="020B0609020204030204" pitchFamily="49" charset="0"/>
+              </a:rPr>
+              <a:t>|              |</a:t>
+            </a:r>
+          </a:p>
+          <a:p>
+            <a:pPr marL="0" indent="0" defTabSz="360000">
+              <a:spcBef>
+                <a:spcPts val="0"/>
+              </a:spcBef>
+              <a:buNone/>
+            </a:pPr>
+            <a:r>
+              <a:rPr lang="fr-FR" sz="1100" dirty="0">
+                <a:latin typeface="Consolas" panose="020B0609020204030204" pitchFamily="49" charset="0"/>
+              </a:rPr>
+              <a:t>	|"844 </a:t>
             </a:r>
             <a:r>
               <a:rPr lang="fr-FR" sz="1100" dirty="0" err="1">
                 <a:latin typeface="Consolas" panose="020B0609020204030204" pitchFamily="49" charset="0"/>
               </a:rPr>
-              <a:t>St"|"Boyd</a:t>
+              <a:t>Binoc</a:t>
             </a:r>
             <a:r>
               <a:rPr lang="fr-FR" sz="1100" dirty="0">
                 <a:latin typeface="Consolas" panose="020B0609020204030204" pitchFamily="49" charset="0"/>
               </a:rPr>
-              <a:t>"  |"841-874-6512"|"30"|"aznol:350mg, hyzol:100mg"|"peanut, wasp"|</a:t>
-            </a:r>
-          </a:p>
-          <a:p>
-            <a:pPr marL="0" indent="0" defTabSz="360000">
-              <a:spcBef>
-                <a:spcPts val="0"/>
-              </a:spcBef>
-              <a:buNone/>
-            </a:pPr>
+              <a:t> Ave" |"Kadiga"|"841-874-6515"|"</a:t>
+            </a:r>
+            <a:r>
+              <a:rPr lang="fr-FR" sz="1100">
+                <a:latin typeface="Consolas" panose="020B0609020204030204" pitchFamily="49" charset="0"/>
+              </a:rPr>
+              <a:t>25"|"Kadiga" |"</a:t>
+            </a:r>
             <a:r>
               <a:rPr lang="fr-FR" sz="1100" dirty="0">
                 <a:latin typeface="Consolas" panose="020B0609020204030204" pitchFamily="49" charset="0"/>
               </a:rPr>
-              <a:t>	|"1509 </a:t>
-            </a:r>
-            <a:r>
-              <a:rPr lang="fr-FR" sz="1100" dirty="0" err="1">
-                <a:latin typeface="Consolas" panose="020B0609020204030204" pitchFamily="49" charset="0"/>
-              </a:rPr>
-              <a:t>Culver</a:t>
-            </a:r>
-            <a:r>
-              <a:rPr lang="fr-FR" sz="1100" dirty="0">
-                <a:latin typeface="Consolas" panose="020B0609020204030204" pitchFamily="49" charset="0"/>
-              </a:rPr>
-              <a:t> </a:t>
-            </a:r>
-            <a:r>
-              <a:rPr lang="fr-FR" sz="1100" dirty="0" err="1">
-                <a:latin typeface="Consolas" panose="020B0609020204030204" pitchFamily="49" charset="0"/>
-              </a:rPr>
-              <a:t>St"|"Boyd</a:t>
-            </a:r>
-            <a:r>
-              <a:rPr lang="fr-FR" sz="1100" dirty="0">
-                <a:latin typeface="Consolas" panose="020B0609020204030204" pitchFamily="49" charset="0"/>
-              </a:rPr>
-              <a:t>"  |"841-874-6513"|"18"|"hyzol:100mg"             |"</a:t>
-            </a:r>
-            <a:r>
-              <a:rPr lang="fr-FR" sz="1100" dirty="0" err="1">
-                <a:latin typeface="Consolas" panose="020B0609020204030204" pitchFamily="49" charset="0"/>
-              </a:rPr>
-              <a:t>peanut</a:t>
-            </a:r>
-            <a:r>
-              <a:rPr lang="fr-FR" sz="1100" dirty="0">
-                <a:latin typeface="Consolas" panose="020B0609020204030204" pitchFamily="49" charset="0"/>
-              </a:rPr>
-              <a:t>"      |</a:t>
-            </a:r>
-          </a:p>
-          <a:p>
-            <a:pPr marL="0" indent="0" defTabSz="360000">
-              <a:spcBef>
-                <a:spcPts val="0"/>
-              </a:spcBef>
-              <a:buNone/>
-            </a:pPr>
-            <a:r>
-              <a:rPr lang="fr-FR" sz="1100" dirty="0">
-                <a:latin typeface="Consolas" panose="020B0609020204030204" pitchFamily="49" charset="0"/>
-              </a:rPr>
-              <a:t>	|"834 </a:t>
-            </a:r>
-            <a:r>
-              <a:rPr lang="fr-FR" sz="1100" dirty="0" err="1">
-                <a:latin typeface="Consolas" panose="020B0609020204030204" pitchFamily="49" charset="0"/>
-              </a:rPr>
-              <a:t>Binoc</a:t>
-            </a:r>
-            <a:r>
-              <a:rPr lang="fr-FR" sz="1100" dirty="0">
-                <a:latin typeface="Consolas" panose="020B0609020204030204" pitchFamily="49" charset="0"/>
-              </a:rPr>
-              <a:t> Ave" |"Carman"|"841-874-6514"|"20"|                          |              |</a:t>
-            </a:r>
-          </a:p>
-          <a:p>
-            <a:pPr marL="0" indent="0" defTabSz="360000">
-              <a:spcBef>
-                <a:spcPts val="0"/>
-              </a:spcBef>
-              <a:buNone/>
-            </a:pPr>
-            <a:r>
-              <a:rPr lang="fr-FR" sz="1100" dirty="0">
-                <a:latin typeface="Consolas" panose="020B0609020204030204" pitchFamily="49" charset="0"/>
-              </a:rPr>
-              <a:t>	|"844 </a:t>
-            </a:r>
-            <a:r>
-              <a:rPr lang="fr-FR" sz="1100" dirty="0" err="1">
-                <a:latin typeface="Consolas" panose="020B0609020204030204" pitchFamily="49" charset="0"/>
-              </a:rPr>
-              <a:t>Binoc</a:t>
-            </a:r>
-            <a:r>
-              <a:rPr lang="fr-FR" sz="1100" dirty="0">
-                <a:latin typeface="Consolas" panose="020B0609020204030204" pitchFamily="49" charset="0"/>
-              </a:rPr>
-              <a:t> Ave" |"Kadiga"|"841-874-6515"|"25"|"onala:200mg, azil:50mg"  |"wasp, </a:t>
+              <a:t>onala:200mg, azil:50mg"  |"wasp, </a:t>
             </a:r>
             <a:r>
               <a:rPr lang="fr-FR" sz="1100" dirty="0" err="1">
@@ -15609,7 +15663,7 @@
         </p:spPr>
         <p:txBody>
           <a:bodyPr>
-            <a:normAutofit fontScale="85000" lnSpcReduction="20000"/>
+            <a:normAutofit fontScale="70000" lnSpcReduction="20000"/>
           </a:bodyPr>
           <a:lstStyle/>
           <a:p>
@@ -16009,180 +16063,94 @@
               <a:buNone/>
             </a:pPr>
             <a:r>
-              <a:rPr lang="fr-FR" sz="1400" dirty="0">
-                <a:latin typeface="Consolas" panose="020B0609020204030204" pitchFamily="49" charset="0"/>
-              </a:rPr>
-              <a:t>		|"John"</a:t>
-            </a:r>
-            <a:r>
-              <a:rPr lang="fr-FR" sz="1400" dirty="0">
-                <a:solidFill>
-                  <a:srgbClr val="FF0000"/>
-                </a:solidFill>
-                <a:latin typeface="Consolas" panose="020B0609020204030204" pitchFamily="49" charset="0"/>
-              </a:rPr>
-              <a:t>   </a:t>
-            </a:r>
-            <a:r>
-              <a:rPr lang="fr-FR" sz="1400" dirty="0">
-                <a:latin typeface="Consolas" panose="020B0609020204030204" pitchFamily="49" charset="0"/>
-              </a:rPr>
-              <a:t>|"Boyd"  |"30"|"1509 </a:t>
-            </a:r>
-            <a:r>
-              <a:rPr lang="fr-FR" sz="1400" dirty="0" err="1">
-                <a:latin typeface="Consolas" panose="020B0609020204030204" pitchFamily="49" charset="0"/>
-              </a:rPr>
-              <a:t>Culver</a:t>
-            </a:r>
-            <a:r>
-              <a:rPr lang="fr-FR" sz="1400" dirty="0">
-                <a:latin typeface="Consolas" panose="020B0609020204030204" pitchFamily="49" charset="0"/>
-              </a:rPr>
-              <a:t> St"|"Culver"|"97451"|"841-874-6512"|"jboyd@email.com"|</a:t>
-            </a:r>
-          </a:p>
-          <a:p>
-            <a:pPr marL="0" indent="0" defTabSz="360000">
-              <a:spcBef>
-                <a:spcPts val="0"/>
-              </a:spcBef>
-              <a:buNone/>
-            </a:pPr>
-            <a:r>
-              <a:rPr lang="fr-FR" sz="1400" dirty="0">
-                <a:latin typeface="Consolas" panose="020B0609020204030204" pitchFamily="49" charset="0"/>
-              </a:rPr>
-              <a:t>		|"</a:t>
-            </a:r>
-            <a:r>
-              <a:rPr lang="fr-FR" sz="1400" dirty="0" err="1">
-                <a:latin typeface="Consolas" panose="020B0609020204030204" pitchFamily="49" charset="0"/>
-              </a:rPr>
-              <a:t>Tenley</a:t>
-            </a:r>
-            <a:r>
-              <a:rPr lang="fr-FR" sz="1400" dirty="0">
-                <a:latin typeface="Consolas" panose="020B0609020204030204" pitchFamily="49" charset="0"/>
-              </a:rPr>
-              <a:t>"</a:t>
-            </a:r>
-            <a:r>
-              <a:rPr lang="fr-FR" sz="1400" dirty="0">
-                <a:solidFill>
-                  <a:srgbClr val="FF0000"/>
-                </a:solidFill>
-                <a:latin typeface="Consolas" panose="020B0609020204030204" pitchFamily="49" charset="0"/>
-              </a:rPr>
-              <a:t> </a:t>
-            </a:r>
-            <a:r>
-              <a:rPr lang="fr-FR" sz="1400" dirty="0">
-                <a:latin typeface="Consolas" panose="020B0609020204030204" pitchFamily="49" charset="0"/>
-              </a:rPr>
-              <a:t>|"Boyd"  |"18"|"1509 </a:t>
-            </a:r>
-            <a:r>
-              <a:rPr lang="fr-FR" sz="1400" dirty="0" err="1">
-                <a:latin typeface="Consolas" panose="020B0609020204030204" pitchFamily="49" charset="0"/>
-              </a:rPr>
-              <a:t>Culver</a:t>
-            </a:r>
-            <a:r>
-              <a:rPr lang="fr-FR" sz="1400" dirty="0">
-                <a:latin typeface="Consolas" panose="020B0609020204030204" pitchFamily="49" charset="0"/>
-              </a:rPr>
-              <a:t> St"|"Culver"|"97451"|"841-874-6513"|"tboyd@email.com"|</a:t>
-            </a:r>
-          </a:p>
-          <a:p>
-            <a:pPr marL="0" indent="0" defTabSz="360000">
-              <a:spcBef>
-                <a:spcPts val="0"/>
-              </a:spcBef>
-              <a:buNone/>
-            </a:pPr>
-            <a:r>
-              <a:rPr lang="fr-FR" sz="1400" dirty="0">
-                <a:latin typeface="Consolas" panose="020B0609020204030204" pitchFamily="49" charset="0"/>
-              </a:rPr>
-              <a:t>		|"Tessa"  |"Carman"|"28"|"1509 </a:t>
-            </a:r>
-            <a:r>
-              <a:rPr lang="fr-FR" sz="1400" dirty="0" err="1">
-                <a:latin typeface="Consolas" panose="020B0609020204030204" pitchFamily="49" charset="0"/>
-              </a:rPr>
-              <a:t>Culver</a:t>
-            </a:r>
-            <a:r>
-              <a:rPr lang="fr-FR" sz="1400" dirty="0">
-                <a:latin typeface="Consolas" panose="020B0609020204030204" pitchFamily="49" charset="0"/>
-              </a:rPr>
-              <a:t> St"|"Culver"|"97451"|"841-874-6514"|"tenz@email.com" |</a:t>
-            </a:r>
-          </a:p>
-          <a:p>
-            <a:pPr marL="0" indent="0" defTabSz="360000">
-              <a:spcBef>
-                <a:spcPts val="0"/>
-              </a:spcBef>
-              <a:buNone/>
-            </a:pPr>
-            <a:r>
-              <a:rPr lang="fr-FR" sz="1400" dirty="0">
-                <a:latin typeface="Consolas" panose="020B0609020204030204" pitchFamily="49" charset="0"/>
-              </a:rPr>
-              <a:t>		|"Tony"   |"Boyd"  |"12"|"1509 </a:t>
-            </a:r>
-            <a:r>
-              <a:rPr lang="fr-FR" sz="1400" dirty="0" err="1">
-                <a:latin typeface="Consolas" panose="020B0609020204030204" pitchFamily="49" charset="0"/>
-              </a:rPr>
-              <a:t>Culver</a:t>
-            </a:r>
-            <a:r>
-              <a:rPr lang="fr-FR" sz="1400" dirty="0">
-                <a:latin typeface="Consolas" panose="020B0609020204030204" pitchFamily="49" charset="0"/>
-              </a:rPr>
-              <a:t> St"|"Culver"|"97451"|"841-874-6512"|"jboyd@email.com"|</a:t>
-            </a:r>
-          </a:p>
-          <a:p>
-            <a:pPr marL="0" indent="0" defTabSz="360000">
-              <a:spcBef>
-                <a:spcPts val="0"/>
-              </a:spcBef>
-              <a:buNone/>
-            </a:pPr>
-            <a:r>
-              <a:rPr lang="fr-FR" sz="1400" dirty="0">
-                <a:latin typeface="Consolas" panose="020B0609020204030204" pitchFamily="49" charset="0"/>
-              </a:rPr>
-              <a:t>		|"</a:t>
-            </a:r>
-            <a:r>
-              <a:rPr lang="fr-FR" sz="1400" dirty="0" err="1">
-                <a:latin typeface="Consolas" panose="020B0609020204030204" pitchFamily="49" charset="0"/>
-              </a:rPr>
-              <a:t>Eric</a:t>
-            </a:r>
-            <a:r>
-              <a:rPr lang="fr-FR" sz="1400" dirty="0">
-                <a:latin typeface="Consolas" panose="020B0609020204030204" pitchFamily="49" charset="0"/>
-              </a:rPr>
-              <a:t>"   |"Kadiga"|"25"|"844 </a:t>
-            </a:r>
-            <a:r>
-              <a:rPr lang="fr-FR" sz="1400" dirty="0" err="1">
-                <a:latin typeface="Consolas" panose="020B0609020204030204" pitchFamily="49" charset="0"/>
-              </a:rPr>
-              <a:t>Binoc</a:t>
-            </a:r>
-            <a:r>
-              <a:rPr lang="fr-FR" sz="1400" dirty="0">
-                <a:latin typeface="Consolas" panose="020B0609020204030204" pitchFamily="49" charset="0"/>
-              </a:rPr>
-              <a:t> Ave" |"Culver"|"97451"|"841-874-6515"|"kadi@email.com" |</a:t>
+              <a:rPr lang="fr-FR" sz="1400">
+                <a:latin typeface="Consolas" panose="020B0609020204030204" pitchFamily="49" charset="0"/>
+              </a:rPr>
+              <a:t>		|"John"   |"Boyd"  |"30"|"1509 Culver St"|"Culver"|"97451"|"841-874-6512"|"jboyd@email.com"|</a:t>
+            </a:r>
+          </a:p>
+          <a:p>
+            <a:pPr marL="0" indent="0" defTabSz="360000">
+              <a:spcBef>
+                <a:spcPts val="0"/>
+              </a:spcBef>
+              <a:buNone/>
+            </a:pPr>
+            <a:r>
+              <a:rPr lang="fr-FR" sz="1400">
+                <a:latin typeface="Consolas" panose="020B0609020204030204" pitchFamily="49" charset="0"/>
+              </a:rPr>
+              <a:t>		|"Tenley" |"Boyd"  |"18"|"1509 Culver St"|"Culver"|"97451"|"841-874-6513"|"tboyd@email.com"|</a:t>
+            </a:r>
+          </a:p>
+          <a:p>
+            <a:pPr marL="0" indent="0" defTabSz="360000">
+              <a:spcBef>
+                <a:spcPts val="0"/>
+              </a:spcBef>
+              <a:buNone/>
+            </a:pPr>
+            <a:r>
+              <a:rPr lang="fr-FR" sz="1400">
+                <a:latin typeface="Consolas" panose="020B0609020204030204" pitchFamily="49" charset="0"/>
+              </a:rPr>
+              <a:t>		|"Tessa"  |"Carman"|"28"|"1509 Culver St"|"Culver"|"97451"|"841-874-6514"|"tenz@email.com" |</a:t>
+            </a:r>
+          </a:p>
+          <a:p>
+            <a:pPr marL="0" indent="0" defTabSz="360000">
+              <a:spcBef>
+                <a:spcPts val="0"/>
+              </a:spcBef>
+              <a:buNone/>
+            </a:pPr>
+            <a:r>
+              <a:rPr lang="fr-FR" sz="1400">
+                <a:latin typeface="Consolas" panose="020B0609020204030204" pitchFamily="49" charset="0"/>
+              </a:rPr>
+              <a:t>		|"Tony"   |"Boyd"  |"12"|"1509 Culver St"|"Culver"|"97451"|"841-874-6512"|"jboyd@email.com"|</a:t>
+            </a:r>
+          </a:p>
+          <a:p>
+            <a:pPr marL="0" indent="0" defTabSz="360000">
+              <a:spcBef>
+                <a:spcPts val="0"/>
+              </a:spcBef>
+              <a:buNone/>
+            </a:pPr>
+            <a:r>
+              <a:rPr lang="fr-FR" sz="1400">
+                <a:latin typeface="Consolas" panose="020B0609020204030204" pitchFamily="49" charset="0"/>
+              </a:rPr>
+              <a:t>		|"Eric"   |"Kadiga"|"25"|"844 Binoc Ave" |"Culver"|"97451"|"841-874-6515"|"kadi@email.com" |</a:t>
+            </a:r>
+          </a:p>
+          <a:p>
+            <a:pPr marL="0" indent="0" defTabSz="360000">
+              <a:spcBef>
+                <a:spcPts val="0"/>
+              </a:spcBef>
+              <a:buNone/>
+            </a:pPr>
+            <a:r>
+              <a:rPr lang="fr-FR" sz="1400">
+                <a:latin typeface="Consolas" panose="020B0609020204030204" pitchFamily="49" charset="0"/>
+              </a:rPr>
+              <a:t>		|"Brad"   |"Voisin"|" 2"|"1509 Culver St"|"Culver"|"97451"|"841-874-6515"|"kadi@email.com" |</a:t>
+            </a:r>
+          </a:p>
+          <a:p>
+            <a:pPr marL="0" indent="0" defTabSz="360000">
+              <a:spcBef>
+                <a:spcPts val="0"/>
+              </a:spcBef>
+              <a:buNone/>
+            </a:pPr>
+            <a:r>
+              <a:rPr lang="fr-FR" sz="1400">
+                <a:latin typeface="Consolas" panose="020B0609020204030204" pitchFamily="49" charset="0"/>
+              </a:rPr>
+              <a:t>		|"Eric"   |"Voisin"|"24"|"1509 Culver St"|"Culver"|"97451"|"841-874-6515"|"kadi@email.com" |</a:t>
             </a:r>
           </a:p>
           <a:p>
@@ -16435,87 +16403,67 @@
               <a:buNone/>
             </a:pPr>
             <a:r>
-              <a:rPr lang="fr-FR" sz="1400" dirty="0">
-                <a:latin typeface="Consolas" panose="020B0609020204030204" pitchFamily="49" charset="0"/>
-              </a:rPr>
-              <a:t>		|"</a:t>
-            </a:r>
-            <a:r>
-              <a:rPr lang="fr-FR" sz="1400" dirty="0" err="1">
-                <a:latin typeface="Consolas" panose="020B0609020204030204" pitchFamily="49" charset="0"/>
-              </a:rPr>
-              <a:t>Tenley</a:t>
-            </a:r>
-            <a:r>
-              <a:rPr lang="fr-FR" sz="1400" dirty="0">
-                <a:latin typeface="Consolas" panose="020B0609020204030204" pitchFamily="49" charset="0"/>
-              </a:rPr>
-              <a:t>"</a:t>
-            </a:r>
-            <a:r>
-              <a:rPr lang="fr-FR" sz="1400" dirty="0">
-                <a:solidFill>
-                  <a:srgbClr val="FF0000"/>
-                </a:solidFill>
-                <a:latin typeface="Consolas" panose="020B0609020204030204" pitchFamily="49" charset="0"/>
-              </a:rPr>
-              <a:t> </a:t>
-            </a:r>
-            <a:r>
-              <a:rPr lang="fr-FR" sz="1400" dirty="0">
-                <a:latin typeface="Consolas" panose="020B0609020204030204" pitchFamily="49" charset="0"/>
-              </a:rPr>
-              <a:t>|"Boyd"  |"18"|"John </a:t>
-            </a:r>
-            <a:r>
               <a:rPr lang="fr-FR" sz="1400">
                 <a:latin typeface="Consolas" panose="020B0609020204030204" pitchFamily="49" charset="0"/>
               </a:rPr>
-              <a:t>Boyd, Tony </a:t>
-            </a:r>
-            <a:r>
-              <a:rPr lang="fr-FR" sz="1400" dirty="0">
-                <a:latin typeface="Consolas" panose="020B0609020204030204" pitchFamily="49" charset="0"/>
-              </a:rPr>
-              <a:t>Boyd"  |</a:t>
-            </a:r>
-          </a:p>
-          <a:p>
-            <a:pPr marL="0" indent="0" defTabSz="360000">
-              <a:spcBef>
-                <a:spcPts val="0"/>
-              </a:spcBef>
-              <a:buNone/>
-            </a:pPr>
-            <a:r>
-              <a:rPr lang="fr-FR" sz="1400" dirty="0">
-                <a:latin typeface="Consolas" panose="020B0609020204030204" pitchFamily="49" charset="0"/>
-              </a:rPr>
-              <a:t>		|"Tony"   |"Boyd"  |"12"|"John Boyd, </a:t>
-            </a:r>
-            <a:r>
-              <a:rPr lang="fr-FR" sz="1400" err="1">
-                <a:latin typeface="Consolas" panose="020B0609020204030204" pitchFamily="49" charset="0"/>
-              </a:rPr>
-              <a:t>Tenley</a:t>
-            </a:r>
+              <a:t>		|"Tenley" |"Boyd"  |"18"|</a:t>
+            </a:r>
+          </a:p>
+          <a:p>
+            <a:pPr marL="0" indent="0" defTabSz="360000">
+              <a:spcBef>
+                <a:spcPts val="0"/>
+              </a:spcBef>
+              <a:buNone/>
+            </a:pPr>
             <a:r>
               <a:rPr lang="fr-FR" sz="1400">
                 <a:latin typeface="Consolas" panose="020B0609020204030204" pitchFamily="49" charset="0"/>
               </a:rPr>
-              <a:t> Boyd"|</a:t>
-            </a:r>
-            <a:endParaRPr lang="fr-FR" sz="1400" dirty="0">
-              <a:latin typeface="Consolas" panose="020B0609020204030204" pitchFamily="49" charset="0"/>
-            </a:endParaRPr>
-          </a:p>
-          <a:p>
-            <a:pPr marL="0" indent="0" defTabSz="360000">
-              <a:spcBef>
-                <a:spcPts val="0"/>
-              </a:spcBef>
-              <a:buNone/>
-            </a:pPr>
+              <a:t>		|"Tony"   |"Boyd"  |"12"|</a:t>
+            </a:r>
+          </a:p>
+          <a:p>
+            <a:pPr marL="0" indent="0" defTabSz="360000">
+              <a:spcBef>
+                <a:spcPts val="0"/>
+              </a:spcBef>
+              <a:buNone/>
+            </a:pPr>
+            <a:r>
+              <a:rPr lang="fr-FR" sz="1400">
+                <a:latin typeface="Consolas" panose="020B0609020204030204" pitchFamily="49" charset="0"/>
+              </a:rPr>
+              <a:t>		|"Brad"   |"Voisin"|" 2"|</a:t>
+            </a:r>
+          </a:p>
+          <a:p>
+            <a:pPr marL="0" indent="0" defTabSz="360000">
+              <a:spcBef>
+                <a:spcPts val="0"/>
+              </a:spcBef>
+              <a:buNone/>
+            </a:pPr>
+            <a:r>
+              <a:rPr lang="fr-FR" sz="1400">
+                <a:latin typeface="Consolas" panose="020B0609020204030204" pitchFamily="49" charset="0"/>
+              </a:rPr>
+              <a:t>		|"John"   |"Boyd"  |"30"|</a:t>
+            </a:r>
+          </a:p>
+          <a:p>
+            <a:pPr marL="0" indent="0" defTabSz="360000">
+              <a:spcBef>
+                <a:spcPts val="0"/>
+              </a:spcBef>
+              <a:buNone/>
+            </a:pPr>
+            <a:r>
+              <a:rPr lang="fr-FR" sz="1400">
+                <a:latin typeface="Consolas" panose="020B0609020204030204" pitchFamily="49" charset="0"/>
+              </a:rPr>
+              <a:t>		|"Eric"   |"Voisin"|"24"|</a:t>
+            </a:r>
             <a:r>
               <a:rPr lang="fr-FR" sz="1400" dirty="0">
                 <a:latin typeface="Consolas" panose="020B0609020204030204" pitchFamily="49" charset="0"/>
@@ -16883,16 +16831,14 @@
               <a:rPr lang="fr-FR" sz="1400" dirty="0">
                 <a:latin typeface="Consolas" panose="020B0609020204030204" pitchFamily="49" charset="0"/>
               </a:rPr>
-              <a:t> la liste C des enfants est:</a:t>
-            </a:r>
-          </a:p>
-          <a:p>
-            <a:pPr marL="0" indent="0" defTabSz="360000">
-              <a:spcBef>
-                <a:spcPts val="0"/>
-              </a:spcBef>
-              <a:buNone/>
-            </a:pPr>
+              <a:t> la liste C des enfants </a:t>
+            </a:r>
+            <a:r>
+              <a:rPr lang="fr-FR" sz="1400">
+                <a:latin typeface="Consolas" panose="020B0609020204030204" pitchFamily="49" charset="0"/>
+              </a:rPr>
+              <a:t>est:</a:t>
+            </a:r>
             <a:endParaRPr lang="fr-FR" sz="1400" dirty="0">
               <a:latin typeface="Consolas" panose="020B0609020204030204" pitchFamily="49" charset="0"/>
             </a:endParaRPr>

</xml_diff>

<commit_message>
wip : minimal coding to understand how coding test 'cause lack of experience 7
</commit_message>
<xml_diff>
--- a/A_Livrables/MOREL_Olivier_4_slides_062022.pptx
+++ b/A_Livrables/MOREL_Olivier_4_slides_062022.pptx
@@ -234,7 +234,7 @@
           <a:p>
             <a:fld id="{5C7AB521-C1B9-49E9-9F3E-FC8BC84D64FF}" type="datetimeFigureOut">
               <a:rPr lang="fr-FR" smtClean="0"/>
-              <a:t>22/08/2022</a:t>
+              <a:t>23/08/2022</a:t>
             </a:fld>
             <a:endParaRPr lang="fr-FR"/>
           </a:p>
@@ -3626,7 +3626,7 @@
           <a:p>
             <a:fld id="{BAAA5C57-0FC7-4809-8DE0-9FB8CD72F45B}" type="datetime1">
               <a:rPr lang="fr-FR" smtClean="0"/>
-              <a:t>22/08/2022</a:t>
+              <a:t>23/08/2022</a:t>
             </a:fld>
             <a:endParaRPr lang="fr-FR"/>
           </a:p>
@@ -3824,7 +3824,7 @@
           <a:p>
             <a:fld id="{D6394C11-AF79-46EB-8628-81685E730859}" type="datetime1">
               <a:rPr lang="fr-FR" smtClean="0"/>
-              <a:t>22/08/2022</a:t>
+              <a:t>23/08/2022</a:t>
             </a:fld>
             <a:endParaRPr lang="fr-FR"/>
           </a:p>
@@ -4032,7 +4032,7 @@
           <a:p>
             <a:fld id="{195502D9-FD20-4B10-85D7-D0A36058A8A9}" type="datetime1">
               <a:rPr lang="fr-FR" smtClean="0"/>
-              <a:t>22/08/2022</a:t>
+              <a:t>23/08/2022</a:t>
             </a:fld>
             <a:endParaRPr lang="fr-FR"/>
           </a:p>
@@ -4230,7 +4230,7 @@
           <a:p>
             <a:fld id="{57684602-8624-4EB1-9235-5DD654D82F09}" type="datetime1">
               <a:rPr lang="fr-FR" smtClean="0"/>
-              <a:t>22/08/2022</a:t>
+              <a:t>23/08/2022</a:t>
             </a:fld>
             <a:endParaRPr lang="fr-FR"/>
           </a:p>
@@ -4505,7 +4505,7 @@
           <a:p>
             <a:fld id="{E41784DB-987A-45B6-9772-C36DF83C3C02}" type="datetime1">
               <a:rPr lang="fr-FR" smtClean="0"/>
-              <a:t>22/08/2022</a:t>
+              <a:t>23/08/2022</a:t>
             </a:fld>
             <a:endParaRPr lang="fr-FR"/>
           </a:p>
@@ -4770,7 +4770,7 @@
           <a:p>
             <a:fld id="{E595D999-DF18-4099-8D0D-BC2297023F60}" type="datetime1">
               <a:rPr lang="fr-FR" smtClean="0"/>
-              <a:t>22/08/2022</a:t>
+              <a:t>23/08/2022</a:t>
             </a:fld>
             <a:endParaRPr lang="fr-FR"/>
           </a:p>
@@ -5182,7 +5182,7 @@
           <a:p>
             <a:fld id="{871871E2-9510-47F9-812F-D25C732F0E19}" type="datetime1">
               <a:rPr lang="fr-FR" smtClean="0"/>
-              <a:t>22/08/2022</a:t>
+              <a:t>23/08/2022</a:t>
             </a:fld>
             <a:endParaRPr lang="fr-FR"/>
           </a:p>
@@ -5323,7 +5323,7 @@
           <a:p>
             <a:fld id="{76383D6D-8978-42A7-ABAD-D463CD4AD0CE}" type="datetime1">
               <a:rPr lang="fr-FR" smtClean="0"/>
-              <a:t>22/08/2022</a:t>
+              <a:t>23/08/2022</a:t>
             </a:fld>
             <a:endParaRPr lang="fr-FR"/>
           </a:p>
@@ -5436,7 +5436,7 @@
           <a:p>
             <a:fld id="{C6571784-1182-4604-B720-0FE25B0575C8}" type="datetime1">
               <a:rPr lang="fr-FR" smtClean="0"/>
-              <a:t>22/08/2022</a:t>
+              <a:t>23/08/2022</a:t>
             </a:fld>
             <a:endParaRPr lang="fr-FR"/>
           </a:p>
@@ -5747,7 +5747,7 @@
           <a:p>
             <a:fld id="{BCE52CFF-6AA8-4EB4-A5AB-E9E18645216B}" type="datetime1">
               <a:rPr lang="fr-FR" smtClean="0"/>
-              <a:t>22/08/2022</a:t>
+              <a:t>23/08/2022</a:t>
             </a:fld>
             <a:endParaRPr lang="fr-FR"/>
           </a:p>
@@ -6035,7 +6035,7 @@
           <a:p>
             <a:fld id="{5EA3A904-D97A-4686-B1B2-2D6167D64CF7}" type="datetime1">
               <a:rPr lang="fr-FR" smtClean="0"/>
-              <a:t>22/08/2022</a:t>
+              <a:t>23/08/2022</a:t>
             </a:fld>
             <a:endParaRPr lang="fr-FR"/>
           </a:p>
@@ -6276,7 +6276,7 @@
           <a:p>
             <a:fld id="{5CD26E4C-FA77-42C7-B5FC-F70A55A82F63}" type="datetime1">
               <a:rPr lang="fr-FR" smtClean="0"/>
-              <a:t>22/08/2022</a:t>
+              <a:t>23/08/2022</a:t>
             </a:fld>
             <a:endParaRPr lang="fr-FR"/>
           </a:p>
@@ -8517,7 +8517,7 @@
               <a:rPr lang="fr-FR" sz="1000">
                 <a:latin typeface="Consolas" panose="020B0609020204030204" pitchFamily="49" charset="0"/>
               </a:rPr>
-              <a:t>Cette url doit retourner la liste des personnes vivant avec la personne donnée ainsi que la liste des personnes portant le même nom.</a:t>
+              <a:t>Cette url doit retourner la personne et la liste des personnes habitant à la même adresse ainsi que la liste des personnes portant le même nom.</a:t>
             </a:r>
           </a:p>
           <a:p>
@@ -14340,7 +14340,33 @@
               <a:rPr lang="fr-FR" sz="1400" dirty="0">
                 <a:latin typeface="Consolas" panose="020B0609020204030204" pitchFamily="49" charset="0"/>
               </a:rPr>
-              <a:t>Cette url doit retourner une liste des personnes couvertes par la caserne de pompiers correspondante avec un décompte du nombre d'adultes et du nombre d'enfants (âge &lt;= 18 ans)</a:t>
+              <a:t>Cette url doit retourner une liste des personnes couvertes par la caserne de </a:t>
+            </a:r>
+            <a:r>
+              <a:rPr lang="fr-FR" sz="1400">
+                <a:latin typeface="Consolas" panose="020B0609020204030204" pitchFamily="49" charset="0"/>
+              </a:rPr>
+              <a:t>pompiers correspondante</a:t>
+            </a:r>
+          </a:p>
+          <a:p>
+            <a:pPr marL="0" indent="0" defTabSz="360000">
+              <a:spcBef>
+                <a:spcPts val="0"/>
+              </a:spcBef>
+              <a:buNone/>
+            </a:pPr>
+            <a:r>
+              <a:rPr lang="fr-FR" sz="1400">
+                <a:latin typeface="Consolas" panose="020B0609020204030204" pitchFamily="49" charset="0"/>
+              </a:rPr>
+              <a:t>avec </a:t>
+            </a:r>
+            <a:r>
+              <a:rPr lang="fr-FR" sz="1400" dirty="0">
+                <a:latin typeface="Consolas" panose="020B0609020204030204" pitchFamily="49" charset="0"/>
+              </a:rPr>
+              <a:t>un décompte du nombre d'adultes et du nombre d'enfants (âge &lt;= 18 ans)</a:t>
             </a:r>
           </a:p>
           <a:p>
@@ -14380,7 +14406,33 @@
               <a:rPr lang="fr-FR" sz="1400" dirty="0">
                 <a:latin typeface="Consolas" panose="020B0609020204030204" pitchFamily="49" charset="0"/>
               </a:rPr>
-              <a:t>’utilisateur, je souhaite obtenir la liste des personnes (prénom, nom, adresse, numéro de téléphone) couverts par la station de numéro donné, avec un décompte du nombre d'adultes et du nombre d'enfants (âge &lt;= 18 ans)</a:t>
+              <a:t>’utilisateur, je souhaite obtenir la liste des personnes (prénom, nom, adresse, numéro de </a:t>
+            </a:r>
+            <a:r>
+              <a:rPr lang="fr-FR" sz="1400">
+                <a:latin typeface="Consolas" panose="020B0609020204030204" pitchFamily="49" charset="0"/>
+              </a:rPr>
+              <a:t>téléphone)</a:t>
+            </a:r>
+          </a:p>
+          <a:p>
+            <a:pPr marL="0" indent="0" defTabSz="360000">
+              <a:spcBef>
+                <a:spcPts val="0"/>
+              </a:spcBef>
+              <a:buNone/>
+            </a:pPr>
+            <a:r>
+              <a:rPr lang="fr-FR" sz="1400">
+                <a:latin typeface="Consolas" panose="020B0609020204030204" pitchFamily="49" charset="0"/>
+              </a:rPr>
+              <a:t>couvertes </a:t>
+            </a:r>
+            <a:r>
+              <a:rPr lang="fr-FR" sz="1400" dirty="0">
+                <a:latin typeface="Consolas" panose="020B0609020204030204" pitchFamily="49" charset="0"/>
+              </a:rPr>
+              <a:t>par la station de numéro donné, avec un décompte du nombre d'adultes et du nombre d'enfants (âge &lt;= 18 ans)</a:t>
             </a:r>
           </a:p>
           <a:p>
@@ -15663,7 +15715,7 @@
         </p:spPr>
         <p:txBody>
           <a:bodyPr>
-            <a:normAutofit fontScale="70000" lnSpcReduction="20000"/>
+            <a:normAutofit fontScale="77500" lnSpcReduction="20000"/>
           </a:bodyPr>
           <a:lstStyle/>
           <a:p>
@@ -15783,10 +15835,24 @@
               <a:buNone/>
             </a:pPr>
             <a:r>
-              <a:rPr lang="fr-FR" sz="1400" dirty="0">
-                <a:latin typeface="Consolas" panose="020B0609020204030204" pitchFamily="49" charset="0"/>
-              </a:rPr>
-              <a:t>Cette url doit retourner une liste d'enfants (âge &lt;= 18 ans) habitant à cette adresse. S'il n'y a pas d'enfant, cette url peut renvoyer une chaîne vide</a:t>
+              <a:rPr lang="fr-FR" sz="1400">
+                <a:latin typeface="Consolas" panose="020B0609020204030204" pitchFamily="49" charset="0"/>
+              </a:rPr>
+              <a:t>Cette url doit retourner une liste d'enfants (âge &lt;= 18 ans) habitant à cette adresse ainsi que les autres membres du foyer</a:t>
+            </a:r>
+          </a:p>
+          <a:p>
+            <a:pPr marL="0" indent="0" defTabSz="360000">
+              <a:spcBef>
+                <a:spcPts val="0"/>
+              </a:spcBef>
+              <a:buNone/>
+            </a:pPr>
+            <a:r>
+              <a:rPr lang="fr-FR" sz="1400">
+                <a:latin typeface="Consolas" panose="020B0609020204030204" pitchFamily="49" charset="0"/>
+              </a:rPr>
+              <a:t>S'il n'y a pas d'enfant, cette url peut renvoyer une chaîne vide</a:t>
             </a:r>
           </a:p>
           <a:p>
@@ -15826,7 +15892,19 @@
               <a:rPr lang="fr-FR" sz="1400" dirty="0">
                 <a:latin typeface="Consolas" panose="020B0609020204030204" pitchFamily="49" charset="0"/>
               </a:rPr>
-              <a:t>’utilisateur, je souhaite obtenir la liste des enfants (prénom, nom, âge, liste des autres membres du foyer) habitant à une adresse donnée</a:t>
+              <a:t>’utilisateur, je souhaite obtenir la liste des enfants (prénom, nom</a:t>
+            </a:r>
+            <a:r>
+              <a:rPr lang="fr-FR" sz="1400">
+                <a:latin typeface="Consolas" panose="020B0609020204030204" pitchFamily="49" charset="0"/>
+              </a:rPr>
+              <a:t>, âge) </a:t>
+            </a:r>
+            <a:r>
+              <a:rPr lang="fr-FR" sz="1400" dirty="0">
+                <a:latin typeface="Consolas" panose="020B0609020204030204" pitchFamily="49" charset="0"/>
+              </a:rPr>
+              <a:t>habitant à une adresse donnée</a:t>
             </a:r>
           </a:p>
           <a:p>
@@ -19246,39 +19324,54 @@
               <a:buNone/>
             </a:pPr>
             <a:r>
-              <a:rPr lang="fr-FR" sz="1400" dirty="0">
+              <a:rPr lang="fr-FR" sz="1400">
                 <a:latin typeface="Consolas" panose="020B0609020204030204" pitchFamily="49" charset="0"/>
               </a:rPr>
               <a:t>	|</a:t>
             </a:r>
             <a:r>
-              <a:rPr lang="fr-FR" sz="1400" dirty="0" err="1">
+              <a:rPr lang="fr-FR" sz="1400">
                 <a:solidFill>
                   <a:srgbClr val="FF0000"/>
                 </a:solidFill>
                 <a:latin typeface="Consolas" panose="020B0609020204030204" pitchFamily="49" charset="0"/>
               </a:rPr>
-              <a:t>fireStation</a:t>
-            </a:r>
-            <a:r>
-              <a:rPr lang="fr-FR" sz="1400" dirty="0">
+              <a:t>Station number</a:t>
+            </a:r>
+            <a:r>
+              <a:rPr lang="fr-FR" sz="1400">
                 <a:latin typeface="Consolas" panose="020B0609020204030204" pitchFamily="49" charset="0"/>
               </a:rPr>
               <a:t>|</a:t>
             </a:r>
-          </a:p>
-          <a:p>
-            <a:pPr marL="0" indent="0" defTabSz="360000">
-              <a:spcBef>
-                <a:spcPts val="0"/>
-              </a:spcBef>
-              <a:buNone/>
-            </a:pPr>
-            <a:r>
-              <a:rPr lang="fr-FR" sz="1400" dirty="0">
-                <a:latin typeface="Consolas" panose="020B0609020204030204" pitchFamily="49" charset="0"/>
-              </a:rPr>
-              <a:t>	|"1"  |</a:t>
+            <a:endParaRPr lang="fr-FR" sz="1400" dirty="0">
+              <a:latin typeface="Consolas" panose="020B0609020204030204" pitchFamily="49" charset="0"/>
+            </a:endParaRPr>
+          </a:p>
+          <a:p>
+            <a:pPr marL="0" indent="0" defTabSz="360000">
+              <a:spcBef>
+                <a:spcPts val="0"/>
+              </a:spcBef>
+              <a:buNone/>
+            </a:pPr>
+            <a:r>
+              <a:rPr lang="fr-FR" sz="1400" dirty="0">
+                <a:latin typeface="Consolas" panose="020B0609020204030204" pitchFamily="49" charset="0"/>
+              </a:rPr>
+              <a:t>	</a:t>
+            </a:r>
+            <a:r>
+              <a:rPr lang="fr-FR" sz="1400">
+                <a:latin typeface="Consolas" panose="020B0609020204030204" pitchFamily="49" charset="0"/>
+              </a:rPr>
+              <a:t>|"1, 2"        </a:t>
+            </a:r>
+            <a:r>
+              <a:rPr lang="fr-FR" sz="1400" dirty="0">
+                <a:latin typeface="Consolas" panose="020B0609020204030204" pitchFamily="49" charset="0"/>
+              </a:rPr>
+              <a:t>|</a:t>
             </a:r>
           </a:p>
           <a:p>

</xml_diff>

<commit_message>
wip : implement DTO finish
</commit_message>
<xml_diff>
--- a/A_Livrables/MOREL_Olivier_4_slides_062022.pptx
+++ b/A_Livrables/MOREL_Olivier_4_slides_062022.pptx
@@ -234,7 +234,7 @@
           <a:p>
             <a:fld id="{5C7AB521-C1B9-49E9-9F3E-FC8BC84D64FF}" type="datetimeFigureOut">
               <a:rPr lang="fr-FR" smtClean="0"/>
-              <a:t>23/08/2022</a:t>
+              <a:t>05/09/2022</a:t>
             </a:fld>
             <a:endParaRPr lang="fr-FR"/>
           </a:p>
@@ -3626,7 +3626,7 @@
           <a:p>
             <a:fld id="{BAAA5C57-0FC7-4809-8DE0-9FB8CD72F45B}" type="datetime1">
               <a:rPr lang="fr-FR" smtClean="0"/>
-              <a:t>23/08/2022</a:t>
+              <a:t>05/09/2022</a:t>
             </a:fld>
             <a:endParaRPr lang="fr-FR"/>
           </a:p>
@@ -3824,7 +3824,7 @@
           <a:p>
             <a:fld id="{D6394C11-AF79-46EB-8628-81685E730859}" type="datetime1">
               <a:rPr lang="fr-FR" smtClean="0"/>
-              <a:t>23/08/2022</a:t>
+              <a:t>05/09/2022</a:t>
             </a:fld>
             <a:endParaRPr lang="fr-FR"/>
           </a:p>
@@ -4032,7 +4032,7 @@
           <a:p>
             <a:fld id="{195502D9-FD20-4B10-85D7-D0A36058A8A9}" type="datetime1">
               <a:rPr lang="fr-FR" smtClean="0"/>
-              <a:t>23/08/2022</a:t>
+              <a:t>05/09/2022</a:t>
             </a:fld>
             <a:endParaRPr lang="fr-FR"/>
           </a:p>
@@ -4230,7 +4230,7 @@
           <a:p>
             <a:fld id="{57684602-8624-4EB1-9235-5DD654D82F09}" type="datetime1">
               <a:rPr lang="fr-FR" smtClean="0"/>
-              <a:t>23/08/2022</a:t>
+              <a:t>05/09/2022</a:t>
             </a:fld>
             <a:endParaRPr lang="fr-FR"/>
           </a:p>
@@ -4505,7 +4505,7 @@
           <a:p>
             <a:fld id="{E41784DB-987A-45B6-9772-C36DF83C3C02}" type="datetime1">
               <a:rPr lang="fr-FR" smtClean="0"/>
-              <a:t>23/08/2022</a:t>
+              <a:t>05/09/2022</a:t>
             </a:fld>
             <a:endParaRPr lang="fr-FR"/>
           </a:p>
@@ -4770,7 +4770,7 @@
           <a:p>
             <a:fld id="{E595D999-DF18-4099-8D0D-BC2297023F60}" type="datetime1">
               <a:rPr lang="fr-FR" smtClean="0"/>
-              <a:t>23/08/2022</a:t>
+              <a:t>05/09/2022</a:t>
             </a:fld>
             <a:endParaRPr lang="fr-FR"/>
           </a:p>
@@ -5182,7 +5182,7 @@
           <a:p>
             <a:fld id="{871871E2-9510-47F9-812F-D25C732F0E19}" type="datetime1">
               <a:rPr lang="fr-FR" smtClean="0"/>
-              <a:t>23/08/2022</a:t>
+              <a:t>05/09/2022</a:t>
             </a:fld>
             <a:endParaRPr lang="fr-FR"/>
           </a:p>
@@ -5323,7 +5323,7 @@
           <a:p>
             <a:fld id="{76383D6D-8978-42A7-ABAD-D463CD4AD0CE}" type="datetime1">
               <a:rPr lang="fr-FR" smtClean="0"/>
-              <a:t>23/08/2022</a:t>
+              <a:t>05/09/2022</a:t>
             </a:fld>
             <a:endParaRPr lang="fr-FR"/>
           </a:p>
@@ -5436,7 +5436,7 @@
           <a:p>
             <a:fld id="{C6571784-1182-4604-B720-0FE25B0575C8}" type="datetime1">
               <a:rPr lang="fr-FR" smtClean="0"/>
-              <a:t>23/08/2022</a:t>
+              <a:t>05/09/2022</a:t>
             </a:fld>
             <a:endParaRPr lang="fr-FR"/>
           </a:p>
@@ -5747,7 +5747,7 @@
           <a:p>
             <a:fld id="{BCE52CFF-6AA8-4EB4-A5AB-E9E18645216B}" type="datetime1">
               <a:rPr lang="fr-FR" smtClean="0"/>
-              <a:t>23/08/2022</a:t>
+              <a:t>05/09/2022</a:t>
             </a:fld>
             <a:endParaRPr lang="fr-FR"/>
           </a:p>
@@ -6035,7 +6035,7 @@
           <a:p>
             <a:fld id="{5EA3A904-D97A-4686-B1B2-2D6167D64CF7}" type="datetime1">
               <a:rPr lang="fr-FR" smtClean="0"/>
-              <a:t>23/08/2022</a:t>
+              <a:t>05/09/2022</a:t>
             </a:fld>
             <a:endParaRPr lang="fr-FR"/>
           </a:p>
@@ -6276,7 +6276,7 @@
           <a:p>
             <a:fld id="{5CD26E4C-FA77-42C7-B5FC-F70A55A82F63}" type="datetime1">
               <a:rPr lang="fr-FR" smtClean="0"/>
-              <a:t>23/08/2022</a:t>
+              <a:t>05/09/2022</a:t>
             </a:fld>
             <a:endParaRPr lang="fr-FR"/>
           </a:p>
@@ -7093,7 +7093,33 @@
               <a:rPr lang="fr-FR" sz="1100" dirty="0">
                 <a:latin typeface="Consolas" panose="020B0609020204030204" pitchFamily="49" charset="0"/>
               </a:rPr>
-              <a:t>’utilisateur, je souhaite obtenir la liste des personnes desservis par les casernes de pompiers, regroupées par adresse, avec les noms, les numéros de téléphone, les âges, et les antécédents médicaux </a:t>
+              <a:t>’utilisateur, je souhaite obtenir la liste des personnes desservis par les casernes de pompiers, regroupées par </a:t>
+            </a:r>
+            <a:r>
+              <a:rPr lang="fr-FR" sz="1100">
+                <a:latin typeface="Consolas" panose="020B0609020204030204" pitchFamily="49" charset="0"/>
+              </a:rPr>
+              <a:t>adresse,</a:t>
+            </a:r>
+          </a:p>
+          <a:p>
+            <a:pPr marL="0" indent="0" defTabSz="360000">
+              <a:spcBef>
+                <a:spcPts val="0"/>
+              </a:spcBef>
+              <a:buNone/>
+            </a:pPr>
+            <a:r>
+              <a:rPr lang="fr-FR" sz="1100">
+                <a:latin typeface="Consolas" panose="020B0609020204030204" pitchFamily="49" charset="0"/>
+              </a:rPr>
+              <a:t>avec </a:t>
+            </a:r>
+            <a:r>
+              <a:rPr lang="fr-FR" sz="1100" dirty="0">
+                <a:latin typeface="Consolas" panose="020B0609020204030204" pitchFamily="49" charset="0"/>
+              </a:rPr>
+              <a:t>les noms, les numéros de téléphone, les âges, et les antécédents médicaux </a:t>
             </a:r>
           </a:p>
           <a:p>
@@ -7730,10 +7756,30 @@
               <a:buNone/>
             </a:pPr>
             <a:r>
+              <a:rPr lang="fr-FR" sz="1100">
+                <a:latin typeface="Consolas" panose="020B0609020204030204" pitchFamily="49" charset="0"/>
+              </a:rPr>
+              <a:t>	|"2" |"834 Binoc Ave" |</a:t>
+            </a:r>
+          </a:p>
+          <a:p>
+            <a:pPr marL="0" indent="0" defTabSz="360000">
+              <a:spcBef>
+                <a:spcPts val="0"/>
+              </a:spcBef>
+              <a:buNone/>
+            </a:pPr>
+            <a:r>
+              <a:rPr lang="fr-FR" sz="1100">
+                <a:latin typeface="Consolas" panose="020B0609020204030204" pitchFamily="49" charset="0"/>
+              </a:rPr>
+              <a:t>	|"</a:t>
+            </a:r>
+            <a:r>
               <a:rPr lang="fr-FR" sz="1100" dirty="0">
                 <a:latin typeface="Consolas" panose="020B0609020204030204" pitchFamily="49" charset="0"/>
               </a:rPr>
-              <a:t>	|"2" |"844 </a:t>
+              <a:t>2" |"844 </a:t>
             </a:r>
             <a:r>
               <a:rPr lang="fr-FR" sz="1100" dirty="0" err="1">
@@ -7747,17 +7793,6 @@
               </a:rPr>
               <a:t> Ave" |</a:t>
             </a:r>
-          </a:p>
-          <a:p>
-            <a:pPr marL="0" indent="0" defTabSz="360000">
-              <a:spcBef>
-                <a:spcPts val="0"/>
-              </a:spcBef>
-              <a:buNone/>
-            </a:pPr>
-            <a:endParaRPr lang="fr-FR" sz="1100" dirty="0">
-              <a:latin typeface="Consolas" panose="020B0609020204030204" pitchFamily="49" charset="0"/>
-            </a:endParaRPr>
           </a:p>
           <a:p>
             <a:pPr marL="0" indent="0" defTabSz="360000">
@@ -8517,7 +8552,7 @@
               <a:rPr lang="fr-FR" sz="1000">
                 <a:latin typeface="Consolas" panose="020B0609020204030204" pitchFamily="49" charset="0"/>
               </a:rPr>
-              <a:t>Cette url doit retourner la personne et la liste des personnes habitant à la même adresse ainsi que la liste des personnes portant le même nom.</a:t>
+              <a:t>Cette url doit retourner la liste des personnes de même nom habitant à l'adresse de la personne précisée.</a:t>
             </a:r>
           </a:p>
           <a:p>
@@ -8557,7 +8592,21 @@
               <a:rPr lang="fr-FR" sz="1000">
                 <a:latin typeface="Consolas" panose="020B0609020204030204" pitchFamily="49" charset="0"/>
               </a:rPr>
-              <a:t>’utilisateur, je souhaite obtenir la liste des personnes vivant et ceux portant le même nom (nom, adresse, âge, courriel, antécédents médicaux) que la personne donnée</a:t>
+              <a:t>’utilisateur, je souhaite obtenir la liste des personnes de même nonm habitant à l'adresse de la personne donnée</a:t>
+            </a:r>
+          </a:p>
+          <a:p>
+            <a:pPr marL="0" indent="0" defTabSz="360000">
+              <a:spcBef>
+                <a:spcPts val="0"/>
+              </a:spcBef>
+              <a:buNone/>
+            </a:pPr>
+            <a:r>
+              <a:rPr lang="fr-FR" sz="1000">
+                <a:latin typeface="Consolas" panose="020B0609020204030204" pitchFamily="49" charset="0"/>
+              </a:rPr>
+              <a:t>(nom, adresse, âge, courriel, antécédents médicaux)</a:t>
             </a:r>
           </a:p>
           <a:p>
@@ -8809,22 +8858,35 @@
               <a:rPr lang="fr-FR" sz="1000">
                 <a:latin typeface="Consolas" panose="020B0609020204030204" pitchFamily="49" charset="0"/>
               </a:rPr>
-              <a:t>	|"John"</a:t>
-            </a:r>
+              <a:t>	|"John"   |"Boyd"  |"30"|"1509 Culver St"|"Culver"|"97451"|"841-874-6512"|"boyd@email.com" |"aznol:350mg, hyzol:100mg"|"peanut, wasp"|</a:t>
+            </a:r>
+          </a:p>
+          <a:p>
+            <a:pPr marL="0" indent="0" defTabSz="360000">
+              <a:spcBef>
+                <a:spcPts val="0"/>
+              </a:spcBef>
+              <a:buNone/>
+            </a:pPr>
             <a:r>
               <a:rPr lang="fr-FR" sz="1000">
-                <a:solidFill>
-                  <a:srgbClr val="FF0000"/>
-                </a:solidFill>
-                <a:latin typeface="Consolas" panose="020B0609020204030204" pitchFamily="49" charset="0"/>
-              </a:rPr>
-              <a:t>   </a:t>
-            </a:r>
+                <a:latin typeface="Consolas" panose="020B0609020204030204" pitchFamily="49" charset="0"/>
+              </a:rPr>
+              <a:t>	|"Tenley" |"Boyd"  |"18"|"1509 Culver St"|"Culver"|"97451"|"841-874-6513"|"tboyd@email.com"|"hyzol:100mg"             |"peanut"      |</a:t>
+            </a:r>
+          </a:p>
+          <a:p>
+            <a:pPr marL="0" indent="0" defTabSz="360000">
+              <a:spcBef>
+                <a:spcPts val="0"/>
+              </a:spcBef>
+              <a:buNone/>
+            </a:pPr>
             <a:r>
               <a:rPr lang="fr-FR" sz="1000">
                 <a:latin typeface="Consolas" panose="020B0609020204030204" pitchFamily="49" charset="0"/>
               </a:rPr>
-              <a:t>|"Boyd"  |"30"|"1509 Culver St"|"Culver"|"97451"|"841-874-6512"|"boyd@email.com" |"aznol:350mg, hyzol:100mg"|"peanut, wasp"|</a:t>
+              <a:t>	|"Tony"   |"Boyd"  |"12"|"1509 Culver St"|"Culver"|"97451"|"841-874-6512"|"jboyd@email.com"|                          |              |</a:t>
             </a:r>
           </a:p>
           <a:p>
@@ -8838,64 +8900,21 @@
               <a:rPr lang="fr-FR" sz="1000">
                 <a:latin typeface="Consolas" panose="020B0609020204030204" pitchFamily="49" charset="0"/>
               </a:rPr>
-              <a:t>	|"Tenley"</a:t>
-            </a:r>
+              <a:t>	|"Tessa"  |"Carman"|"75"|"1509 Culver St"|"Culver"|"97451"|"841-874-6514"|"tenz@email.com" |"tilia:3g"                |"fish"        |</a:t>
+            </a:r>
+          </a:p>
+          <a:p>
+            <a:pPr marL="0" indent="0" defTabSz="360000">
+              <a:spcBef>
+                <a:spcPts val="0"/>
+              </a:spcBef>
+              <a:buNone/>
+            </a:pPr>
             <a:r>
               <a:rPr lang="fr-FR" sz="1000">
-                <a:solidFill>
-                  <a:srgbClr val="FF0000"/>
-                </a:solidFill>
-                <a:latin typeface="Consolas" panose="020B0609020204030204" pitchFamily="49" charset="0"/>
-              </a:rPr>
-              <a:t> </a:t>
-            </a:r>
-            <a:r>
-              <a:rPr lang="fr-FR" sz="1000">
-                <a:latin typeface="Consolas" panose="020B0609020204030204" pitchFamily="49" charset="0"/>
-              </a:rPr>
-              <a:t>|"Boyd"  |"18"|"1509 Culver St"|"Culver"|"97451"|"841-874-6513"|"tboyd@email.com"|"hyzol:100mg"             |"peanut"      |</a:t>
-            </a:r>
-          </a:p>
-          <a:p>
-            <a:pPr marL="0" indent="0" defTabSz="360000">
-              <a:spcBef>
-                <a:spcPts val="0"/>
-              </a:spcBef>
-              <a:buNone/>
-            </a:pPr>
-            <a:r>
-              <a:rPr lang="fr-FR" sz="1000">
-                <a:latin typeface="Consolas" panose="020B0609020204030204" pitchFamily="49" charset="0"/>
-              </a:rPr>
-              <a:t>	|"Tony"   |"Boyd"  |"12"|"1509 Culver St"|"Culver"|"97451"|"841-874-6512"|"jboyd@email.com"|                          |              |</a:t>
-            </a:r>
-          </a:p>
-          <a:p>
-            <a:pPr marL="0" indent="0" defTabSz="360000">
-              <a:spcBef>
-                <a:spcPts val="0"/>
-              </a:spcBef>
-              <a:buNone/>
-            </a:pPr>
-            <a:r>
-              <a:rPr lang="fr-FR" sz="1000">
                 <a:latin typeface="Consolas" panose="020B0609020204030204" pitchFamily="49" charset="0"/>
               </a:rPr>
               <a:t>	|"Alice"  |"Boyd"  |"80"|"112 Steppes Pl"|"Culver"|"97451"|"841-874-6682"|"aboyd@email.com"|"haldol:10mg"             |"bee, peanut" |</a:t>
-            </a:r>
-          </a:p>
-          <a:p>
-            <a:pPr marL="0" indent="0" defTabSz="360000">
-              <a:spcBef>
-                <a:spcPts val="0"/>
-              </a:spcBef>
-              <a:buNone/>
-            </a:pPr>
-            <a:r>
-              <a:rPr lang="fr-FR" sz="1000">
-                <a:latin typeface="Consolas" panose="020B0609020204030204" pitchFamily="49" charset="0"/>
-              </a:rPr>
-              <a:t>	|"Tessa"  |"Carman"|"75"|"112 Steppes Pl"|"Culver"|"97451"|"841-874-6514"|"tenz@email.com" |"tilia:3g"                |"fish"        |</a:t>
             </a:r>
           </a:p>
           <a:p>
@@ -9139,49 +9158,35 @@
               <a:rPr lang="fr-FR" sz="1000">
                 <a:latin typeface="Consolas" panose="020B0609020204030204" pitchFamily="49" charset="0"/>
               </a:rPr>
+              <a:t>	|"Boyd"  |"1509 Culver St"|"30"|"boyd@email.com" |"aznol:350mg, hyzol:100mg"|"peanut, wasp"|</a:t>
+            </a:r>
+          </a:p>
+          <a:p>
+            <a:pPr marL="0" indent="0" defTabSz="360000">
+              <a:spcBef>
+                <a:spcPts val="0"/>
+              </a:spcBef>
+              <a:buNone/>
+            </a:pPr>
+            <a:r>
+              <a:rPr lang="fr-FR" sz="1000">
+                <a:latin typeface="Consolas" panose="020B0609020204030204" pitchFamily="49" charset="0"/>
+              </a:rPr>
+              <a:t>	|"Boyd"  |"1509 Culver St"|"18"|"tboyd@email.com"|"hyzol:100mg"             |"peanut"      |</a:t>
+            </a:r>
+          </a:p>
+          <a:p>
+            <a:pPr marL="0" indent="0" defTabSz="360000">
+              <a:spcBef>
+                <a:spcPts val="0"/>
+              </a:spcBef>
+              <a:buNone/>
+            </a:pPr>
+            <a:r>
+              <a:rPr lang="fr-FR" sz="1000">
+                <a:latin typeface="Consolas" panose="020B0609020204030204" pitchFamily="49" charset="0"/>
+              </a:rPr>
               <a:t>	|"Boyd"  |"1509 Culver St"|"12"|"jboyd@email.com"|                          |              |</a:t>
-            </a:r>
-          </a:p>
-          <a:p>
-            <a:pPr marL="0" indent="0" defTabSz="360000">
-              <a:spcBef>
-                <a:spcPts val="0"/>
-              </a:spcBef>
-              <a:buNone/>
-            </a:pPr>
-            <a:r>
-              <a:rPr lang="fr-FR" sz="1000">
-                <a:latin typeface="Consolas" panose="020B0609020204030204" pitchFamily="49" charset="0"/>
-              </a:rPr>
-              <a:t>	|"Boyd"  |"1509 Culver St"|"30"|"boyd@email.com" |"aznol:350mg, hyzol:100mg"|"peanut, wasp"|</a:t>
-            </a:r>
-          </a:p>
-          <a:p>
-            <a:pPr marL="0" indent="0" defTabSz="360000">
-              <a:spcBef>
-                <a:spcPts val="0"/>
-              </a:spcBef>
-              <a:buNone/>
-            </a:pPr>
-            <a:r>
-              <a:rPr lang="fr-FR" sz="1000">
-                <a:latin typeface="Consolas" panose="020B0609020204030204" pitchFamily="49" charset="0"/>
-              </a:rPr>
-              <a:t>	|"Boyd"  |"1509 Culver St"|"18"|"tboyd@email.com"|"hyzol:100mg"             |"peanut"      |</a:t>
-            </a:r>
-          </a:p>
-          <a:p>
-            <a:pPr marL="0" indent="0" defTabSz="360000">
-              <a:spcBef>
-                <a:spcPts val="0"/>
-              </a:spcBef>
-              <a:buNone/>
-            </a:pPr>
-            <a:r>
-              <a:rPr lang="fr-FR" sz="1000">
-                <a:latin typeface="Consolas" panose="020B0609020204030204" pitchFamily="49" charset="0"/>
-              </a:rPr>
-              <a:t>	|"Boyd"  |"112 Steppes Pl"|"80"|"aboyd@email.com"|"haldol:10mg"             |"bee, peanut" |</a:t>
             </a:r>
           </a:p>
           <a:p>
@@ -10429,36 +10434,6 @@
           <a:chExt cx="0" cy="0"/>
         </a:xfrm>
       </p:grpSpPr>
-      <p:pic>
-        <p:nvPicPr>
-          <p:cNvPr id="15" name="Image 14">
-            <a:extLst>
-              <a:ext uri="{FF2B5EF4-FFF2-40B4-BE49-F238E27FC236}">
-                <a16:creationId xmlns:a16="http://schemas.microsoft.com/office/drawing/2014/main" id="{37A43F00-E365-4C73-A8B0-806408C80B66}"/>
-              </a:ext>
-            </a:extLst>
-          </p:cNvPr>
-          <p:cNvPicPr>
-            <a:picLocks noChangeAspect="1"/>
-          </p:cNvPicPr>
-          <p:nvPr/>
-        </p:nvPicPr>
-        <p:blipFill>
-          <a:blip r:embed="rId3"/>
-          <a:stretch>
-            <a:fillRect/>
-          </a:stretch>
-        </p:blipFill>
-        <p:spPr>
-          <a:xfrm>
-            <a:off x="7565838" y="2405062"/>
-            <a:ext cx="3838575" cy="2047875"/>
-          </a:xfrm>
-          <a:prstGeom prst="rect">
-            <a:avLst/>
-          </a:prstGeom>
-        </p:spPr>
-      </p:pic>
       <p:sp>
         <p:nvSpPr>
           <p:cNvPr id="16" name="ZoneTexte 15">
@@ -10500,36 +10475,6 @@
           </a:p>
         </p:txBody>
       </p:sp>
-      <p:pic>
-        <p:nvPicPr>
-          <p:cNvPr id="18" name="Image 17">
-            <a:extLst>
-              <a:ext uri="{FF2B5EF4-FFF2-40B4-BE49-F238E27FC236}">
-                <a16:creationId xmlns:a16="http://schemas.microsoft.com/office/drawing/2014/main" id="{4A78C9B5-54B7-424F-9051-2A52073F18E5}"/>
-              </a:ext>
-            </a:extLst>
-          </p:cNvPr>
-          <p:cNvPicPr>
-            <a:picLocks noChangeAspect="1"/>
-          </p:cNvPicPr>
-          <p:nvPr/>
-        </p:nvPicPr>
-        <p:blipFill>
-          <a:blip r:embed="rId4"/>
-          <a:stretch>
-            <a:fillRect/>
-          </a:stretch>
-        </p:blipFill>
-        <p:spPr>
-          <a:xfrm>
-            <a:off x="7565838" y="4686300"/>
-            <a:ext cx="2257425" cy="2171700"/>
-          </a:xfrm>
-          <a:prstGeom prst="rect">
-            <a:avLst/>
-          </a:prstGeom>
-        </p:spPr>
-      </p:pic>
       <p:sp>
         <p:nvSpPr>
           <p:cNvPr id="7" name="ZoneTexte 6">
@@ -10545,7 +10490,7 @@
         <p:spPr>
           <a:xfrm>
             <a:off x="402336" y="323961"/>
-            <a:ext cx="11286744" cy="4708981"/>
+            <a:ext cx="11286744" cy="461665"/>
           </a:xfrm>
           <a:prstGeom prst="rect">
             <a:avLst/>
@@ -10564,538 +10509,13 @@
               </a:spcAft>
             </a:pPr>
             <a:r>
-              <a:rPr lang="fr-FR" sz="2400" dirty="0"/>
-              <a:t>Test du code original :</a:t>
-            </a:r>
-          </a:p>
-          <a:p>
-            <a:r>
-              <a:rPr lang="en-US" dirty="0" err="1">
-                <a:solidFill>
-                  <a:srgbClr val="000000"/>
-                </a:solidFill>
-                <a:latin typeface="Consolas" panose="020B0609020204030204" pitchFamily="49" charset="0"/>
-              </a:rPr>
-              <a:t>BufferedReader</a:t>
-            </a:r>
-            <a:r>
-              <a:rPr lang="en-US" dirty="0">
-                <a:solidFill>
-                  <a:srgbClr val="000000"/>
-                </a:solidFill>
-                <a:latin typeface="Consolas" panose="020B0609020204030204" pitchFamily="49" charset="0"/>
-              </a:rPr>
-              <a:t> </a:t>
-            </a:r>
-            <a:r>
-              <a:rPr lang="en-US" u="sng" dirty="0">
-                <a:solidFill>
-                  <a:srgbClr val="6A3E3E"/>
-                </a:solidFill>
-                <a:latin typeface="Consolas" panose="020B0609020204030204" pitchFamily="49" charset="0"/>
-              </a:rPr>
-              <a:t>reader</a:t>
-            </a:r>
-            <a:r>
-              <a:rPr lang="en-US" u="sng" dirty="0">
-                <a:solidFill>
-                  <a:srgbClr val="000000"/>
-                </a:solidFill>
-                <a:latin typeface="Consolas" panose="020B0609020204030204" pitchFamily="49" charset="0"/>
-              </a:rPr>
-              <a:t> = </a:t>
-            </a:r>
-            <a:r>
-              <a:rPr lang="en-US" b="1" u="sng" dirty="0">
-                <a:solidFill>
-                  <a:srgbClr val="7F0055"/>
-                </a:solidFill>
-                <a:latin typeface="Consolas" panose="020B0609020204030204" pitchFamily="49" charset="0"/>
-              </a:rPr>
-              <a:t>new</a:t>
-            </a:r>
-            <a:r>
-              <a:rPr lang="en-US" b="1" u="sng" dirty="0">
-                <a:solidFill>
-                  <a:srgbClr val="000000"/>
-                </a:solidFill>
-                <a:latin typeface="Consolas" panose="020B0609020204030204" pitchFamily="49" charset="0"/>
-              </a:rPr>
-              <a:t> </a:t>
-            </a:r>
-            <a:r>
-              <a:rPr lang="en-US" b="1" u="sng" dirty="0" err="1">
-                <a:solidFill>
-                  <a:srgbClr val="000000"/>
-                </a:solidFill>
-                <a:latin typeface="Consolas" panose="020B0609020204030204" pitchFamily="49" charset="0"/>
-              </a:rPr>
-              <a:t>BufferedReader</a:t>
-            </a:r>
-            <a:r>
-              <a:rPr lang="en-US" b="1" u="sng" dirty="0">
-                <a:solidFill>
-                  <a:srgbClr val="000000"/>
-                </a:solidFill>
-                <a:latin typeface="Consolas" panose="020B0609020204030204" pitchFamily="49" charset="0"/>
-              </a:rPr>
-              <a:t> (</a:t>
-            </a:r>
-            <a:r>
-              <a:rPr lang="en-US" b="1" u="sng" dirty="0">
-                <a:solidFill>
-                  <a:srgbClr val="7F0055"/>
-                </a:solidFill>
-                <a:latin typeface="Consolas" panose="020B0609020204030204" pitchFamily="49" charset="0"/>
-              </a:rPr>
-              <a:t>new</a:t>
-            </a:r>
-            <a:r>
-              <a:rPr lang="en-US" b="1" u="sng" dirty="0">
-                <a:solidFill>
-                  <a:srgbClr val="000000"/>
-                </a:solidFill>
-                <a:latin typeface="Consolas" panose="020B0609020204030204" pitchFamily="49" charset="0"/>
-              </a:rPr>
-              <a:t> </a:t>
-            </a:r>
-            <a:r>
-              <a:rPr lang="en-US" b="1" u="sng" dirty="0" err="1">
-                <a:solidFill>
-                  <a:srgbClr val="000000"/>
-                </a:solidFill>
-                <a:latin typeface="Consolas" panose="020B0609020204030204" pitchFamily="49" charset="0"/>
-              </a:rPr>
-              <a:t>FileReader</a:t>
-            </a:r>
-            <a:r>
-              <a:rPr lang="en-US" b="1" u="sng" dirty="0">
-                <a:solidFill>
-                  <a:srgbClr val="000000"/>
-                </a:solidFill>
-                <a:latin typeface="Consolas" panose="020B0609020204030204" pitchFamily="49" charset="0"/>
-              </a:rPr>
-              <a:t>(</a:t>
-            </a:r>
-            <a:r>
-              <a:rPr lang="en-US" b="1" u="sng" dirty="0">
-                <a:solidFill>
-                  <a:srgbClr val="2A00FF"/>
-                </a:solidFill>
-                <a:latin typeface="Consolas" panose="020B0609020204030204" pitchFamily="49" charset="0"/>
-              </a:rPr>
-              <a:t>"symptoms.txt"</a:t>
-            </a:r>
-            <a:r>
-              <a:rPr lang="en-US" b="1" u="sng" dirty="0">
-                <a:solidFill>
-                  <a:srgbClr val="000000"/>
-                </a:solidFill>
-                <a:latin typeface="Consolas" panose="020B0609020204030204" pitchFamily="49" charset="0"/>
-              </a:rPr>
-              <a:t>));</a:t>
-            </a:r>
-          </a:p>
-          <a:p>
-            <a:r>
-              <a:rPr lang="fr-FR" dirty="0">
-                <a:solidFill>
-                  <a:srgbClr val="FF0000"/>
-                </a:solidFill>
-                <a:latin typeface="Consolas" panose="020B0609020204030204" pitchFamily="49" charset="0"/>
-              </a:rPr>
-              <a:t>symptoms.txt (Le fichier spécifié est introuvable)</a:t>
-            </a:r>
-          </a:p>
-          <a:p>
-            <a:endParaRPr lang="fr-FR" sz="1200" dirty="0">
-              <a:solidFill>
-                <a:srgbClr val="FF0000"/>
-              </a:solidFill>
-              <a:latin typeface="Consolas" panose="020B0609020204030204" pitchFamily="49" charset="0"/>
-            </a:endParaRPr>
-          </a:p>
-          <a:p>
-            <a:pPr>
-              <a:spcAft>
-                <a:spcPts val="600"/>
-              </a:spcAft>
-            </a:pPr>
-            <a:r>
-              <a:rPr lang="fr-FR" sz="2400" dirty="0"/>
-              <a:t>docs.oracle.com/</a:t>
-            </a:r>
-            <a:r>
-              <a:rPr lang="fr-FR" sz="2400" dirty="0" err="1"/>
-              <a:t>javase</a:t>
-            </a:r>
-            <a:r>
-              <a:rPr lang="fr-FR" sz="2400" dirty="0"/>
-              <a:t>/8/docs/api/ , Class File :</a:t>
-            </a:r>
-          </a:p>
-          <a:p>
-            <a:pPr>
-              <a:spcAft>
-                <a:spcPts val="600"/>
-              </a:spcAft>
-            </a:pPr>
-            <a:r>
-              <a:rPr lang="en-US" dirty="0"/>
-              <a:t>By default the classes in the java.io package always resolve relative pathnames against the current user directory. This directory is named by the system property </a:t>
-            </a:r>
-            <a:r>
-              <a:rPr lang="en-US" dirty="0" err="1">
-                <a:highlight>
-                  <a:srgbClr val="FFFF00"/>
-                </a:highlight>
-              </a:rPr>
-              <a:t>user.dir</a:t>
-            </a:r>
-            <a:r>
-              <a:rPr lang="en-US" dirty="0">
-                <a:highlight>
-                  <a:srgbClr val="FFFF00"/>
-                </a:highlight>
-              </a:rPr>
-              <a:t> </a:t>
-            </a:r>
-            <a:r>
-              <a:rPr lang="en-US" dirty="0"/>
-              <a:t>…</a:t>
-            </a:r>
-          </a:p>
-          <a:p>
-            <a:pPr>
-              <a:spcAft>
-                <a:spcPts val="600"/>
-              </a:spcAft>
-            </a:pPr>
-            <a:endParaRPr lang="en-US" sz="1200" dirty="0"/>
-          </a:p>
-          <a:p>
-            <a:pPr>
-              <a:spcAft>
-                <a:spcPts val="600"/>
-              </a:spcAft>
-            </a:pPr>
-            <a:r>
-              <a:rPr lang="en-US" sz="2400" dirty="0" err="1"/>
-              <a:t>Ajout</a:t>
-            </a:r>
-            <a:r>
-              <a:rPr lang="en-US" sz="2400" dirty="0"/>
-              <a:t> du code : </a:t>
-            </a:r>
-          </a:p>
-          <a:p>
-            <a:pPr algn="l"/>
-            <a:r>
-              <a:rPr lang="en-US" dirty="0">
-                <a:solidFill>
-                  <a:srgbClr val="000000"/>
-                </a:solidFill>
-                <a:latin typeface="Consolas" panose="020B0609020204030204" pitchFamily="49" charset="0"/>
-              </a:rPr>
-              <a:t>String </a:t>
-            </a:r>
-            <a:r>
-              <a:rPr lang="en-US" dirty="0">
-                <a:solidFill>
-                  <a:srgbClr val="6A3E3E"/>
-                </a:solidFill>
-                <a:latin typeface="Consolas" panose="020B0609020204030204" pitchFamily="49" charset="0"/>
-              </a:rPr>
-              <a:t>path</a:t>
-            </a:r>
-            <a:r>
-              <a:rPr lang="en-US" dirty="0">
-                <a:solidFill>
-                  <a:srgbClr val="000000"/>
-                </a:solidFill>
-                <a:latin typeface="Consolas" panose="020B0609020204030204" pitchFamily="49" charset="0"/>
-              </a:rPr>
-              <a:t> = </a:t>
-            </a:r>
-            <a:r>
-              <a:rPr lang="en-US" dirty="0" err="1">
-                <a:solidFill>
-                  <a:srgbClr val="000000"/>
-                </a:solidFill>
-                <a:latin typeface="Consolas" panose="020B0609020204030204" pitchFamily="49" charset="0"/>
-              </a:rPr>
-              <a:t>System.</a:t>
-            </a:r>
-            <a:r>
-              <a:rPr lang="en-US" i="1" dirty="0" err="1">
-                <a:solidFill>
-                  <a:srgbClr val="000000"/>
-                </a:solidFill>
-                <a:latin typeface="Consolas" panose="020B0609020204030204" pitchFamily="49" charset="0"/>
-              </a:rPr>
-              <a:t>getProperty</a:t>
-            </a:r>
-            <a:r>
-              <a:rPr lang="en-US" i="1" dirty="0">
-                <a:solidFill>
-                  <a:srgbClr val="000000"/>
-                </a:solidFill>
-                <a:latin typeface="Consolas" panose="020B0609020204030204" pitchFamily="49" charset="0"/>
-              </a:rPr>
-              <a:t>(</a:t>
-            </a:r>
-            <a:r>
-              <a:rPr lang="en-US" i="1" dirty="0">
-                <a:solidFill>
-                  <a:srgbClr val="2A00FF"/>
-                </a:solidFill>
-                <a:latin typeface="Consolas" panose="020B0609020204030204" pitchFamily="49" charset="0"/>
-              </a:rPr>
-              <a:t>"</a:t>
-            </a:r>
-            <a:r>
-              <a:rPr lang="en-US" i="1" dirty="0" err="1">
-                <a:solidFill>
-                  <a:srgbClr val="2A00FF"/>
-                </a:solidFill>
-                <a:latin typeface="Consolas" panose="020B0609020204030204" pitchFamily="49" charset="0"/>
-              </a:rPr>
-              <a:t>user.dir</a:t>
-            </a:r>
-            <a:r>
-              <a:rPr lang="en-US" i="1" dirty="0">
-                <a:solidFill>
-                  <a:srgbClr val="2A00FF"/>
-                </a:solidFill>
-                <a:latin typeface="Consolas" panose="020B0609020204030204" pitchFamily="49" charset="0"/>
-              </a:rPr>
-              <a:t>"</a:t>
-            </a:r>
-            <a:r>
-              <a:rPr lang="en-US" i="1" dirty="0">
-                <a:solidFill>
-                  <a:srgbClr val="000000"/>
-                </a:solidFill>
-                <a:latin typeface="Consolas" panose="020B0609020204030204" pitchFamily="49" charset="0"/>
-              </a:rPr>
-              <a:t>);</a:t>
-            </a:r>
-          </a:p>
-          <a:p>
-            <a:pPr algn="l"/>
-            <a:r>
-              <a:rPr lang="fr-FR" dirty="0" err="1">
-                <a:solidFill>
-                  <a:srgbClr val="000000"/>
-                </a:solidFill>
-                <a:latin typeface="Consolas" panose="020B0609020204030204" pitchFamily="49" charset="0"/>
-              </a:rPr>
-              <a:t>System.</a:t>
-            </a:r>
-            <a:r>
-              <a:rPr lang="fr-FR" b="1" i="1" dirty="0" err="1">
-                <a:solidFill>
-                  <a:srgbClr val="0000C0"/>
-                </a:solidFill>
-                <a:latin typeface="Consolas" panose="020B0609020204030204" pitchFamily="49" charset="0"/>
-              </a:rPr>
-              <a:t>out</a:t>
-            </a:r>
-            <a:r>
-              <a:rPr lang="fr-FR" b="1" i="1" dirty="0" err="1">
-                <a:solidFill>
-                  <a:srgbClr val="000000"/>
-                </a:solidFill>
-                <a:latin typeface="Consolas" panose="020B0609020204030204" pitchFamily="49" charset="0"/>
-              </a:rPr>
-              <a:t>.println</a:t>
-            </a:r>
-            <a:r>
-              <a:rPr lang="fr-FR" b="1" i="1" dirty="0">
-                <a:solidFill>
-                  <a:srgbClr val="000000"/>
-                </a:solidFill>
-                <a:latin typeface="Consolas" panose="020B0609020204030204" pitchFamily="49" charset="0"/>
-              </a:rPr>
-              <a:t>(</a:t>
-            </a:r>
-            <a:r>
-              <a:rPr lang="fr-FR" b="1" i="1" dirty="0" err="1">
-                <a:solidFill>
-                  <a:srgbClr val="6A3E3E"/>
-                </a:solidFill>
-                <a:latin typeface="Consolas" panose="020B0609020204030204" pitchFamily="49" charset="0"/>
-              </a:rPr>
-              <a:t>path</a:t>
-            </a:r>
-            <a:r>
-              <a:rPr lang="fr-FR" b="1" i="1" dirty="0">
-                <a:solidFill>
-                  <a:srgbClr val="000000"/>
-                </a:solidFill>
-                <a:latin typeface="Consolas" panose="020B0609020204030204" pitchFamily="49" charset="0"/>
-              </a:rPr>
-              <a:t>);</a:t>
-            </a:r>
-          </a:p>
-          <a:p>
-            <a:pPr algn="l"/>
-            <a:endParaRPr lang="fr-FR" b="1" i="1" dirty="0">
-              <a:solidFill>
-                <a:srgbClr val="000000"/>
-              </a:solidFill>
-              <a:latin typeface="Consolas" panose="020B0609020204030204" pitchFamily="49" charset="0"/>
-            </a:endParaRPr>
-          </a:p>
-          <a:p>
-            <a:pPr>
-              <a:spcAft>
-                <a:spcPts val="600"/>
-              </a:spcAft>
-            </a:pPr>
-            <a:r>
-              <a:rPr lang="en-US" sz="2400" dirty="0"/>
-              <a:t>Modification du code :</a:t>
-            </a:r>
-          </a:p>
-          <a:p>
-            <a:pPr>
-              <a:spcAft>
-                <a:spcPts val="600"/>
-              </a:spcAft>
-            </a:pPr>
-            <a:r>
-              <a:rPr lang="en-US" dirty="0">
-                <a:solidFill>
-                  <a:srgbClr val="000000"/>
-                </a:solidFill>
-                <a:latin typeface="Consolas" panose="020B0609020204030204" pitchFamily="49" charset="0"/>
-              </a:rPr>
-              <a:t>(</a:t>
-            </a:r>
-            <a:r>
-              <a:rPr lang="en-US" b="1" dirty="0">
-                <a:solidFill>
-                  <a:srgbClr val="7F0055"/>
-                </a:solidFill>
-                <a:latin typeface="Consolas" panose="020B0609020204030204" pitchFamily="49" charset="0"/>
-              </a:rPr>
-              <a:t>new</a:t>
-            </a:r>
-            <a:r>
-              <a:rPr lang="en-US" b="1" dirty="0">
-                <a:solidFill>
-                  <a:srgbClr val="000000"/>
-                </a:solidFill>
-                <a:latin typeface="Consolas" panose="020B0609020204030204" pitchFamily="49" charset="0"/>
-              </a:rPr>
-              <a:t> </a:t>
-            </a:r>
-            <a:r>
-              <a:rPr lang="en-US" b="1" dirty="0" err="1">
-                <a:solidFill>
-                  <a:srgbClr val="000000"/>
-                </a:solidFill>
-                <a:latin typeface="Consolas" panose="020B0609020204030204" pitchFamily="49" charset="0"/>
-              </a:rPr>
-              <a:t>FileReader</a:t>
-            </a:r>
-            <a:r>
-              <a:rPr lang="en-US" b="1" dirty="0">
-                <a:solidFill>
-                  <a:srgbClr val="000000"/>
-                </a:solidFill>
-                <a:latin typeface="Consolas" panose="020B0609020204030204" pitchFamily="49" charset="0"/>
-              </a:rPr>
-              <a:t>(</a:t>
-            </a:r>
-            <a:r>
-              <a:rPr lang="en-US" b="1" dirty="0">
-                <a:solidFill>
-                  <a:srgbClr val="6A3E3E"/>
-                </a:solidFill>
-                <a:latin typeface="Consolas" panose="020B0609020204030204" pitchFamily="49" charset="0"/>
-              </a:rPr>
-              <a:t>path</a:t>
-            </a:r>
-            <a:r>
-              <a:rPr lang="en-US" b="1" dirty="0">
-                <a:solidFill>
-                  <a:srgbClr val="000000"/>
-                </a:solidFill>
-                <a:latin typeface="Consolas" panose="020B0609020204030204" pitchFamily="49" charset="0"/>
-              </a:rPr>
-              <a:t>+</a:t>
-            </a:r>
-            <a:r>
-              <a:rPr lang="en-US" b="1" dirty="0">
-                <a:solidFill>
-                  <a:srgbClr val="2A00FF"/>
-                </a:solidFill>
-                <a:latin typeface="Consolas" panose="020B0609020204030204" pitchFamily="49" charset="0"/>
-              </a:rPr>
-              <a:t>"/Project02Eclipse/symptoms.txt"</a:t>
-            </a:r>
-            <a:r>
-              <a:rPr lang="en-US" b="1" dirty="0">
-                <a:solidFill>
-                  <a:srgbClr val="000000"/>
-                </a:solidFill>
-                <a:latin typeface="Consolas" panose="020B0609020204030204" pitchFamily="49" charset="0"/>
-              </a:rPr>
-              <a:t>));</a:t>
-            </a:r>
-            <a:endParaRPr lang="en-US" dirty="0"/>
+              <a:rPr lang="fr-FR" sz="2400"/>
+              <a:t>1:</a:t>
+            </a:r>
+            <a:endParaRPr lang="fr-FR" sz="2400" dirty="0"/>
           </a:p>
         </p:txBody>
       </p:sp>
-      <p:cxnSp>
-        <p:nvCxnSpPr>
-          <p:cNvPr id="19" name="Connecteur : en angle 18">
-            <a:extLst>
-              <a:ext uri="{FF2B5EF4-FFF2-40B4-BE49-F238E27FC236}">
-                <a16:creationId xmlns:a16="http://schemas.microsoft.com/office/drawing/2014/main" id="{257998A5-154C-4A03-B211-DF906111591E}"/>
-              </a:ext>
-            </a:extLst>
-          </p:cNvPr>
-          <p:cNvCxnSpPr>
-            <a:cxnSpLocks/>
-          </p:cNvCxnSpPr>
-          <p:nvPr/>
-        </p:nvCxnSpPr>
-        <p:spPr>
-          <a:xfrm flipV="1">
-            <a:off x="3736258" y="2507226"/>
-            <a:ext cx="3829580" cy="1327355"/>
-          </a:xfrm>
-          <a:prstGeom prst="bentConnector3">
-            <a:avLst>
-              <a:gd name="adj1" fmla="val 74134"/>
-            </a:avLst>
-          </a:prstGeom>
-          <a:ln w="25400">
-            <a:solidFill>
-              <a:schemeClr val="tx1"/>
-            </a:solidFill>
-            <a:headEnd type="triangle"/>
-            <a:tailEnd type="triangle"/>
-          </a:ln>
-        </p:spPr>
-        <p:style>
-          <a:lnRef idx="1">
-            <a:schemeClr val="accent1"/>
-          </a:lnRef>
-          <a:fillRef idx="0">
-            <a:schemeClr val="accent1"/>
-          </a:fillRef>
-          <a:effectRef idx="0">
-            <a:schemeClr val="accent1"/>
-          </a:effectRef>
-          <a:fontRef idx="minor">
-            <a:schemeClr val="tx1"/>
-          </a:fontRef>
-        </p:style>
-      </p:cxnSp>
       <p:sp>
         <p:nvSpPr>
           <p:cNvPr id="2" name="Espace réservé du numéro de diapositive 1">
@@ -11193,276 +10613,10 @@
           <a:p>
             <a:pPr algn="ctr"/>
             <a:r>
-              <a:rPr lang="fr-FR" sz="3200" dirty="0"/>
+              <a:rPr lang="fr-FR" sz="3200"/>
               <a:t>1</a:t>
             </a:r>
-            <a:r>
-              <a:rPr lang="fr-FR" sz="3200" baseline="30000" dirty="0"/>
-              <a:t>ère</a:t>
-            </a:r>
-            <a:r>
-              <a:rPr lang="fr-FR" sz="3200" dirty="0"/>
-              <a:t> itération : lire le fichier</a:t>
-            </a:r>
-          </a:p>
-        </p:txBody>
-      </p:sp>
-      <p:pic>
-        <p:nvPicPr>
-          <p:cNvPr id="4" name="Image 3">
-            <a:extLst>
-              <a:ext uri="{FF2B5EF4-FFF2-40B4-BE49-F238E27FC236}">
-                <a16:creationId xmlns:a16="http://schemas.microsoft.com/office/drawing/2014/main" id="{ADDBEE4C-B2AB-4A26-8320-3FED74D890EB}"/>
-              </a:ext>
-            </a:extLst>
-          </p:cNvPr>
-          <p:cNvPicPr>
-            <a:picLocks noChangeAspect="1"/>
-          </p:cNvPicPr>
-          <p:nvPr/>
-        </p:nvPicPr>
-        <p:blipFill>
-          <a:blip r:embed="rId3"/>
-          <a:stretch>
-            <a:fillRect/>
-          </a:stretch>
-        </p:blipFill>
-        <p:spPr>
-          <a:xfrm>
-            <a:off x="264409" y="1604707"/>
-            <a:ext cx="4549958" cy="4878389"/>
-          </a:xfrm>
-          <a:prstGeom prst="rect">
-            <a:avLst/>
-          </a:prstGeom>
-        </p:spPr>
-      </p:pic>
-      <p:cxnSp>
-        <p:nvCxnSpPr>
-          <p:cNvPr id="6" name="Connecteur droit 5">
-            <a:extLst>
-              <a:ext uri="{FF2B5EF4-FFF2-40B4-BE49-F238E27FC236}">
-                <a16:creationId xmlns:a16="http://schemas.microsoft.com/office/drawing/2014/main" id="{250CF61C-DC26-49C5-ADD8-56CAE46F5A6F}"/>
-              </a:ext>
-            </a:extLst>
-          </p:cNvPr>
-          <p:cNvCxnSpPr>
-            <a:cxnSpLocks/>
-          </p:cNvCxnSpPr>
-          <p:nvPr/>
-        </p:nvCxnSpPr>
-        <p:spPr>
-          <a:xfrm>
-            <a:off x="4931366" y="994034"/>
-            <a:ext cx="0" cy="5760000"/>
-          </a:xfrm>
-          <a:prstGeom prst="line">
-            <a:avLst/>
-          </a:prstGeom>
-        </p:spPr>
-        <p:style>
-          <a:lnRef idx="1">
-            <a:schemeClr val="dk1"/>
-          </a:lnRef>
-          <a:fillRef idx="0">
-            <a:schemeClr val="dk1"/>
-          </a:fillRef>
-          <a:effectRef idx="0">
-            <a:schemeClr val="dk1"/>
-          </a:effectRef>
-          <a:fontRef idx="minor">
-            <a:schemeClr val="tx1"/>
-          </a:fontRef>
-        </p:style>
-      </p:cxnSp>
-      <p:sp>
-        <p:nvSpPr>
-          <p:cNvPr id="7" name="ZoneTexte 6">
-            <a:extLst>
-              <a:ext uri="{FF2B5EF4-FFF2-40B4-BE49-F238E27FC236}">
-                <a16:creationId xmlns:a16="http://schemas.microsoft.com/office/drawing/2014/main" id="{16E2AC71-5EAB-4CA4-8E0B-D18CBC4309EF}"/>
-              </a:ext>
-            </a:extLst>
-          </p:cNvPr>
-          <p:cNvSpPr txBox="1"/>
-          <p:nvPr/>
-        </p:nvSpPr>
-        <p:spPr>
-          <a:xfrm>
-            <a:off x="5210979" y="1021235"/>
-            <a:ext cx="4793043" cy="369332"/>
-          </a:xfrm>
-          <a:prstGeom prst="rect">
-            <a:avLst/>
-          </a:prstGeom>
-          <a:noFill/>
-        </p:spPr>
-        <p:txBody>
-          <a:bodyPr wrap="none" rtlCol="0">
-            <a:spAutoFit/>
-          </a:bodyPr>
-          <a:lstStyle/>
-          <a:p>
-            <a:r>
-              <a:rPr lang="fr-FR" dirty="0"/>
-              <a:t>Aucune logique dans le main (</a:t>
-            </a:r>
-            <a:r>
-              <a:rPr lang="fr-FR" dirty="0" err="1"/>
-              <a:t>AnalyticsCounter</a:t>
-            </a:r>
-            <a:r>
-              <a:rPr lang="fr-FR" dirty="0"/>
-              <a:t>) :</a:t>
-            </a:r>
-          </a:p>
-        </p:txBody>
-      </p:sp>
-      <p:sp>
-        <p:nvSpPr>
-          <p:cNvPr id="3" name="ZoneTexte 2">
-            <a:extLst>
-              <a:ext uri="{FF2B5EF4-FFF2-40B4-BE49-F238E27FC236}">
-                <a16:creationId xmlns:a16="http://schemas.microsoft.com/office/drawing/2014/main" id="{25737779-FF34-47F3-AA8C-963970459FE2}"/>
-              </a:ext>
-            </a:extLst>
-          </p:cNvPr>
-          <p:cNvSpPr txBox="1"/>
-          <p:nvPr/>
-        </p:nvSpPr>
-        <p:spPr>
-          <a:xfrm>
-            <a:off x="5048366" y="4023591"/>
-            <a:ext cx="6841996" cy="1754326"/>
-          </a:xfrm>
-          <a:prstGeom prst="rect">
-            <a:avLst/>
-          </a:prstGeom>
-          <a:noFill/>
-        </p:spPr>
-        <p:txBody>
-          <a:bodyPr wrap="square" rtlCol="0">
-            <a:spAutoFit/>
-          </a:bodyPr>
-          <a:lstStyle/>
-          <a:p>
-            <a:endParaRPr lang="fr-FR" dirty="0"/>
-          </a:p>
-          <a:p>
-            <a:r>
-              <a:rPr lang="fr-FR" dirty="0"/>
-              <a:t>Documentation JDK 1.8 </a:t>
-            </a:r>
-            <a:r>
-              <a:rPr lang="fr-FR" dirty="0" err="1"/>
-              <a:t>FileWriter</a:t>
-            </a:r>
-            <a:r>
-              <a:rPr lang="fr-FR" dirty="0"/>
-              <a:t> : </a:t>
-            </a:r>
-            <a:endParaRPr lang="en-US" dirty="0"/>
-          </a:p>
-          <a:p>
-            <a:r>
-              <a:rPr lang="en-US" dirty="0"/>
-              <a:t>Some platforms, in particular, allow a file to be opened for writing by</a:t>
-            </a:r>
-          </a:p>
-          <a:p>
-            <a:r>
-              <a:rPr lang="en-US" dirty="0"/>
-              <a:t>only one </a:t>
-            </a:r>
-            <a:r>
-              <a:rPr lang="en-US" dirty="0" err="1"/>
-              <a:t>FileWriter</a:t>
-            </a:r>
-            <a:r>
-              <a:rPr lang="en-US" dirty="0"/>
-              <a:t> (or other file-writing object) at a time.</a:t>
-            </a:r>
-          </a:p>
-          <a:p>
-            <a:r>
-              <a:rPr lang="en-US" dirty="0"/>
-              <a:t>In such situations the constructors in this class will fail if the file involved is already open.</a:t>
-            </a:r>
-            <a:endParaRPr lang="fr-FR" dirty="0"/>
-          </a:p>
-        </p:txBody>
-      </p:sp>
-      <p:pic>
-        <p:nvPicPr>
-          <p:cNvPr id="8" name="Image 7">
-            <a:extLst>
-              <a:ext uri="{FF2B5EF4-FFF2-40B4-BE49-F238E27FC236}">
-                <a16:creationId xmlns:a16="http://schemas.microsoft.com/office/drawing/2014/main" id="{C3EED654-CAE4-40D5-B41F-B771DFDFA163}"/>
-              </a:ext>
-            </a:extLst>
-          </p:cNvPr>
-          <p:cNvPicPr>
-            <a:picLocks noChangeAspect="1"/>
-          </p:cNvPicPr>
-          <p:nvPr/>
-        </p:nvPicPr>
-        <p:blipFill>
-          <a:blip r:embed="rId4"/>
-          <a:stretch>
-            <a:fillRect/>
-          </a:stretch>
-        </p:blipFill>
-        <p:spPr>
-          <a:xfrm>
-            <a:off x="5282949" y="1513677"/>
-            <a:ext cx="5430008" cy="1867161"/>
-          </a:xfrm>
-          <a:prstGeom prst="rect">
-            <a:avLst/>
-          </a:prstGeom>
-        </p:spPr>
-      </p:pic>
-      <p:sp>
-        <p:nvSpPr>
-          <p:cNvPr id="5" name="ZoneTexte 4">
-            <a:extLst>
-              <a:ext uri="{FF2B5EF4-FFF2-40B4-BE49-F238E27FC236}">
-                <a16:creationId xmlns:a16="http://schemas.microsoft.com/office/drawing/2014/main" id="{DB0609E4-1F72-48CB-8C05-D669F23EE721}"/>
-              </a:ext>
-            </a:extLst>
-          </p:cNvPr>
-          <p:cNvSpPr txBox="1"/>
-          <p:nvPr/>
-        </p:nvSpPr>
-        <p:spPr>
-          <a:xfrm>
-            <a:off x="293370" y="860486"/>
-            <a:ext cx="4657750" cy="923330"/>
-          </a:xfrm>
-          <a:prstGeom prst="rect">
-            <a:avLst/>
-          </a:prstGeom>
-          <a:noFill/>
-        </p:spPr>
-        <p:txBody>
-          <a:bodyPr wrap="none" rtlCol="0">
-            <a:spAutoFit/>
-          </a:bodyPr>
-          <a:lstStyle/>
-          <a:p>
-            <a:r>
-              <a:rPr lang="fr-FR" dirty="0"/>
-              <a:t>Tout d’abord organisation en modèle, vue,</a:t>
-            </a:r>
-          </a:p>
-          <a:p>
-            <a:r>
-              <a:rPr lang="fr-FR" dirty="0"/>
-              <a:t>contrôleur et objet d’accès aux données (DAO) :</a:t>
-            </a:r>
-          </a:p>
-          <a:p>
-            <a:endParaRPr lang="fr-FR" dirty="0"/>
+            <a:endParaRPr lang="fr-FR" sz="3200" dirty="0"/>
           </a:p>
         </p:txBody>
       </p:sp>
@@ -11533,186 +10687,6 @@
           <a:chExt cx="0" cy="0"/>
         </a:xfrm>
       </p:grpSpPr>
-      <p:pic>
-        <p:nvPicPr>
-          <p:cNvPr id="6" name="Image 5">
-            <a:extLst>
-              <a:ext uri="{FF2B5EF4-FFF2-40B4-BE49-F238E27FC236}">
-                <a16:creationId xmlns:a16="http://schemas.microsoft.com/office/drawing/2014/main" id="{99E6AF4B-CD01-4FFC-AA3E-7A43ED40BF55}"/>
-              </a:ext>
-            </a:extLst>
-          </p:cNvPr>
-          <p:cNvPicPr>
-            <a:picLocks noChangeAspect="1"/>
-          </p:cNvPicPr>
-          <p:nvPr/>
-        </p:nvPicPr>
-        <p:blipFill>
-          <a:blip r:embed="rId3"/>
-          <a:stretch>
-            <a:fillRect/>
-          </a:stretch>
-        </p:blipFill>
-        <p:spPr>
-          <a:xfrm>
-            <a:off x="5547187" y="-27001"/>
-            <a:ext cx="7305" cy="6912000"/>
-          </a:xfrm>
-          <a:prstGeom prst="rect">
-            <a:avLst/>
-          </a:prstGeom>
-        </p:spPr>
-      </p:pic>
-      <p:sp>
-        <p:nvSpPr>
-          <p:cNvPr id="7" name="ZoneTexte 6">
-            <a:extLst>
-              <a:ext uri="{FF2B5EF4-FFF2-40B4-BE49-F238E27FC236}">
-                <a16:creationId xmlns:a16="http://schemas.microsoft.com/office/drawing/2014/main" id="{D80E86C4-7E62-4AFB-A9B8-EDABAF87EBF7}"/>
-              </a:ext>
-            </a:extLst>
-          </p:cNvPr>
-          <p:cNvSpPr txBox="1"/>
-          <p:nvPr/>
-        </p:nvSpPr>
-        <p:spPr>
-          <a:xfrm>
-            <a:off x="288" y="27000"/>
-            <a:ext cx="5660043" cy="1354217"/>
-          </a:xfrm>
-          <a:prstGeom prst="rect">
-            <a:avLst/>
-          </a:prstGeom>
-          <a:noFill/>
-        </p:spPr>
-        <p:txBody>
-          <a:bodyPr wrap="square">
-            <a:spAutoFit/>
-          </a:bodyPr>
-          <a:lstStyle/>
-          <a:p>
-            <a:pPr>
-              <a:spcAft>
-                <a:spcPts val="600"/>
-              </a:spcAft>
-            </a:pPr>
-            <a:r>
-              <a:rPr lang="fr-FR" dirty="0"/>
-              <a:t>Le contrôleur (</a:t>
-            </a:r>
-            <a:r>
-              <a:rPr lang="fr-FR" dirty="0" err="1"/>
-              <a:t>AnalitycsController</a:t>
-            </a:r>
-            <a:r>
-              <a:rPr lang="fr-FR" dirty="0"/>
-              <a:t>) :</a:t>
-            </a:r>
-          </a:p>
-          <a:p>
-            <a:pPr marL="285750" indent="-285750">
-              <a:spcAft>
-                <a:spcPts val="300"/>
-              </a:spcAft>
-              <a:buFont typeface="Wingdings" panose="05000000000000000000" pitchFamily="2" charset="2"/>
-              <a:buChar char="Ø"/>
-            </a:pPr>
-            <a:r>
-              <a:rPr lang="fr-FR" dirty="0"/>
-              <a:t>contiendra la logique de contrôle</a:t>
-            </a:r>
-          </a:p>
-          <a:p>
-            <a:pPr marL="285750" indent="-285750">
-              <a:spcAft>
-                <a:spcPts val="300"/>
-              </a:spcAft>
-              <a:buFont typeface="Wingdings" panose="05000000000000000000" pitchFamily="2" charset="2"/>
-              <a:buChar char="Ø"/>
-            </a:pPr>
-            <a:r>
-              <a:rPr lang="fr-FR" dirty="0"/>
-              <a:t>singleton : une seule instance afin d’éviter plusieurs </a:t>
-            </a:r>
-            <a:r>
-              <a:rPr lang="fr-FR" dirty="0" err="1"/>
-              <a:t>reader</a:t>
-            </a:r>
-            <a:r>
-              <a:rPr lang="fr-FR" dirty="0"/>
-              <a:t>/</a:t>
-            </a:r>
-            <a:r>
-              <a:rPr lang="fr-FR" dirty="0" err="1"/>
-              <a:t>writer</a:t>
-            </a:r>
-            <a:r>
-              <a:rPr lang="fr-FR" dirty="0"/>
-              <a:t> sur le même fichier</a:t>
-            </a:r>
-          </a:p>
-        </p:txBody>
-      </p:sp>
-      <p:pic>
-        <p:nvPicPr>
-          <p:cNvPr id="16" name="Image 15">
-            <a:extLst>
-              <a:ext uri="{FF2B5EF4-FFF2-40B4-BE49-F238E27FC236}">
-                <a16:creationId xmlns:a16="http://schemas.microsoft.com/office/drawing/2014/main" id="{452441C5-7247-41B4-BEC8-065992C21D58}"/>
-              </a:ext>
-            </a:extLst>
-          </p:cNvPr>
-          <p:cNvPicPr>
-            <a:picLocks noChangeAspect="1"/>
-          </p:cNvPicPr>
-          <p:nvPr/>
-        </p:nvPicPr>
-        <p:blipFill>
-          <a:blip r:embed="rId4"/>
-          <a:stretch>
-            <a:fillRect/>
-          </a:stretch>
-        </p:blipFill>
-        <p:spPr>
-          <a:xfrm>
-            <a:off x="-4126" y="1381217"/>
-            <a:ext cx="5476875" cy="5010150"/>
-          </a:xfrm>
-          <a:prstGeom prst="rect">
-            <a:avLst/>
-          </a:prstGeom>
-        </p:spPr>
-      </p:pic>
-      <p:pic>
-        <p:nvPicPr>
-          <p:cNvPr id="24" name="Image 23">
-            <a:extLst>
-              <a:ext uri="{FF2B5EF4-FFF2-40B4-BE49-F238E27FC236}">
-                <a16:creationId xmlns:a16="http://schemas.microsoft.com/office/drawing/2014/main" id="{03BEB98F-D187-4A63-8229-4128CB8AD57F}"/>
-              </a:ext>
-            </a:extLst>
-          </p:cNvPr>
-          <p:cNvPicPr>
-            <a:picLocks noChangeAspect="1"/>
-          </p:cNvPicPr>
-          <p:nvPr/>
-        </p:nvPicPr>
-        <p:blipFill>
-          <a:blip r:embed="rId5"/>
-          <a:stretch>
-            <a:fillRect/>
-          </a:stretch>
-        </p:blipFill>
-        <p:spPr>
-          <a:xfrm>
-            <a:off x="5628930" y="385762"/>
-            <a:ext cx="6429375" cy="5876925"/>
-          </a:xfrm>
-          <a:prstGeom prst="rect">
-            <a:avLst/>
-          </a:prstGeom>
-        </p:spPr>
-      </p:pic>
       <p:sp>
         <p:nvSpPr>
           <p:cNvPr id="2" name="Espace réservé du numéro de diapositive 1">
@@ -11780,36 +10754,6 @@
           <a:chExt cx="0" cy="0"/>
         </a:xfrm>
       </p:grpSpPr>
-      <p:pic>
-        <p:nvPicPr>
-          <p:cNvPr id="11" name="Image 10">
-            <a:extLst>
-              <a:ext uri="{FF2B5EF4-FFF2-40B4-BE49-F238E27FC236}">
-                <a16:creationId xmlns:a16="http://schemas.microsoft.com/office/drawing/2014/main" id="{70FCACCA-1E12-4887-8012-74281607E070}"/>
-              </a:ext>
-            </a:extLst>
-          </p:cNvPr>
-          <p:cNvPicPr>
-            <a:picLocks noChangeAspect="1"/>
-          </p:cNvPicPr>
-          <p:nvPr/>
-        </p:nvPicPr>
-        <p:blipFill>
-          <a:blip r:embed="rId3"/>
-          <a:stretch>
-            <a:fillRect/>
-          </a:stretch>
-        </p:blipFill>
-        <p:spPr>
-          <a:xfrm>
-            <a:off x="6425250" y="0"/>
-            <a:ext cx="5871823" cy="6858000"/>
-          </a:xfrm>
-          <a:prstGeom prst="rect">
-            <a:avLst/>
-          </a:prstGeom>
-        </p:spPr>
-      </p:pic>
       <p:sp>
         <p:nvSpPr>
           <p:cNvPr id="6" name="ZoneTexte 5">
@@ -11825,7 +10769,7 @@
         <p:spPr>
           <a:xfrm>
             <a:off x="-1905" y="0"/>
-            <a:ext cx="6892197" cy="646331"/>
+            <a:ext cx="6892197" cy="369332"/>
           </a:xfrm>
           <a:prstGeom prst="rect">
             <a:avLst/>
@@ -11839,88 +10783,13 @@
           <a:lstStyle/>
           <a:p>
             <a:r>
-              <a:rPr lang="fr-FR" dirty="0"/>
-              <a:t>DAO : interface (</a:t>
-            </a:r>
-            <a:r>
-              <a:rPr lang="fr-FR" dirty="0" err="1"/>
-              <a:t>ISymptomIO</a:t>
-            </a:r>
-            <a:r>
-              <a:rPr lang="fr-FR" dirty="0"/>
-              <a:t>) et implémentation (</a:t>
-            </a:r>
-            <a:r>
-              <a:rPr lang="fr-FR" dirty="0" err="1"/>
-              <a:t>SymptomReadDataFromFile</a:t>
-            </a:r>
-            <a:r>
-              <a:rPr lang="fr-FR" dirty="0"/>
-              <a:t>) :</a:t>
-            </a:r>
+              <a:rPr lang="fr-FR"/>
+              <a:t>:</a:t>
+            </a:r>
+            <a:endParaRPr lang="fr-FR" dirty="0"/>
           </a:p>
         </p:txBody>
       </p:sp>
-      <p:pic>
-        <p:nvPicPr>
-          <p:cNvPr id="7" name="Image 6">
-            <a:extLst>
-              <a:ext uri="{FF2B5EF4-FFF2-40B4-BE49-F238E27FC236}">
-                <a16:creationId xmlns:a16="http://schemas.microsoft.com/office/drawing/2014/main" id="{B328AAE6-05A7-42CA-BFF1-F26C64BF160D}"/>
-              </a:ext>
-            </a:extLst>
-          </p:cNvPr>
-          <p:cNvPicPr>
-            <a:picLocks noChangeAspect="1"/>
-          </p:cNvPicPr>
-          <p:nvPr/>
-        </p:nvPicPr>
-        <p:blipFill>
-          <a:blip r:embed="rId4"/>
-          <a:stretch>
-            <a:fillRect/>
-          </a:stretch>
-        </p:blipFill>
-        <p:spPr>
-          <a:xfrm>
-            <a:off x="6417945" y="0"/>
-            <a:ext cx="7305" cy="6912000"/>
-          </a:xfrm>
-          <a:prstGeom prst="rect">
-            <a:avLst/>
-          </a:prstGeom>
-        </p:spPr>
-      </p:pic>
-      <p:pic>
-        <p:nvPicPr>
-          <p:cNvPr id="4" name="Image 3">
-            <a:extLst>
-              <a:ext uri="{FF2B5EF4-FFF2-40B4-BE49-F238E27FC236}">
-                <a16:creationId xmlns:a16="http://schemas.microsoft.com/office/drawing/2014/main" id="{E3736ACE-DD1F-4D23-B7C5-5790032C101F}"/>
-              </a:ext>
-            </a:extLst>
-          </p:cNvPr>
-          <p:cNvPicPr>
-            <a:picLocks noChangeAspect="1"/>
-          </p:cNvPicPr>
-          <p:nvPr/>
-        </p:nvPicPr>
-        <p:blipFill>
-          <a:blip r:embed="rId5"/>
-          <a:stretch>
-            <a:fillRect/>
-          </a:stretch>
-        </p:blipFill>
-        <p:spPr>
-          <a:xfrm>
-            <a:off x="-1905" y="1065431"/>
-            <a:ext cx="6419850" cy="4352925"/>
-          </a:xfrm>
-          <a:prstGeom prst="rect">
-            <a:avLst/>
-          </a:prstGeom>
-        </p:spPr>
-      </p:pic>
       <p:sp>
         <p:nvSpPr>
           <p:cNvPr id="2" name="Espace réservé du numéro de diapositive 1">
@@ -11993,36 +10862,6 @@
           <a:chExt cx="0" cy="0"/>
         </a:xfrm>
       </p:grpSpPr>
-      <p:pic>
-        <p:nvPicPr>
-          <p:cNvPr id="3" name="Image 2">
-            <a:extLst>
-              <a:ext uri="{FF2B5EF4-FFF2-40B4-BE49-F238E27FC236}">
-                <a16:creationId xmlns:a16="http://schemas.microsoft.com/office/drawing/2014/main" id="{03499102-AB2A-4461-8160-752DA326B029}"/>
-              </a:ext>
-            </a:extLst>
-          </p:cNvPr>
-          <p:cNvPicPr>
-            <a:picLocks noChangeAspect="1"/>
-          </p:cNvPicPr>
-          <p:nvPr/>
-        </p:nvPicPr>
-        <p:blipFill>
-          <a:blip r:embed="rId3"/>
-          <a:stretch>
-            <a:fillRect/>
-          </a:stretch>
-        </p:blipFill>
-        <p:spPr>
-          <a:xfrm>
-            <a:off x="4953000" y="1671637"/>
-            <a:ext cx="2286000" cy="3514725"/>
-          </a:xfrm>
-          <a:prstGeom prst="rect">
-            <a:avLst/>
-          </a:prstGeom>
-        </p:spPr>
-      </p:pic>
       <p:sp>
         <p:nvSpPr>
           <p:cNvPr id="4" name="ZoneTexte 3">
@@ -12038,7 +10877,7 @@
         <p:spPr>
           <a:xfrm>
             <a:off x="4953000" y="409575"/>
-            <a:ext cx="1349216" cy="461665"/>
+            <a:ext cx="266420" cy="461665"/>
           </a:xfrm>
           <a:prstGeom prst="rect">
             <a:avLst/>
@@ -12052,9 +10891,10 @@
           <a:lstStyle/>
           <a:p>
             <a:r>
-              <a:rPr lang="fr-FR" sz="2400" dirty="0"/>
-              <a:t>Résultat :</a:t>
-            </a:r>
+              <a:rPr lang="fr-FR" sz="2400"/>
+              <a:t>:</a:t>
+            </a:r>
+            <a:endParaRPr lang="fr-FR" sz="2400" dirty="0"/>
           </a:p>
         </p:txBody>
       </p:sp>
@@ -12140,7 +10980,7 @@
         <p:spPr>
           <a:xfrm>
             <a:off x="527220" y="173959"/>
-            <a:ext cx="11165669" cy="1354217"/>
+            <a:ext cx="11165669" cy="861774"/>
           </a:xfrm>
           <a:prstGeom prst="rect">
             <a:avLst/>
@@ -12155,9 +10995,10 @@
           <a:p>
             <a:pPr algn="ctr"/>
             <a:r>
-              <a:rPr lang="fr-FR" sz="3200" dirty="0"/>
-              <a:t>2ème itération : écrire le fichier result.out par ordre alphabétique des symptômes avec leurs occurrences</a:t>
-            </a:r>
+              <a:rPr lang="fr-FR" sz="3200"/>
+              <a:t>2</a:t>
+            </a:r>
+            <a:endParaRPr lang="fr-FR" sz="3200" dirty="0"/>
           </a:p>
           <a:p>
             <a:endParaRPr lang="fr-FR" dirty="0"/>
@@ -12179,7 +11020,7 @@
         <p:spPr>
           <a:xfrm>
             <a:off x="527219" y="2200414"/>
-            <a:ext cx="11165669" cy="3277820"/>
+            <a:ext cx="11165669" cy="461665"/>
           </a:xfrm>
           <a:prstGeom prst="rect">
             <a:avLst/>
@@ -12197,46 +11038,7 @@
                 <a:spcPts val="600"/>
               </a:spcAft>
             </a:pPr>
-            <a:r>
-              <a:rPr lang="fr-FR" sz="2400" dirty="0"/>
-              <a:t>Le modèle en classe abstraite (Occurrence) permet de répondre à l’exigence de réemployabilité du code par une classe héritée implémentant les méthodes : un objet instancié par symptôme.</a:t>
-            </a:r>
-          </a:p>
-          <a:p>
-            <a:pPr>
-              <a:spcAft>
-                <a:spcPts val="600"/>
-              </a:spcAft>
-            </a:pPr>
-            <a:r>
-              <a:rPr lang="fr-FR" sz="2400" dirty="0"/>
-              <a:t>Les champs décrivent les caractéristiques de l’objet (nom et nombre d’occurrence) et les méthodes les actions sur les caractéristiques de l’objet (lecture et modification selon la logique métier).</a:t>
-            </a:r>
-          </a:p>
-          <a:p>
-            <a:pPr>
-              <a:spcAft>
-                <a:spcPts val="600"/>
-              </a:spcAft>
-            </a:pPr>
-            <a:r>
-              <a:rPr lang="fr-FR" sz="2400" dirty="0"/>
-              <a:t>Le constructeur de la </a:t>
-            </a:r>
-            <a:r>
-              <a:rPr lang="fr-FR" sz="2400"/>
-              <a:t>classe héritée permet </a:t>
-            </a:r>
-            <a:r>
-              <a:rPr lang="fr-FR" sz="2400" dirty="0"/>
-              <a:t>d’initialiser les champs (nom transmis).</a:t>
-            </a:r>
-          </a:p>
-          <a:p>
-            <a:r>
-              <a:rPr lang="fr-FR" sz="2400" dirty="0"/>
-              <a:t>Cf. diapo suivante</a:t>
-            </a:r>
+            <a:endParaRPr lang="fr-FR" sz="2400" dirty="0"/>
           </a:p>
         </p:txBody>
       </p:sp>
@@ -12440,24 +11242,9 @@
               </a:lnSpc>
             </a:pPr>
             <a:r>
-              <a:rPr lang="fr-FR" sz="2600" dirty="0">
-                <a:hlinkClick r:id="rId8" action="ppaction://hlinksldjump"/>
-              </a:rPr>
+              <a:rPr lang="fr-FR" sz="2600"/>
               <a:t>1</a:t>
             </a:r>
-            <a:r>
-              <a:rPr lang="fr-FR" sz="2600" baseline="30000" dirty="0">
-                <a:hlinkClick r:id="rId8" action="ppaction://hlinksldjump"/>
-              </a:rPr>
-              <a:t>ère</a:t>
-            </a:r>
-            <a:r>
-              <a:rPr lang="fr-FR" sz="2600" dirty="0">
-                <a:hlinkClick r:id="rId8" action="ppaction://hlinksldjump"/>
-              </a:rPr>
-              <a:t> itération : lire le fichier</a:t>
-            </a:r>
-            <a:endParaRPr lang="fr-FR" sz="2600" dirty="0"/>
           </a:p>
           <a:p>
             <a:pPr lvl="1">
@@ -12468,16 +11255,9 @@
               <a:buChar char="o"/>
             </a:pPr>
             <a:r>
-              <a:rPr lang="fr-FR" sz="2200" dirty="0"/>
+              <a:rPr lang="fr-FR" sz="2200"/>
               <a:t> </a:t>
             </a:r>
-            <a:r>
-              <a:rPr lang="fr-FR" sz="2200" dirty="0">
-                <a:hlinkClick r:id="rId9" action="ppaction://hlinksldjump"/>
-              </a:rPr>
-              <a:t>Le contrôleur</a:t>
-            </a:r>
-            <a:endParaRPr lang="fr-FR" sz="2200" dirty="0"/>
           </a:p>
           <a:p>
             <a:pPr lvl="1">
@@ -12488,14 +11268,8 @@
               <a:buChar char="o"/>
             </a:pPr>
             <a:r>
-              <a:rPr lang="fr-FR" sz="2200" dirty="0"/>
+              <a:rPr lang="fr-FR" sz="2200"/>
               <a:t> </a:t>
-            </a:r>
-            <a:r>
-              <a:rPr lang="fr-FR" sz="2200" dirty="0">
-                <a:hlinkClick r:id="rId10" action="ppaction://hlinksldjump"/>
-              </a:rPr>
-              <a:t>DAO</a:t>
             </a:r>
             <a:endParaRPr lang="fr-FR" sz="2200" dirty="0"/>
           </a:p>
@@ -12508,14 +11282,8 @@
               <a:buChar char="o"/>
             </a:pPr>
             <a:r>
-              <a:rPr lang="fr-FR" sz="2200" dirty="0"/>
+              <a:rPr lang="fr-FR" sz="2200"/>
               <a:t> </a:t>
-            </a:r>
-            <a:r>
-              <a:rPr lang="fr-FR" sz="2200" dirty="0">
-                <a:hlinkClick r:id="rId11" action="ppaction://hlinksldjump"/>
-              </a:rPr>
-              <a:t>Résultat</a:t>
             </a:r>
             <a:endParaRPr lang="fr-FR" sz="2200" dirty="0"/>
           </a:p>
@@ -12526,16 +11294,8 @@
               </a:lnSpc>
             </a:pPr>
             <a:r>
-              <a:rPr lang="fr-FR" sz="2600" dirty="0">
-                <a:hlinkClick r:id="rId12" action="ppaction://hlinksldjump"/>
-              </a:rPr>
-              <a:t>2ème itération : écrire le fichier </a:t>
-            </a:r>
-            <a:r>
-              <a:rPr lang="fr-FR" sz="2600" dirty="0" err="1">
-                <a:hlinkClick r:id="rId12" action="ppaction://hlinksldjump"/>
-              </a:rPr>
-              <a:t>result.out</a:t>
+              <a:rPr lang="fr-FR" sz="2600"/>
+              <a:t>2</a:t>
             </a:r>
             <a:endParaRPr lang="fr-FR" sz="2600" dirty="0"/>
           </a:p>
@@ -12548,14 +11308,8 @@
               <a:buChar char="o"/>
             </a:pPr>
             <a:r>
-              <a:rPr lang="fr-FR" sz="2200" dirty="0"/>
+              <a:rPr lang="fr-FR" sz="2200"/>
               <a:t> </a:t>
-            </a:r>
-            <a:r>
-              <a:rPr lang="fr-FR" sz="2200" dirty="0">
-                <a:hlinkClick r:id="rId13" action="ppaction://hlinksldjump"/>
-              </a:rPr>
-              <a:t>Le modèle</a:t>
             </a:r>
             <a:endParaRPr lang="fr-FR" sz="2200" dirty="0"/>
           </a:p>
@@ -12568,14 +11322,8 @@
               <a:buChar char="o"/>
             </a:pPr>
             <a:r>
-              <a:rPr lang="fr-FR" sz="2200" dirty="0"/>
+              <a:rPr lang="fr-FR" sz="2200"/>
               <a:t> </a:t>
-            </a:r>
-            <a:r>
-              <a:rPr lang="fr-FR" sz="2200" dirty="0">
-                <a:hlinkClick r:id="rId14" action="ppaction://hlinksldjump"/>
-              </a:rPr>
-              <a:t>Code ajouté dans le contrôleur</a:t>
             </a:r>
             <a:endParaRPr lang="fr-FR" sz="2200" dirty="0"/>
           </a:p>
@@ -12588,14 +11336,8 @@
               <a:buChar char="o"/>
             </a:pPr>
             <a:r>
-              <a:rPr lang="fr-FR" sz="2200" dirty="0"/>
+              <a:rPr lang="fr-FR" sz="2200"/>
               <a:t> </a:t>
-            </a:r>
-            <a:r>
-              <a:rPr lang="fr-FR" sz="2200" dirty="0">
-                <a:hlinkClick r:id="rId15" action="ppaction://hlinksldjump"/>
-              </a:rPr>
-              <a:t>DAO</a:t>
             </a:r>
             <a:endParaRPr lang="fr-FR" sz="2200" dirty="0"/>
           </a:p>
@@ -12608,14 +11350,8 @@
               <a:buChar char="o"/>
             </a:pPr>
             <a:r>
-              <a:rPr lang="fr-FR" sz="2200" dirty="0"/>
+              <a:rPr lang="fr-FR" sz="2200"/>
               <a:t> </a:t>
-            </a:r>
-            <a:r>
-              <a:rPr lang="fr-FR" sz="2200" dirty="0">
-                <a:hlinkClick r:id="rId16" action="ppaction://hlinksldjump"/>
-              </a:rPr>
-              <a:t>La solution fonctionnelle</a:t>
             </a:r>
             <a:endParaRPr lang="fr-FR" sz="2000" dirty="0"/>
           </a:p>
@@ -12739,145 +11475,6 @@
       </p:grpSpPr>
       <p:sp>
         <p:nvSpPr>
-          <p:cNvPr id="5" name="ZoneTexte 4">
-            <a:extLst>
-              <a:ext uri="{FF2B5EF4-FFF2-40B4-BE49-F238E27FC236}">
-                <a16:creationId xmlns:a16="http://schemas.microsoft.com/office/drawing/2014/main" id="{FE8D7701-A565-4296-B432-8C57B9AA8FDB}"/>
-              </a:ext>
-            </a:extLst>
-          </p:cNvPr>
-          <p:cNvSpPr txBox="1"/>
-          <p:nvPr/>
-        </p:nvSpPr>
-        <p:spPr>
-          <a:xfrm>
-            <a:off x="968859" y="131584"/>
-            <a:ext cx="10254282" cy="461665"/>
-          </a:xfrm>
-          <a:prstGeom prst="rect">
-            <a:avLst/>
-          </a:prstGeom>
-          <a:noFill/>
-        </p:spPr>
-        <p:txBody>
-          <a:bodyPr wrap="none" rtlCol="0">
-            <a:spAutoFit/>
-          </a:bodyPr>
-          <a:lstStyle/>
-          <a:p>
-            <a:r>
-              <a:rPr lang="fr-FR" sz="2400" dirty="0"/>
-              <a:t>Le modèle : classe abstraite et classe héritée avec implémentation des méthodes</a:t>
-            </a:r>
-          </a:p>
-        </p:txBody>
-      </p:sp>
-      <p:pic>
-        <p:nvPicPr>
-          <p:cNvPr id="3" name="Image 2">
-            <a:extLst>
-              <a:ext uri="{FF2B5EF4-FFF2-40B4-BE49-F238E27FC236}">
-                <a16:creationId xmlns:a16="http://schemas.microsoft.com/office/drawing/2014/main" id="{C9DB6EF3-AB29-4068-AE77-E6C8D61EFE45}"/>
-              </a:ext>
-            </a:extLst>
-          </p:cNvPr>
-          <p:cNvPicPr>
-            <a:picLocks noChangeAspect="1"/>
-          </p:cNvPicPr>
-          <p:nvPr/>
-        </p:nvPicPr>
-        <p:blipFill>
-          <a:blip r:embed="rId3"/>
-          <a:stretch>
-            <a:fillRect/>
-          </a:stretch>
-        </p:blipFill>
-        <p:spPr>
-          <a:xfrm>
-            <a:off x="0" y="890587"/>
-            <a:ext cx="5495925" cy="5324475"/>
-          </a:xfrm>
-          <a:prstGeom prst="rect">
-            <a:avLst/>
-          </a:prstGeom>
-        </p:spPr>
-      </p:pic>
-      <p:pic>
-        <p:nvPicPr>
-          <p:cNvPr id="9" name="Image 8">
-            <a:extLst>
-              <a:ext uri="{FF2B5EF4-FFF2-40B4-BE49-F238E27FC236}">
-                <a16:creationId xmlns:a16="http://schemas.microsoft.com/office/drawing/2014/main" id="{18538A7E-FA35-431F-B5E4-7E2F4B6E7841}"/>
-              </a:ext>
-            </a:extLst>
-          </p:cNvPr>
-          <p:cNvPicPr>
-            <a:picLocks noChangeAspect="1"/>
-          </p:cNvPicPr>
-          <p:nvPr/>
-        </p:nvPicPr>
-        <p:blipFill>
-          <a:blip r:embed="rId4"/>
-          <a:stretch>
-            <a:fillRect/>
-          </a:stretch>
-        </p:blipFill>
-        <p:spPr>
-          <a:xfrm>
-            <a:off x="6661454" y="1014412"/>
-            <a:ext cx="4318300" cy="5141839"/>
-          </a:xfrm>
-          <a:prstGeom prst="rect">
-            <a:avLst/>
-          </a:prstGeom>
-        </p:spPr>
-      </p:pic>
-      <p:cxnSp>
-        <p:nvCxnSpPr>
-          <p:cNvPr id="4" name="Connecteur droit 3">
-            <a:extLst>
-              <a:ext uri="{FF2B5EF4-FFF2-40B4-BE49-F238E27FC236}">
-                <a16:creationId xmlns:a16="http://schemas.microsoft.com/office/drawing/2014/main" id="{9D82F854-5F59-41B2-8EB7-C80DD187FC75}"/>
-              </a:ext>
-            </a:extLst>
-          </p:cNvPr>
-          <p:cNvCxnSpPr>
-            <a:cxnSpLocks/>
-            <a:stCxn id="5" idx="2"/>
-          </p:cNvCxnSpPr>
-          <p:nvPr/>
-        </p:nvCxnSpPr>
-        <p:spPr>
-          <a:xfrm>
-            <a:off x="6096000" y="593249"/>
-            <a:ext cx="0" cy="6264751"/>
-          </a:xfrm>
-          <a:prstGeom prst="line">
-            <a:avLst/>
-          </a:prstGeom>
-          <a:ln>
-            <a:solidFill>
-              <a:schemeClr val="tx1"/>
-            </a:solidFill>
-          </a:ln>
-        </p:spPr>
-        <p:style>
-          <a:lnRef idx="1">
-            <a:schemeClr val="accent1"/>
-          </a:lnRef>
-          <a:fillRef idx="0">
-            <a:schemeClr val="accent1"/>
-          </a:fillRef>
-          <a:effectRef idx="0">
-            <a:schemeClr val="accent1"/>
-          </a:effectRef>
-          <a:fontRef idx="minor">
-            <a:schemeClr val="tx1"/>
-          </a:fontRef>
-        </p:style>
-      </p:cxnSp>
-      <p:sp>
-        <p:nvSpPr>
           <p:cNvPr id="2" name="Espace réservé du numéro de diapositive 1">
             <a:extLst>
               <a:ext uri="{FF2B5EF4-FFF2-40B4-BE49-F238E27FC236}">
@@ -12945,72 +11542,6 @@
       </p:grpSpPr>
       <p:sp>
         <p:nvSpPr>
-          <p:cNvPr id="2" name="ZoneTexte 1">
-            <a:extLst>
-              <a:ext uri="{FF2B5EF4-FFF2-40B4-BE49-F238E27FC236}">
-                <a16:creationId xmlns:a16="http://schemas.microsoft.com/office/drawing/2014/main" id="{5318B654-42B3-43A3-A943-2FB7151BA169}"/>
-              </a:ext>
-            </a:extLst>
-          </p:cNvPr>
-          <p:cNvSpPr txBox="1"/>
-          <p:nvPr/>
-        </p:nvSpPr>
-        <p:spPr>
-          <a:xfrm>
-            <a:off x="0" y="0"/>
-            <a:ext cx="12192000" cy="523220"/>
-          </a:xfrm>
-          <a:prstGeom prst="rect">
-            <a:avLst/>
-          </a:prstGeom>
-          <a:noFill/>
-        </p:spPr>
-        <p:txBody>
-          <a:bodyPr wrap="square" rtlCol="0">
-            <a:spAutoFit/>
-          </a:bodyPr>
-          <a:lstStyle/>
-          <a:p>
-            <a:pPr algn="ctr"/>
-            <a:r>
-              <a:rPr lang="fr-FR" sz="2800" dirty="0"/>
-              <a:t>Code ajouté dans le contrôleur : utilisation des objets modèles</a:t>
-            </a:r>
-          </a:p>
-        </p:txBody>
-      </p:sp>
-      <p:pic>
-        <p:nvPicPr>
-          <p:cNvPr id="8" name="Image 7">
-            <a:extLst>
-              <a:ext uri="{FF2B5EF4-FFF2-40B4-BE49-F238E27FC236}">
-                <a16:creationId xmlns:a16="http://schemas.microsoft.com/office/drawing/2014/main" id="{2A4985BD-9E18-4252-B468-6EA16DFD5564}"/>
-              </a:ext>
-            </a:extLst>
-          </p:cNvPr>
-          <p:cNvPicPr>
-            <a:picLocks noChangeAspect="1"/>
-          </p:cNvPicPr>
-          <p:nvPr/>
-        </p:nvPicPr>
-        <p:blipFill>
-          <a:blip r:embed="rId3"/>
-          <a:stretch>
-            <a:fillRect/>
-          </a:stretch>
-        </p:blipFill>
-        <p:spPr>
-          <a:xfrm>
-            <a:off x="2462212" y="814387"/>
-            <a:ext cx="7267575" cy="5724525"/>
-          </a:xfrm>
-          <a:prstGeom prst="rect">
-            <a:avLst/>
-          </a:prstGeom>
-        </p:spPr>
-      </p:pic>
-      <p:sp>
-        <p:nvSpPr>
           <p:cNvPr id="3" name="Espace réservé du numéro de diapositive 2">
             <a:extLst>
               <a:ext uri="{FF2B5EF4-FFF2-40B4-BE49-F238E27FC236}">
@@ -13091,7 +11622,7 @@
         <p:spPr>
           <a:xfrm>
             <a:off x="0" y="122663"/>
-            <a:ext cx="4171950" cy="646331"/>
+            <a:ext cx="4171950" cy="369332"/>
           </a:xfrm>
           <a:prstGeom prst="rect">
             <a:avLst/>
@@ -13106,42 +11637,13 @@
           <a:p>
             <a:pPr algn="ctr"/>
             <a:r>
-              <a:rPr lang="fr-FR" dirty="0"/>
-              <a:t> DAO : implémentation de l’interface pour écrire les données dans le fichier :</a:t>
-            </a:r>
+              <a:rPr lang="fr-FR"/>
+              <a:t> </a:t>
+            </a:r>
+            <a:endParaRPr lang="fr-FR" dirty="0"/>
           </a:p>
         </p:txBody>
       </p:sp>
-      <p:pic>
-        <p:nvPicPr>
-          <p:cNvPr id="4" name="Image 3">
-            <a:extLst>
-              <a:ext uri="{FF2B5EF4-FFF2-40B4-BE49-F238E27FC236}">
-                <a16:creationId xmlns:a16="http://schemas.microsoft.com/office/drawing/2014/main" id="{41C262A0-511C-4F08-9AC4-5A9799C6DB61}"/>
-              </a:ext>
-            </a:extLst>
-          </p:cNvPr>
-          <p:cNvPicPr>
-            <a:picLocks noChangeAspect="1"/>
-          </p:cNvPicPr>
-          <p:nvPr/>
-        </p:nvPicPr>
-        <p:blipFill>
-          <a:blip r:embed="rId3"/>
-          <a:stretch>
-            <a:fillRect/>
-          </a:stretch>
-        </p:blipFill>
-        <p:spPr>
-          <a:xfrm>
-            <a:off x="4975336" y="0"/>
-            <a:ext cx="6089431" cy="6858000"/>
-          </a:xfrm>
-          <a:prstGeom prst="rect">
-            <a:avLst/>
-          </a:prstGeom>
-        </p:spPr>
-      </p:pic>
       <p:sp>
         <p:nvSpPr>
           <p:cNvPr id="2" name="Espace réservé du numéro de diapositive 1">
@@ -13209,36 +11711,6 @@
           <a:chExt cx="0" cy="0"/>
         </a:xfrm>
       </p:grpSpPr>
-      <p:pic>
-        <p:nvPicPr>
-          <p:cNvPr id="3" name="Image 2">
-            <a:extLst>
-              <a:ext uri="{FF2B5EF4-FFF2-40B4-BE49-F238E27FC236}">
-                <a16:creationId xmlns:a16="http://schemas.microsoft.com/office/drawing/2014/main" id="{52820277-3C07-44E9-9AF6-B5A19DA6AE53}"/>
-              </a:ext>
-            </a:extLst>
-          </p:cNvPr>
-          <p:cNvPicPr>
-            <a:picLocks noChangeAspect="1"/>
-          </p:cNvPicPr>
-          <p:nvPr/>
-        </p:nvPicPr>
-        <p:blipFill>
-          <a:blip r:embed="rId3"/>
-          <a:stretch>
-            <a:fillRect/>
-          </a:stretch>
-        </p:blipFill>
-        <p:spPr>
-          <a:xfrm>
-            <a:off x="0" y="746693"/>
-            <a:ext cx="5720576" cy="6119329"/>
-          </a:xfrm>
-          <a:prstGeom prst="rect">
-            <a:avLst/>
-          </a:prstGeom>
-        </p:spPr>
-      </p:pic>
       <p:sp>
         <p:nvSpPr>
           <p:cNvPr id="4" name="ZoneTexte 3">
@@ -13269,42 +11741,13 @@
           <a:p>
             <a:pPr algn="ctr"/>
             <a:r>
-              <a:rPr lang="fr-FR" sz="3600" dirty="0"/>
-              <a:t>La solution fonctionnelle et sa vérification</a:t>
-            </a:r>
+              <a:rPr lang="fr-FR" sz="3600"/>
+              <a:t>L</a:t>
+            </a:r>
+            <a:endParaRPr lang="fr-FR" sz="3600" dirty="0"/>
           </a:p>
         </p:txBody>
       </p:sp>
-      <p:pic>
-        <p:nvPicPr>
-          <p:cNvPr id="6" name="Image 5">
-            <a:extLst>
-              <a:ext uri="{FF2B5EF4-FFF2-40B4-BE49-F238E27FC236}">
-                <a16:creationId xmlns:a16="http://schemas.microsoft.com/office/drawing/2014/main" id="{8C86F1D4-92F7-4A3A-9426-0753AD0F53EA}"/>
-              </a:ext>
-            </a:extLst>
-          </p:cNvPr>
-          <p:cNvPicPr>
-            <a:picLocks noChangeAspect="1"/>
-          </p:cNvPicPr>
-          <p:nvPr/>
-        </p:nvPicPr>
-        <p:blipFill>
-          <a:blip r:embed="rId4"/>
-          <a:stretch>
-            <a:fillRect/>
-          </a:stretch>
-        </p:blipFill>
-        <p:spPr>
-          <a:xfrm>
-            <a:off x="7429940" y="935425"/>
-            <a:ext cx="4037719" cy="5930597"/>
-          </a:xfrm>
-          <a:prstGeom prst="rect">
-            <a:avLst/>
-          </a:prstGeom>
-        </p:spPr>
-      </p:pic>
       <p:sp>
         <p:nvSpPr>
           <p:cNvPr id="2" name="Espace réservé du numéro de diapositive 1">
@@ -18927,48 +17370,38 @@
               <a:buNone/>
             </a:pPr>
             <a:r>
-              <a:rPr lang="fr-FR" sz="1400" dirty="0">
-                <a:latin typeface="Consolas" panose="020B0609020204030204" pitchFamily="49" charset="0"/>
-              </a:rPr>
-              <a:t>	|"1" |"1509 </a:t>
-            </a:r>
-            <a:r>
-              <a:rPr lang="fr-FR" sz="1400" dirty="0" err="1">
-                <a:latin typeface="Consolas" panose="020B0609020204030204" pitchFamily="49" charset="0"/>
-              </a:rPr>
-              <a:t>Culver</a:t>
-            </a:r>
-            <a:r>
-              <a:rPr lang="fr-FR" sz="1400" dirty="0">
-                <a:latin typeface="Consolas" panose="020B0609020204030204" pitchFamily="49" charset="0"/>
-              </a:rPr>
-              <a:t> St"|</a:t>
-            </a:r>
-          </a:p>
-          <a:p>
-            <a:pPr marL="0" indent="0" defTabSz="360000">
-              <a:spcBef>
-                <a:spcPts val="0"/>
-              </a:spcBef>
-              <a:buNone/>
-            </a:pPr>
-            <a:r>
-              <a:rPr lang="fr-FR" sz="1400" dirty="0">
-                <a:latin typeface="Consolas" panose="020B0609020204030204" pitchFamily="49" charset="0"/>
-              </a:rPr>
-              <a:t>	|"2" |"834 </a:t>
-            </a:r>
-            <a:r>
-              <a:rPr lang="fr-FR" sz="1400" dirty="0" err="1">
-                <a:latin typeface="Consolas" panose="020B0609020204030204" pitchFamily="49" charset="0"/>
-              </a:rPr>
-              <a:t>Binoc</a:t>
-            </a:r>
-            <a:r>
-              <a:rPr lang="fr-FR" sz="1400" dirty="0">
-                <a:latin typeface="Consolas" panose="020B0609020204030204" pitchFamily="49" charset="0"/>
-              </a:rPr>
-              <a:t> Ave" |</a:t>
+              <a:rPr lang="fr-FR" sz="1400">
+                <a:latin typeface="Consolas" panose="020B0609020204030204" pitchFamily="49" charset="0"/>
+              </a:rPr>
+              <a:t>	|"1" |"1509 Culver St"|</a:t>
+            </a:r>
+          </a:p>
+          <a:p>
+            <a:pPr marL="0" indent="0" defTabSz="360000">
+              <a:spcBef>
+                <a:spcPts val="0"/>
+              </a:spcBef>
+              <a:buNone/>
+            </a:pPr>
+            <a:r>
+              <a:rPr lang="fr-FR" sz="1400">
+                <a:latin typeface="Consolas" panose="020B0609020204030204" pitchFamily="49" charset="0"/>
+              </a:rPr>
+              <a:t>	|"2" |"1509 Culver St"|</a:t>
+            </a:r>
+          </a:p>
+          <a:p>
+            <a:pPr marL="0" indent="0" defTabSz="360000">
+              <a:spcBef>
+                <a:spcPts val="0"/>
+              </a:spcBef>
+              <a:buNone/>
+            </a:pPr>
+            <a:r>
+              <a:rPr lang="fr-FR" sz="1400">
+                <a:latin typeface="Consolas" panose="020B0609020204030204" pitchFamily="49" charset="0"/>
+              </a:rPr>
+              <a:t>	|"3" |"834 Binoc Ave" |</a:t>
             </a:r>
           </a:p>
           <a:p>

</xml_diff>

<commit_message>
wip : implement DTO finish2
</commit_message>
<xml_diff>
--- a/A_Livrables/MOREL_Olivier_4_slides_062022.pptx
+++ b/A_Livrables/MOREL_Olivier_4_slides_062022.pptx
@@ -10356,14 +10356,13 @@
               </a:ext>
             </a:extLst>
           </a:blip>
-          <a:stretch>
-            <a:fillRect/>
-          </a:stretch>
+          <a:srcRect/>
+          <a:stretch/>
         </p:blipFill>
         <p:spPr>
           <a:xfrm>
-            <a:off x="1207464" y="1097243"/>
-            <a:ext cx="9777072" cy="5624232"/>
+            <a:off x="469767" y="921157"/>
+            <a:ext cx="11252465" cy="5435193"/>
           </a:xfrm>
         </p:spPr>
       </p:pic>

</xml_diff>

<commit_message>
feat : childAlert list child : first and last names, age and adults
</commit_message>
<xml_diff>
--- a/A_Livrables/MOREL_Olivier_4_slides_062022.pptx
+++ b/A_Livrables/MOREL_Olivier_4_slides_062022.pptx
@@ -234,7 +234,7 @@
           <a:p>
             <a:fld id="{5C7AB521-C1B9-49E9-9F3E-FC8BC84D64FF}" type="datetimeFigureOut">
               <a:rPr lang="fr-FR" smtClean="0"/>
-              <a:t>05/09/2022</a:t>
+              <a:t>09/09/2022</a:t>
             </a:fld>
             <a:endParaRPr lang="fr-FR"/>
           </a:p>
@@ -3626,7 +3626,7 @@
           <a:p>
             <a:fld id="{BAAA5C57-0FC7-4809-8DE0-9FB8CD72F45B}" type="datetime1">
               <a:rPr lang="fr-FR" smtClean="0"/>
-              <a:t>05/09/2022</a:t>
+              <a:t>09/09/2022</a:t>
             </a:fld>
             <a:endParaRPr lang="fr-FR"/>
           </a:p>
@@ -3824,7 +3824,7 @@
           <a:p>
             <a:fld id="{D6394C11-AF79-46EB-8628-81685E730859}" type="datetime1">
               <a:rPr lang="fr-FR" smtClean="0"/>
-              <a:t>05/09/2022</a:t>
+              <a:t>09/09/2022</a:t>
             </a:fld>
             <a:endParaRPr lang="fr-FR"/>
           </a:p>
@@ -4032,7 +4032,7 @@
           <a:p>
             <a:fld id="{195502D9-FD20-4B10-85D7-D0A36058A8A9}" type="datetime1">
               <a:rPr lang="fr-FR" smtClean="0"/>
-              <a:t>05/09/2022</a:t>
+              <a:t>09/09/2022</a:t>
             </a:fld>
             <a:endParaRPr lang="fr-FR"/>
           </a:p>
@@ -4230,7 +4230,7 @@
           <a:p>
             <a:fld id="{57684602-8624-4EB1-9235-5DD654D82F09}" type="datetime1">
               <a:rPr lang="fr-FR" smtClean="0"/>
-              <a:t>05/09/2022</a:t>
+              <a:t>09/09/2022</a:t>
             </a:fld>
             <a:endParaRPr lang="fr-FR"/>
           </a:p>
@@ -4505,7 +4505,7 @@
           <a:p>
             <a:fld id="{E41784DB-987A-45B6-9772-C36DF83C3C02}" type="datetime1">
               <a:rPr lang="fr-FR" smtClean="0"/>
-              <a:t>05/09/2022</a:t>
+              <a:t>09/09/2022</a:t>
             </a:fld>
             <a:endParaRPr lang="fr-FR"/>
           </a:p>
@@ -4770,7 +4770,7 @@
           <a:p>
             <a:fld id="{E595D999-DF18-4099-8D0D-BC2297023F60}" type="datetime1">
               <a:rPr lang="fr-FR" smtClean="0"/>
-              <a:t>05/09/2022</a:t>
+              <a:t>09/09/2022</a:t>
             </a:fld>
             <a:endParaRPr lang="fr-FR"/>
           </a:p>
@@ -5182,7 +5182,7 @@
           <a:p>
             <a:fld id="{871871E2-9510-47F9-812F-D25C732F0E19}" type="datetime1">
               <a:rPr lang="fr-FR" smtClean="0"/>
-              <a:t>05/09/2022</a:t>
+              <a:t>09/09/2022</a:t>
             </a:fld>
             <a:endParaRPr lang="fr-FR"/>
           </a:p>
@@ -5323,7 +5323,7 @@
           <a:p>
             <a:fld id="{76383D6D-8978-42A7-ABAD-D463CD4AD0CE}" type="datetime1">
               <a:rPr lang="fr-FR" smtClean="0"/>
-              <a:t>05/09/2022</a:t>
+              <a:t>09/09/2022</a:t>
             </a:fld>
             <a:endParaRPr lang="fr-FR"/>
           </a:p>
@@ -5436,7 +5436,7 @@
           <a:p>
             <a:fld id="{C6571784-1182-4604-B720-0FE25B0575C8}" type="datetime1">
               <a:rPr lang="fr-FR" smtClean="0"/>
-              <a:t>05/09/2022</a:t>
+              <a:t>09/09/2022</a:t>
             </a:fld>
             <a:endParaRPr lang="fr-FR"/>
           </a:p>
@@ -5747,7 +5747,7 @@
           <a:p>
             <a:fld id="{BCE52CFF-6AA8-4EB4-A5AB-E9E18645216B}" type="datetime1">
               <a:rPr lang="fr-FR" smtClean="0"/>
-              <a:t>05/09/2022</a:t>
+              <a:t>09/09/2022</a:t>
             </a:fld>
             <a:endParaRPr lang="fr-FR"/>
           </a:p>
@@ -6035,7 +6035,7 @@
           <a:p>
             <a:fld id="{5EA3A904-D97A-4686-B1B2-2D6167D64CF7}" type="datetime1">
               <a:rPr lang="fr-FR" smtClean="0"/>
-              <a:t>05/09/2022</a:t>
+              <a:t>09/09/2022</a:t>
             </a:fld>
             <a:endParaRPr lang="fr-FR"/>
           </a:p>
@@ -6276,7 +6276,7 @@
           <a:p>
             <a:fld id="{5CD26E4C-FA77-42C7-B5FC-F70A55A82F63}" type="datetime1">
               <a:rPr lang="fr-FR" smtClean="0"/>
-              <a:t>05/09/2022</a:t>
+              <a:t>09/09/2022</a:t>
             </a:fld>
             <a:endParaRPr lang="fr-FR"/>
           </a:p>
@@ -14151,13 +14151,13 @@
         </p:nvSpPr>
         <p:spPr>
           <a:xfrm>
-            <a:off x="838200" y="1690688"/>
-            <a:ext cx="10515600" cy="4665662"/>
+            <a:off x="163774" y="1690688"/>
+            <a:ext cx="12028226" cy="4665662"/>
           </a:xfrm>
         </p:spPr>
         <p:txBody>
           <a:bodyPr>
-            <a:normAutofit fontScale="77500" lnSpcReduction="20000"/>
+            <a:normAutofit fontScale="70000" lnSpcReduction="20000"/>
           </a:bodyPr>
           <a:lstStyle/>
           <a:p>
@@ -14280,7 +14280,7 @@
               <a:rPr lang="fr-FR" sz="1400">
                 <a:latin typeface="Consolas" panose="020B0609020204030204" pitchFamily="49" charset="0"/>
               </a:rPr>
-              <a:t>Cette url doit retourner une liste d'enfants (âge &lt;= 18 ans) habitant à cette adresse ainsi que les autres membres du foyer</a:t>
+              <a:t>Cette url doit retourner une liste d'enfants (âge &lt;= 18 ans) habitant à cette adresse.</a:t>
             </a:r>
           </a:p>
           <a:p>
@@ -14334,28 +14334,28 @@
               <a:rPr lang="fr-FR" sz="1400" dirty="0">
                 <a:latin typeface="Consolas" panose="020B0609020204030204" pitchFamily="49" charset="0"/>
               </a:rPr>
-              <a:t>’utilisateur, je souhaite obtenir la liste des enfants (prénom, nom</a:t>
+              <a:t>’utilisateur</a:t>
             </a:r>
             <a:r>
               <a:rPr lang="fr-FR" sz="1400">
                 <a:latin typeface="Consolas" panose="020B0609020204030204" pitchFamily="49" charset="0"/>
               </a:rPr>
-              <a:t>, âge) </a:t>
-            </a:r>
-            <a:r>
-              <a:rPr lang="fr-FR" sz="1400" dirty="0">
+              <a:t>, je souhaite obtenir la liste des enfants (prénom, nom, âge, liste des adultes)</a:t>
+            </a:r>
+          </a:p>
+          <a:p>
+            <a:pPr marL="0" indent="0" defTabSz="360000">
+              <a:spcBef>
+                <a:spcPts val="0"/>
+              </a:spcBef>
+              <a:buNone/>
+            </a:pPr>
+            <a:r>
+              <a:rPr lang="fr-FR" sz="1400">
                 <a:latin typeface="Consolas" panose="020B0609020204030204" pitchFamily="49" charset="0"/>
               </a:rPr>
               <a:t>habitant à une adresse donnée</a:t>
             </a:r>
-          </a:p>
-          <a:p>
-            <a:pPr marL="0" indent="0" defTabSz="360000">
-              <a:spcBef>
-                <a:spcPts val="0"/>
-              </a:spcBef>
-              <a:buNone/>
-            </a:pPr>
             <a:endParaRPr lang="fr-FR" sz="1400" dirty="0">
               <a:latin typeface="Consolas" panose="020B0609020204030204" pitchFamily="49" charset="0"/>
             </a:endParaRPr>
@@ -14600,6 +14600,20 @@
               <a:rPr lang="fr-FR" sz="1400">
                 <a:latin typeface="Consolas" panose="020B0609020204030204" pitchFamily="49" charset="0"/>
               </a:rPr>
+              <a:t>		|"Elsa"   |"Boyd"  |"33"|"1509 Culver St"|"Culver"|"97451"|"841-874-6512"|"elsad@email.com"|</a:t>
+            </a:r>
+          </a:p>
+          <a:p>
+            <a:pPr marL="0" indent="0" defTabSz="360000">
+              <a:spcBef>
+                <a:spcPts val="0"/>
+              </a:spcBef>
+              <a:buNone/>
+            </a:pPr>
+            <a:r>
+              <a:rPr lang="fr-FR" sz="1400">
+                <a:latin typeface="Consolas" panose="020B0609020204030204" pitchFamily="49" charset="0"/>
+              </a:rPr>
               <a:t>		|"Tenley" |"Boyd"  |"18"|"1509 Culver St"|"Culver"|"97451"|"841-874-6513"|"tboyd@email.com"|</a:t>
             </a:r>
           </a:p>
@@ -14672,14 +14686,6 @@
               </a:rPr>
               <a:t>		|"Eric"   |"Voisin"|"24"|"1509 Culver St"|"Culver"|"97451"|"841-874-6515"|"kadi@email.com" |</a:t>
             </a:r>
-          </a:p>
-          <a:p>
-            <a:pPr marL="0" indent="0" defTabSz="360000">
-              <a:spcBef>
-                <a:spcPts val="0"/>
-              </a:spcBef>
-              <a:buNone/>
-            </a:pPr>
             <a:endParaRPr lang="fr-FR" sz="1400" dirty="0">
               <a:latin typeface="Consolas" panose="020B0609020204030204" pitchFamily="49" charset="0"/>
             </a:endParaRPr>
@@ -14926,7 +14932,7 @@
               <a:rPr lang="fr-FR" sz="1400">
                 <a:latin typeface="Consolas" panose="020B0609020204030204" pitchFamily="49" charset="0"/>
               </a:rPr>
-              <a:t>		|"Tenley" |"Boyd"  |"18"|</a:t>
+              <a:t>		|firstName|lastName|age |adults                                                                                                                              |</a:t>
             </a:r>
           </a:p>
           <a:p>
@@ -14940,7 +14946,7 @@
               <a:rPr lang="fr-FR" sz="1400">
                 <a:latin typeface="Consolas" panose="020B0609020204030204" pitchFamily="49" charset="0"/>
               </a:rPr>
-              <a:t>		|"Tony"   |"Boyd"  |"12"|</a:t>
+              <a:t>		|"Tenley" |"Boyd"  |"18"|"[{\"firstName\":\"John\", \"lastName\":\"Boyd\", \"age\":\"30\"}, {\"firstName\":\"Elsa\", \"lastName\":\"Boyd\", \"age\":\"33\"}]"|</a:t>
             </a:r>
           </a:p>
           <a:p>
@@ -14954,7 +14960,7 @@
               <a:rPr lang="fr-FR" sz="1400">
                 <a:latin typeface="Consolas" panose="020B0609020204030204" pitchFamily="49" charset="0"/>
               </a:rPr>
-              <a:t>		|"Brad"   |"Voisin"|" 2"|</a:t>
+              <a:t>		|"Tony"   |"Boyd"  |"12"|"[{\"firstName\":\"John\", \"lastName\":\"Boyd\", \"age\":\"30\"}, {\"firstName\":\"Elsa\", \"lastName\":\"Boyd\", \"age\":\"33\"}]"|</a:t>
             </a:r>
           </a:p>
           <a:p>
@@ -14968,27 +14974,7 @@
               <a:rPr lang="fr-FR" sz="1400">
                 <a:latin typeface="Consolas" panose="020B0609020204030204" pitchFamily="49" charset="0"/>
               </a:rPr>
-              <a:t>		|"John"   |"Boyd"  |"30"|</a:t>
-            </a:r>
-          </a:p>
-          <a:p>
-            <a:pPr marL="0" indent="0" defTabSz="360000">
-              <a:spcBef>
-                <a:spcPts val="0"/>
-              </a:spcBef>
-              <a:buNone/>
-            </a:pPr>
-            <a:r>
-              <a:rPr lang="fr-FR" sz="1400">
-                <a:latin typeface="Consolas" panose="020B0609020204030204" pitchFamily="49" charset="0"/>
-              </a:rPr>
-              <a:t>		|"Eric"   |"Voisin"|"24"|</a:t>
-            </a:r>
-            <a:r>
-              <a:rPr lang="fr-FR" sz="1400" dirty="0">
-                <a:latin typeface="Consolas" panose="020B0609020204030204" pitchFamily="49" charset="0"/>
-              </a:rPr>
-              <a:t>	</a:t>
+              <a:t>		|"Brad"   |"Voisin"|" 2"|"[{\"firstName\":\"Eric\", \"lastName\":\"Voisin\", \"age\":\"24\"}]"                                                               |</a:t>
             </a:r>
           </a:p>
           <a:p>

</xml_diff>

<commit_message>
feat : before session eval
</commit_message>
<xml_diff>
--- a/A_Livrables/MOREL_Olivier_4_slides_062022.pptx
+++ b/A_Livrables/MOREL_Olivier_4_slides_062022.pptx
@@ -5,35 +5,27 @@
     <p:sldMasterId id="2147483648" r:id="rId1"/>
   </p:sldMasterIdLst>
   <p:notesMasterIdLst>
-    <p:notesMasterId r:id="rId28"/>
+    <p:notesMasterId r:id="rId20"/>
   </p:notesMasterIdLst>
   <p:sldIdLst>
     <p:sldId id="256" r:id="rId2"/>
     <p:sldId id="269" r:id="rId3"/>
     <p:sldId id="272" r:id="rId4"/>
     <p:sldId id="268" r:id="rId5"/>
-    <p:sldId id="273" r:id="rId6"/>
-    <p:sldId id="281" r:id="rId7"/>
-    <p:sldId id="282" r:id="rId8"/>
-    <p:sldId id="275" r:id="rId9"/>
-    <p:sldId id="283" r:id="rId10"/>
-    <p:sldId id="284" r:id="rId11"/>
-    <p:sldId id="277" r:id="rId12"/>
-    <p:sldId id="285" r:id="rId13"/>
-    <p:sldId id="286" r:id="rId14"/>
-    <p:sldId id="274" r:id="rId15"/>
-    <p:sldId id="287" r:id="rId16"/>
-    <p:sldId id="288" r:id="rId17"/>
-    <p:sldId id="276" r:id="rId18"/>
-    <p:sldId id="289" r:id="rId19"/>
-    <p:sldId id="290" r:id="rId20"/>
-    <p:sldId id="279" r:id="rId21"/>
-    <p:sldId id="291" r:id="rId22"/>
-    <p:sldId id="292" r:id="rId23"/>
-    <p:sldId id="278" r:id="rId24"/>
-    <p:sldId id="293" r:id="rId25"/>
-    <p:sldId id="294" r:id="rId26"/>
-    <p:sldId id="280" r:id="rId27"/>
+    <p:sldId id="280" r:id="rId6"/>
+    <p:sldId id="273" r:id="rId7"/>
+    <p:sldId id="275" r:id="rId8"/>
+    <p:sldId id="277" r:id="rId9"/>
+    <p:sldId id="274" r:id="rId10"/>
+    <p:sldId id="276" r:id="rId11"/>
+    <p:sldId id="279" r:id="rId12"/>
+    <p:sldId id="278" r:id="rId13"/>
+    <p:sldId id="298" r:id="rId14"/>
+    <p:sldId id="304" r:id="rId15"/>
+    <p:sldId id="295" r:id="rId16"/>
+    <p:sldId id="307" r:id="rId17"/>
+    <p:sldId id="308" r:id="rId18"/>
+    <p:sldId id="309" r:id="rId19"/>
   </p:sldIdLst>
   <p:sldSz cx="12192000" cy="6858000"/>
   <p:notesSz cx="6858000" cy="9144000"/>
@@ -237,7 +229,7 @@
           <a:p>
             <a:fld id="{5C7AB521-C1B9-49E9-9F3E-FC8BC84D64FF}" type="datetimeFigureOut">
               <a:rPr lang="fr-FR" smtClean="0"/>
-              <a:t>01/10/2022</a:t>
+              <a:t>04/10/2022</a:t>
             </a:fld>
             <a:endParaRPr lang="fr-FR"/>
           </a:p>
@@ -721,7 +713,7 @@
           <a:p>
             <a:fld id="{20E6D720-7EE3-48C6-A432-79F856A50EC5}" type="slidenum">
               <a:rPr lang="fr-FR" smtClean="0"/>
-              <a:t>20</a:t>
+              <a:t>10</a:t>
             </a:fld>
             <a:endParaRPr lang="fr-FR"/>
           </a:p>
@@ -730,7 +722,7 @@
     </p:spTree>
     <p:extLst>
       <p:ext uri="{BB962C8B-B14F-4D97-AF65-F5344CB8AC3E}">
-        <p14:creationId xmlns:p14="http://schemas.microsoft.com/office/powerpoint/2010/main" val="2946232381"/>
+        <p14:creationId xmlns:p14="http://schemas.microsoft.com/office/powerpoint/2010/main" val="2972302065"/>
       </p:ext>
     </p:extLst>
   </p:cSld>
@@ -818,7 +810,7 @@
           <a:p>
             <a:fld id="{20E6D720-7EE3-48C6-A432-79F856A50EC5}" type="slidenum">
               <a:rPr lang="fr-FR" smtClean="0"/>
-              <a:t>23</a:t>
+              <a:t>11</a:t>
             </a:fld>
             <a:endParaRPr lang="fr-FR"/>
           </a:p>
@@ -827,7 +819,7 @@
     </p:spTree>
     <p:extLst>
       <p:ext uri="{BB962C8B-B14F-4D97-AF65-F5344CB8AC3E}">
-        <p14:creationId xmlns:p14="http://schemas.microsoft.com/office/powerpoint/2010/main" val="4059511108"/>
+        <p14:creationId xmlns:p14="http://schemas.microsoft.com/office/powerpoint/2010/main" val="2946232381"/>
       </p:ext>
     </p:extLst>
   </p:cSld>
@@ -915,7 +907,7 @@
           <a:p>
             <a:fld id="{20E6D720-7EE3-48C6-A432-79F856A50EC5}" type="slidenum">
               <a:rPr lang="fr-FR" smtClean="0"/>
-              <a:t>26</a:t>
+              <a:t>12</a:t>
             </a:fld>
             <a:endParaRPr lang="fr-FR"/>
           </a:p>
@@ -924,7 +916,7 @@
     </p:spTree>
     <p:extLst>
       <p:ext uri="{BB962C8B-B14F-4D97-AF65-F5344CB8AC3E}">
-        <p14:creationId xmlns:p14="http://schemas.microsoft.com/office/powerpoint/2010/main" val="829223417"/>
+        <p14:creationId xmlns:p14="http://schemas.microsoft.com/office/powerpoint/2010/main" val="4059511108"/>
       </p:ext>
     </p:extLst>
   </p:cSld>
@@ -1450,7 +1442,7 @@
     </p:spTree>
     <p:extLst>
       <p:ext uri="{BB962C8B-B14F-4D97-AF65-F5344CB8AC3E}">
-        <p14:creationId xmlns:p14="http://schemas.microsoft.com/office/powerpoint/2010/main" val="2410043598"/>
+        <p14:creationId xmlns:p14="http://schemas.microsoft.com/office/powerpoint/2010/main" val="829223417"/>
       </p:ext>
     </p:extLst>
   </p:cSld>
@@ -1538,7 +1530,7 @@
           <a:p>
             <a:fld id="{20E6D720-7EE3-48C6-A432-79F856A50EC5}" type="slidenum">
               <a:rPr lang="fr-FR" smtClean="0"/>
-              <a:t>8</a:t>
+              <a:t>6</a:t>
             </a:fld>
             <a:endParaRPr lang="fr-FR"/>
           </a:p>
@@ -1547,7 +1539,7 @@
     </p:spTree>
     <p:extLst>
       <p:ext uri="{BB962C8B-B14F-4D97-AF65-F5344CB8AC3E}">
-        <p14:creationId xmlns:p14="http://schemas.microsoft.com/office/powerpoint/2010/main" val="2376184141"/>
+        <p14:creationId xmlns:p14="http://schemas.microsoft.com/office/powerpoint/2010/main" val="2410043598"/>
       </p:ext>
     </p:extLst>
   </p:cSld>
@@ -1635,7 +1627,7 @@
           <a:p>
             <a:fld id="{20E6D720-7EE3-48C6-A432-79F856A50EC5}" type="slidenum">
               <a:rPr lang="fr-FR" smtClean="0"/>
-              <a:t>11</a:t>
+              <a:t>7</a:t>
             </a:fld>
             <a:endParaRPr lang="fr-FR"/>
           </a:p>
@@ -1644,7 +1636,7 @@
     </p:spTree>
     <p:extLst>
       <p:ext uri="{BB962C8B-B14F-4D97-AF65-F5344CB8AC3E}">
-        <p14:creationId xmlns:p14="http://schemas.microsoft.com/office/powerpoint/2010/main" val="578173222"/>
+        <p14:creationId xmlns:p14="http://schemas.microsoft.com/office/powerpoint/2010/main" val="2376184141"/>
       </p:ext>
     </p:extLst>
   </p:cSld>
@@ -1732,7 +1724,7 @@
           <a:p>
             <a:fld id="{20E6D720-7EE3-48C6-A432-79F856A50EC5}" type="slidenum">
               <a:rPr lang="fr-FR" smtClean="0"/>
-              <a:t>14</a:t>
+              <a:t>8</a:t>
             </a:fld>
             <a:endParaRPr lang="fr-FR"/>
           </a:p>
@@ -1741,7 +1733,7 @@
     </p:spTree>
     <p:extLst>
       <p:ext uri="{BB962C8B-B14F-4D97-AF65-F5344CB8AC3E}">
-        <p14:creationId xmlns:p14="http://schemas.microsoft.com/office/powerpoint/2010/main" val="653350904"/>
+        <p14:creationId xmlns:p14="http://schemas.microsoft.com/office/powerpoint/2010/main" val="578173222"/>
       </p:ext>
     </p:extLst>
   </p:cSld>
@@ -1829,7 +1821,7 @@
           <a:p>
             <a:fld id="{20E6D720-7EE3-48C6-A432-79F856A50EC5}" type="slidenum">
               <a:rPr lang="fr-FR" smtClean="0"/>
-              <a:t>17</a:t>
+              <a:t>9</a:t>
             </a:fld>
             <a:endParaRPr lang="fr-FR"/>
           </a:p>
@@ -1838,7 +1830,7 @@
     </p:spTree>
     <p:extLst>
       <p:ext uri="{BB962C8B-B14F-4D97-AF65-F5344CB8AC3E}">
-        <p14:creationId xmlns:p14="http://schemas.microsoft.com/office/powerpoint/2010/main" val="2972302065"/>
+        <p14:creationId xmlns:p14="http://schemas.microsoft.com/office/powerpoint/2010/main" val="653350904"/>
       </p:ext>
     </p:extLst>
   </p:cSld>
@@ -1995,7 +1987,7 @@
           <a:p>
             <a:fld id="{BAAA5C57-0FC7-4809-8DE0-9FB8CD72F45B}" type="datetime1">
               <a:rPr lang="fr-FR" smtClean="0"/>
-              <a:t>01/10/2022</a:t>
+              <a:t>04/10/2022</a:t>
             </a:fld>
             <a:endParaRPr lang="fr-FR"/>
           </a:p>
@@ -2193,7 +2185,7 @@
           <a:p>
             <a:fld id="{D6394C11-AF79-46EB-8628-81685E730859}" type="datetime1">
               <a:rPr lang="fr-FR" smtClean="0"/>
-              <a:t>01/10/2022</a:t>
+              <a:t>04/10/2022</a:t>
             </a:fld>
             <a:endParaRPr lang="fr-FR"/>
           </a:p>
@@ -2401,7 +2393,7 @@
           <a:p>
             <a:fld id="{195502D9-FD20-4B10-85D7-D0A36058A8A9}" type="datetime1">
               <a:rPr lang="fr-FR" smtClean="0"/>
-              <a:t>01/10/2022</a:t>
+              <a:t>04/10/2022</a:t>
             </a:fld>
             <a:endParaRPr lang="fr-FR"/>
           </a:p>
@@ -2599,7 +2591,7 @@
           <a:p>
             <a:fld id="{57684602-8624-4EB1-9235-5DD654D82F09}" type="datetime1">
               <a:rPr lang="fr-FR" smtClean="0"/>
-              <a:t>01/10/2022</a:t>
+              <a:t>04/10/2022</a:t>
             </a:fld>
             <a:endParaRPr lang="fr-FR"/>
           </a:p>
@@ -2874,7 +2866,7 @@
           <a:p>
             <a:fld id="{E41784DB-987A-45B6-9772-C36DF83C3C02}" type="datetime1">
               <a:rPr lang="fr-FR" smtClean="0"/>
-              <a:t>01/10/2022</a:t>
+              <a:t>04/10/2022</a:t>
             </a:fld>
             <a:endParaRPr lang="fr-FR"/>
           </a:p>
@@ -3139,7 +3131,7 @@
           <a:p>
             <a:fld id="{E595D999-DF18-4099-8D0D-BC2297023F60}" type="datetime1">
               <a:rPr lang="fr-FR" smtClean="0"/>
-              <a:t>01/10/2022</a:t>
+              <a:t>04/10/2022</a:t>
             </a:fld>
             <a:endParaRPr lang="fr-FR"/>
           </a:p>
@@ -3551,7 +3543,7 @@
           <a:p>
             <a:fld id="{871871E2-9510-47F9-812F-D25C732F0E19}" type="datetime1">
               <a:rPr lang="fr-FR" smtClean="0"/>
-              <a:t>01/10/2022</a:t>
+              <a:t>04/10/2022</a:t>
             </a:fld>
             <a:endParaRPr lang="fr-FR"/>
           </a:p>
@@ -3692,7 +3684,7 @@
           <a:p>
             <a:fld id="{76383D6D-8978-42A7-ABAD-D463CD4AD0CE}" type="datetime1">
               <a:rPr lang="fr-FR" smtClean="0"/>
-              <a:t>01/10/2022</a:t>
+              <a:t>04/10/2022</a:t>
             </a:fld>
             <a:endParaRPr lang="fr-FR"/>
           </a:p>
@@ -3805,7 +3797,7 @@
           <a:p>
             <a:fld id="{C6571784-1182-4604-B720-0FE25B0575C8}" type="datetime1">
               <a:rPr lang="fr-FR" smtClean="0"/>
-              <a:t>01/10/2022</a:t>
+              <a:t>04/10/2022</a:t>
             </a:fld>
             <a:endParaRPr lang="fr-FR"/>
           </a:p>
@@ -4116,7 +4108,7 @@
           <a:p>
             <a:fld id="{BCE52CFF-6AA8-4EB4-A5AB-E9E18645216B}" type="datetime1">
               <a:rPr lang="fr-FR" smtClean="0"/>
-              <a:t>01/10/2022</a:t>
+              <a:t>04/10/2022</a:t>
             </a:fld>
             <a:endParaRPr lang="fr-FR"/>
           </a:p>
@@ -4404,7 +4396,7 @@
           <a:p>
             <a:fld id="{5EA3A904-D97A-4686-B1B2-2D6167D64CF7}" type="datetime1">
               <a:rPr lang="fr-FR" smtClean="0"/>
-              <a:t>01/10/2022</a:t>
+              <a:t>04/10/2022</a:t>
             </a:fld>
             <a:endParaRPr lang="fr-FR"/>
           </a:p>
@@ -4645,7 +4637,7 @@
           <a:p>
             <a:fld id="{5CD26E4C-FA77-42C7-B5FC-F70A55A82F63}" type="datetime1">
               <a:rPr lang="fr-FR" smtClean="0"/>
-              <a:t>01/10/2022</a:t>
+              <a:t>04/10/2022</a:t>
             </a:fld>
             <a:endParaRPr lang="fr-FR"/>
           </a:p>
@@ -5215,41 +5207,150 @@
           <a:chExt cx="0" cy="0"/>
         </a:xfrm>
       </p:grpSpPr>
-      <p:pic>
-        <p:nvPicPr>
-          <p:cNvPr id="6" name="Espace réservé du contenu 5">
-            <a:extLst>
-              <a:ext uri="{FF2B5EF4-FFF2-40B4-BE49-F238E27FC236}">
-                <a16:creationId xmlns:a16="http://schemas.microsoft.com/office/drawing/2014/main" id="{4AA5791A-800F-A3F4-039D-F6B334B6D206}"/>
-              </a:ext>
-            </a:extLst>
-          </p:cNvPr>
-          <p:cNvPicPr>
-            <a:picLocks noGrp="1" noChangeAspect="1"/>
-          </p:cNvPicPr>
-          <p:nvPr>
-            <p:ph idx="1"/>
-          </p:nvPr>
-        </p:nvPicPr>
-        <p:blipFill>
-          <a:blip r:embed="rId2"/>
-          <a:stretch>
-            <a:fillRect/>
-          </a:stretch>
-        </p:blipFill>
+      <p:sp>
+        <p:nvSpPr>
+          <p:cNvPr id="2" name="Titre 1">
+            <a:extLst>
+              <a:ext uri="{FF2B5EF4-FFF2-40B4-BE49-F238E27FC236}">
+                <a16:creationId xmlns:a16="http://schemas.microsoft.com/office/drawing/2014/main" id="{71B8B1D2-694D-4124-BFA6-F2C501B35109}"/>
+              </a:ext>
+            </a:extLst>
+          </p:cNvPr>
+          <p:cNvSpPr>
+            <a:spLocks noGrp="1"/>
+          </p:cNvSpPr>
+          <p:nvPr>
+            <p:ph type="title"/>
+          </p:nvPr>
+        </p:nvSpPr>
         <p:spPr>
           <a:xfrm>
-            <a:off x="2216774" y="0"/>
-            <a:ext cx="7526994" cy="3406575"/>
+            <a:off x="698091" y="365125"/>
+            <a:ext cx="10776154" cy="1325563"/>
           </a:xfrm>
         </p:spPr>
-      </p:pic>
+        <p:txBody>
+          <a:bodyPr/>
+          <a:lstStyle/>
+          <a:p>
+            <a:pPr marL="0" indent="0" algn="ctr" defTabSz="360000">
+              <a:spcBef>
+                <a:spcPts val="0"/>
+              </a:spcBef>
+              <a:buNone/>
+            </a:pPr>
+            <a:r>
+              <a:rPr lang="en-US" sz="4400">
+                <a:solidFill>
+                  <a:srgbClr val="0070C0"/>
+                </a:solidFill>
+                <a:latin typeface="Consolas" panose="020B0609020204030204" pitchFamily="49" charset="0"/>
+              </a:rPr>
+              <a:t>http://localhost:8080/fire?address=&lt;address&gt;</a:t>
+            </a:r>
+            <a:endParaRPr lang="fr-FR" sz="4400" dirty="0">
+              <a:solidFill>
+                <a:srgbClr val="0070C0"/>
+              </a:solidFill>
+              <a:latin typeface="Consolas" panose="020B0609020204030204" pitchFamily="49" charset="0"/>
+            </a:endParaRPr>
+          </a:p>
+        </p:txBody>
+      </p:sp>
+      <p:sp>
+        <p:nvSpPr>
+          <p:cNvPr id="3" name="Espace réservé du contenu 2">
+            <a:extLst>
+              <a:ext uri="{FF2B5EF4-FFF2-40B4-BE49-F238E27FC236}">
+                <a16:creationId xmlns:a16="http://schemas.microsoft.com/office/drawing/2014/main" id="{7C9B0652-5A35-430D-A916-25405324295F}"/>
+              </a:ext>
+            </a:extLst>
+          </p:cNvPr>
+          <p:cNvSpPr>
+            <a:spLocks noGrp="1"/>
+          </p:cNvSpPr>
+          <p:nvPr>
+            <p:ph idx="1"/>
+          </p:nvPr>
+        </p:nvSpPr>
+        <p:spPr>
+          <a:xfrm>
+            <a:off x="838200" y="1690689"/>
+            <a:ext cx="10515600" cy="4486274"/>
+          </a:xfrm>
+        </p:spPr>
+        <p:txBody>
+          <a:bodyPr>
+            <a:normAutofit/>
+          </a:bodyPr>
+          <a:lstStyle/>
+          <a:p>
+            <a:pPr marL="365125" indent="-365125">
+              <a:spcAft>
+                <a:spcPts val="1200"/>
+              </a:spcAft>
+              <a:buFont typeface="Wingdings" panose="05000000000000000000" pitchFamily="2" charset="2"/>
+              <a:buChar char="Ø"/>
+            </a:pPr>
+            <a:endParaRPr lang="fr-FR"/>
+          </a:p>
+          <a:p>
+            <a:pPr marL="365125" indent="-365125">
+              <a:spcAft>
+                <a:spcPts val="1200"/>
+              </a:spcAft>
+              <a:buFont typeface="Wingdings" panose="05000000000000000000" pitchFamily="2" charset="2"/>
+              <a:buChar char="Ø"/>
+            </a:pPr>
+            <a:r>
+              <a:rPr lang="fr-FR"/>
+              <a:t>Cette </a:t>
+            </a:r>
+            <a:r>
+              <a:rPr lang="fr-FR" dirty="0"/>
+              <a:t>url doit retourner la liste des habitants vivant à l’adresse donnée ainsi que le numéro de la caserne de pompiers la desservant</a:t>
+            </a:r>
+          </a:p>
+          <a:p>
+            <a:pPr marL="365125" indent="-365125">
+              <a:spcAft>
+                <a:spcPts val="1200"/>
+              </a:spcAft>
+              <a:buFont typeface="Wingdings" panose="05000000000000000000" pitchFamily="2" charset="2"/>
+              <a:buChar char="Ø"/>
+            </a:pPr>
+            <a:endParaRPr lang="fr-FR" dirty="0"/>
+          </a:p>
+          <a:p>
+            <a:pPr marL="365125" indent="-365125">
+              <a:spcAft>
+                <a:spcPts val="1200"/>
+              </a:spcAft>
+              <a:buFont typeface="Wingdings" panose="05000000000000000000" pitchFamily="2" charset="2"/>
+              <a:buChar char="Ø"/>
+            </a:pPr>
+            <a:r>
+              <a:rPr lang="fr-FR"/>
+              <a:t>Sont précisés par habitant : nom</a:t>
+            </a:r>
+            <a:r>
+              <a:rPr lang="fr-FR" dirty="0"/>
+              <a:t>, numéro de téléphone, âge </a:t>
+            </a:r>
+            <a:r>
+              <a:rPr lang="fr-FR"/>
+              <a:t>et antécédents médicaux</a:t>
+            </a:r>
+            <a:endParaRPr lang="fr-FR" dirty="0"/>
+          </a:p>
+        </p:txBody>
+      </p:sp>
       <p:sp>
         <p:nvSpPr>
           <p:cNvPr id="4" name="Espace réservé du numéro de diapositive 3">
             <a:extLst>
               <a:ext uri="{FF2B5EF4-FFF2-40B4-BE49-F238E27FC236}">
-                <a16:creationId xmlns:a16="http://schemas.microsoft.com/office/drawing/2014/main" id="{7A2838A0-90CD-BAAE-EA85-71055E8AAC0E}"/>
+                <a16:creationId xmlns:a16="http://schemas.microsoft.com/office/drawing/2014/main" id="{CE404544-46A4-47E3-ABC8-EAD4F49196F5}"/>
               </a:ext>
             </a:extLst>
           </p:cNvPr>
@@ -5266,47 +5367,25 @@
           <a:lstStyle/>
           <a:p>
             <a:fld id="{504562DC-6A68-4B1A-ACD4-40BBA2BD5EE0}" type="slidenum">
-              <a:rPr lang="fr-FR" smtClean="0"/>
+              <a:rPr lang="fr-FR" smtClean="0">
+                <a:solidFill>
+                  <a:schemeClr val="tx1"/>
+                </a:solidFill>
+              </a:rPr>
               <a:t>10</a:t>
             </a:fld>
-            <a:endParaRPr lang="fr-FR"/>
-          </a:p>
-        </p:txBody>
-      </p:sp>
-      <p:pic>
-        <p:nvPicPr>
-          <p:cNvPr id="8" name="Image 7">
-            <a:extLst>
-              <a:ext uri="{FF2B5EF4-FFF2-40B4-BE49-F238E27FC236}">
-                <a16:creationId xmlns:a16="http://schemas.microsoft.com/office/drawing/2014/main" id="{2B2F6114-34AA-3BFB-6A7D-30A81E11CA57}"/>
-              </a:ext>
-            </a:extLst>
-          </p:cNvPr>
-          <p:cNvPicPr>
-            <a:picLocks noChangeAspect="1"/>
-          </p:cNvPicPr>
-          <p:nvPr/>
-        </p:nvPicPr>
-        <p:blipFill>
-          <a:blip r:embed="rId3"/>
-          <a:stretch>
-            <a:fillRect/>
-          </a:stretch>
-        </p:blipFill>
-        <p:spPr>
-          <a:xfrm>
-            <a:off x="2216774" y="3474530"/>
-            <a:ext cx="7428671" cy="3330717"/>
-          </a:xfrm>
-          <a:prstGeom prst="rect">
-            <a:avLst/>
-          </a:prstGeom>
-        </p:spPr>
-      </p:pic>
+            <a:endParaRPr lang="fr-FR" dirty="0">
+              <a:solidFill>
+                <a:schemeClr val="tx1"/>
+              </a:solidFill>
+            </a:endParaRPr>
+          </a:p>
+        </p:txBody>
+      </p:sp>
     </p:spTree>
     <p:extLst>
       <p:ext uri="{BB962C8B-B14F-4D97-AF65-F5344CB8AC3E}">
-        <p14:creationId xmlns:p14="http://schemas.microsoft.com/office/powerpoint/2010/main" val="2602208407"/>
+        <p14:creationId xmlns:p14="http://schemas.microsoft.com/office/powerpoint/2010/main" val="640475224"/>
       </p:ext>
     </p:extLst>
   </p:cSld>
@@ -5351,17 +5430,20 @@
         </p:nvSpPr>
         <p:spPr>
           <a:xfrm>
-            <a:off x="838200" y="365125"/>
-            <a:ext cx="10606548" cy="1325563"/>
+            <a:off x="419100" y="365126"/>
+            <a:ext cx="11353800" cy="1325563"/>
           </a:xfrm>
         </p:spPr>
         <p:txBody>
-          <a:bodyPr>
-            <a:normAutofit fontScale="90000"/>
-          </a:bodyPr>
-          <a:lstStyle/>
-          <a:p>
-            <a:pPr algn="ctr"/>
+          <a:bodyPr/>
+          <a:lstStyle/>
+          <a:p>
+            <a:pPr marL="0" indent="0" algn="ctr" defTabSz="360000">
+              <a:spcBef>
+                <a:spcPts val="0"/>
+              </a:spcBef>
+              <a:buNone/>
+            </a:pPr>
             <a:r>
               <a:rPr lang="en-US" sz="4400">
                 <a:solidFill>
@@ -5369,9 +5451,14 @@
                 </a:solidFill>
                 <a:latin typeface="Consolas" panose="020B0609020204030204" pitchFamily="49" charset="0"/>
               </a:rPr>
-              <a:t>http://localhost:8080/flood/stations?stations=&lt;a list of station_numbers&gt;</a:t>
-            </a:r>
-            <a:endParaRPr lang="fr-FR" dirty="0"/>
+              <a:t>http://localhost:8080/communityEmail?city=&lt;city&gt;</a:t>
+            </a:r>
+            <a:endParaRPr lang="fr-FR" sz="4400">
+              <a:solidFill>
+                <a:srgbClr val="0070C0"/>
+              </a:solidFill>
+              <a:latin typeface="Consolas" panose="020B0609020204030204" pitchFamily="49" charset="0"/>
+            </a:endParaRPr>
           </a:p>
         </p:txBody>
       </p:sp>
@@ -5422,11 +5509,7 @@
             </a:pPr>
             <a:r>
               <a:rPr lang="fr-FR"/>
-              <a:t>Cette </a:t>
-            </a:r>
-            <a:r>
-              <a:rPr lang="fr-FR" dirty="0"/>
-              <a:t>url doit retourner une liste de tous les foyers desservis par les casernes. Cette liste doit regrouper les personnes par adresse.</a:t>
+              <a:t>Cette url doit retourner les adresses mail de tous les habitants de la ville</a:t>
             </a:r>
           </a:p>
           <a:p>
@@ -5437,7 +5520,7 @@
               <a:buFont typeface="Wingdings" panose="05000000000000000000" pitchFamily="2" charset="2"/>
               <a:buChar char="Ø"/>
             </a:pPr>
-            <a:endParaRPr lang="fr-FR" dirty="0"/>
+            <a:endParaRPr lang="fr-FR"/>
           </a:p>
           <a:p>
             <a:pPr marL="365125" indent="-365125">
@@ -5449,25 +5532,19 @@
             </a:pPr>
             <a:r>
               <a:rPr lang="fr-FR"/>
-              <a:t>Sont précisés, regroupés </a:t>
-            </a:r>
-            <a:r>
-              <a:rPr lang="fr-FR" dirty="0"/>
-              <a:t>par </a:t>
-            </a:r>
-            <a:r>
-              <a:rPr lang="fr-FR"/>
-              <a:t>adresse, les </a:t>
-            </a:r>
-            <a:r>
-              <a:rPr lang="fr-FR" dirty="0"/>
-              <a:t>noms, les numéros de téléphone, les âges, et les </a:t>
-            </a:r>
-            <a:r>
-              <a:rPr lang="fr-FR"/>
-              <a:t>antécédents médicaux</a:t>
-            </a:r>
-            <a:endParaRPr lang="fr-FR" dirty="0"/>
+              <a:t>Les emails sont distincts (pas de duplication)</a:t>
+            </a:r>
+          </a:p>
+          <a:p>
+            <a:pPr marL="0" indent="0" defTabSz="360000">
+              <a:spcBef>
+                <a:spcPts val="0"/>
+              </a:spcBef>
+              <a:buNone/>
+            </a:pPr>
+            <a:endParaRPr lang="fr-FR" sz="1400">
+              <a:latin typeface="Consolas" panose="020B0609020204030204" pitchFamily="49" charset="0"/>
+            </a:endParaRPr>
           </a:p>
         </p:txBody>
       </p:sp>
@@ -5511,7 +5588,7 @@
     </p:spTree>
     <p:extLst>
       <p:ext uri="{BB962C8B-B14F-4D97-AF65-F5344CB8AC3E}">
-        <p14:creationId xmlns:p14="http://schemas.microsoft.com/office/powerpoint/2010/main" val="594387854"/>
+        <p14:creationId xmlns:p14="http://schemas.microsoft.com/office/powerpoint/2010/main" val="4180230509"/>
       </p:ext>
     </p:extLst>
   </p:cSld>
@@ -5538,41 +5615,87 @@
           <a:chExt cx="0" cy="0"/>
         </a:xfrm>
       </p:grpSpPr>
-      <p:pic>
-        <p:nvPicPr>
-          <p:cNvPr id="6" name="Espace réservé du contenu 5">
-            <a:extLst>
-              <a:ext uri="{FF2B5EF4-FFF2-40B4-BE49-F238E27FC236}">
-                <a16:creationId xmlns:a16="http://schemas.microsoft.com/office/drawing/2014/main" id="{3EC9FF73-50AE-48DC-D8D5-DBF6F6176AF7}"/>
-              </a:ext>
-            </a:extLst>
-          </p:cNvPr>
-          <p:cNvPicPr>
-            <a:picLocks noGrp="1" noChangeAspect="1"/>
-          </p:cNvPicPr>
+      <p:sp>
+        <p:nvSpPr>
+          <p:cNvPr id="3" name="Espace réservé du contenu 2">
+            <a:extLst>
+              <a:ext uri="{FF2B5EF4-FFF2-40B4-BE49-F238E27FC236}">
+                <a16:creationId xmlns:a16="http://schemas.microsoft.com/office/drawing/2014/main" id="{7C9B0652-5A35-430D-A916-25405324295F}"/>
+              </a:ext>
+            </a:extLst>
+          </p:cNvPr>
+          <p:cNvSpPr>
+            <a:spLocks noGrp="1"/>
+          </p:cNvSpPr>
           <p:nvPr>
             <p:ph idx="1"/>
           </p:nvPr>
-        </p:nvPicPr>
-        <p:blipFill>
-          <a:blip r:embed="rId2"/>
-          <a:stretch>
-            <a:fillRect/>
-          </a:stretch>
-        </p:blipFill>
+        </p:nvSpPr>
         <p:spPr>
           <a:xfrm>
-            <a:off x="1778888" y="191165"/>
-            <a:ext cx="8634224" cy="6475669"/>
+            <a:off x="838200" y="1690689"/>
+            <a:ext cx="10515600" cy="4486274"/>
           </a:xfrm>
         </p:spPr>
-      </p:pic>
+        <p:txBody>
+          <a:bodyPr>
+            <a:normAutofit/>
+          </a:bodyPr>
+          <a:lstStyle/>
+          <a:p>
+            <a:pPr marL="365125" indent="-365125">
+              <a:spcAft>
+                <a:spcPts val="1200"/>
+              </a:spcAft>
+              <a:buFont typeface="Wingdings" panose="05000000000000000000" pitchFamily="2" charset="2"/>
+              <a:buChar char="Ø"/>
+            </a:pPr>
+            <a:endParaRPr lang="fr-FR"/>
+          </a:p>
+          <a:p>
+            <a:pPr marL="365125" indent="-365125">
+              <a:spcAft>
+                <a:spcPts val="1200"/>
+              </a:spcAft>
+              <a:buFont typeface="Wingdings" panose="05000000000000000000" pitchFamily="2" charset="2"/>
+              <a:buChar char="Ø"/>
+            </a:pPr>
+            <a:r>
+              <a:rPr lang="fr-FR"/>
+              <a:t>Cette url doit retourner la liste des personnes de même nom habitant à l'adresse de la personne précisée.</a:t>
+            </a:r>
+          </a:p>
+          <a:p>
+            <a:pPr marL="365125" indent="-365125">
+              <a:spcAft>
+                <a:spcPts val="1200"/>
+              </a:spcAft>
+              <a:buFont typeface="Wingdings" panose="05000000000000000000" pitchFamily="2" charset="2"/>
+              <a:buChar char="Ø"/>
+            </a:pPr>
+            <a:endParaRPr lang="fr-FR"/>
+          </a:p>
+          <a:p>
+            <a:pPr marL="365125" indent="-365125">
+              <a:spcAft>
+                <a:spcPts val="1200"/>
+              </a:spcAft>
+              <a:buFont typeface="Wingdings" panose="05000000000000000000" pitchFamily="2" charset="2"/>
+              <a:buChar char="Ø"/>
+            </a:pPr>
+            <a:r>
+              <a:rPr lang="fr-FR"/>
+              <a:t>Sont précisés par habitant :(nom, adresse, âge, courriel, antécédents médicaux</a:t>
+            </a:r>
+          </a:p>
+        </p:txBody>
+      </p:sp>
       <p:sp>
         <p:nvSpPr>
           <p:cNvPr id="4" name="Espace réservé du numéro de diapositive 3">
             <a:extLst>
               <a:ext uri="{FF2B5EF4-FFF2-40B4-BE49-F238E27FC236}">
-                <a16:creationId xmlns:a16="http://schemas.microsoft.com/office/drawing/2014/main" id="{3F06F1DA-DD4B-99A4-D5E0-FAD96C0C421B}"/>
+                <a16:creationId xmlns:a16="http://schemas.microsoft.com/office/drawing/2014/main" id="{CE404544-46A4-47E3-ABC8-EAD4F49196F5}"/>
               </a:ext>
             </a:extLst>
           </p:cNvPr>
@@ -5589,9 +5712,58 @@
           <a:lstStyle/>
           <a:p>
             <a:fld id="{504562DC-6A68-4B1A-ACD4-40BBA2BD5EE0}" type="slidenum">
-              <a:rPr lang="fr-FR" smtClean="0"/>
+              <a:rPr lang="fr-FR" smtClean="0">
+                <a:solidFill>
+                  <a:schemeClr val="tx1"/>
+                </a:solidFill>
+              </a:rPr>
               <a:t>12</a:t>
             </a:fld>
+            <a:endParaRPr lang="fr-FR" dirty="0">
+              <a:solidFill>
+                <a:schemeClr val="tx1"/>
+              </a:solidFill>
+            </a:endParaRPr>
+          </a:p>
+        </p:txBody>
+      </p:sp>
+      <p:sp>
+        <p:nvSpPr>
+          <p:cNvPr id="6" name="Titre 5">
+            <a:extLst>
+              <a:ext uri="{FF2B5EF4-FFF2-40B4-BE49-F238E27FC236}">
+                <a16:creationId xmlns:a16="http://schemas.microsoft.com/office/drawing/2014/main" id="{014B82FB-4187-5393-970F-8F61832E03EB}"/>
+              </a:ext>
+            </a:extLst>
+          </p:cNvPr>
+          <p:cNvSpPr>
+            <a:spLocks noGrp="1"/>
+          </p:cNvSpPr>
+          <p:nvPr>
+            <p:ph type="title"/>
+          </p:nvPr>
+        </p:nvSpPr>
+        <p:spPr>
+          <a:xfrm>
+            <a:off x="757083" y="96736"/>
+            <a:ext cx="11012129" cy="1325563"/>
+          </a:xfrm>
+        </p:spPr>
+        <p:txBody>
+          <a:bodyPr>
+            <a:normAutofit fontScale="90000"/>
+          </a:bodyPr>
+          <a:lstStyle/>
+          <a:p>
+            <a:r>
+              <a:rPr lang="en-US" sz="4400">
+                <a:solidFill>
+                  <a:srgbClr val="0070C0"/>
+                </a:solidFill>
+                <a:latin typeface="Consolas" panose="020B0609020204030204" pitchFamily="49" charset="0"/>
+              </a:rPr>
+              <a:t>http://localhost:8080/personInfo?firstName=&lt;firstName&gt;&amp;lastName=&lt;lastName&gt;</a:t>
+            </a:r>
             <a:endParaRPr lang="fr-FR"/>
           </a:p>
         </p:txBody>
@@ -5599,7 +5771,7 @@
     </p:spTree>
     <p:extLst>
       <p:ext uri="{BB962C8B-B14F-4D97-AF65-F5344CB8AC3E}">
-        <p14:creationId xmlns:p14="http://schemas.microsoft.com/office/powerpoint/2010/main" val="1413676828"/>
+        <p14:creationId xmlns:p14="http://schemas.microsoft.com/office/powerpoint/2010/main" val="3148092973"/>
       </p:ext>
     </p:extLst>
   </p:cSld>
@@ -5628,46 +5800,52 @@
       </p:grpSpPr>
       <p:sp>
         <p:nvSpPr>
-          <p:cNvPr id="4" name="Espace réservé du numéro de diapositive 3">
-            <a:extLst>
-              <a:ext uri="{FF2B5EF4-FFF2-40B4-BE49-F238E27FC236}">
-                <a16:creationId xmlns:a16="http://schemas.microsoft.com/office/drawing/2014/main" id="{FE8A0765-519C-726E-F222-515423A519D1}"/>
-              </a:ext>
-            </a:extLst>
-          </p:cNvPr>
-          <p:cNvSpPr>
-            <a:spLocks noGrp="1"/>
-          </p:cNvSpPr>
-          <p:nvPr>
-            <p:ph type="sldNum" sz="quarter" idx="12"/>
-          </p:nvPr>
-        </p:nvSpPr>
-        <p:spPr/>
-        <p:txBody>
-          <a:bodyPr/>
-          <a:lstStyle/>
-          <a:p>
-            <a:fld id="{504562DC-6A68-4B1A-ACD4-40BBA2BD5EE0}" type="slidenum">
-              <a:rPr lang="fr-FR" smtClean="0"/>
-              <a:t>13</a:t>
-            </a:fld>
-            <a:endParaRPr lang="fr-FR"/>
+          <p:cNvPr id="2" name="Titre 1">
+            <a:extLst>
+              <a:ext uri="{FF2B5EF4-FFF2-40B4-BE49-F238E27FC236}">
+                <a16:creationId xmlns:a16="http://schemas.microsoft.com/office/drawing/2014/main" id="{BA7BB0D5-EC15-CCB5-8043-1D6217105085}"/>
+              </a:ext>
+            </a:extLst>
+          </p:cNvPr>
+          <p:cNvSpPr>
+            <a:spLocks noGrp="1"/>
+          </p:cNvSpPr>
+          <p:nvPr>
+            <p:ph type="title"/>
+          </p:nvPr>
+        </p:nvSpPr>
+        <p:spPr/>
+        <p:txBody>
+          <a:bodyPr/>
+          <a:lstStyle/>
+          <a:p>
+            <a:r>
+              <a:rPr lang="fr-FR" sz="4000">
+                <a:solidFill>
+                  <a:srgbClr val="0070C0"/>
+                </a:solidFill>
+                <a:latin typeface="Consolas" panose="020B0609020204030204" pitchFamily="49" charset="0"/>
+              </a:rPr>
+              <a:t>http://localhost:8080/person</a:t>
+            </a:r>
           </a:p>
         </p:txBody>
       </p:sp>
       <p:pic>
         <p:nvPicPr>
-          <p:cNvPr id="6" name="Image 5">
-            <a:extLst>
-              <a:ext uri="{FF2B5EF4-FFF2-40B4-BE49-F238E27FC236}">
-                <a16:creationId xmlns:a16="http://schemas.microsoft.com/office/drawing/2014/main" id="{C4318D97-C0D5-F1B0-339A-76A5EDD0F741}"/>
+          <p:cNvPr id="6" name="Espace réservé du contenu 5">
+            <a:extLst>
+              <a:ext uri="{FF2B5EF4-FFF2-40B4-BE49-F238E27FC236}">
+                <a16:creationId xmlns:a16="http://schemas.microsoft.com/office/drawing/2014/main" id="{19D4DE44-B360-5522-24C6-2F93BE561233}"/>
               </a:ext>
             </a:extLst>
           </p:cNvPr>
           <p:cNvPicPr>
-            <a:picLocks noChangeAspect="1"/>
+            <a:picLocks noGrp="1" noChangeAspect="1"/>
           </p:cNvPicPr>
-          <p:nvPr/>
+          <p:nvPr>
+            <p:ph idx="1"/>
+          </p:nvPr>
         </p:nvPicPr>
         <p:blipFill>
           <a:blip r:embed="rId2"/>
@@ -5677,48 +5855,44 @@
         </p:blipFill>
         <p:spPr>
           <a:xfrm>
-            <a:off x="2273932" y="127428"/>
-            <a:ext cx="7076545" cy="3258142"/>
+            <a:off x="1326345" y="1455174"/>
+            <a:ext cx="8713555" cy="4651439"/>
           </a:xfrm>
-          <a:prstGeom prst="rect">
-            <a:avLst/>
-          </a:prstGeom>
         </p:spPr>
       </p:pic>
-      <p:pic>
-        <p:nvPicPr>
-          <p:cNvPr id="8" name="Image 7">
-            <a:extLst>
-              <a:ext uri="{FF2B5EF4-FFF2-40B4-BE49-F238E27FC236}">
-                <a16:creationId xmlns:a16="http://schemas.microsoft.com/office/drawing/2014/main" id="{B5B08228-7D47-E62E-D75D-0994F72F05E5}"/>
-              </a:ext>
-            </a:extLst>
-          </p:cNvPr>
-          <p:cNvPicPr>
-            <a:picLocks noChangeAspect="1"/>
-          </p:cNvPicPr>
-          <p:nvPr/>
-        </p:nvPicPr>
-        <p:blipFill>
-          <a:blip r:embed="rId3"/>
-          <a:stretch>
-            <a:fillRect/>
-          </a:stretch>
-        </p:blipFill>
-        <p:spPr>
-          <a:xfrm>
-            <a:off x="2273932" y="3385570"/>
-            <a:ext cx="7158589" cy="3304635"/>
-          </a:xfrm>
-          <a:prstGeom prst="rect">
-            <a:avLst/>
-          </a:prstGeom>
-        </p:spPr>
-      </p:pic>
+      <p:sp>
+        <p:nvSpPr>
+          <p:cNvPr id="4" name="Espace réservé du numéro de diapositive 3">
+            <a:extLst>
+              <a:ext uri="{FF2B5EF4-FFF2-40B4-BE49-F238E27FC236}">
+                <a16:creationId xmlns:a16="http://schemas.microsoft.com/office/drawing/2014/main" id="{E538AB80-0C45-A8F0-2D8D-7E23FCF955AF}"/>
+              </a:ext>
+            </a:extLst>
+          </p:cNvPr>
+          <p:cNvSpPr>
+            <a:spLocks noGrp="1"/>
+          </p:cNvSpPr>
+          <p:nvPr>
+            <p:ph type="sldNum" sz="quarter" idx="12"/>
+          </p:nvPr>
+        </p:nvSpPr>
+        <p:spPr/>
+        <p:txBody>
+          <a:bodyPr/>
+          <a:lstStyle/>
+          <a:p>
+            <a:fld id="{504562DC-6A68-4B1A-ACD4-40BBA2BD5EE0}" type="slidenum">
+              <a:rPr lang="fr-FR" smtClean="0"/>
+              <a:t>13</a:t>
+            </a:fld>
+            <a:endParaRPr lang="fr-FR"/>
+          </a:p>
+        </p:txBody>
+      </p:sp>
     </p:spTree>
     <p:extLst>
       <p:ext uri="{BB962C8B-B14F-4D97-AF65-F5344CB8AC3E}">
-        <p14:creationId xmlns:p14="http://schemas.microsoft.com/office/powerpoint/2010/main" val="1247010763"/>
+        <p14:creationId xmlns:p14="http://schemas.microsoft.com/office/powerpoint/2010/main" val="3448837635"/>
       </p:ext>
     </p:extLst>
   </p:cSld>
@@ -5750,7 +5924,7 @@
           <p:cNvPr id="2" name="Titre 1">
             <a:extLst>
               <a:ext uri="{FF2B5EF4-FFF2-40B4-BE49-F238E27FC236}">
-                <a16:creationId xmlns:a16="http://schemas.microsoft.com/office/drawing/2014/main" id="{71B8B1D2-694D-4124-BFA6-F2C501B35109}"/>
+                <a16:creationId xmlns:a16="http://schemas.microsoft.com/office/drawing/2014/main" id="{E893D473-8F20-B40A-BE9D-0E0F4981A182}"/>
               </a:ext>
             </a:extLst>
           </p:cNvPr>
@@ -5766,95 +5940,109 @@
           <a:bodyPr/>
           <a:lstStyle/>
           <a:p>
-            <a:pPr algn="ctr"/>
-            <a:r>
-              <a:rPr lang="en-US" sz="4400">
+            <a:r>
+              <a:rPr lang="fr-FR"/>
+              <a:t>De meme pour les autres endpoints :</a:t>
+            </a:r>
+          </a:p>
+        </p:txBody>
+      </p:sp>
+      <p:sp>
+        <p:nvSpPr>
+          <p:cNvPr id="3" name="Espace réservé du contenu 2">
+            <a:extLst>
+              <a:ext uri="{FF2B5EF4-FFF2-40B4-BE49-F238E27FC236}">
+                <a16:creationId xmlns:a16="http://schemas.microsoft.com/office/drawing/2014/main" id="{09827601-33F0-BC72-D060-009B43993141}"/>
+              </a:ext>
+            </a:extLst>
+          </p:cNvPr>
+          <p:cNvSpPr>
+            <a:spLocks noGrp="1"/>
+          </p:cNvSpPr>
+          <p:nvPr>
+            <p:ph idx="1"/>
+          </p:nvPr>
+        </p:nvSpPr>
+        <p:spPr/>
+        <p:txBody>
+          <a:bodyPr/>
+          <a:lstStyle/>
+          <a:p>
+            <a:r>
+              <a:rPr lang="fr-FR" sz="4000">
                 <a:solidFill>
                   <a:srgbClr val="0070C0"/>
                 </a:solidFill>
                 <a:latin typeface="Consolas" panose="020B0609020204030204" pitchFamily="49" charset="0"/>
+                <a:ea typeface="+mj-ea"/>
+                <a:cs typeface="+mj-cs"/>
+                <a:hlinkClick r:id="rId2"/>
               </a:rPr>
-              <a:t>http://localhost:8080/childAlert?address=&lt;address&gt;</a:t>
-            </a:r>
-            <a:endParaRPr lang="fr-FR" dirty="0"/>
-          </a:p>
-        </p:txBody>
-      </p:sp>
-      <p:sp>
-        <p:nvSpPr>
-          <p:cNvPr id="3" name="Espace réservé du contenu 2">
-            <a:extLst>
-              <a:ext uri="{FF2B5EF4-FFF2-40B4-BE49-F238E27FC236}">
-                <a16:creationId xmlns:a16="http://schemas.microsoft.com/office/drawing/2014/main" id="{7C9B0652-5A35-430D-A916-25405324295F}"/>
-              </a:ext>
-            </a:extLst>
-          </p:cNvPr>
-          <p:cNvSpPr>
-            <a:spLocks noGrp="1"/>
-          </p:cNvSpPr>
-          <p:nvPr>
-            <p:ph idx="1"/>
-          </p:nvPr>
-        </p:nvSpPr>
-        <p:spPr>
-          <a:xfrm>
-            <a:off x="163774" y="1690688"/>
-            <a:ext cx="12028226" cy="4665662"/>
-          </a:xfrm>
-        </p:spPr>
-        <p:txBody>
-          <a:bodyPr>
-            <a:normAutofit/>
-          </a:bodyPr>
-          <a:lstStyle/>
-          <a:p>
-            <a:pPr marL="365125" indent="-365125">
-              <a:spcAft>
-                <a:spcPts val="1200"/>
-              </a:spcAft>
-              <a:buFont typeface="Wingdings" panose="05000000000000000000" pitchFamily="2" charset="2"/>
-              <a:buChar char="Ø"/>
+              <a:t>http://localhost:8080/firestation</a:t>
+            </a:r>
+            <a:endParaRPr lang="fr-FR" sz="4000">
+              <a:solidFill>
+                <a:srgbClr val="0070C0"/>
+              </a:solidFill>
+              <a:latin typeface="Consolas" panose="020B0609020204030204" pitchFamily="49" charset="0"/>
+              <a:ea typeface="+mj-ea"/>
+              <a:cs typeface="+mj-cs"/>
+            </a:endParaRPr>
+          </a:p>
+          <a:p>
+            <a:r>
+              <a:rPr lang="fr-FR" sz="4000">
+                <a:solidFill>
+                  <a:srgbClr val="0070C0"/>
+                </a:solidFill>
+                <a:latin typeface="Consolas" panose="020B0609020204030204" pitchFamily="49" charset="0"/>
+                <a:ea typeface="+mj-ea"/>
+                <a:cs typeface="+mj-cs"/>
+                <a:hlinkClick r:id="rId3"/>
+              </a:rPr>
+              <a:t>http://localhost:8080/medicalRecord</a:t>
+            </a:r>
+            <a:endParaRPr lang="fr-FR" sz="4000">
+              <a:solidFill>
+                <a:srgbClr val="0070C0"/>
+              </a:solidFill>
+              <a:latin typeface="Consolas" panose="020B0609020204030204" pitchFamily="49" charset="0"/>
+              <a:ea typeface="+mj-ea"/>
+              <a:cs typeface="+mj-cs"/>
+            </a:endParaRPr>
+          </a:p>
+          <a:p>
+            <a:endParaRPr lang="fr-FR" sz="4000">
+              <a:solidFill>
+                <a:srgbClr val="0070C0"/>
+              </a:solidFill>
+              <a:latin typeface="Consolas" panose="020B0609020204030204" pitchFamily="49" charset="0"/>
+              <a:ea typeface="+mj-ea"/>
+              <a:cs typeface="+mj-cs"/>
+            </a:endParaRPr>
+          </a:p>
+          <a:p>
+            <a:pPr marL="0" indent="0">
+              <a:buNone/>
             </a:pPr>
-            <a:endParaRPr lang="fr-FR"/>
-          </a:p>
-          <a:p>
-            <a:pPr marL="365125" indent="-365125">
-              <a:spcAft>
-                <a:spcPts val="1200"/>
-              </a:spcAft>
-              <a:buFont typeface="Wingdings" panose="05000000000000000000" pitchFamily="2" charset="2"/>
-              <a:buChar char="Ø"/>
-            </a:pPr>
-            <a:r>
-              <a:rPr lang="fr-FR"/>
-              <a:t>Cette url doit retourner une liste d'enfants (âge &lt;= 18 ans) habitant à cette adresse.</a:t>
-            </a:r>
-          </a:p>
-          <a:p>
-            <a:pPr marL="365125" indent="-365125">
-              <a:spcAft>
-                <a:spcPts val="1200"/>
-              </a:spcAft>
-              <a:buFont typeface="Wingdings" panose="05000000000000000000" pitchFamily="2" charset="2"/>
-              <a:buChar char="Ø"/>
-            </a:pPr>
-            <a:r>
-              <a:rPr lang="fr-FR"/>
-              <a:t>S'il n'y a pas d'enfant, cette url peut renvoyer une chaîne vide</a:t>
-            </a:r>
-          </a:p>
-          <a:p>
-            <a:pPr marL="365125" indent="-365125">
-              <a:spcAft>
-                <a:spcPts val="1200"/>
-              </a:spcAft>
-              <a:buFont typeface="Wingdings" panose="05000000000000000000" pitchFamily="2" charset="2"/>
-              <a:buChar char="Ø"/>
-            </a:pPr>
-            <a:r>
-              <a:rPr lang="fr-FR"/>
-              <a:t>Sont précisés par enfant : prénom, nom, âge, liste des adultes</a:t>
-            </a:r>
+            <a:r>
+              <a:rPr lang="fr-FR" sz="4000">
+                <a:latin typeface="Consolas" panose="020B0609020204030204" pitchFamily="49" charset="0"/>
+                <a:ea typeface="+mj-ea"/>
+                <a:cs typeface="+mj-cs"/>
+              </a:rPr>
+              <a:t>Cf tests unitaires des controlleurs et services</a:t>
+            </a:r>
+          </a:p>
+          <a:p>
+            <a:endParaRPr lang="fr-FR" sz="4000">
+              <a:solidFill>
+                <a:srgbClr val="0070C0"/>
+              </a:solidFill>
+              <a:latin typeface="Consolas" panose="020B0609020204030204" pitchFamily="49" charset="0"/>
+              <a:ea typeface="+mj-ea"/>
+              <a:cs typeface="+mj-cs"/>
+            </a:endParaRPr>
           </a:p>
         </p:txBody>
       </p:sp>
@@ -5863,7 +6051,7 @@
           <p:cNvPr id="4" name="Espace réservé du numéro de diapositive 3">
             <a:extLst>
               <a:ext uri="{FF2B5EF4-FFF2-40B4-BE49-F238E27FC236}">
-                <a16:creationId xmlns:a16="http://schemas.microsoft.com/office/drawing/2014/main" id="{CE404544-46A4-47E3-ABC8-EAD4F49196F5}"/>
+                <a16:creationId xmlns:a16="http://schemas.microsoft.com/office/drawing/2014/main" id="{6DD4B35E-4FFC-C361-F788-DDCA22E8B6A0}"/>
               </a:ext>
             </a:extLst>
           </p:cNvPr>
@@ -5880,25 +6068,17 @@
           <a:lstStyle/>
           <a:p>
             <a:fld id="{504562DC-6A68-4B1A-ACD4-40BBA2BD5EE0}" type="slidenum">
-              <a:rPr lang="fr-FR" smtClean="0">
-                <a:solidFill>
-                  <a:schemeClr val="tx1"/>
-                </a:solidFill>
-              </a:rPr>
+              <a:rPr lang="fr-FR" smtClean="0"/>
               <a:t>14</a:t>
             </a:fld>
-            <a:endParaRPr lang="fr-FR" dirty="0">
-              <a:solidFill>
-                <a:schemeClr val="tx1"/>
-              </a:solidFill>
-            </a:endParaRPr>
+            <a:endParaRPr lang="fr-FR"/>
           </a:p>
         </p:txBody>
       </p:sp>
     </p:spTree>
     <p:extLst>
       <p:ext uri="{BB962C8B-B14F-4D97-AF65-F5344CB8AC3E}">
-        <p14:creationId xmlns:p14="http://schemas.microsoft.com/office/powerpoint/2010/main" val="2679787578"/>
+        <p14:creationId xmlns:p14="http://schemas.microsoft.com/office/powerpoint/2010/main" val="406801394"/>
       </p:ext>
     </p:extLst>
   </p:cSld>
@@ -5925,41 +6105,116 @@
           <a:chExt cx="0" cy="0"/>
         </a:xfrm>
       </p:grpSpPr>
-      <p:pic>
-        <p:nvPicPr>
-          <p:cNvPr id="6" name="Espace réservé du contenu 5">
-            <a:extLst>
-              <a:ext uri="{FF2B5EF4-FFF2-40B4-BE49-F238E27FC236}">
-                <a16:creationId xmlns:a16="http://schemas.microsoft.com/office/drawing/2014/main" id="{4CA11B9D-36C5-74C2-41D4-9A3E08DF477B}"/>
-              </a:ext>
-            </a:extLst>
-          </p:cNvPr>
-          <p:cNvPicPr>
-            <a:picLocks noGrp="1" noChangeAspect="1"/>
-          </p:cNvPicPr>
+      <p:sp>
+        <p:nvSpPr>
+          <p:cNvPr id="2" name="Titre 1">
+            <a:extLst>
+              <a:ext uri="{FF2B5EF4-FFF2-40B4-BE49-F238E27FC236}">
+                <a16:creationId xmlns:a16="http://schemas.microsoft.com/office/drawing/2014/main" id="{3AB65E76-F488-117C-AD71-8DDCB83DA55E}"/>
+              </a:ext>
+            </a:extLst>
+          </p:cNvPr>
+          <p:cNvSpPr>
+            <a:spLocks noGrp="1"/>
+          </p:cNvSpPr>
+          <p:nvPr>
+            <p:ph type="title"/>
+          </p:nvPr>
+        </p:nvSpPr>
+        <p:spPr/>
+        <p:txBody>
+          <a:bodyPr/>
+          <a:lstStyle/>
+          <a:p>
+            <a:r>
+              <a:rPr lang="fr-FR"/>
+              <a:t>Tout est enrgistré en log :</a:t>
+            </a:r>
+            <a:br>
+              <a:rPr lang="fr-FR"/>
+            </a:br>
+            <a:r>
+              <a:rPr lang="fr-FR"/>
+              <a:t>informations au démarrage</a:t>
+            </a:r>
+          </a:p>
+        </p:txBody>
+      </p:sp>
+      <p:sp>
+        <p:nvSpPr>
+          <p:cNvPr id="3" name="Espace réservé du contenu 2">
+            <a:extLst>
+              <a:ext uri="{FF2B5EF4-FFF2-40B4-BE49-F238E27FC236}">
+                <a16:creationId xmlns:a16="http://schemas.microsoft.com/office/drawing/2014/main" id="{3D2ED908-141F-B216-297F-0457B348EF90}"/>
+              </a:ext>
+            </a:extLst>
+          </p:cNvPr>
+          <p:cNvSpPr>
+            <a:spLocks noGrp="1"/>
+          </p:cNvSpPr>
           <p:nvPr>
             <p:ph idx="1"/>
           </p:nvPr>
-        </p:nvPicPr>
-        <p:blipFill>
-          <a:blip r:embed="rId2"/>
-          <a:stretch>
-            <a:fillRect/>
-          </a:stretch>
-        </p:blipFill>
-        <p:spPr>
-          <a:xfrm>
-            <a:off x="2338161" y="169167"/>
-            <a:ext cx="7515677" cy="6519665"/>
-          </a:xfrm>
-        </p:spPr>
-      </p:pic>
+        </p:nvSpPr>
+        <p:spPr/>
+        <p:txBody>
+          <a:bodyPr>
+            <a:normAutofit fontScale="77500" lnSpcReduction="20000"/>
+          </a:bodyPr>
+          <a:lstStyle/>
+          <a:p>
+            <a:r>
+              <a:rPr lang="fr-FR"/>
+              <a:t>2022-10-04 12:51:34,718 DEBUG c.s.a.r.GetFromFileImpl [main] read entity persons from file</a:t>
+            </a:r>
+          </a:p>
+          <a:p>
+            <a:r>
+              <a:rPr lang="fr-FR"/>
+              <a:t>2022-10-04 12:51:35,410 DEBUG c.s.a.r.JsonRepositoryImpl [main] persons Map filled and in IoC</a:t>
+            </a:r>
+          </a:p>
+          <a:p>
+            <a:r>
+              <a:rPr lang="fr-FR"/>
+              <a:t>2022-10-04 12:51:35,411 DEBUG c.s.a.r.GetFromFileImpl [main] read entity firestations from file</a:t>
+            </a:r>
+          </a:p>
+          <a:p>
+            <a:r>
+              <a:rPr lang="fr-FR"/>
+              <a:t>2022-10-04 12:51:35,460 DEBUG c.s.a.r.JsonRepositoryImpl [main] firestations Map filled and in IoC</a:t>
+            </a:r>
+          </a:p>
+          <a:p>
+            <a:r>
+              <a:rPr lang="fr-FR"/>
+              <a:t>2022-10-04 12:51:35,460 DEBUG c.s.a.r.GetFromFileImpl [main] read entity medicalrecords from file</a:t>
+            </a:r>
+          </a:p>
+          <a:p>
+            <a:r>
+              <a:rPr lang="fr-FR"/>
+              <a:t>2022-10-04 12:51:35,576 DEBUG c.s.a.r.JsonRepositoryImpl [main] medicalrecords Map filled and in IoC</a:t>
+            </a:r>
+          </a:p>
+          <a:p>
+            <a:r>
+              <a:rPr lang="fr-FR"/>
+              <a:t>2022-10-04 12:51:35,580 DEBUG c.s.a.r.JsonRepositoryImpl [main] medicalrecords attached to persons</a:t>
+            </a:r>
+          </a:p>
+          <a:p>
+            <a:endParaRPr lang="fr-FR"/>
+          </a:p>
+        </p:txBody>
+      </p:sp>
       <p:sp>
         <p:nvSpPr>
           <p:cNvPr id="4" name="Espace réservé du numéro de diapositive 3">
             <a:extLst>
               <a:ext uri="{FF2B5EF4-FFF2-40B4-BE49-F238E27FC236}">
-                <a16:creationId xmlns:a16="http://schemas.microsoft.com/office/drawing/2014/main" id="{B93D9683-4E0F-FD8C-B7B6-3FF487ACAF98}"/>
+                <a16:creationId xmlns:a16="http://schemas.microsoft.com/office/drawing/2014/main" id="{B04F7DBD-EBE3-E59F-D170-FF1BF72FFA2F}"/>
               </a:ext>
             </a:extLst>
           </p:cNvPr>
@@ -5986,7 +6241,7 @@
     </p:spTree>
     <p:extLst>
       <p:ext uri="{BB962C8B-B14F-4D97-AF65-F5344CB8AC3E}">
-        <p14:creationId xmlns:p14="http://schemas.microsoft.com/office/powerpoint/2010/main" val="2321609572"/>
+        <p14:creationId xmlns:p14="http://schemas.microsoft.com/office/powerpoint/2010/main" val="1588569003"/>
       </p:ext>
     </p:extLst>
   </p:cSld>
@@ -6013,21 +6268,76 @@
           <a:chExt cx="0" cy="0"/>
         </a:xfrm>
       </p:grpSpPr>
+      <p:sp>
+        <p:nvSpPr>
+          <p:cNvPr id="2" name="Titre 1">
+            <a:extLst>
+              <a:ext uri="{FF2B5EF4-FFF2-40B4-BE49-F238E27FC236}">
+                <a16:creationId xmlns:a16="http://schemas.microsoft.com/office/drawing/2014/main" id="{834270EC-2139-2720-A7D0-F6FA9AB9B8BC}"/>
+              </a:ext>
+            </a:extLst>
+          </p:cNvPr>
+          <p:cNvSpPr>
+            <a:spLocks noGrp="1"/>
+          </p:cNvSpPr>
+          <p:nvPr>
+            <p:ph type="title"/>
+          </p:nvPr>
+        </p:nvSpPr>
+        <p:spPr/>
+        <p:txBody>
+          <a:bodyPr/>
+          <a:lstStyle/>
+          <a:p>
+            <a:r>
+              <a:rPr lang="fr-FR"/>
+              <a:t>Couverture Jacoco</a:t>
+            </a:r>
+          </a:p>
+        </p:txBody>
+      </p:sp>
+      <p:sp>
+        <p:nvSpPr>
+          <p:cNvPr id="4" name="Espace réservé du numéro de diapositive 3">
+            <a:extLst>
+              <a:ext uri="{FF2B5EF4-FFF2-40B4-BE49-F238E27FC236}">
+                <a16:creationId xmlns:a16="http://schemas.microsoft.com/office/drawing/2014/main" id="{3FE83BBB-A6AB-ECA0-62C7-3B1DF38BA2AF}"/>
+              </a:ext>
+            </a:extLst>
+          </p:cNvPr>
+          <p:cNvSpPr>
+            <a:spLocks noGrp="1"/>
+          </p:cNvSpPr>
+          <p:nvPr>
+            <p:ph type="sldNum" sz="quarter" idx="12"/>
+          </p:nvPr>
+        </p:nvSpPr>
+        <p:spPr/>
+        <p:txBody>
+          <a:bodyPr/>
+          <a:lstStyle/>
+          <a:p>
+            <a:fld id="{504562DC-6A68-4B1A-ACD4-40BBA2BD5EE0}" type="slidenum">
+              <a:rPr lang="fr-FR" smtClean="0"/>
+              <a:t>16</a:t>
+            </a:fld>
+            <a:endParaRPr lang="fr-FR"/>
+          </a:p>
+        </p:txBody>
+      </p:sp>
       <p:pic>
         <p:nvPicPr>
-          <p:cNvPr id="6" name="Espace réservé du contenu 5">
-            <a:extLst>
-              <a:ext uri="{FF2B5EF4-FFF2-40B4-BE49-F238E27FC236}">
-                <a16:creationId xmlns:a16="http://schemas.microsoft.com/office/drawing/2014/main" id="{3F7EA374-AC7E-B36C-C0E9-04CFC8B4DD17}"/>
+          <p:cNvPr id="6" name="Image 5">
+            <a:extLst>
+              <a:ext uri="{FF2B5EF4-FFF2-40B4-BE49-F238E27FC236}">
+                <a16:creationId xmlns:a16="http://schemas.microsoft.com/office/drawing/2014/main" id="{8625F893-2E6E-2EE1-27FD-D9D6D782D849}"/>
               </a:ext>
             </a:extLst>
           </p:cNvPr>
           <p:cNvPicPr>
-            <a:picLocks noGrp="1" noChangeAspect="1"/>
+            <a:picLocks noChangeAspect="1"/>
           </p:cNvPicPr>
-          <p:nvPr>
-            <p:ph idx="1"/>
-          </p:nvPr>
+          <p:nvPr/>
         </p:nvPicPr>
         <p:blipFill>
           <a:blip r:embed="rId2"/>
@@ -6037,64 +6347,8 @@
         </p:blipFill>
         <p:spPr>
           <a:xfrm>
-            <a:off x="2594368" y="136525"/>
-            <a:ext cx="7003263" cy="3227665"/>
-          </a:xfrm>
-        </p:spPr>
-      </p:pic>
-      <p:sp>
-        <p:nvSpPr>
-          <p:cNvPr id="4" name="Espace réservé du numéro de diapositive 3">
-            <a:extLst>
-              <a:ext uri="{FF2B5EF4-FFF2-40B4-BE49-F238E27FC236}">
-                <a16:creationId xmlns:a16="http://schemas.microsoft.com/office/drawing/2014/main" id="{4CD46F40-EC24-8D13-EE54-C7D193B6B04B}"/>
-              </a:ext>
-            </a:extLst>
-          </p:cNvPr>
-          <p:cNvSpPr>
-            <a:spLocks noGrp="1"/>
-          </p:cNvSpPr>
-          <p:nvPr>
-            <p:ph type="sldNum" sz="quarter" idx="12"/>
-          </p:nvPr>
-        </p:nvSpPr>
-        <p:spPr/>
-        <p:txBody>
-          <a:bodyPr/>
-          <a:lstStyle/>
-          <a:p>
-            <a:fld id="{504562DC-6A68-4B1A-ACD4-40BBA2BD5EE0}" type="slidenum">
-              <a:rPr lang="fr-FR" smtClean="0"/>
-              <a:t>16</a:t>
-            </a:fld>
-            <a:endParaRPr lang="fr-FR"/>
-          </a:p>
-        </p:txBody>
-      </p:sp>
-      <p:pic>
-        <p:nvPicPr>
-          <p:cNvPr id="8" name="Image 7">
-            <a:extLst>
-              <a:ext uri="{FF2B5EF4-FFF2-40B4-BE49-F238E27FC236}">
-                <a16:creationId xmlns:a16="http://schemas.microsoft.com/office/drawing/2014/main" id="{476FBF43-FFA1-7DA9-1A16-7DD5DC422371}"/>
-              </a:ext>
-            </a:extLst>
-          </p:cNvPr>
-          <p:cNvPicPr>
-            <a:picLocks noChangeAspect="1"/>
-          </p:cNvPicPr>
-          <p:nvPr/>
-        </p:nvPicPr>
-        <p:blipFill>
-          <a:blip r:embed="rId3"/>
-          <a:stretch>
-            <a:fillRect/>
-          </a:stretch>
-        </p:blipFill>
-        <p:spPr>
-          <a:xfrm>
-            <a:off x="2594368" y="3390785"/>
-            <a:ext cx="7040611" cy="3227665"/>
+            <a:off x="832703" y="2100077"/>
+            <a:ext cx="10526594" cy="2657846"/>
           </a:xfrm>
           <a:prstGeom prst="rect">
             <a:avLst/>
@@ -6104,7 +6358,7 @@
     </p:spTree>
     <p:extLst>
       <p:ext uri="{BB962C8B-B14F-4D97-AF65-F5344CB8AC3E}">
-        <p14:creationId xmlns:p14="http://schemas.microsoft.com/office/powerpoint/2010/main" val="984150916"/>
+        <p14:creationId xmlns:p14="http://schemas.microsoft.com/office/powerpoint/2010/main" val="2915237998"/>
       </p:ext>
     </p:extLst>
   </p:cSld>
@@ -6136,7 +6390,7 @@
           <p:cNvPr id="2" name="Titre 1">
             <a:extLst>
               <a:ext uri="{FF2B5EF4-FFF2-40B4-BE49-F238E27FC236}">
-                <a16:creationId xmlns:a16="http://schemas.microsoft.com/office/drawing/2014/main" id="{71B8B1D2-694D-4124-BFA6-F2C501B35109}"/>
+                <a16:creationId xmlns:a16="http://schemas.microsoft.com/office/drawing/2014/main" id="{25404BD3-8D1B-83BD-54B3-545383B626B0}"/>
               </a:ext>
             </a:extLst>
           </p:cNvPr>
@@ -6147,126 +6401,177 @@
             <p:ph type="title"/>
           </p:nvPr>
         </p:nvSpPr>
-        <p:spPr>
-          <a:xfrm>
-            <a:off x="698091" y="365125"/>
-            <a:ext cx="10776154" cy="1325563"/>
-          </a:xfrm>
-        </p:spPr>
-        <p:txBody>
-          <a:bodyPr/>
-          <a:lstStyle/>
-          <a:p>
-            <a:pPr marL="0" indent="0" algn="ctr" defTabSz="360000">
-              <a:spcBef>
-                <a:spcPts val="0"/>
-              </a:spcBef>
-              <a:buNone/>
+        <p:spPr/>
+        <p:txBody>
+          <a:bodyPr/>
+          <a:lstStyle/>
+          <a:p>
+            <a:r>
+              <a:rPr lang="fr-FR"/>
+              <a:t>Cycle maven</a:t>
+            </a:r>
+          </a:p>
+        </p:txBody>
+      </p:sp>
+      <p:sp>
+        <p:nvSpPr>
+          <p:cNvPr id="3" name="Espace réservé du contenu 2">
+            <a:extLst>
+              <a:ext uri="{FF2B5EF4-FFF2-40B4-BE49-F238E27FC236}">
+                <a16:creationId xmlns:a16="http://schemas.microsoft.com/office/drawing/2014/main" id="{A9232929-3496-E2F4-6F9F-9A438D8A0BFF}"/>
+              </a:ext>
+            </a:extLst>
+          </p:cNvPr>
+          <p:cNvSpPr>
+            <a:spLocks noGrp="1"/>
+          </p:cNvSpPr>
+          <p:nvPr>
+            <p:ph idx="1"/>
+          </p:nvPr>
+        </p:nvSpPr>
+        <p:spPr/>
+        <p:txBody>
+          <a:bodyPr>
+            <a:normAutofit fontScale="92500" lnSpcReduction="10000"/>
+          </a:bodyPr>
+          <a:lstStyle/>
+          <a:p>
+            <a:pPr algn="l">
+              <a:buFont typeface="Arial" panose="020B0604020202020204" pitchFamily="34" charset="0"/>
+              <a:buChar char="•"/>
             </a:pPr>
             <a:r>
-              <a:rPr lang="en-US" sz="4400">
+              <a:rPr lang="fr-FR" b="0" i="0">
                 <a:solidFill>
-                  <a:srgbClr val="0070C0"/>
+                  <a:srgbClr val="24292F"/>
                 </a:solidFill>
-                <a:latin typeface="Consolas" panose="020B0609020204030204" pitchFamily="49" charset="0"/>
+                <a:effectLst/>
+                <a:latin typeface="-apple-system"/>
               </a:rPr>
-              <a:t>http://localhost:8080/fire?address=&lt;address&gt;</a:t>
-            </a:r>
-            <a:endParaRPr lang="fr-FR" sz="4400" dirty="0">
-              <a:solidFill>
-                <a:srgbClr val="0070C0"/>
-              </a:solidFill>
-              <a:latin typeface="Consolas" panose="020B0609020204030204" pitchFamily="49" charset="0"/>
-            </a:endParaRPr>
-          </a:p>
-        </p:txBody>
-      </p:sp>
-      <p:sp>
-        <p:nvSpPr>
-          <p:cNvPr id="3" name="Espace réservé du contenu 2">
-            <a:extLst>
-              <a:ext uri="{FF2B5EF4-FFF2-40B4-BE49-F238E27FC236}">
-                <a16:creationId xmlns:a16="http://schemas.microsoft.com/office/drawing/2014/main" id="{7C9B0652-5A35-430D-A916-25405324295F}"/>
-              </a:ext>
-            </a:extLst>
-          </p:cNvPr>
-          <p:cNvSpPr>
-            <a:spLocks noGrp="1"/>
-          </p:cNvSpPr>
-          <p:nvPr>
-            <p:ph idx="1"/>
-          </p:nvPr>
-        </p:nvSpPr>
-        <p:spPr>
-          <a:xfrm>
-            <a:off x="838200" y="1690689"/>
-            <a:ext cx="10515600" cy="4486274"/>
-          </a:xfrm>
-        </p:spPr>
-        <p:txBody>
-          <a:bodyPr>
-            <a:normAutofit/>
-          </a:bodyPr>
-          <a:lstStyle/>
-          <a:p>
-            <a:pPr marL="365125" indent="-365125">
-              <a:spcAft>
-                <a:spcPts val="1200"/>
-              </a:spcAft>
-              <a:buFont typeface="Wingdings" panose="05000000000000000000" pitchFamily="2" charset="2"/>
-              <a:buChar char="Ø"/>
+              <a:t>$ mvn clean → clean ./target</a:t>
+            </a:r>
+          </a:p>
+          <a:p>
+            <a:pPr algn="l">
+              <a:buFont typeface="Arial" panose="020B0604020202020204" pitchFamily="34" charset="0"/>
+              <a:buChar char="•"/>
             </a:pPr>
+            <a:r>
+              <a:rPr lang="fr-FR" b="0" i="0">
+                <a:solidFill>
+                  <a:srgbClr val="24292F"/>
+                </a:solidFill>
+                <a:effectLst/>
+                <a:latin typeface="-apple-system"/>
+              </a:rPr>
+              <a:t>$ mvn test → run Unit Tests</a:t>
+            </a:r>
+          </a:p>
+          <a:p>
+            <a:pPr algn="l">
+              <a:buFont typeface="Arial" panose="020B0604020202020204" pitchFamily="34" charset="0"/>
+              <a:buChar char="•"/>
+            </a:pPr>
+            <a:r>
+              <a:rPr lang="fr-FR" b="0" i="0">
+                <a:solidFill>
+                  <a:srgbClr val="24292F"/>
+                </a:solidFill>
+                <a:effectLst/>
+                <a:latin typeface="-apple-system"/>
+              </a:rPr>
+              <a:t>$ mvn verify → run Unit Tests, SIT and AIT</a:t>
+            </a:r>
+          </a:p>
+          <a:p>
+            <a:pPr algn="l">
+              <a:buFont typeface="Arial" panose="020B0604020202020204" pitchFamily="34" charset="0"/>
+              <a:buChar char="•"/>
+            </a:pPr>
+            <a:r>
+              <a:rPr lang="fr-FR" b="0" i="0">
+                <a:solidFill>
+                  <a:srgbClr val="24292F"/>
+                </a:solidFill>
+                <a:effectLst/>
+                <a:latin typeface="-apple-system"/>
+              </a:rPr>
+              <a:t>$ mvn package → build .jar + Jacoco report in ./target/site/jacoco/index.html</a:t>
+            </a:r>
+            <a:br>
+              <a:rPr lang="fr-FR" b="0" i="0">
+                <a:solidFill>
+                  <a:srgbClr val="24292F"/>
+                </a:solidFill>
+                <a:effectLst/>
+                <a:latin typeface="-apple-system"/>
+              </a:rPr>
+            </a:br>
+            <a:r>
+              <a:rPr lang="fr-FR" b="0" i="0">
+                <a:solidFill>
+                  <a:srgbClr val="24292F"/>
+                </a:solidFill>
+                <a:effectLst/>
+                <a:latin typeface="-apple-system"/>
+              </a:rPr>
+              <a:t>(run : $ java -jar target/alerts-0.0.1-SNAPSHOT.jar)</a:t>
+            </a:r>
+          </a:p>
+          <a:p>
+            <a:pPr algn="l">
+              <a:buFont typeface="Arial" panose="020B0604020202020204" pitchFamily="34" charset="0"/>
+              <a:buChar char="•"/>
+            </a:pPr>
+            <a:r>
+              <a:rPr lang="fr-FR" b="0" i="0">
+                <a:solidFill>
+                  <a:srgbClr val="24292F"/>
+                </a:solidFill>
+                <a:effectLst/>
+                <a:latin typeface="-apple-system"/>
+              </a:rPr>
+              <a:t>$ mvn site → put project reports in ./target/site/index.html</a:t>
+            </a:r>
+            <a:br>
+              <a:rPr lang="fr-FR" b="0" i="0">
+                <a:solidFill>
+                  <a:srgbClr val="24292F"/>
+                </a:solidFill>
+                <a:effectLst/>
+                <a:latin typeface="-apple-system"/>
+              </a:rPr>
+            </a:br>
+            <a:r>
+              <a:rPr lang="fr-FR" b="0" i="0">
+                <a:solidFill>
+                  <a:srgbClr val="24292F"/>
+                </a:solidFill>
+                <a:effectLst/>
+                <a:latin typeface="-apple-system"/>
+              </a:rPr>
+              <a:t>( JavaDocs, SpotBugs, Surefire &amp; Failsafe Reports, Jacoco &amp; JaCoCo IT Reports)</a:t>
+            </a:r>
+          </a:p>
+          <a:p>
+            <a:pPr algn="l">
+              <a:buFont typeface="Arial" panose="020B0604020202020204" pitchFamily="34" charset="0"/>
+              <a:buChar char="•"/>
+            </a:pPr>
+            <a:r>
+              <a:rPr lang="fr-FR" b="0" i="0">
+                <a:solidFill>
+                  <a:srgbClr val="24292F"/>
+                </a:solidFill>
+                <a:effectLst/>
+                <a:latin typeface="-apple-system"/>
+              </a:rPr>
+              <a:t>$ mvn surefire-report:report → surefire report in ./target/site/ surefire-report</a:t>
+            </a:r>
+          </a:p>
+          <a:p>
             <a:endParaRPr lang="fr-FR"/>
           </a:p>
-          <a:p>
-            <a:pPr marL="365125" indent="-365125">
-              <a:spcAft>
-                <a:spcPts val="1200"/>
-              </a:spcAft>
-              <a:buFont typeface="Wingdings" panose="05000000000000000000" pitchFamily="2" charset="2"/>
-              <a:buChar char="Ø"/>
-            </a:pPr>
-            <a:r>
-              <a:rPr lang="fr-FR"/>
-              <a:t>Cette </a:t>
-            </a:r>
-            <a:r>
-              <a:rPr lang="fr-FR" dirty="0"/>
-              <a:t>url doit retourner la liste des habitants vivant à l’adresse donnée ainsi que le numéro de la caserne de pompiers la desservant</a:t>
-            </a:r>
-          </a:p>
-          <a:p>
-            <a:pPr marL="365125" indent="-365125">
-              <a:spcAft>
-                <a:spcPts val="1200"/>
-              </a:spcAft>
-              <a:buFont typeface="Wingdings" panose="05000000000000000000" pitchFamily="2" charset="2"/>
-              <a:buChar char="Ø"/>
-            </a:pPr>
-            <a:endParaRPr lang="fr-FR" dirty="0"/>
-          </a:p>
-          <a:p>
-            <a:pPr marL="365125" indent="-365125">
-              <a:spcAft>
-                <a:spcPts val="1200"/>
-              </a:spcAft>
-              <a:buFont typeface="Wingdings" panose="05000000000000000000" pitchFamily="2" charset="2"/>
-              <a:buChar char="Ø"/>
-            </a:pPr>
-            <a:r>
-              <a:rPr lang="fr-FR"/>
-              <a:t>Sont précisés par habitant : nom</a:t>
-            </a:r>
-            <a:r>
-              <a:rPr lang="fr-FR" dirty="0"/>
-              <a:t>, numéro de téléphone, âge </a:t>
-            </a:r>
-            <a:r>
-              <a:rPr lang="fr-FR"/>
-              <a:t>et antécédents médicaux</a:t>
-            </a:r>
-            <a:endParaRPr lang="fr-FR" dirty="0"/>
-          </a:p>
         </p:txBody>
       </p:sp>
       <p:sp>
@@ -6274,7 +6579,7 @@
           <p:cNvPr id="4" name="Espace réservé du numéro de diapositive 3">
             <a:extLst>
               <a:ext uri="{FF2B5EF4-FFF2-40B4-BE49-F238E27FC236}">
-                <a16:creationId xmlns:a16="http://schemas.microsoft.com/office/drawing/2014/main" id="{CE404544-46A4-47E3-ABC8-EAD4F49196F5}"/>
+                <a16:creationId xmlns:a16="http://schemas.microsoft.com/office/drawing/2014/main" id="{6DE72E73-A97E-57EB-3B3A-17C24C43760B}"/>
               </a:ext>
             </a:extLst>
           </p:cNvPr>
@@ -6291,25 +6596,17 @@
           <a:lstStyle/>
           <a:p>
             <a:fld id="{504562DC-6A68-4B1A-ACD4-40BBA2BD5EE0}" type="slidenum">
-              <a:rPr lang="fr-FR" smtClean="0">
-                <a:solidFill>
-                  <a:schemeClr val="tx1"/>
-                </a:solidFill>
-              </a:rPr>
+              <a:rPr lang="fr-FR" smtClean="0"/>
               <a:t>17</a:t>
             </a:fld>
-            <a:endParaRPr lang="fr-FR" dirty="0">
-              <a:solidFill>
-                <a:schemeClr val="tx1"/>
-              </a:solidFill>
-            </a:endParaRPr>
+            <a:endParaRPr lang="fr-FR"/>
           </a:p>
         </p:txBody>
       </p:sp>
     </p:spTree>
     <p:extLst>
       <p:ext uri="{BB962C8B-B14F-4D97-AF65-F5344CB8AC3E}">
-        <p14:creationId xmlns:p14="http://schemas.microsoft.com/office/powerpoint/2010/main" val="640475224"/>
+        <p14:creationId xmlns:p14="http://schemas.microsoft.com/office/powerpoint/2010/main" val="4169648522"/>
       </p:ext>
     </p:extLst>
   </p:cSld>
@@ -6336,41 +6633,62 @@
           <a:chExt cx="0" cy="0"/>
         </a:xfrm>
       </p:grpSpPr>
-      <p:pic>
-        <p:nvPicPr>
-          <p:cNvPr id="6" name="Espace réservé du contenu 5">
-            <a:extLst>
-              <a:ext uri="{FF2B5EF4-FFF2-40B4-BE49-F238E27FC236}">
-                <a16:creationId xmlns:a16="http://schemas.microsoft.com/office/drawing/2014/main" id="{7CDB9E6D-826D-A4B0-2814-E7A1A4B0E03B}"/>
-              </a:ext>
-            </a:extLst>
-          </p:cNvPr>
-          <p:cNvPicPr>
-            <a:picLocks noGrp="1" noChangeAspect="1"/>
-          </p:cNvPicPr>
+      <p:sp>
+        <p:nvSpPr>
+          <p:cNvPr id="2" name="Titre 1">
+            <a:extLst>
+              <a:ext uri="{FF2B5EF4-FFF2-40B4-BE49-F238E27FC236}">
+                <a16:creationId xmlns:a16="http://schemas.microsoft.com/office/drawing/2014/main" id="{79D730C2-A494-36C1-41BD-32303E5DFF66}"/>
+              </a:ext>
+            </a:extLst>
+          </p:cNvPr>
+          <p:cNvSpPr>
+            <a:spLocks noGrp="1"/>
+          </p:cNvSpPr>
+          <p:nvPr>
+            <p:ph type="title"/>
+          </p:nvPr>
+        </p:nvSpPr>
+        <p:spPr/>
+        <p:txBody>
+          <a:bodyPr/>
+          <a:lstStyle/>
+          <a:p>
+            <a:endParaRPr lang="fr-FR"/>
+          </a:p>
+        </p:txBody>
+      </p:sp>
+      <p:sp>
+        <p:nvSpPr>
+          <p:cNvPr id="3" name="Espace réservé du contenu 2">
+            <a:extLst>
+              <a:ext uri="{FF2B5EF4-FFF2-40B4-BE49-F238E27FC236}">
+                <a16:creationId xmlns:a16="http://schemas.microsoft.com/office/drawing/2014/main" id="{0A2D3939-C173-258D-164B-DF7741BDB3F5}"/>
+              </a:ext>
+            </a:extLst>
+          </p:cNvPr>
+          <p:cNvSpPr>
+            <a:spLocks noGrp="1"/>
+          </p:cNvSpPr>
           <p:nvPr>
             <p:ph idx="1"/>
           </p:nvPr>
-        </p:nvPicPr>
-        <p:blipFill>
-          <a:blip r:embed="rId2"/>
-          <a:stretch>
-            <a:fillRect/>
-          </a:stretch>
-        </p:blipFill>
-        <p:spPr>
-          <a:xfrm>
-            <a:off x="2389597" y="190963"/>
-            <a:ext cx="7412805" cy="6476073"/>
-          </a:xfrm>
-        </p:spPr>
-      </p:pic>
+        </p:nvSpPr>
+        <p:spPr/>
+        <p:txBody>
+          <a:bodyPr/>
+          <a:lstStyle/>
+          <a:p>
+            <a:endParaRPr lang="fr-FR"/>
+          </a:p>
+        </p:txBody>
+      </p:sp>
       <p:sp>
         <p:nvSpPr>
           <p:cNvPr id="4" name="Espace réservé du numéro de diapositive 3">
             <a:extLst>
               <a:ext uri="{FF2B5EF4-FFF2-40B4-BE49-F238E27FC236}">
-                <a16:creationId xmlns:a16="http://schemas.microsoft.com/office/drawing/2014/main" id="{177114E3-291B-9711-FB74-F552130AFD6F}"/>
+                <a16:creationId xmlns:a16="http://schemas.microsoft.com/office/drawing/2014/main" id="{5BD69E2F-31F3-C73F-15F2-B7A34CA97557}"/>
               </a:ext>
             </a:extLst>
           </p:cNvPr>
@@ -6397,126 +6715,7 @@
     </p:spTree>
     <p:extLst>
       <p:ext uri="{BB962C8B-B14F-4D97-AF65-F5344CB8AC3E}">
-        <p14:creationId xmlns:p14="http://schemas.microsoft.com/office/powerpoint/2010/main" val="3000209433"/>
-      </p:ext>
-    </p:extLst>
-  </p:cSld>
-  <p:clrMapOvr>
-    <a:masterClrMapping/>
-  </p:clrMapOvr>
-</p:sld>
-</file>
-
-<file path=ppt/slides/slide19.xml><?xml version="1.0" encoding="utf-8"?>
-<p:sld xmlns:a="http://schemas.openxmlformats.org/drawingml/2006/main" xmlns:r="http://schemas.openxmlformats.org/officeDocument/2006/relationships" xmlns:p="http://schemas.openxmlformats.org/presentationml/2006/main">
-  <p:cSld>
-    <p:spTree>
-      <p:nvGrpSpPr>
-        <p:cNvPr id="1" name=""/>
-        <p:cNvGrpSpPr/>
-        <p:nvPr/>
-      </p:nvGrpSpPr>
-      <p:grpSpPr>
-        <a:xfrm>
-          <a:off x="0" y="0"/>
-          <a:ext cx="0" cy="0"/>
-          <a:chOff x="0" y="0"/>
-          <a:chExt cx="0" cy="0"/>
-        </a:xfrm>
-      </p:grpSpPr>
-      <p:sp>
-        <p:nvSpPr>
-          <p:cNvPr id="4" name="Espace réservé du numéro de diapositive 3">
-            <a:extLst>
-              <a:ext uri="{FF2B5EF4-FFF2-40B4-BE49-F238E27FC236}">
-                <a16:creationId xmlns:a16="http://schemas.microsoft.com/office/drawing/2014/main" id="{576166A0-0628-2008-5E7C-647CB58FFB31}"/>
-              </a:ext>
-            </a:extLst>
-          </p:cNvPr>
-          <p:cNvSpPr>
-            <a:spLocks noGrp="1"/>
-          </p:cNvSpPr>
-          <p:nvPr>
-            <p:ph type="sldNum" sz="quarter" idx="12"/>
-          </p:nvPr>
-        </p:nvSpPr>
-        <p:spPr/>
-        <p:txBody>
-          <a:bodyPr/>
-          <a:lstStyle/>
-          <a:p>
-            <a:fld id="{504562DC-6A68-4B1A-ACD4-40BBA2BD5EE0}" type="slidenum">
-              <a:rPr lang="fr-FR" smtClean="0"/>
-              <a:t>19</a:t>
-            </a:fld>
-            <a:endParaRPr lang="fr-FR"/>
-          </a:p>
-        </p:txBody>
-      </p:sp>
-      <p:pic>
-        <p:nvPicPr>
-          <p:cNvPr id="6" name="Image 5">
-            <a:extLst>
-              <a:ext uri="{FF2B5EF4-FFF2-40B4-BE49-F238E27FC236}">
-                <a16:creationId xmlns:a16="http://schemas.microsoft.com/office/drawing/2014/main" id="{47665096-8B30-6B51-06BD-BF2960556AB7}"/>
-              </a:ext>
-            </a:extLst>
-          </p:cNvPr>
-          <p:cNvPicPr>
-            <a:picLocks noChangeAspect="1"/>
-          </p:cNvPicPr>
-          <p:nvPr/>
-        </p:nvPicPr>
-        <p:blipFill>
-          <a:blip r:embed="rId2"/>
-          <a:stretch>
-            <a:fillRect/>
-          </a:stretch>
-        </p:blipFill>
-        <p:spPr>
-          <a:xfrm>
-            <a:off x="2866478" y="136525"/>
-            <a:ext cx="7094682" cy="3262518"/>
-          </a:xfrm>
-          <a:prstGeom prst="rect">
-            <a:avLst/>
-          </a:prstGeom>
-        </p:spPr>
-      </p:pic>
-      <p:pic>
-        <p:nvPicPr>
-          <p:cNvPr id="8" name="Image 7">
-            <a:extLst>
-              <a:ext uri="{FF2B5EF4-FFF2-40B4-BE49-F238E27FC236}">
-                <a16:creationId xmlns:a16="http://schemas.microsoft.com/office/drawing/2014/main" id="{C17E772E-88CE-9DFC-943A-8DC5EDBC4151}"/>
-              </a:ext>
-            </a:extLst>
-          </p:cNvPr>
-          <p:cNvPicPr>
-            <a:picLocks noChangeAspect="1"/>
-          </p:cNvPicPr>
-          <p:nvPr/>
-        </p:nvPicPr>
-        <p:blipFill>
-          <a:blip r:embed="rId3"/>
-          <a:stretch>
-            <a:fillRect/>
-          </a:stretch>
-        </p:blipFill>
-        <p:spPr>
-          <a:xfrm>
-            <a:off x="2893948" y="3246437"/>
-            <a:ext cx="7064507" cy="3262518"/>
-          </a:xfrm>
-          <a:prstGeom prst="rect">
-            <a:avLst/>
-          </a:prstGeom>
-        </p:spPr>
-      </p:pic>
-    </p:spTree>
-    <p:extLst>
-      <p:ext uri="{BB962C8B-B14F-4D97-AF65-F5344CB8AC3E}">
-        <p14:creationId xmlns:p14="http://schemas.microsoft.com/office/powerpoint/2010/main" val="3708466263"/>
+        <p14:creationId xmlns:p14="http://schemas.microsoft.com/office/powerpoint/2010/main" val="462728745"/>
       </p:ext>
     </p:extLst>
   </p:cSld>
@@ -6788,7 +6987,7 @@
 </p:sld>
 </file>
 
-<file path=ppt/slides/slide20.xml><?xml version="1.0" encoding="utf-8"?>
+<file path=ppt/slides/slide3.xml><?xml version="1.0" encoding="utf-8"?>
 <p:sld xmlns:a="http://schemas.openxmlformats.org/drawingml/2006/main" xmlns:r="http://schemas.openxmlformats.org/officeDocument/2006/relationships" xmlns:p="http://schemas.openxmlformats.org/presentationml/2006/main">
   <p:cSld>
     <p:spTree>
@@ -6810,7 +7009,7 @@
           <p:cNvPr id="2" name="Titre 1">
             <a:extLst>
               <a:ext uri="{FF2B5EF4-FFF2-40B4-BE49-F238E27FC236}">
-                <a16:creationId xmlns:a16="http://schemas.microsoft.com/office/drawing/2014/main" id="{71B8B1D2-694D-4124-BFA6-F2C501B35109}"/>
+                <a16:creationId xmlns:a16="http://schemas.microsoft.com/office/drawing/2014/main" id="{42EC595B-F242-4543-A4EB-D42B84EE2613}"/>
               </a:ext>
             </a:extLst>
           </p:cNvPr>
@@ -6819,125 +7018,143 @@
           </p:cNvSpPr>
           <p:nvPr>
             <p:ph type="title"/>
+          </p:nvPr>
+        </p:nvSpPr>
+        <p:spPr/>
+        <p:txBody>
+          <a:bodyPr/>
+          <a:lstStyle/>
+          <a:p>
+            <a:pPr algn="ctr"/>
+            <a:r>
+              <a:rPr lang="fr-FR"/>
+              <a:t>Exigences</a:t>
+            </a:r>
+            <a:endParaRPr lang="fr-FR" dirty="0"/>
+          </a:p>
+        </p:txBody>
+      </p:sp>
+      <p:sp>
+        <p:nvSpPr>
+          <p:cNvPr id="3" name="Espace réservé du contenu 2">
+            <a:extLst>
+              <a:ext uri="{FF2B5EF4-FFF2-40B4-BE49-F238E27FC236}">
+                <a16:creationId xmlns:a16="http://schemas.microsoft.com/office/drawing/2014/main" id="{15EDCA51-41BE-49FE-A2C4-320E6D755AA5}"/>
+              </a:ext>
+            </a:extLst>
+          </p:cNvPr>
+          <p:cNvSpPr>
+            <a:spLocks noGrp="1"/>
+          </p:cNvSpPr>
+          <p:nvPr>
+            <p:ph idx="1"/>
           </p:nvPr>
         </p:nvSpPr>
         <p:spPr>
           <a:xfrm>
-            <a:off x="419100" y="365126"/>
-            <a:ext cx="11353800" cy="1325563"/>
+            <a:off x="487680" y="1825625"/>
+            <a:ext cx="11155680" cy="4351338"/>
           </a:xfrm>
         </p:spPr>
         <p:txBody>
-          <a:bodyPr/>
-          <a:lstStyle/>
-          <a:p>
-            <a:pPr marL="0" indent="0" algn="ctr" defTabSz="360000">
-              <a:spcBef>
-                <a:spcPts val="0"/>
-              </a:spcBef>
-              <a:buNone/>
-            </a:pPr>
-            <a:r>
-              <a:rPr lang="en-US" sz="4400">
-                <a:solidFill>
-                  <a:srgbClr val="0070C0"/>
-                </a:solidFill>
-                <a:latin typeface="Consolas" panose="020B0609020204030204" pitchFamily="49" charset="0"/>
-              </a:rPr>
-              <a:t>http://localhost:8080/communityEmail?city=&lt;city&gt;</a:t>
-            </a:r>
-            <a:endParaRPr lang="fr-FR" sz="4400">
-              <a:solidFill>
-                <a:srgbClr val="0070C0"/>
-              </a:solidFill>
-              <a:latin typeface="Consolas" panose="020B0609020204030204" pitchFamily="49" charset="0"/>
-            </a:endParaRPr>
-          </a:p>
-        </p:txBody>
-      </p:sp>
-      <p:sp>
-        <p:nvSpPr>
-          <p:cNvPr id="3" name="Espace réservé du contenu 2">
-            <a:extLst>
-              <a:ext uri="{FF2B5EF4-FFF2-40B4-BE49-F238E27FC236}">
-                <a16:creationId xmlns:a16="http://schemas.microsoft.com/office/drawing/2014/main" id="{7C9B0652-5A35-430D-A916-25405324295F}"/>
-              </a:ext>
-            </a:extLst>
-          </p:cNvPr>
-          <p:cNvSpPr>
-            <a:spLocks noGrp="1"/>
-          </p:cNvSpPr>
-          <p:nvPr>
-            <p:ph idx="1"/>
-          </p:nvPr>
-        </p:nvSpPr>
-        <p:spPr>
-          <a:xfrm>
-            <a:off x="838200" y="1690689"/>
-            <a:ext cx="10515600" cy="4486274"/>
-          </a:xfrm>
-        </p:spPr>
-        <p:txBody>
           <a:bodyPr>
-            <a:normAutofit/>
+            <a:normAutofit fontScale="92500" lnSpcReduction="10000"/>
           </a:bodyPr>
           <a:lstStyle/>
           <a:p>
             <a:pPr marL="365125" indent="-365125">
-              <a:spcAft>
-                <a:spcPts val="1200"/>
-              </a:spcAft>
               <a:buFont typeface="Wingdings" panose="05000000000000000000" pitchFamily="2" charset="2"/>
               <a:buChar char="Ø"/>
             </a:pPr>
-            <a:endParaRPr lang="fr-FR"/>
+            <a:r>
+              <a:rPr lang="fr-FR"/>
+              <a:t>le serveur d'alertes SafetyNet démarre ;</a:t>
+            </a:r>
           </a:p>
           <a:p>
             <a:pPr marL="365125" indent="-365125">
-              <a:spcAft>
-                <a:spcPts val="1200"/>
-              </a:spcAft>
               <a:buFont typeface="Wingdings" panose="05000000000000000000" pitchFamily="2" charset="2"/>
               <a:buChar char="Ø"/>
             </a:pPr>
             <a:r>
               <a:rPr lang="fr-FR"/>
-              <a:t>Cette url doit retourner les adresses mail de tous les habitants de la ville</a:t>
+              <a:t>tous les endpoints url sont fonctionnels ainsi que les Actuators health, info, trace et metrics ;</a:t>
             </a:r>
           </a:p>
           <a:p>
             <a:pPr marL="365125" indent="-365125">
-              <a:spcAft>
-                <a:spcPts val="1200"/>
-              </a:spcAft>
               <a:buFont typeface="Wingdings" panose="05000000000000000000" pitchFamily="2" charset="2"/>
               <a:buChar char="Ø"/>
             </a:pPr>
-            <a:endParaRPr lang="fr-FR"/>
+            <a:r>
+              <a:rPr lang="fr-FR"/>
+              <a:t>tous les endpoints url enregistrent leurs requêtes et leurs réponses :</a:t>
+            </a:r>
+          </a:p>
+          <a:p>
+            <a:pPr lvl="1">
+              <a:buFont typeface="Wingdings" panose="05000000000000000000" pitchFamily="2" charset="2"/>
+              <a:buChar char="ü"/>
+            </a:pPr>
+            <a:r>
+              <a:rPr lang="fr-FR"/>
+              <a:t> log niveau info si réussite,</a:t>
+            </a:r>
+          </a:p>
+          <a:p>
+            <a:pPr lvl="1">
+              <a:buFont typeface="Wingdings" panose="05000000000000000000" pitchFamily="2" charset="2"/>
+              <a:buChar char="ü"/>
+            </a:pPr>
+            <a:r>
+              <a:rPr lang="fr-FR"/>
+              <a:t> log niveau erreur si  erreurs ou exceptions,</a:t>
+            </a:r>
+          </a:p>
+          <a:p>
+            <a:pPr lvl="1">
+              <a:buFont typeface="Wingdings" panose="05000000000000000000" pitchFamily="2" charset="2"/>
+              <a:buChar char="ü"/>
+            </a:pPr>
+            <a:r>
+              <a:rPr lang="fr-FR"/>
+              <a:t> log niveau debug pour les étapes ou calculs informatif.</a:t>
+            </a:r>
           </a:p>
           <a:p>
             <a:pPr marL="365125" indent="-365125">
-              <a:spcAft>
-                <a:spcPts val="1200"/>
-              </a:spcAft>
               <a:buFont typeface="Wingdings" panose="05000000000000000000" pitchFamily="2" charset="2"/>
               <a:buChar char="Ø"/>
             </a:pPr>
             <a:r>
               <a:rPr lang="fr-FR"/>
-              <a:t>Les emails sont distincts (pas de duplication)</a:t>
-            </a:r>
-          </a:p>
-          <a:p>
-            <a:pPr marL="0" indent="0" defTabSz="360000">
-              <a:spcBef>
-                <a:spcPts val="0"/>
-              </a:spcBef>
-              <a:buNone/>
+              <a:t>mvn : test, verify, package et site (→ </a:t>
+            </a:r>
+            <a:r>
+              <a:rPr lang="en-US"/>
+              <a:t>JavaDocs, SpotBugs, Surefire &amp; Failsafe, Jacoco reports)</a:t>
+            </a:r>
+          </a:p>
+          <a:p>
+            <a:pPr marL="365125" indent="-365125">
+              <a:buFont typeface="Wingdings" panose="05000000000000000000" pitchFamily="2" charset="2"/>
+              <a:buChar char="Ø"/>
             </a:pPr>
-            <a:endParaRPr lang="fr-FR" sz="1400">
-              <a:latin typeface="Consolas" panose="020B0609020204030204" pitchFamily="49" charset="0"/>
-            </a:endParaRPr>
+            <a:r>
+              <a:rPr lang="fr-FR"/>
+              <a:t>couverture JaCoCo de code de 80 %</a:t>
+            </a:r>
+          </a:p>
+          <a:p>
+            <a:pPr marL="365125" indent="-365125">
+              <a:buFont typeface="Wingdings" panose="05000000000000000000" pitchFamily="2" charset="2"/>
+              <a:buChar char="Ø"/>
+            </a:pPr>
+            <a:r>
+              <a:rPr lang="fr-FR"/>
+              <a:t>la base de code adhère aux principes SOLID</a:t>
+            </a:r>
+            <a:endParaRPr lang="fr-FR" dirty="0"/>
           </a:p>
         </p:txBody>
       </p:sp>
@@ -6946,7 +7163,7 @@
           <p:cNvPr id="4" name="Espace réservé du numéro de diapositive 3">
             <a:extLst>
               <a:ext uri="{FF2B5EF4-FFF2-40B4-BE49-F238E27FC236}">
-                <a16:creationId xmlns:a16="http://schemas.microsoft.com/office/drawing/2014/main" id="{CE404544-46A4-47E3-ABC8-EAD4F49196F5}"/>
+                <a16:creationId xmlns:a16="http://schemas.microsoft.com/office/drawing/2014/main" id="{D46998E7-1987-4497-B45B-2C68884A6A68}"/>
               </a:ext>
             </a:extLst>
           </p:cNvPr>
@@ -6968,7 +7185,7 @@
                   <a:schemeClr val="tx1"/>
                 </a:solidFill>
               </a:rPr>
-              <a:t>20</a:t>
+              <a:t>3</a:t>
             </a:fld>
             <a:endParaRPr lang="fr-FR" dirty="0">
               <a:solidFill>
@@ -6981,7 +7198,7 @@
     </p:spTree>
     <p:extLst>
       <p:ext uri="{BB962C8B-B14F-4D97-AF65-F5344CB8AC3E}">
-        <p14:creationId xmlns:p14="http://schemas.microsoft.com/office/powerpoint/2010/main" val="4180230509"/>
+        <p14:creationId xmlns:p14="http://schemas.microsoft.com/office/powerpoint/2010/main" val="383149609"/>
       </p:ext>
     </p:extLst>
   </p:cSld>
@@ -6991,7 +7208,7 @@
 </p:sld>
 </file>
 
-<file path=ppt/slides/slide21.xml><?xml version="1.0" encoding="utf-8"?>
+<file path=ppt/slides/slide4.xml><?xml version="1.0" encoding="utf-8"?>
 <p:sld xmlns:a="http://schemas.openxmlformats.org/drawingml/2006/main" xmlns:r="http://schemas.openxmlformats.org/officeDocument/2006/relationships" xmlns:p="http://schemas.openxmlformats.org/presentationml/2006/main">
   <p:cSld>
     <p:spTree>
@@ -7010,67 +7227,144 @@
       </p:grpSpPr>
       <p:sp>
         <p:nvSpPr>
-          <p:cNvPr id="4" name="Espace réservé du numéro de diapositive 3">
-            <a:extLst>
-              <a:ext uri="{FF2B5EF4-FFF2-40B4-BE49-F238E27FC236}">
-                <a16:creationId xmlns:a16="http://schemas.microsoft.com/office/drawing/2014/main" id="{6219D347-1B8B-DC7C-2CDB-D3983B1CC4DE}"/>
-              </a:ext>
-            </a:extLst>
-          </p:cNvPr>
-          <p:cNvSpPr>
-            <a:spLocks noGrp="1"/>
-          </p:cNvSpPr>
-          <p:nvPr>
-            <p:ph type="sldNum" sz="quarter" idx="12"/>
-          </p:nvPr>
-        </p:nvSpPr>
-        <p:spPr/>
-        <p:txBody>
-          <a:bodyPr/>
-          <a:lstStyle/>
-          <a:p>
-            <a:fld id="{504562DC-6A68-4B1A-ACD4-40BBA2BD5EE0}" type="slidenum">
-              <a:rPr lang="fr-FR" smtClean="0"/>
-              <a:t>21</a:t>
-            </a:fld>
-            <a:endParaRPr lang="fr-FR"/>
-          </a:p>
-        </p:txBody>
-      </p:sp>
-      <p:pic>
-        <p:nvPicPr>
-          <p:cNvPr id="6" name="Image 5">
-            <a:extLst>
-              <a:ext uri="{FF2B5EF4-FFF2-40B4-BE49-F238E27FC236}">
-                <a16:creationId xmlns:a16="http://schemas.microsoft.com/office/drawing/2014/main" id="{E1DB9B64-C430-0FA2-8291-3D5C79970033}"/>
-              </a:ext>
-            </a:extLst>
-          </p:cNvPr>
-          <p:cNvPicPr>
-            <a:picLocks noChangeAspect="1"/>
-          </p:cNvPicPr>
-          <p:nvPr/>
-        </p:nvPicPr>
-        <p:blipFill>
-          <a:blip r:embed="rId2"/>
-          <a:stretch>
-            <a:fillRect/>
-          </a:stretch>
-        </p:blipFill>
+          <p:cNvPr id="2" name="Titre 1">
+            <a:extLst>
+              <a:ext uri="{FF2B5EF4-FFF2-40B4-BE49-F238E27FC236}">
+                <a16:creationId xmlns:a16="http://schemas.microsoft.com/office/drawing/2014/main" id="{71B8B1D2-694D-4124-BFA6-F2C501B35109}"/>
+              </a:ext>
+            </a:extLst>
+          </p:cNvPr>
+          <p:cNvSpPr>
+            <a:spLocks noGrp="1"/>
+          </p:cNvSpPr>
+          <p:nvPr>
+            <p:ph type="title"/>
+          </p:nvPr>
+        </p:nvSpPr>
+        <p:spPr/>
+        <p:txBody>
+          <a:bodyPr/>
+          <a:lstStyle/>
+          <a:p>
+            <a:pPr algn="ctr"/>
+            <a:r>
+              <a:rPr lang="fr-FR"/>
+              <a:t>Les besoins du back-end</a:t>
+            </a:r>
+            <a:endParaRPr lang="fr-FR" dirty="0"/>
+          </a:p>
+        </p:txBody>
+      </p:sp>
+      <p:sp>
+        <p:nvSpPr>
+          <p:cNvPr id="3" name="Espace réservé du contenu 2">
+            <a:extLst>
+              <a:ext uri="{FF2B5EF4-FFF2-40B4-BE49-F238E27FC236}">
+                <a16:creationId xmlns:a16="http://schemas.microsoft.com/office/drawing/2014/main" id="{7C9B0652-5A35-430D-A916-25405324295F}"/>
+              </a:ext>
+            </a:extLst>
+          </p:cNvPr>
+          <p:cNvSpPr>
+            <a:spLocks noGrp="1"/>
+          </p:cNvSpPr>
+          <p:nvPr>
+            <p:ph idx="1"/>
+          </p:nvPr>
+        </p:nvSpPr>
         <p:spPr>
           <a:xfrm>
-            <a:off x="1943550" y="294968"/>
-            <a:ext cx="8429909" cy="6176471"/>
+            <a:off x="838200" y="2336799"/>
+            <a:ext cx="10515600" cy="3840163"/>
           </a:xfrm>
-          <a:prstGeom prst="rect">
-            <a:avLst/>
-          </a:prstGeom>
         </p:spPr>
-      </p:pic>
+        <p:txBody>
+          <a:bodyPr>
+            <a:normAutofit/>
+          </a:bodyPr>
+          <a:lstStyle/>
+          <a:p>
+            <a:pPr marL="365125" indent="-365125">
+              <a:spcAft>
+                <a:spcPts val="1200"/>
+              </a:spcAft>
+              <a:buFont typeface="Wingdings" panose="05000000000000000000" pitchFamily="2" charset="2"/>
+              <a:buChar char="Ø"/>
+            </a:pPr>
+            <a:r>
+              <a:rPr lang="fr-FR"/>
+              <a:t>lire le fichier de données ./resources/input/data.json</a:t>
+            </a:r>
+            <a:endParaRPr lang="fr-FR" dirty="0"/>
+          </a:p>
+          <a:p>
+            <a:pPr marL="365125" indent="-365125">
+              <a:spcAft>
+                <a:spcPts val="1200"/>
+              </a:spcAft>
+              <a:buFont typeface="Wingdings" panose="05000000000000000000" pitchFamily="2" charset="2"/>
+              <a:buChar char="Ø"/>
+            </a:pPr>
+            <a:r>
+              <a:rPr lang="fr-FR"/>
+              <a:t>produire en sortie dans ./resources/output/ un fichier JSON à partir des URL correspondant à des endpoints que l’application doit disposer.</a:t>
+            </a:r>
+          </a:p>
+          <a:p>
+            <a:pPr marL="365125" indent="-365125">
+              <a:spcAft>
+                <a:spcPts val="1200"/>
+              </a:spcAft>
+              <a:buFont typeface="Wingdings" panose="05000000000000000000" pitchFamily="2" charset="2"/>
+              <a:buChar char="Ø"/>
+            </a:pPr>
+            <a:r>
+              <a:rPr lang="fr-FR"/>
+              <a:t>besoin d’autres endpoints pour la mise à jour des données</a:t>
+            </a:r>
+          </a:p>
+        </p:txBody>
+      </p:sp>
+      <p:sp>
+        <p:nvSpPr>
+          <p:cNvPr id="4" name="Espace réservé du numéro de diapositive 3">
+            <a:extLst>
+              <a:ext uri="{FF2B5EF4-FFF2-40B4-BE49-F238E27FC236}">
+                <a16:creationId xmlns:a16="http://schemas.microsoft.com/office/drawing/2014/main" id="{CE404544-46A4-47E3-ABC8-EAD4F49196F5}"/>
+              </a:ext>
+            </a:extLst>
+          </p:cNvPr>
+          <p:cNvSpPr>
+            <a:spLocks noGrp="1"/>
+          </p:cNvSpPr>
+          <p:nvPr>
+            <p:ph type="sldNum" sz="quarter" idx="12"/>
+          </p:nvPr>
+        </p:nvSpPr>
+        <p:spPr/>
+        <p:txBody>
+          <a:bodyPr/>
+          <a:lstStyle/>
+          <a:p>
+            <a:fld id="{504562DC-6A68-4B1A-ACD4-40BBA2BD5EE0}" type="slidenum">
+              <a:rPr lang="fr-FR" smtClean="0">
+                <a:solidFill>
+                  <a:schemeClr val="tx1"/>
+                </a:solidFill>
+              </a:rPr>
+              <a:t>4</a:t>
+            </a:fld>
+            <a:endParaRPr lang="fr-FR" dirty="0">
+              <a:solidFill>
+                <a:schemeClr val="tx1"/>
+              </a:solidFill>
+            </a:endParaRPr>
+          </a:p>
+        </p:txBody>
+      </p:sp>
     </p:spTree>
     <p:extLst>
       <p:ext uri="{BB962C8B-B14F-4D97-AF65-F5344CB8AC3E}">
-        <p14:creationId xmlns:p14="http://schemas.microsoft.com/office/powerpoint/2010/main" val="4142099814"/>
+        <p14:creationId xmlns:p14="http://schemas.microsoft.com/office/powerpoint/2010/main" val="3411694865"/>
       </p:ext>
     </p:extLst>
   </p:cSld>
@@ -7080,7 +7374,7 @@
 </p:sld>
 </file>
 
-<file path=ppt/slides/slide22.xml><?xml version="1.0" encoding="utf-8"?>
+<file path=ppt/slides/slide5.xml><?xml version="1.0" encoding="utf-8"?>
 <p:sld xmlns:a="http://schemas.openxmlformats.org/drawingml/2006/main" xmlns:r="http://schemas.openxmlformats.org/officeDocument/2006/relationships" xmlns:p="http://schemas.openxmlformats.org/presentationml/2006/main">
   <p:cSld>
     <p:spTree>
@@ -7099,195 +7393,36 @@
       </p:grpSpPr>
       <p:sp>
         <p:nvSpPr>
-          <p:cNvPr id="4" name="Espace réservé du numéro de diapositive 3">
-            <a:extLst>
-              <a:ext uri="{FF2B5EF4-FFF2-40B4-BE49-F238E27FC236}">
-                <a16:creationId xmlns:a16="http://schemas.microsoft.com/office/drawing/2014/main" id="{1BE19AC2-A8E6-1E51-BC3E-D68AAF012327}"/>
-              </a:ext>
-            </a:extLst>
-          </p:cNvPr>
-          <p:cNvSpPr>
-            <a:spLocks noGrp="1"/>
-          </p:cNvSpPr>
-          <p:nvPr>
-            <p:ph type="sldNum" sz="quarter" idx="12"/>
-          </p:nvPr>
-        </p:nvSpPr>
-        <p:spPr/>
-        <p:txBody>
-          <a:bodyPr/>
-          <a:lstStyle/>
-          <a:p>
-            <a:fld id="{504562DC-6A68-4B1A-ACD4-40BBA2BD5EE0}" type="slidenum">
-              <a:rPr lang="fr-FR" smtClean="0"/>
-              <a:t>22</a:t>
-            </a:fld>
-            <a:endParaRPr lang="fr-FR"/>
-          </a:p>
-        </p:txBody>
-      </p:sp>
-      <p:pic>
-        <p:nvPicPr>
-          <p:cNvPr id="6" name="Image 5">
-            <a:extLst>
-              <a:ext uri="{FF2B5EF4-FFF2-40B4-BE49-F238E27FC236}">
-                <a16:creationId xmlns:a16="http://schemas.microsoft.com/office/drawing/2014/main" id="{A38A2AEF-3A3E-19D9-B448-5676F0A27411}"/>
-              </a:ext>
-            </a:extLst>
-          </p:cNvPr>
-          <p:cNvPicPr>
-            <a:picLocks noChangeAspect="1"/>
-          </p:cNvPicPr>
-          <p:nvPr/>
-        </p:nvPicPr>
-        <p:blipFill>
-          <a:blip r:embed="rId2"/>
-          <a:stretch>
-            <a:fillRect/>
-          </a:stretch>
-        </p:blipFill>
+          <p:cNvPr id="2" name="Titre 1">
+            <a:extLst>
+              <a:ext uri="{FF2B5EF4-FFF2-40B4-BE49-F238E27FC236}">
+                <a16:creationId xmlns:a16="http://schemas.microsoft.com/office/drawing/2014/main" id="{71B8B1D2-694D-4124-BFA6-F2C501B35109}"/>
+              </a:ext>
+            </a:extLst>
+          </p:cNvPr>
+          <p:cNvSpPr>
+            <a:spLocks noGrp="1"/>
+          </p:cNvSpPr>
+          <p:nvPr>
+            <p:ph type="title"/>
+          </p:nvPr>
+        </p:nvSpPr>
         <p:spPr>
           <a:xfrm>
-            <a:off x="2166388" y="60920"/>
-            <a:ext cx="7203754" cy="3309361"/>
-          </a:xfrm>
-          <a:prstGeom prst="rect">
-            <a:avLst/>
-          </a:prstGeom>
-        </p:spPr>
-      </p:pic>
-      <p:pic>
-        <p:nvPicPr>
-          <p:cNvPr id="8" name="Image 7">
-            <a:extLst>
-              <a:ext uri="{FF2B5EF4-FFF2-40B4-BE49-F238E27FC236}">
-                <a16:creationId xmlns:a16="http://schemas.microsoft.com/office/drawing/2014/main" id="{BB930E0D-20FC-B044-370D-838BE8E8F9C3}"/>
-              </a:ext>
-            </a:extLst>
-          </p:cNvPr>
-          <p:cNvPicPr>
-            <a:picLocks noChangeAspect="1"/>
-          </p:cNvPicPr>
-          <p:nvPr/>
-        </p:nvPicPr>
-        <p:blipFill>
-          <a:blip r:embed="rId3"/>
-          <a:stretch>
-            <a:fillRect/>
-          </a:stretch>
-        </p:blipFill>
-        <p:spPr>
-          <a:xfrm>
-            <a:off x="2297748" y="3370280"/>
-            <a:ext cx="7029220" cy="3350939"/>
-          </a:xfrm>
-          <a:prstGeom prst="rect">
-            <a:avLst/>
-          </a:prstGeom>
-        </p:spPr>
-      </p:pic>
-    </p:spTree>
-    <p:extLst>
-      <p:ext uri="{BB962C8B-B14F-4D97-AF65-F5344CB8AC3E}">
-        <p14:creationId xmlns:p14="http://schemas.microsoft.com/office/powerpoint/2010/main" val="2091810413"/>
-      </p:ext>
-    </p:extLst>
-  </p:cSld>
-  <p:clrMapOvr>
-    <a:masterClrMapping/>
-  </p:clrMapOvr>
-</p:sld>
-</file>
-
-<file path=ppt/slides/slide23.xml><?xml version="1.0" encoding="utf-8"?>
-<p:sld xmlns:a="http://schemas.openxmlformats.org/drawingml/2006/main" xmlns:r="http://schemas.openxmlformats.org/officeDocument/2006/relationships" xmlns:p="http://schemas.openxmlformats.org/presentationml/2006/main">
-  <p:cSld>
-    <p:spTree>
-      <p:nvGrpSpPr>
-        <p:cNvPr id="1" name=""/>
-        <p:cNvGrpSpPr/>
-        <p:nvPr/>
-      </p:nvGrpSpPr>
-      <p:grpSpPr>
-        <a:xfrm>
-          <a:off x="0" y="0"/>
-          <a:ext cx="0" cy="0"/>
-          <a:chOff x="0" y="0"/>
-          <a:chExt cx="0" cy="0"/>
-        </a:xfrm>
-      </p:grpSpPr>
-      <p:sp>
-        <p:nvSpPr>
-          <p:cNvPr id="3" name="Espace réservé du contenu 2">
-            <a:extLst>
-              <a:ext uri="{FF2B5EF4-FFF2-40B4-BE49-F238E27FC236}">
-                <a16:creationId xmlns:a16="http://schemas.microsoft.com/office/drawing/2014/main" id="{7C9B0652-5A35-430D-A916-25405324295F}"/>
-              </a:ext>
-            </a:extLst>
-          </p:cNvPr>
-          <p:cNvSpPr>
-            <a:spLocks noGrp="1"/>
-          </p:cNvSpPr>
-          <p:nvPr>
-            <p:ph idx="1"/>
-          </p:nvPr>
-        </p:nvSpPr>
-        <p:spPr>
-          <a:xfrm>
-            <a:off x="838200" y="1690689"/>
-            <a:ext cx="10515600" cy="4486274"/>
+            <a:off x="838200" y="365126"/>
+            <a:ext cx="10515600" cy="732118"/>
           </a:xfrm>
         </p:spPr>
         <p:txBody>
-          <a:bodyPr>
-            <a:normAutofit/>
-          </a:bodyPr>
-          <a:lstStyle/>
-          <a:p>
-            <a:pPr marL="365125" indent="-365125">
-              <a:spcAft>
-                <a:spcPts val="1200"/>
-              </a:spcAft>
-              <a:buFont typeface="Wingdings" panose="05000000000000000000" pitchFamily="2" charset="2"/>
-              <a:buChar char="Ø"/>
-            </a:pPr>
-            <a:endParaRPr lang="fr-FR"/>
-          </a:p>
-          <a:p>
-            <a:pPr marL="365125" indent="-365125">
-              <a:spcAft>
-                <a:spcPts val="1200"/>
-              </a:spcAft>
-              <a:buFont typeface="Wingdings" panose="05000000000000000000" pitchFamily="2" charset="2"/>
-              <a:buChar char="Ø"/>
-            </a:pPr>
-            <a:r>
-              <a:rPr lang="fr-FR"/>
-              <a:t>Cette url doit retourner la liste des personnes de même nom habitant à l'adresse de la personne précisée.</a:t>
-            </a:r>
-          </a:p>
-          <a:p>
-            <a:pPr marL="365125" indent="-365125">
-              <a:spcAft>
-                <a:spcPts val="1200"/>
-              </a:spcAft>
-              <a:buFont typeface="Wingdings" panose="05000000000000000000" pitchFamily="2" charset="2"/>
-              <a:buChar char="Ø"/>
-            </a:pPr>
-            <a:endParaRPr lang="fr-FR"/>
-          </a:p>
-          <a:p>
-            <a:pPr marL="365125" indent="-365125">
-              <a:spcAft>
-                <a:spcPts val="1200"/>
-              </a:spcAft>
-              <a:buFont typeface="Wingdings" panose="05000000000000000000" pitchFamily="2" charset="2"/>
-              <a:buChar char="Ø"/>
-            </a:pPr>
-            <a:r>
-              <a:rPr lang="fr-FR"/>
-              <a:t>Sont précisés par habitant :(nom, adresse, âge, courriel, antécédents médicaux</a:t>
-            </a:r>
+          <a:bodyPr/>
+          <a:lstStyle/>
+          <a:p>
+            <a:pPr algn="ctr"/>
+            <a:r>
+              <a:rPr lang="fr-FR"/>
+              <a:t>UML Modèle</a:t>
+            </a:r>
+            <a:endParaRPr lang="fr-FR" dirty="0"/>
           </a:p>
         </p:txBody>
       </p:sp>
@@ -7318,356 +7453,7 @@
                   <a:schemeClr val="tx1"/>
                 </a:solidFill>
               </a:rPr>
-              <a:t>23</a:t>
-            </a:fld>
-            <a:endParaRPr lang="fr-FR" dirty="0">
-              <a:solidFill>
-                <a:schemeClr val="tx1"/>
-              </a:solidFill>
-            </a:endParaRPr>
-          </a:p>
-        </p:txBody>
-      </p:sp>
-      <p:sp>
-        <p:nvSpPr>
-          <p:cNvPr id="6" name="Titre 5">
-            <a:extLst>
-              <a:ext uri="{FF2B5EF4-FFF2-40B4-BE49-F238E27FC236}">
-                <a16:creationId xmlns:a16="http://schemas.microsoft.com/office/drawing/2014/main" id="{014B82FB-4187-5393-970F-8F61832E03EB}"/>
-              </a:ext>
-            </a:extLst>
-          </p:cNvPr>
-          <p:cNvSpPr>
-            <a:spLocks noGrp="1"/>
-          </p:cNvSpPr>
-          <p:nvPr>
-            <p:ph type="title"/>
-          </p:nvPr>
-        </p:nvSpPr>
-        <p:spPr>
-          <a:xfrm>
-            <a:off x="757083" y="96736"/>
-            <a:ext cx="11012129" cy="1325563"/>
-          </a:xfrm>
-        </p:spPr>
-        <p:txBody>
-          <a:bodyPr>
-            <a:normAutofit fontScale="90000"/>
-          </a:bodyPr>
-          <a:lstStyle/>
-          <a:p>
-            <a:r>
-              <a:rPr lang="en-US" sz="4400">
-                <a:solidFill>
-                  <a:srgbClr val="0070C0"/>
-                </a:solidFill>
-                <a:latin typeface="Consolas" panose="020B0609020204030204" pitchFamily="49" charset="0"/>
-              </a:rPr>
-              <a:t>http://localhost:8080/personInfo?firstName=&lt;firstName&gt;&amp;lastName=&lt;lastName&gt;</a:t>
-            </a:r>
-            <a:endParaRPr lang="fr-FR"/>
-          </a:p>
-        </p:txBody>
-      </p:sp>
-    </p:spTree>
-    <p:extLst>
-      <p:ext uri="{BB962C8B-B14F-4D97-AF65-F5344CB8AC3E}">
-        <p14:creationId xmlns:p14="http://schemas.microsoft.com/office/powerpoint/2010/main" val="3148092973"/>
-      </p:ext>
-    </p:extLst>
-  </p:cSld>
-  <p:clrMapOvr>
-    <a:masterClrMapping/>
-  </p:clrMapOvr>
-</p:sld>
-</file>
-
-<file path=ppt/slides/slide24.xml><?xml version="1.0" encoding="utf-8"?>
-<p:sld xmlns:a="http://schemas.openxmlformats.org/drawingml/2006/main" xmlns:r="http://schemas.openxmlformats.org/officeDocument/2006/relationships" xmlns:p="http://schemas.openxmlformats.org/presentationml/2006/main">
-  <p:cSld>
-    <p:spTree>
-      <p:nvGrpSpPr>
-        <p:cNvPr id="1" name=""/>
-        <p:cNvGrpSpPr/>
-        <p:nvPr/>
-      </p:nvGrpSpPr>
-      <p:grpSpPr>
-        <a:xfrm>
-          <a:off x="0" y="0"/>
-          <a:ext cx="0" cy="0"/>
-          <a:chOff x="0" y="0"/>
-          <a:chExt cx="0" cy="0"/>
-        </a:xfrm>
-      </p:grpSpPr>
-      <p:pic>
-        <p:nvPicPr>
-          <p:cNvPr id="6" name="Espace réservé du contenu 5">
-            <a:extLst>
-              <a:ext uri="{FF2B5EF4-FFF2-40B4-BE49-F238E27FC236}">
-                <a16:creationId xmlns:a16="http://schemas.microsoft.com/office/drawing/2014/main" id="{91247A72-3A0F-C900-58B3-2EFF37BC2519}"/>
-              </a:ext>
-            </a:extLst>
-          </p:cNvPr>
-          <p:cNvPicPr>
-            <a:picLocks noGrp="1" noChangeAspect="1"/>
-          </p:cNvPicPr>
-          <p:nvPr>
-            <p:ph idx="1"/>
-          </p:nvPr>
-        </p:nvPicPr>
-        <p:blipFill>
-          <a:blip r:embed="rId2"/>
-          <a:stretch>
-            <a:fillRect/>
-          </a:stretch>
-        </p:blipFill>
-        <p:spPr>
-          <a:xfrm>
-            <a:off x="2113010" y="225014"/>
-            <a:ext cx="7331659" cy="6234779"/>
-          </a:xfrm>
-        </p:spPr>
-      </p:pic>
-      <p:sp>
-        <p:nvSpPr>
-          <p:cNvPr id="4" name="Espace réservé du numéro de diapositive 3">
-            <a:extLst>
-              <a:ext uri="{FF2B5EF4-FFF2-40B4-BE49-F238E27FC236}">
-                <a16:creationId xmlns:a16="http://schemas.microsoft.com/office/drawing/2014/main" id="{C86924AA-CE60-11C8-A77A-ECA6CAC3095B}"/>
-              </a:ext>
-            </a:extLst>
-          </p:cNvPr>
-          <p:cNvSpPr>
-            <a:spLocks noGrp="1"/>
-          </p:cNvSpPr>
-          <p:nvPr>
-            <p:ph type="sldNum" sz="quarter" idx="12"/>
-          </p:nvPr>
-        </p:nvSpPr>
-        <p:spPr/>
-        <p:txBody>
-          <a:bodyPr/>
-          <a:lstStyle/>
-          <a:p>
-            <a:fld id="{504562DC-6A68-4B1A-ACD4-40BBA2BD5EE0}" type="slidenum">
-              <a:rPr lang="fr-FR" smtClean="0"/>
-              <a:t>24</a:t>
-            </a:fld>
-            <a:endParaRPr lang="fr-FR"/>
-          </a:p>
-        </p:txBody>
-      </p:sp>
-    </p:spTree>
-    <p:extLst>
-      <p:ext uri="{BB962C8B-B14F-4D97-AF65-F5344CB8AC3E}">
-        <p14:creationId xmlns:p14="http://schemas.microsoft.com/office/powerpoint/2010/main" val="3880285295"/>
-      </p:ext>
-    </p:extLst>
-  </p:cSld>
-  <p:clrMapOvr>
-    <a:masterClrMapping/>
-  </p:clrMapOvr>
-</p:sld>
-</file>
-
-<file path=ppt/slides/slide25.xml><?xml version="1.0" encoding="utf-8"?>
-<p:sld xmlns:a="http://schemas.openxmlformats.org/drawingml/2006/main" xmlns:r="http://schemas.openxmlformats.org/officeDocument/2006/relationships" xmlns:p="http://schemas.openxmlformats.org/presentationml/2006/main">
-  <p:cSld>
-    <p:spTree>
-      <p:nvGrpSpPr>
-        <p:cNvPr id="1" name=""/>
-        <p:cNvGrpSpPr/>
-        <p:nvPr/>
-      </p:nvGrpSpPr>
-      <p:grpSpPr>
-        <a:xfrm>
-          <a:off x="0" y="0"/>
-          <a:ext cx="0" cy="0"/>
-          <a:chOff x="0" y="0"/>
-          <a:chExt cx="0" cy="0"/>
-        </a:xfrm>
-      </p:grpSpPr>
-      <p:pic>
-        <p:nvPicPr>
-          <p:cNvPr id="6" name="Espace réservé du contenu 5">
-            <a:extLst>
-              <a:ext uri="{FF2B5EF4-FFF2-40B4-BE49-F238E27FC236}">
-                <a16:creationId xmlns:a16="http://schemas.microsoft.com/office/drawing/2014/main" id="{7B72DA9B-F83A-4D7F-0005-C2E69276E7C8}"/>
-              </a:ext>
-            </a:extLst>
-          </p:cNvPr>
-          <p:cNvPicPr>
-            <a:picLocks noGrp="1" noChangeAspect="1"/>
-          </p:cNvPicPr>
-          <p:nvPr>
-            <p:ph idx="1"/>
-          </p:nvPr>
-        </p:nvPicPr>
-        <p:blipFill>
-          <a:blip r:embed="rId2"/>
-          <a:stretch>
-            <a:fillRect/>
-          </a:stretch>
-        </p:blipFill>
-        <p:spPr>
-          <a:xfrm>
-            <a:off x="2377935" y="136526"/>
-            <a:ext cx="6520259" cy="3191922"/>
-          </a:xfrm>
-        </p:spPr>
-      </p:pic>
-      <p:sp>
-        <p:nvSpPr>
-          <p:cNvPr id="4" name="Espace réservé du numéro de diapositive 3">
-            <a:extLst>
-              <a:ext uri="{FF2B5EF4-FFF2-40B4-BE49-F238E27FC236}">
-                <a16:creationId xmlns:a16="http://schemas.microsoft.com/office/drawing/2014/main" id="{D95F5FD9-86CD-681F-9B9A-2B4170F81355}"/>
-              </a:ext>
-            </a:extLst>
-          </p:cNvPr>
-          <p:cNvSpPr>
-            <a:spLocks noGrp="1"/>
-          </p:cNvSpPr>
-          <p:nvPr>
-            <p:ph type="sldNum" sz="quarter" idx="12"/>
-          </p:nvPr>
-        </p:nvSpPr>
-        <p:spPr/>
-        <p:txBody>
-          <a:bodyPr/>
-          <a:lstStyle/>
-          <a:p>
-            <a:fld id="{504562DC-6A68-4B1A-ACD4-40BBA2BD5EE0}" type="slidenum">
-              <a:rPr lang="fr-FR" smtClean="0"/>
-              <a:t>25</a:t>
-            </a:fld>
-            <a:endParaRPr lang="fr-FR"/>
-          </a:p>
-        </p:txBody>
-      </p:sp>
-      <p:pic>
-        <p:nvPicPr>
-          <p:cNvPr id="8" name="Image 7">
-            <a:extLst>
-              <a:ext uri="{FF2B5EF4-FFF2-40B4-BE49-F238E27FC236}">
-                <a16:creationId xmlns:a16="http://schemas.microsoft.com/office/drawing/2014/main" id="{F60C8A67-F0DE-A7AB-B459-12DC59040AD6}"/>
-              </a:ext>
-            </a:extLst>
-          </p:cNvPr>
-          <p:cNvPicPr>
-            <a:picLocks noChangeAspect="1"/>
-          </p:cNvPicPr>
-          <p:nvPr/>
-        </p:nvPicPr>
-        <p:blipFill>
-          <a:blip r:embed="rId3"/>
-          <a:stretch>
-            <a:fillRect/>
-          </a:stretch>
-        </p:blipFill>
-        <p:spPr>
-          <a:xfrm>
-            <a:off x="2377935" y="3254477"/>
-            <a:ext cx="6580876" cy="3466998"/>
-          </a:xfrm>
-          <a:prstGeom prst="rect">
-            <a:avLst/>
-          </a:prstGeom>
-        </p:spPr>
-      </p:pic>
-    </p:spTree>
-    <p:extLst>
-      <p:ext uri="{BB962C8B-B14F-4D97-AF65-F5344CB8AC3E}">
-        <p14:creationId xmlns:p14="http://schemas.microsoft.com/office/powerpoint/2010/main" val="221813195"/>
-      </p:ext>
-    </p:extLst>
-  </p:cSld>
-  <p:clrMapOvr>
-    <a:masterClrMapping/>
-  </p:clrMapOvr>
-</p:sld>
-</file>
-
-<file path=ppt/slides/slide26.xml><?xml version="1.0" encoding="utf-8"?>
-<p:sld xmlns:a="http://schemas.openxmlformats.org/drawingml/2006/main" xmlns:r="http://schemas.openxmlformats.org/officeDocument/2006/relationships" xmlns:p="http://schemas.openxmlformats.org/presentationml/2006/main">
-  <p:cSld>
-    <p:spTree>
-      <p:nvGrpSpPr>
-        <p:cNvPr id="1" name=""/>
-        <p:cNvGrpSpPr/>
-        <p:nvPr/>
-      </p:nvGrpSpPr>
-      <p:grpSpPr>
-        <a:xfrm>
-          <a:off x="0" y="0"/>
-          <a:ext cx="0" cy="0"/>
-          <a:chOff x="0" y="0"/>
-          <a:chExt cx="0" cy="0"/>
-        </a:xfrm>
-      </p:grpSpPr>
-      <p:sp>
-        <p:nvSpPr>
-          <p:cNvPr id="2" name="Titre 1">
-            <a:extLst>
-              <a:ext uri="{FF2B5EF4-FFF2-40B4-BE49-F238E27FC236}">
-                <a16:creationId xmlns:a16="http://schemas.microsoft.com/office/drawing/2014/main" id="{71B8B1D2-694D-4124-BFA6-F2C501B35109}"/>
-              </a:ext>
-            </a:extLst>
-          </p:cNvPr>
-          <p:cNvSpPr>
-            <a:spLocks noGrp="1"/>
-          </p:cNvSpPr>
-          <p:nvPr>
-            <p:ph type="title"/>
-          </p:nvPr>
-        </p:nvSpPr>
-        <p:spPr>
-          <a:xfrm>
-            <a:off x="838200" y="365126"/>
-            <a:ext cx="10515600" cy="732118"/>
-          </a:xfrm>
-        </p:spPr>
-        <p:txBody>
-          <a:bodyPr/>
-          <a:lstStyle/>
-          <a:p>
-            <a:pPr algn="ctr"/>
-            <a:r>
-              <a:rPr lang="fr-FR"/>
-              <a:t>UML Modèle</a:t>
-            </a:r>
-            <a:endParaRPr lang="fr-FR" dirty="0"/>
-          </a:p>
-        </p:txBody>
-      </p:sp>
-      <p:sp>
-        <p:nvSpPr>
-          <p:cNvPr id="4" name="Espace réservé du numéro de diapositive 3">
-            <a:extLst>
-              <a:ext uri="{FF2B5EF4-FFF2-40B4-BE49-F238E27FC236}">
-                <a16:creationId xmlns:a16="http://schemas.microsoft.com/office/drawing/2014/main" id="{CE404544-46A4-47E3-ABC8-EAD4F49196F5}"/>
-              </a:ext>
-            </a:extLst>
-          </p:cNvPr>
-          <p:cNvSpPr>
-            <a:spLocks noGrp="1"/>
-          </p:cNvSpPr>
-          <p:nvPr>
-            <p:ph type="sldNum" sz="quarter" idx="12"/>
-          </p:nvPr>
-        </p:nvSpPr>
-        <p:spPr/>
-        <p:txBody>
-          <a:bodyPr/>
-          <a:lstStyle/>
-          <a:p>
-            <a:fld id="{504562DC-6A68-4B1A-ACD4-40BBA2BD5EE0}" type="slidenum">
-              <a:rPr lang="fr-FR" smtClean="0">
-                <a:solidFill>
-                  <a:schemeClr val="tx1"/>
-                </a:solidFill>
-              </a:rPr>
-              <a:t>26</a:t>
+              <a:t>5</a:t>
             </a:fld>
             <a:endParaRPr lang="fr-FR" dirty="0">
               <a:solidFill>
@@ -7720,608 +7506,6 @@
 </p:sld>
 </file>
 
-<file path=ppt/slides/slide3.xml><?xml version="1.0" encoding="utf-8"?>
-<p:sld xmlns:a="http://schemas.openxmlformats.org/drawingml/2006/main" xmlns:r="http://schemas.openxmlformats.org/officeDocument/2006/relationships" xmlns:p="http://schemas.openxmlformats.org/presentationml/2006/main">
-  <p:cSld>
-    <p:spTree>
-      <p:nvGrpSpPr>
-        <p:cNvPr id="1" name=""/>
-        <p:cNvGrpSpPr/>
-        <p:nvPr/>
-      </p:nvGrpSpPr>
-      <p:grpSpPr>
-        <a:xfrm>
-          <a:off x="0" y="0"/>
-          <a:ext cx="0" cy="0"/>
-          <a:chOff x="0" y="0"/>
-          <a:chExt cx="0" cy="0"/>
-        </a:xfrm>
-      </p:grpSpPr>
-      <p:sp>
-        <p:nvSpPr>
-          <p:cNvPr id="2" name="Titre 1">
-            <a:extLst>
-              <a:ext uri="{FF2B5EF4-FFF2-40B4-BE49-F238E27FC236}">
-                <a16:creationId xmlns:a16="http://schemas.microsoft.com/office/drawing/2014/main" id="{42EC595B-F242-4543-A4EB-D42B84EE2613}"/>
-              </a:ext>
-            </a:extLst>
-          </p:cNvPr>
-          <p:cNvSpPr>
-            <a:spLocks noGrp="1"/>
-          </p:cNvSpPr>
-          <p:nvPr>
-            <p:ph type="title"/>
-          </p:nvPr>
-        </p:nvSpPr>
-        <p:spPr/>
-        <p:txBody>
-          <a:bodyPr/>
-          <a:lstStyle/>
-          <a:p>
-            <a:pPr algn="ctr"/>
-            <a:r>
-              <a:rPr lang="fr-FR"/>
-              <a:t>Exigences</a:t>
-            </a:r>
-            <a:endParaRPr lang="fr-FR" dirty="0"/>
-          </a:p>
-        </p:txBody>
-      </p:sp>
-      <p:sp>
-        <p:nvSpPr>
-          <p:cNvPr id="3" name="Espace réservé du contenu 2">
-            <a:extLst>
-              <a:ext uri="{FF2B5EF4-FFF2-40B4-BE49-F238E27FC236}">
-                <a16:creationId xmlns:a16="http://schemas.microsoft.com/office/drawing/2014/main" id="{15EDCA51-41BE-49FE-A2C4-320E6D755AA5}"/>
-              </a:ext>
-            </a:extLst>
-          </p:cNvPr>
-          <p:cNvSpPr>
-            <a:spLocks noGrp="1"/>
-          </p:cNvSpPr>
-          <p:nvPr>
-            <p:ph idx="1"/>
-          </p:nvPr>
-        </p:nvSpPr>
-        <p:spPr>
-          <a:xfrm>
-            <a:off x="487680" y="1825625"/>
-            <a:ext cx="11155680" cy="4351338"/>
-          </a:xfrm>
-        </p:spPr>
-        <p:txBody>
-          <a:bodyPr>
-            <a:normAutofit fontScale="92500" lnSpcReduction="10000"/>
-          </a:bodyPr>
-          <a:lstStyle/>
-          <a:p>
-            <a:pPr marL="365125" indent="-365125">
-              <a:buFont typeface="Wingdings" panose="05000000000000000000" pitchFamily="2" charset="2"/>
-              <a:buChar char="Ø"/>
-            </a:pPr>
-            <a:r>
-              <a:rPr lang="fr-FR"/>
-              <a:t>le serveur d'alertes SafetyNet démarre ;</a:t>
-            </a:r>
-          </a:p>
-          <a:p>
-            <a:pPr marL="365125" indent="-365125">
-              <a:buFont typeface="Wingdings" panose="05000000000000000000" pitchFamily="2" charset="2"/>
-              <a:buChar char="Ø"/>
-            </a:pPr>
-            <a:r>
-              <a:rPr lang="fr-FR"/>
-              <a:t>tous les endpoints url sont fonctionnels ainsi que les Actuators health, info, trace et metrics ;</a:t>
-            </a:r>
-          </a:p>
-          <a:p>
-            <a:pPr marL="365125" indent="-365125">
-              <a:buFont typeface="Wingdings" panose="05000000000000000000" pitchFamily="2" charset="2"/>
-              <a:buChar char="Ø"/>
-            </a:pPr>
-            <a:r>
-              <a:rPr lang="fr-FR"/>
-              <a:t>tous les endpoints url enregistrent leurs requêtes et leurs réponses :</a:t>
-            </a:r>
-          </a:p>
-          <a:p>
-            <a:pPr lvl="1">
-              <a:buFont typeface="Wingdings" panose="05000000000000000000" pitchFamily="2" charset="2"/>
-              <a:buChar char="ü"/>
-            </a:pPr>
-            <a:r>
-              <a:rPr lang="fr-FR"/>
-              <a:t> log niveau info si réussite,</a:t>
-            </a:r>
-          </a:p>
-          <a:p>
-            <a:pPr lvl="1">
-              <a:buFont typeface="Wingdings" panose="05000000000000000000" pitchFamily="2" charset="2"/>
-              <a:buChar char="ü"/>
-            </a:pPr>
-            <a:r>
-              <a:rPr lang="fr-FR"/>
-              <a:t> log niveau erreur si  erreurs ou exceptions,</a:t>
-            </a:r>
-          </a:p>
-          <a:p>
-            <a:pPr lvl="1">
-              <a:buFont typeface="Wingdings" panose="05000000000000000000" pitchFamily="2" charset="2"/>
-              <a:buChar char="ü"/>
-            </a:pPr>
-            <a:r>
-              <a:rPr lang="fr-FR"/>
-              <a:t> log niveau debug pour les étapes ou calculs informatif.</a:t>
-            </a:r>
-          </a:p>
-          <a:p>
-            <a:pPr marL="365125" indent="-365125">
-              <a:buFont typeface="Wingdings" panose="05000000000000000000" pitchFamily="2" charset="2"/>
-              <a:buChar char="Ø"/>
-            </a:pPr>
-            <a:r>
-              <a:rPr lang="fr-FR"/>
-              <a:t>mvn : test, verify, package et site (→ </a:t>
-            </a:r>
-            <a:r>
-              <a:rPr lang="en-US"/>
-              <a:t>JavaDocs, SpotBugs, Surefire &amp; Failsafe, Jacoco reports)</a:t>
-            </a:r>
-          </a:p>
-          <a:p>
-            <a:pPr marL="365125" indent="-365125">
-              <a:buFont typeface="Wingdings" panose="05000000000000000000" pitchFamily="2" charset="2"/>
-              <a:buChar char="Ø"/>
-            </a:pPr>
-            <a:r>
-              <a:rPr lang="fr-FR"/>
-              <a:t>couverture JaCoCo de code de 80 %</a:t>
-            </a:r>
-          </a:p>
-          <a:p>
-            <a:pPr marL="365125" indent="-365125">
-              <a:buFont typeface="Wingdings" panose="05000000000000000000" pitchFamily="2" charset="2"/>
-              <a:buChar char="Ø"/>
-            </a:pPr>
-            <a:r>
-              <a:rPr lang="fr-FR"/>
-              <a:t>la base de code adhère aux principes SOLID</a:t>
-            </a:r>
-            <a:endParaRPr lang="fr-FR" dirty="0"/>
-          </a:p>
-        </p:txBody>
-      </p:sp>
-      <p:sp>
-        <p:nvSpPr>
-          <p:cNvPr id="4" name="Espace réservé du numéro de diapositive 3">
-            <a:extLst>
-              <a:ext uri="{FF2B5EF4-FFF2-40B4-BE49-F238E27FC236}">
-                <a16:creationId xmlns:a16="http://schemas.microsoft.com/office/drawing/2014/main" id="{D46998E7-1987-4497-B45B-2C68884A6A68}"/>
-              </a:ext>
-            </a:extLst>
-          </p:cNvPr>
-          <p:cNvSpPr>
-            <a:spLocks noGrp="1"/>
-          </p:cNvSpPr>
-          <p:nvPr>
-            <p:ph type="sldNum" sz="quarter" idx="12"/>
-          </p:nvPr>
-        </p:nvSpPr>
-        <p:spPr/>
-        <p:txBody>
-          <a:bodyPr/>
-          <a:lstStyle/>
-          <a:p>
-            <a:fld id="{504562DC-6A68-4B1A-ACD4-40BBA2BD5EE0}" type="slidenum">
-              <a:rPr lang="fr-FR" smtClean="0">
-                <a:solidFill>
-                  <a:schemeClr val="tx1"/>
-                </a:solidFill>
-              </a:rPr>
-              <a:t>3</a:t>
-            </a:fld>
-            <a:endParaRPr lang="fr-FR" dirty="0">
-              <a:solidFill>
-                <a:schemeClr val="tx1"/>
-              </a:solidFill>
-            </a:endParaRPr>
-          </a:p>
-        </p:txBody>
-      </p:sp>
-    </p:spTree>
-    <p:extLst>
-      <p:ext uri="{BB962C8B-B14F-4D97-AF65-F5344CB8AC3E}">
-        <p14:creationId xmlns:p14="http://schemas.microsoft.com/office/powerpoint/2010/main" val="383149609"/>
-      </p:ext>
-    </p:extLst>
-  </p:cSld>
-  <p:clrMapOvr>
-    <a:masterClrMapping/>
-  </p:clrMapOvr>
-</p:sld>
-</file>
-
-<file path=ppt/slides/slide4.xml><?xml version="1.0" encoding="utf-8"?>
-<p:sld xmlns:a="http://schemas.openxmlformats.org/drawingml/2006/main" xmlns:r="http://schemas.openxmlformats.org/officeDocument/2006/relationships" xmlns:p="http://schemas.openxmlformats.org/presentationml/2006/main">
-  <p:cSld>
-    <p:spTree>
-      <p:nvGrpSpPr>
-        <p:cNvPr id="1" name=""/>
-        <p:cNvGrpSpPr/>
-        <p:nvPr/>
-      </p:nvGrpSpPr>
-      <p:grpSpPr>
-        <a:xfrm>
-          <a:off x="0" y="0"/>
-          <a:ext cx="0" cy="0"/>
-          <a:chOff x="0" y="0"/>
-          <a:chExt cx="0" cy="0"/>
-        </a:xfrm>
-      </p:grpSpPr>
-      <p:sp>
-        <p:nvSpPr>
-          <p:cNvPr id="2" name="Titre 1">
-            <a:extLst>
-              <a:ext uri="{FF2B5EF4-FFF2-40B4-BE49-F238E27FC236}">
-                <a16:creationId xmlns:a16="http://schemas.microsoft.com/office/drawing/2014/main" id="{71B8B1D2-694D-4124-BFA6-F2C501B35109}"/>
-              </a:ext>
-            </a:extLst>
-          </p:cNvPr>
-          <p:cNvSpPr>
-            <a:spLocks noGrp="1"/>
-          </p:cNvSpPr>
-          <p:nvPr>
-            <p:ph type="title"/>
-          </p:nvPr>
-        </p:nvSpPr>
-        <p:spPr/>
-        <p:txBody>
-          <a:bodyPr/>
-          <a:lstStyle/>
-          <a:p>
-            <a:pPr algn="ctr"/>
-            <a:r>
-              <a:rPr lang="fr-FR"/>
-              <a:t>Les besoins du back-end</a:t>
-            </a:r>
-            <a:endParaRPr lang="fr-FR" dirty="0"/>
-          </a:p>
-        </p:txBody>
-      </p:sp>
-      <p:sp>
-        <p:nvSpPr>
-          <p:cNvPr id="3" name="Espace réservé du contenu 2">
-            <a:extLst>
-              <a:ext uri="{FF2B5EF4-FFF2-40B4-BE49-F238E27FC236}">
-                <a16:creationId xmlns:a16="http://schemas.microsoft.com/office/drawing/2014/main" id="{7C9B0652-5A35-430D-A916-25405324295F}"/>
-              </a:ext>
-            </a:extLst>
-          </p:cNvPr>
-          <p:cNvSpPr>
-            <a:spLocks noGrp="1"/>
-          </p:cNvSpPr>
-          <p:nvPr>
-            <p:ph idx="1"/>
-          </p:nvPr>
-        </p:nvSpPr>
-        <p:spPr>
-          <a:xfrm>
-            <a:off x="838200" y="2336799"/>
-            <a:ext cx="10515600" cy="3840163"/>
-          </a:xfrm>
-        </p:spPr>
-        <p:txBody>
-          <a:bodyPr>
-            <a:normAutofit/>
-          </a:bodyPr>
-          <a:lstStyle/>
-          <a:p>
-            <a:pPr marL="365125" indent="-365125">
-              <a:spcAft>
-                <a:spcPts val="1200"/>
-              </a:spcAft>
-              <a:buFont typeface="Wingdings" panose="05000000000000000000" pitchFamily="2" charset="2"/>
-              <a:buChar char="Ø"/>
-            </a:pPr>
-            <a:r>
-              <a:rPr lang="fr-FR"/>
-              <a:t>lire le fichier de données ./resources/input/data.json</a:t>
-            </a:r>
-            <a:endParaRPr lang="fr-FR" dirty="0"/>
-          </a:p>
-          <a:p>
-            <a:pPr marL="365125" indent="-365125">
-              <a:spcAft>
-                <a:spcPts val="1200"/>
-              </a:spcAft>
-              <a:buFont typeface="Wingdings" panose="05000000000000000000" pitchFamily="2" charset="2"/>
-              <a:buChar char="Ø"/>
-            </a:pPr>
-            <a:r>
-              <a:rPr lang="fr-FR"/>
-              <a:t>produire en sortie dans ./resources/output/ un fichier JSON à partir des URL correspondant à des endpoints que l’application doit disposer.</a:t>
-            </a:r>
-          </a:p>
-          <a:p>
-            <a:pPr marL="365125" indent="-365125">
-              <a:spcAft>
-                <a:spcPts val="1200"/>
-              </a:spcAft>
-              <a:buFont typeface="Wingdings" panose="05000000000000000000" pitchFamily="2" charset="2"/>
-              <a:buChar char="Ø"/>
-            </a:pPr>
-            <a:r>
-              <a:rPr lang="fr-FR"/>
-              <a:t>besoin d’autres endpoints pour la mise à jour des données</a:t>
-            </a:r>
-          </a:p>
-        </p:txBody>
-      </p:sp>
-      <p:sp>
-        <p:nvSpPr>
-          <p:cNvPr id="4" name="Espace réservé du numéro de diapositive 3">
-            <a:extLst>
-              <a:ext uri="{FF2B5EF4-FFF2-40B4-BE49-F238E27FC236}">
-                <a16:creationId xmlns:a16="http://schemas.microsoft.com/office/drawing/2014/main" id="{CE404544-46A4-47E3-ABC8-EAD4F49196F5}"/>
-              </a:ext>
-            </a:extLst>
-          </p:cNvPr>
-          <p:cNvSpPr>
-            <a:spLocks noGrp="1"/>
-          </p:cNvSpPr>
-          <p:nvPr>
-            <p:ph type="sldNum" sz="quarter" idx="12"/>
-          </p:nvPr>
-        </p:nvSpPr>
-        <p:spPr/>
-        <p:txBody>
-          <a:bodyPr/>
-          <a:lstStyle/>
-          <a:p>
-            <a:fld id="{504562DC-6A68-4B1A-ACD4-40BBA2BD5EE0}" type="slidenum">
-              <a:rPr lang="fr-FR" smtClean="0">
-                <a:solidFill>
-                  <a:schemeClr val="tx1"/>
-                </a:solidFill>
-              </a:rPr>
-              <a:t>4</a:t>
-            </a:fld>
-            <a:endParaRPr lang="fr-FR" dirty="0">
-              <a:solidFill>
-                <a:schemeClr val="tx1"/>
-              </a:solidFill>
-            </a:endParaRPr>
-          </a:p>
-        </p:txBody>
-      </p:sp>
-    </p:spTree>
-    <p:extLst>
-      <p:ext uri="{BB962C8B-B14F-4D97-AF65-F5344CB8AC3E}">
-        <p14:creationId xmlns:p14="http://schemas.microsoft.com/office/powerpoint/2010/main" val="3411694865"/>
-      </p:ext>
-    </p:extLst>
-  </p:cSld>
-  <p:clrMapOvr>
-    <a:masterClrMapping/>
-  </p:clrMapOvr>
-</p:sld>
-</file>
-
-<file path=ppt/slides/slide5.xml><?xml version="1.0" encoding="utf-8"?>
-<p:sld xmlns:a="http://schemas.openxmlformats.org/drawingml/2006/main" xmlns:r="http://schemas.openxmlformats.org/officeDocument/2006/relationships" xmlns:p="http://schemas.openxmlformats.org/presentationml/2006/main">
-  <p:cSld>
-    <p:spTree>
-      <p:nvGrpSpPr>
-        <p:cNvPr id="1" name=""/>
-        <p:cNvGrpSpPr/>
-        <p:nvPr/>
-      </p:nvGrpSpPr>
-      <p:grpSpPr>
-        <a:xfrm>
-          <a:off x="0" y="0"/>
-          <a:ext cx="0" cy="0"/>
-          <a:chOff x="0" y="0"/>
-          <a:chExt cx="0" cy="0"/>
-        </a:xfrm>
-      </p:grpSpPr>
-      <p:sp>
-        <p:nvSpPr>
-          <p:cNvPr id="2" name="Titre 1">
-            <a:extLst>
-              <a:ext uri="{FF2B5EF4-FFF2-40B4-BE49-F238E27FC236}">
-                <a16:creationId xmlns:a16="http://schemas.microsoft.com/office/drawing/2014/main" id="{71B8B1D2-694D-4124-BFA6-F2C501B35109}"/>
-              </a:ext>
-            </a:extLst>
-          </p:cNvPr>
-          <p:cNvSpPr>
-            <a:spLocks noGrp="1"/>
-          </p:cNvSpPr>
-          <p:nvPr>
-            <p:ph type="title"/>
-          </p:nvPr>
-        </p:nvSpPr>
-        <p:spPr/>
-        <p:txBody>
-          <a:bodyPr/>
-          <a:lstStyle/>
-          <a:p>
-            <a:pPr marL="0" indent="0" defTabSz="360000">
-              <a:spcBef>
-                <a:spcPts val="0"/>
-              </a:spcBef>
-              <a:buNone/>
-            </a:pPr>
-            <a:r>
-              <a:rPr lang="en-US" sz="4400">
-                <a:solidFill>
-                  <a:srgbClr val="0070C0"/>
-                </a:solidFill>
-                <a:latin typeface="Consolas" panose="020B0609020204030204" pitchFamily="49" charset="0"/>
-              </a:rPr>
-              <a:t>http://localhost:8080/firestation?stationNumber=&lt;station_number&gt;</a:t>
-            </a:r>
-            <a:endParaRPr lang="fr-FR" sz="4400" dirty="0">
-              <a:solidFill>
-                <a:srgbClr val="0070C0"/>
-              </a:solidFill>
-              <a:latin typeface="Consolas" panose="020B0609020204030204" pitchFamily="49" charset="0"/>
-            </a:endParaRPr>
-          </a:p>
-        </p:txBody>
-      </p:sp>
-      <p:sp>
-        <p:nvSpPr>
-          <p:cNvPr id="3" name="Espace réservé du contenu 2">
-            <a:extLst>
-              <a:ext uri="{FF2B5EF4-FFF2-40B4-BE49-F238E27FC236}">
-                <a16:creationId xmlns:a16="http://schemas.microsoft.com/office/drawing/2014/main" id="{7C9B0652-5A35-430D-A916-25405324295F}"/>
-              </a:ext>
-            </a:extLst>
-          </p:cNvPr>
-          <p:cNvSpPr>
-            <a:spLocks noGrp="1"/>
-          </p:cNvSpPr>
-          <p:nvPr>
-            <p:ph idx="1"/>
-          </p:nvPr>
-        </p:nvSpPr>
-        <p:spPr>
-          <a:xfrm>
-            <a:off x="838200" y="1690689"/>
-            <a:ext cx="10515600" cy="4582292"/>
-          </a:xfrm>
-        </p:spPr>
-        <p:txBody>
-          <a:bodyPr>
-            <a:normAutofit/>
-          </a:bodyPr>
-          <a:lstStyle/>
-          <a:p>
-            <a:pPr marL="0" indent="0" defTabSz="360000">
-              <a:spcBef>
-                <a:spcPts val="0"/>
-              </a:spcBef>
-              <a:buNone/>
-            </a:pPr>
-            <a:endParaRPr lang="fr-FR"/>
-          </a:p>
-          <a:p>
-            <a:pPr marL="0" indent="0" defTabSz="360000">
-              <a:spcBef>
-                <a:spcPts val="0"/>
-              </a:spcBef>
-              <a:buNone/>
-            </a:pPr>
-            <a:endParaRPr lang="fr-FR"/>
-          </a:p>
-          <a:p>
-            <a:pPr marL="365125" indent="-365125">
-              <a:spcAft>
-                <a:spcPts val="1200"/>
-              </a:spcAft>
-              <a:buFont typeface="Wingdings" panose="05000000000000000000" pitchFamily="2" charset="2"/>
-              <a:buChar char="Ø"/>
-            </a:pPr>
-            <a:r>
-              <a:rPr lang="fr-FR"/>
-              <a:t>Cette </a:t>
-            </a:r>
-            <a:r>
-              <a:rPr lang="fr-FR" dirty="0"/>
-              <a:t>url doit retourner une liste des personnes couvertes par la caserne de </a:t>
-            </a:r>
-            <a:r>
-              <a:rPr lang="fr-FR"/>
-              <a:t>pompiers correspondante avec </a:t>
-            </a:r>
-            <a:r>
-              <a:rPr lang="fr-FR" dirty="0"/>
-              <a:t>un décompte du nombre d'adultes et du nombre d'enfants (âge &lt;= 18 ans)</a:t>
-            </a:r>
-          </a:p>
-          <a:p>
-            <a:pPr marL="365125" indent="-365125">
-              <a:spcAft>
-                <a:spcPts val="1200"/>
-              </a:spcAft>
-              <a:buFont typeface="Wingdings" panose="05000000000000000000" pitchFamily="2" charset="2"/>
-              <a:buChar char="Ø"/>
-            </a:pPr>
-            <a:endParaRPr lang="fr-FR" dirty="0"/>
-          </a:p>
-          <a:p>
-            <a:pPr marL="365125" indent="-365125">
-              <a:spcAft>
-                <a:spcPts val="1200"/>
-              </a:spcAft>
-              <a:buFont typeface="Wingdings" panose="05000000000000000000" pitchFamily="2" charset="2"/>
-              <a:buChar char="Ø"/>
-            </a:pPr>
-            <a:r>
-              <a:rPr lang="fr-FR"/>
-              <a:t>Sont précisés par personne : prénom</a:t>
-            </a:r>
-            <a:r>
-              <a:rPr lang="fr-FR" dirty="0"/>
-              <a:t>, nom, adresse, numéro </a:t>
-            </a:r>
-            <a:r>
-              <a:rPr lang="fr-FR"/>
-              <a:t>de téléphone</a:t>
-            </a:r>
-          </a:p>
-        </p:txBody>
-      </p:sp>
-      <p:sp>
-        <p:nvSpPr>
-          <p:cNvPr id="4" name="Espace réservé du numéro de diapositive 3">
-            <a:extLst>
-              <a:ext uri="{FF2B5EF4-FFF2-40B4-BE49-F238E27FC236}">
-                <a16:creationId xmlns:a16="http://schemas.microsoft.com/office/drawing/2014/main" id="{CE404544-46A4-47E3-ABC8-EAD4F49196F5}"/>
-              </a:ext>
-            </a:extLst>
-          </p:cNvPr>
-          <p:cNvSpPr>
-            <a:spLocks noGrp="1"/>
-          </p:cNvSpPr>
-          <p:nvPr>
-            <p:ph type="sldNum" sz="quarter" idx="12"/>
-          </p:nvPr>
-        </p:nvSpPr>
-        <p:spPr/>
-        <p:txBody>
-          <a:bodyPr/>
-          <a:lstStyle/>
-          <a:p>
-            <a:fld id="{504562DC-6A68-4B1A-ACD4-40BBA2BD5EE0}" type="slidenum">
-              <a:rPr lang="fr-FR" smtClean="0">
-                <a:solidFill>
-                  <a:schemeClr val="tx1"/>
-                </a:solidFill>
-              </a:rPr>
-              <a:t>5</a:t>
-            </a:fld>
-            <a:endParaRPr lang="fr-FR" dirty="0">
-              <a:solidFill>
-                <a:schemeClr val="tx1"/>
-              </a:solidFill>
-            </a:endParaRPr>
-          </a:p>
-        </p:txBody>
-      </p:sp>
-    </p:spTree>
-    <p:extLst>
-      <p:ext uri="{BB962C8B-B14F-4D97-AF65-F5344CB8AC3E}">
-        <p14:creationId xmlns:p14="http://schemas.microsoft.com/office/powerpoint/2010/main" val="3740756343"/>
-      </p:ext>
-    </p:extLst>
-  </p:cSld>
-  <p:clrMapOvr>
-    <a:masterClrMapping/>
-  </p:clrMapOvr>
-</p:sld>
-</file>
-
 <file path=ppt/slides/slide6.xml><?xml version="1.0" encoding="utf-8"?>
 <p:sld xmlns:a="http://schemas.openxmlformats.org/drawingml/2006/main" xmlns:r="http://schemas.openxmlformats.org/officeDocument/2006/relationships" xmlns:p="http://schemas.openxmlformats.org/presentationml/2006/main">
   <p:cSld>
@@ -8339,41 +7523,160 @@
           <a:chExt cx="0" cy="0"/>
         </a:xfrm>
       </p:grpSpPr>
-      <p:pic>
-        <p:nvPicPr>
-          <p:cNvPr id="6" name="Espace réservé du contenu 5">
-            <a:extLst>
-              <a:ext uri="{FF2B5EF4-FFF2-40B4-BE49-F238E27FC236}">
-                <a16:creationId xmlns:a16="http://schemas.microsoft.com/office/drawing/2014/main" id="{480D58F0-2A33-456B-8C86-1D885523E4E7}"/>
-              </a:ext>
-            </a:extLst>
-          </p:cNvPr>
-          <p:cNvPicPr>
-            <a:picLocks noGrp="1" noChangeAspect="1"/>
-          </p:cNvPicPr>
+      <p:sp>
+        <p:nvSpPr>
+          <p:cNvPr id="2" name="Titre 1">
+            <a:extLst>
+              <a:ext uri="{FF2B5EF4-FFF2-40B4-BE49-F238E27FC236}">
+                <a16:creationId xmlns:a16="http://schemas.microsoft.com/office/drawing/2014/main" id="{71B8B1D2-694D-4124-BFA6-F2C501B35109}"/>
+              </a:ext>
+            </a:extLst>
+          </p:cNvPr>
+          <p:cNvSpPr>
+            <a:spLocks noGrp="1"/>
+          </p:cNvSpPr>
+          <p:nvPr>
+            <p:ph type="title"/>
+          </p:nvPr>
+        </p:nvSpPr>
+        <p:spPr/>
+        <p:txBody>
+          <a:bodyPr/>
+          <a:lstStyle/>
+          <a:p>
+            <a:pPr marL="0" indent="0" defTabSz="360000">
+              <a:spcBef>
+                <a:spcPts val="0"/>
+              </a:spcBef>
+              <a:buNone/>
+            </a:pPr>
+            <a:r>
+              <a:rPr lang="en-US" sz="4400">
+                <a:solidFill>
+                  <a:srgbClr val="0070C0"/>
+                </a:solidFill>
+                <a:latin typeface="Consolas" panose="020B0609020204030204" pitchFamily="49" charset="0"/>
+              </a:rPr>
+              <a:t>http://localhost:8080/firestation?stationNumber=&lt;station_number&gt;</a:t>
+            </a:r>
+            <a:endParaRPr lang="fr-FR" sz="4400" dirty="0">
+              <a:solidFill>
+                <a:srgbClr val="0070C0"/>
+              </a:solidFill>
+              <a:latin typeface="Consolas" panose="020B0609020204030204" pitchFamily="49" charset="0"/>
+            </a:endParaRPr>
+          </a:p>
+        </p:txBody>
+      </p:sp>
+      <p:sp>
+        <p:nvSpPr>
+          <p:cNvPr id="3" name="Espace réservé du contenu 2">
+            <a:extLst>
+              <a:ext uri="{FF2B5EF4-FFF2-40B4-BE49-F238E27FC236}">
+                <a16:creationId xmlns:a16="http://schemas.microsoft.com/office/drawing/2014/main" id="{7C9B0652-5A35-430D-A916-25405324295F}"/>
+              </a:ext>
+            </a:extLst>
+          </p:cNvPr>
+          <p:cNvSpPr>
+            <a:spLocks noGrp="1"/>
+          </p:cNvSpPr>
           <p:nvPr>
             <p:ph idx="1"/>
           </p:nvPr>
-        </p:nvPicPr>
-        <p:blipFill>
-          <a:blip r:embed="rId2"/>
-          <a:stretch>
-            <a:fillRect/>
-          </a:stretch>
-        </p:blipFill>
+        </p:nvSpPr>
         <p:spPr>
           <a:xfrm>
-            <a:off x="1682693" y="136525"/>
-            <a:ext cx="8826614" cy="6534266"/>
+            <a:off x="838200" y="1690689"/>
+            <a:ext cx="10515600" cy="4582292"/>
           </a:xfrm>
         </p:spPr>
-      </p:pic>
+        <p:txBody>
+          <a:bodyPr>
+            <a:normAutofit/>
+          </a:bodyPr>
+          <a:lstStyle/>
+          <a:p>
+            <a:pPr marL="0" indent="0" defTabSz="360000">
+              <a:spcBef>
+                <a:spcPts val="0"/>
+              </a:spcBef>
+              <a:buNone/>
+            </a:pPr>
+            <a:endParaRPr lang="fr-FR"/>
+          </a:p>
+          <a:p>
+            <a:pPr marL="0" indent="0" defTabSz="360000">
+              <a:spcBef>
+                <a:spcPts val="0"/>
+              </a:spcBef>
+              <a:buNone/>
+            </a:pPr>
+            <a:endParaRPr lang="fr-FR"/>
+          </a:p>
+          <a:p>
+            <a:pPr marL="365125" indent="-365125">
+              <a:spcAft>
+                <a:spcPts val="1200"/>
+              </a:spcAft>
+              <a:buFont typeface="Wingdings" panose="05000000000000000000" pitchFamily="2" charset="2"/>
+              <a:buChar char="Ø"/>
+            </a:pPr>
+            <a:r>
+              <a:rPr lang="fr-FR"/>
+              <a:t>Cette </a:t>
+            </a:r>
+            <a:r>
+              <a:rPr lang="fr-FR" dirty="0"/>
+              <a:t>url doit retourner une liste des personnes couvertes par la caserne de </a:t>
+            </a:r>
+            <a:r>
+              <a:rPr lang="fr-FR"/>
+              <a:t>pompiers correspondante avec </a:t>
+            </a:r>
+            <a:r>
+              <a:rPr lang="fr-FR" dirty="0"/>
+              <a:t>un décompte du nombre d'adultes et du nombre d'enfants (âge &lt;= 18 ans)</a:t>
+            </a:r>
+          </a:p>
+          <a:p>
+            <a:pPr marL="365125" indent="-365125">
+              <a:spcAft>
+                <a:spcPts val="1200"/>
+              </a:spcAft>
+              <a:buFont typeface="Wingdings" panose="05000000000000000000" pitchFamily="2" charset="2"/>
+              <a:buChar char="Ø"/>
+            </a:pPr>
+            <a:endParaRPr lang="fr-FR" dirty="0"/>
+          </a:p>
+          <a:p>
+            <a:pPr marL="365125" indent="-365125">
+              <a:spcAft>
+                <a:spcPts val="1200"/>
+              </a:spcAft>
+              <a:buFont typeface="Wingdings" panose="05000000000000000000" pitchFamily="2" charset="2"/>
+              <a:buChar char="Ø"/>
+            </a:pPr>
+            <a:r>
+              <a:rPr lang="fr-FR"/>
+              <a:t>Sont précisés par personne : prénom</a:t>
+            </a:r>
+            <a:r>
+              <a:rPr lang="fr-FR" dirty="0"/>
+              <a:t>, nom, adresse, numéro </a:t>
+            </a:r>
+            <a:r>
+              <a:rPr lang="fr-FR"/>
+              <a:t>de téléphone</a:t>
+            </a:r>
+          </a:p>
+        </p:txBody>
+      </p:sp>
       <p:sp>
         <p:nvSpPr>
           <p:cNvPr id="4" name="Espace réservé du numéro de diapositive 3">
             <a:extLst>
               <a:ext uri="{FF2B5EF4-FFF2-40B4-BE49-F238E27FC236}">
-                <a16:creationId xmlns:a16="http://schemas.microsoft.com/office/drawing/2014/main" id="{79014F16-6182-051B-387A-2E6F9E821148}"/>
+                <a16:creationId xmlns:a16="http://schemas.microsoft.com/office/drawing/2014/main" id="{CE404544-46A4-47E3-ABC8-EAD4F49196F5}"/>
               </a:ext>
             </a:extLst>
           </p:cNvPr>
@@ -8390,17 +7693,25 @@
           <a:lstStyle/>
           <a:p>
             <a:fld id="{504562DC-6A68-4B1A-ACD4-40BBA2BD5EE0}" type="slidenum">
-              <a:rPr lang="fr-FR" smtClean="0"/>
+              <a:rPr lang="fr-FR" smtClean="0">
+                <a:solidFill>
+                  <a:schemeClr val="tx1"/>
+                </a:solidFill>
+              </a:rPr>
               <a:t>6</a:t>
             </a:fld>
-            <a:endParaRPr lang="fr-FR"/>
+            <a:endParaRPr lang="fr-FR" dirty="0">
+              <a:solidFill>
+                <a:schemeClr val="tx1"/>
+              </a:solidFill>
+            </a:endParaRPr>
           </a:p>
         </p:txBody>
       </p:sp>
     </p:spTree>
     <p:extLst>
       <p:ext uri="{BB962C8B-B14F-4D97-AF65-F5344CB8AC3E}">
-        <p14:creationId xmlns:p14="http://schemas.microsoft.com/office/powerpoint/2010/main" val="1211651386"/>
+        <p14:creationId xmlns:p14="http://schemas.microsoft.com/office/powerpoint/2010/main" val="3740756343"/>
       </p:ext>
     </p:extLst>
   </p:cSld>
@@ -8427,41 +7738,140 @@
           <a:chExt cx="0" cy="0"/>
         </a:xfrm>
       </p:grpSpPr>
-      <p:pic>
-        <p:nvPicPr>
-          <p:cNvPr id="6" name="Espace réservé du contenu 5">
-            <a:extLst>
-              <a:ext uri="{FF2B5EF4-FFF2-40B4-BE49-F238E27FC236}">
-                <a16:creationId xmlns:a16="http://schemas.microsoft.com/office/drawing/2014/main" id="{6C18A1D1-BA61-BAD6-7100-D02B91BAFD0D}"/>
-              </a:ext>
-            </a:extLst>
-          </p:cNvPr>
-          <p:cNvPicPr>
-            <a:picLocks noGrp="1" noChangeAspect="1"/>
-          </p:cNvPicPr>
+      <p:sp>
+        <p:nvSpPr>
+          <p:cNvPr id="2" name="Titre 1">
+            <a:extLst>
+              <a:ext uri="{FF2B5EF4-FFF2-40B4-BE49-F238E27FC236}">
+                <a16:creationId xmlns:a16="http://schemas.microsoft.com/office/drawing/2014/main" id="{71B8B1D2-694D-4124-BFA6-F2C501B35109}"/>
+              </a:ext>
+            </a:extLst>
+          </p:cNvPr>
+          <p:cNvSpPr>
+            <a:spLocks noGrp="1"/>
+          </p:cNvSpPr>
+          <p:nvPr>
+            <p:ph type="title"/>
+          </p:nvPr>
+        </p:nvSpPr>
+        <p:spPr/>
+        <p:txBody>
+          <a:bodyPr/>
+          <a:lstStyle/>
+          <a:p>
+            <a:pPr marL="0" indent="0" defTabSz="360000">
+              <a:spcBef>
+                <a:spcPts val="0"/>
+              </a:spcBef>
+              <a:buNone/>
+            </a:pPr>
+            <a:r>
+              <a:rPr lang="en-US" sz="4400">
+                <a:solidFill>
+                  <a:srgbClr val="0070C0"/>
+                </a:solidFill>
+                <a:latin typeface="Consolas" panose="020B0609020204030204" pitchFamily="49" charset="0"/>
+              </a:rPr>
+              <a:t>http://localhost:8080/phoneAlert?firestation=&lt;firestation_number&gt;</a:t>
+            </a:r>
+            <a:endParaRPr lang="fr-FR" sz="4400" dirty="0">
+              <a:solidFill>
+                <a:srgbClr val="0070C0"/>
+              </a:solidFill>
+              <a:latin typeface="Consolas" panose="020B0609020204030204" pitchFamily="49" charset="0"/>
+            </a:endParaRPr>
+          </a:p>
+        </p:txBody>
+      </p:sp>
+      <p:sp>
+        <p:nvSpPr>
+          <p:cNvPr id="3" name="Espace réservé du contenu 2">
+            <a:extLst>
+              <a:ext uri="{FF2B5EF4-FFF2-40B4-BE49-F238E27FC236}">
+                <a16:creationId xmlns:a16="http://schemas.microsoft.com/office/drawing/2014/main" id="{7C9B0652-5A35-430D-A916-25405324295F}"/>
+              </a:ext>
+            </a:extLst>
+          </p:cNvPr>
+          <p:cNvSpPr>
+            <a:spLocks noGrp="1"/>
+          </p:cNvSpPr>
           <p:nvPr>
             <p:ph idx="1"/>
           </p:nvPr>
-        </p:nvPicPr>
-        <p:blipFill>
-          <a:blip r:embed="rId2"/>
-          <a:stretch>
-            <a:fillRect/>
-          </a:stretch>
-        </p:blipFill>
+        </p:nvSpPr>
         <p:spPr>
           <a:xfrm>
-            <a:off x="2609728" y="136525"/>
-            <a:ext cx="6972543" cy="3384975"/>
+            <a:off x="838200" y="1690689"/>
+            <a:ext cx="10515600" cy="4486274"/>
           </a:xfrm>
         </p:spPr>
-      </p:pic>
+        <p:txBody>
+          <a:bodyPr>
+            <a:normAutofit/>
+          </a:bodyPr>
+          <a:lstStyle/>
+          <a:p>
+            <a:pPr marL="365125" indent="-365125">
+              <a:spcAft>
+                <a:spcPts val="1200"/>
+              </a:spcAft>
+              <a:buFont typeface="Wingdings" panose="05000000000000000000" pitchFamily="2" charset="2"/>
+              <a:buChar char="Ø"/>
+            </a:pPr>
+            <a:endParaRPr lang="fr-FR"/>
+          </a:p>
+          <a:p>
+            <a:pPr marL="365125" indent="-365125">
+              <a:spcAft>
+                <a:spcPts val="1200"/>
+              </a:spcAft>
+              <a:buFont typeface="Wingdings" panose="05000000000000000000" pitchFamily="2" charset="2"/>
+              <a:buChar char="Ø"/>
+            </a:pPr>
+            <a:r>
+              <a:rPr lang="fr-FR"/>
+              <a:t>Cette </a:t>
+            </a:r>
+            <a:r>
+              <a:rPr lang="fr-FR" dirty="0"/>
+              <a:t>url doit retourner une liste des numéros de téléphone des résidents desservis par la caserne </a:t>
+            </a:r>
+            <a:r>
+              <a:rPr lang="fr-FR"/>
+              <a:t>de pompiers.</a:t>
+            </a:r>
+          </a:p>
+          <a:p>
+            <a:pPr marL="0" indent="0">
+              <a:spcAft>
+                <a:spcPts val="1200"/>
+              </a:spcAft>
+              <a:buNone/>
+            </a:pPr>
+            <a:endParaRPr lang="fr-FR"/>
+          </a:p>
+          <a:p>
+            <a:pPr marL="365125" indent="-365125">
+              <a:spcAft>
+                <a:spcPts val="1200"/>
+              </a:spcAft>
+              <a:buFont typeface="Wingdings" panose="05000000000000000000" pitchFamily="2" charset="2"/>
+              <a:buChar char="Ø"/>
+            </a:pPr>
+            <a:r>
+              <a:rPr lang="fr-FR"/>
+              <a:t>Les numéros sont distincts (pas de duplication)</a:t>
+            </a:r>
+            <a:endParaRPr lang="fr-FR" dirty="0"/>
+          </a:p>
+        </p:txBody>
+      </p:sp>
       <p:sp>
         <p:nvSpPr>
           <p:cNvPr id="4" name="Espace réservé du numéro de diapositive 3">
             <a:extLst>
               <a:ext uri="{FF2B5EF4-FFF2-40B4-BE49-F238E27FC236}">
-                <a16:creationId xmlns:a16="http://schemas.microsoft.com/office/drawing/2014/main" id="{53D6E232-C8A0-F178-9442-F5F4CFF20370}"/>
+                <a16:creationId xmlns:a16="http://schemas.microsoft.com/office/drawing/2014/main" id="{CE404544-46A4-47E3-ABC8-EAD4F49196F5}"/>
               </a:ext>
             </a:extLst>
           </p:cNvPr>
@@ -8478,47 +7888,25 @@
           <a:lstStyle/>
           <a:p>
             <a:fld id="{504562DC-6A68-4B1A-ACD4-40BBA2BD5EE0}" type="slidenum">
-              <a:rPr lang="fr-FR" smtClean="0"/>
+              <a:rPr lang="fr-FR" smtClean="0">
+                <a:solidFill>
+                  <a:schemeClr val="tx1"/>
+                </a:solidFill>
+              </a:rPr>
               <a:t>7</a:t>
             </a:fld>
-            <a:endParaRPr lang="fr-FR"/>
-          </a:p>
-        </p:txBody>
-      </p:sp>
-      <p:pic>
-        <p:nvPicPr>
-          <p:cNvPr id="8" name="Image 7">
-            <a:extLst>
-              <a:ext uri="{FF2B5EF4-FFF2-40B4-BE49-F238E27FC236}">
-                <a16:creationId xmlns:a16="http://schemas.microsoft.com/office/drawing/2014/main" id="{B2D8346C-08FC-CB4F-A42D-F550C359576E}"/>
-              </a:ext>
-            </a:extLst>
-          </p:cNvPr>
-          <p:cNvPicPr>
-            <a:picLocks noChangeAspect="1"/>
-          </p:cNvPicPr>
-          <p:nvPr/>
-        </p:nvPicPr>
-        <p:blipFill>
-          <a:blip r:embed="rId3"/>
-          <a:stretch>
-            <a:fillRect/>
-          </a:stretch>
-        </p:blipFill>
-        <p:spPr>
-          <a:xfrm>
-            <a:off x="2609728" y="3312835"/>
-            <a:ext cx="6972543" cy="3252181"/>
-          </a:xfrm>
-          <a:prstGeom prst="rect">
-            <a:avLst/>
-          </a:prstGeom>
-        </p:spPr>
-      </p:pic>
+            <a:endParaRPr lang="fr-FR" dirty="0">
+              <a:solidFill>
+                <a:schemeClr val="tx1"/>
+              </a:solidFill>
+            </a:endParaRPr>
+          </a:p>
+        </p:txBody>
+      </p:sp>
     </p:spTree>
     <p:extLst>
       <p:ext uri="{BB962C8B-B14F-4D97-AF65-F5344CB8AC3E}">
-        <p14:creationId xmlns:p14="http://schemas.microsoft.com/office/powerpoint/2010/main" val="3177366282"/>
+        <p14:creationId xmlns:p14="http://schemas.microsoft.com/office/powerpoint/2010/main" val="328954703"/>
       </p:ext>
     </p:extLst>
   </p:cSld>
@@ -8561,17 +7949,19 @@
             <p:ph type="title"/>
           </p:nvPr>
         </p:nvSpPr>
-        <p:spPr/>
-        <p:txBody>
-          <a:bodyPr/>
-          <a:lstStyle/>
-          <a:p>
-            <a:pPr marL="0" indent="0" defTabSz="360000">
-              <a:spcBef>
-                <a:spcPts val="0"/>
-              </a:spcBef>
-              <a:buNone/>
-            </a:pPr>
+        <p:spPr>
+          <a:xfrm>
+            <a:off x="838200" y="365125"/>
+            <a:ext cx="10606548" cy="1325563"/>
+          </a:xfrm>
+        </p:spPr>
+        <p:txBody>
+          <a:bodyPr>
+            <a:normAutofit fontScale="90000"/>
+          </a:bodyPr>
+          <a:lstStyle/>
+          <a:p>
+            <a:pPr algn="ctr"/>
             <a:r>
               <a:rPr lang="en-US" sz="4400">
                 <a:solidFill>
@@ -8579,14 +7969,9 @@
                 </a:solidFill>
                 <a:latin typeface="Consolas" panose="020B0609020204030204" pitchFamily="49" charset="0"/>
               </a:rPr>
-              <a:t>http://localhost:8080/phoneAlert?firestation=&lt;firestation_number&gt;</a:t>
-            </a:r>
-            <a:endParaRPr lang="fr-FR" sz="4400" dirty="0">
-              <a:solidFill>
-                <a:srgbClr val="0070C0"/>
-              </a:solidFill>
-              <a:latin typeface="Consolas" panose="020B0609020204030204" pitchFamily="49" charset="0"/>
-            </a:endParaRPr>
+              <a:t>http://localhost:8080/flood/stations?stations=&lt;a list of station_numbers&gt;</a:t>
+            </a:r>
+            <a:endParaRPr lang="fr-FR" dirty="0"/>
           </a:p>
         </p:txBody>
       </p:sp>
@@ -8641,21 +8026,8 @@
             </a:r>
             <a:r>
               <a:rPr lang="fr-FR" dirty="0"/>
-              <a:t>url doit retourner une liste des numéros de téléphone des résidents desservis par la caserne </a:t>
-            </a:r>
-            <a:r>
-              <a:rPr lang="fr-FR"/>
-              <a:t>de pompiers.</a:t>
-            </a:r>
-          </a:p>
-          <a:p>
-            <a:pPr marL="0" indent="0">
-              <a:spcAft>
-                <a:spcPts val="1200"/>
-              </a:spcAft>
-              <a:buNone/>
-            </a:pPr>
-            <a:endParaRPr lang="fr-FR"/>
+              <a:t>url doit retourner une liste de tous les foyers desservis par les casernes. Cette liste doit regrouper les personnes par adresse.</a:t>
+            </a:r>
           </a:p>
           <a:p>
             <a:pPr marL="365125" indent="-365125">
@@ -8665,9 +8037,35 @@
               <a:buFont typeface="Wingdings" panose="05000000000000000000" pitchFamily="2" charset="2"/>
               <a:buChar char="Ø"/>
             </a:pPr>
-            <a:r>
-              <a:rPr lang="fr-FR"/>
-              <a:t>Les numéros sont distincts (pas de duplication)</a:t>
+            <a:endParaRPr lang="fr-FR" dirty="0"/>
+          </a:p>
+          <a:p>
+            <a:pPr marL="365125" indent="-365125">
+              <a:spcAft>
+                <a:spcPts val="1200"/>
+              </a:spcAft>
+              <a:buFont typeface="Wingdings" panose="05000000000000000000" pitchFamily="2" charset="2"/>
+              <a:buChar char="Ø"/>
+            </a:pPr>
+            <a:r>
+              <a:rPr lang="fr-FR"/>
+              <a:t>Sont précisés, regroupés </a:t>
+            </a:r>
+            <a:r>
+              <a:rPr lang="fr-FR" dirty="0"/>
+              <a:t>par </a:t>
+            </a:r>
+            <a:r>
+              <a:rPr lang="fr-FR"/>
+              <a:t>adresse, les </a:t>
+            </a:r>
+            <a:r>
+              <a:rPr lang="fr-FR" dirty="0"/>
+              <a:t>noms, les numéros de téléphone, les âges, et les </a:t>
+            </a:r>
+            <a:r>
+              <a:rPr lang="fr-FR"/>
+              <a:t>antécédents médicaux</a:t>
             </a:r>
             <a:endParaRPr lang="fr-FR" dirty="0"/>
           </a:p>
@@ -8713,7 +8111,7 @@
     </p:spTree>
     <p:extLst>
       <p:ext uri="{BB962C8B-B14F-4D97-AF65-F5344CB8AC3E}">
-        <p14:creationId xmlns:p14="http://schemas.microsoft.com/office/powerpoint/2010/main" val="328954703"/>
+        <p14:creationId xmlns:p14="http://schemas.microsoft.com/office/powerpoint/2010/main" val="594387854"/>
       </p:ext>
     </p:extLst>
   </p:cSld>
@@ -8740,41 +8138,125 @@
           <a:chExt cx="0" cy="0"/>
         </a:xfrm>
       </p:grpSpPr>
-      <p:pic>
-        <p:nvPicPr>
-          <p:cNvPr id="6" name="Espace réservé du contenu 5">
-            <a:extLst>
-              <a:ext uri="{FF2B5EF4-FFF2-40B4-BE49-F238E27FC236}">
-                <a16:creationId xmlns:a16="http://schemas.microsoft.com/office/drawing/2014/main" id="{F2F1E6E3-225E-D891-61EE-A6E611148DB2}"/>
-              </a:ext>
-            </a:extLst>
-          </p:cNvPr>
-          <p:cNvPicPr>
-            <a:picLocks noGrp="1" noChangeAspect="1"/>
-          </p:cNvPicPr>
+      <p:sp>
+        <p:nvSpPr>
+          <p:cNvPr id="2" name="Titre 1">
+            <a:extLst>
+              <a:ext uri="{FF2B5EF4-FFF2-40B4-BE49-F238E27FC236}">
+                <a16:creationId xmlns:a16="http://schemas.microsoft.com/office/drawing/2014/main" id="{71B8B1D2-694D-4124-BFA6-F2C501B35109}"/>
+              </a:ext>
+            </a:extLst>
+          </p:cNvPr>
+          <p:cNvSpPr>
+            <a:spLocks noGrp="1"/>
+          </p:cNvSpPr>
+          <p:nvPr>
+            <p:ph type="title"/>
+          </p:nvPr>
+        </p:nvSpPr>
+        <p:spPr/>
+        <p:txBody>
+          <a:bodyPr/>
+          <a:lstStyle/>
+          <a:p>
+            <a:pPr algn="ctr"/>
+            <a:r>
+              <a:rPr lang="en-US" sz="4400">
+                <a:solidFill>
+                  <a:srgbClr val="0070C0"/>
+                </a:solidFill>
+                <a:latin typeface="Consolas" panose="020B0609020204030204" pitchFamily="49" charset="0"/>
+              </a:rPr>
+              <a:t>http://localhost:8080/childAlert?address=&lt;address&gt;</a:t>
+            </a:r>
+            <a:endParaRPr lang="fr-FR" dirty="0"/>
+          </a:p>
+        </p:txBody>
+      </p:sp>
+      <p:sp>
+        <p:nvSpPr>
+          <p:cNvPr id="3" name="Espace réservé du contenu 2">
+            <a:extLst>
+              <a:ext uri="{FF2B5EF4-FFF2-40B4-BE49-F238E27FC236}">
+                <a16:creationId xmlns:a16="http://schemas.microsoft.com/office/drawing/2014/main" id="{7C9B0652-5A35-430D-A916-25405324295F}"/>
+              </a:ext>
+            </a:extLst>
+          </p:cNvPr>
+          <p:cNvSpPr>
+            <a:spLocks noGrp="1"/>
+          </p:cNvSpPr>
           <p:nvPr>
             <p:ph idx="1"/>
           </p:nvPr>
-        </p:nvPicPr>
-        <p:blipFill>
-          <a:blip r:embed="rId2"/>
-          <a:stretch>
-            <a:fillRect/>
-          </a:stretch>
-        </p:blipFill>
+        </p:nvSpPr>
         <p:spPr>
           <a:xfrm>
-            <a:off x="1821917" y="522415"/>
-            <a:ext cx="8548165" cy="5813169"/>
+            <a:off x="163774" y="1690688"/>
+            <a:ext cx="12028226" cy="4665662"/>
           </a:xfrm>
         </p:spPr>
-      </p:pic>
+        <p:txBody>
+          <a:bodyPr>
+            <a:normAutofit/>
+          </a:bodyPr>
+          <a:lstStyle/>
+          <a:p>
+            <a:pPr marL="365125" indent="-365125">
+              <a:spcAft>
+                <a:spcPts val="1200"/>
+              </a:spcAft>
+              <a:buFont typeface="Wingdings" panose="05000000000000000000" pitchFamily="2" charset="2"/>
+              <a:buChar char="Ø"/>
+            </a:pPr>
+            <a:endParaRPr lang="fr-FR"/>
+          </a:p>
+          <a:p>
+            <a:pPr marL="365125" indent="-365125">
+              <a:spcAft>
+                <a:spcPts val="1200"/>
+              </a:spcAft>
+              <a:buFont typeface="Wingdings" panose="05000000000000000000" pitchFamily="2" charset="2"/>
+              <a:buChar char="Ø"/>
+            </a:pPr>
+            <a:r>
+              <a:rPr lang="fr-FR"/>
+              <a:t>Cette url doit retourner une liste d'enfants (âge &lt;= 18 ans) habitant à cette adresse.</a:t>
+            </a:r>
+          </a:p>
+          <a:p>
+            <a:pPr marL="365125" indent="-365125">
+              <a:spcAft>
+                <a:spcPts val="1200"/>
+              </a:spcAft>
+              <a:buFont typeface="Wingdings" panose="05000000000000000000" pitchFamily="2" charset="2"/>
+              <a:buChar char="Ø"/>
+            </a:pPr>
+            <a:r>
+              <a:rPr lang="fr-FR"/>
+              <a:t>S'il n'y a pas d'enfant, cette url peut renvoyer une chaîne vide</a:t>
+            </a:r>
+          </a:p>
+          <a:p>
+            <a:pPr marL="365125" indent="-365125">
+              <a:spcAft>
+                <a:spcPts val="1200"/>
+              </a:spcAft>
+              <a:buFont typeface="Wingdings" panose="05000000000000000000" pitchFamily="2" charset="2"/>
+              <a:buChar char="Ø"/>
+            </a:pPr>
+            <a:r>
+              <a:rPr lang="fr-FR"/>
+              <a:t>Sont précisés par enfant : prénom, nom, âge, liste des adultes</a:t>
+            </a:r>
+          </a:p>
+        </p:txBody>
+      </p:sp>
       <p:sp>
         <p:nvSpPr>
           <p:cNvPr id="4" name="Espace réservé du numéro de diapositive 3">
             <a:extLst>
               <a:ext uri="{FF2B5EF4-FFF2-40B4-BE49-F238E27FC236}">
-                <a16:creationId xmlns:a16="http://schemas.microsoft.com/office/drawing/2014/main" id="{487A0642-572E-5770-1E39-5D780E10D729}"/>
+                <a16:creationId xmlns:a16="http://schemas.microsoft.com/office/drawing/2014/main" id="{CE404544-46A4-47E3-ABC8-EAD4F49196F5}"/>
               </a:ext>
             </a:extLst>
           </p:cNvPr>
@@ -8791,17 +8273,25 @@
           <a:lstStyle/>
           <a:p>
             <a:fld id="{504562DC-6A68-4B1A-ACD4-40BBA2BD5EE0}" type="slidenum">
-              <a:rPr lang="fr-FR" smtClean="0"/>
+              <a:rPr lang="fr-FR" smtClean="0">
+                <a:solidFill>
+                  <a:schemeClr val="tx1"/>
+                </a:solidFill>
+              </a:rPr>
               <a:t>9</a:t>
             </a:fld>
-            <a:endParaRPr lang="fr-FR"/>
+            <a:endParaRPr lang="fr-FR" dirty="0">
+              <a:solidFill>
+                <a:schemeClr val="tx1"/>
+              </a:solidFill>
+            </a:endParaRPr>
           </a:p>
         </p:txBody>
       </p:sp>
     </p:spTree>
     <p:extLst>
       <p:ext uri="{BB962C8B-B14F-4D97-AF65-F5344CB8AC3E}">
-        <p14:creationId xmlns:p14="http://schemas.microsoft.com/office/powerpoint/2010/main" val="1927076353"/>
+        <p14:creationId xmlns:p14="http://schemas.microsoft.com/office/powerpoint/2010/main" val="2679787578"/>
       </p:ext>
     </p:extLst>
   </p:cSld>

</xml_diff>